<commit_message>
[PublicEngagement] Edited Powerpoint colour scheme
</commit_message>
<xml_diff>
--- a/Documents/Public Engagement/PublicEngagementActivity.pptx
+++ b/Documents/Public Engagement/PublicEngagementActivity.pptx
@@ -5,10 +5,10 @@
     <p:sldMasterId id="2147483666" r:id="rId4"/>
   </p:sldMasterIdLst>
   <p:notesMasterIdLst>
-    <p:notesMasterId r:id="rId16"/>
+    <p:notesMasterId r:id="rId17"/>
   </p:notesMasterIdLst>
   <p:handoutMasterIdLst>
-    <p:handoutMasterId r:id="rId17"/>
+    <p:handoutMasterId r:id="rId18"/>
   </p:handoutMasterIdLst>
   <p:sldIdLst>
     <p:sldId id="256" r:id="rId5"/>
@@ -16,12 +16,13 @@
     <p:sldId id="261" r:id="rId7"/>
     <p:sldId id="262" r:id="rId8"/>
     <p:sldId id="289" r:id="rId9"/>
-    <p:sldId id="264" r:id="rId10"/>
-    <p:sldId id="258" r:id="rId11"/>
-    <p:sldId id="278" r:id="rId12"/>
-    <p:sldId id="266" r:id="rId13"/>
-    <p:sldId id="275" r:id="rId14"/>
-    <p:sldId id="276" r:id="rId15"/>
+    <p:sldId id="290" r:id="rId10"/>
+    <p:sldId id="264" r:id="rId11"/>
+    <p:sldId id="258" r:id="rId12"/>
+    <p:sldId id="278" r:id="rId13"/>
+    <p:sldId id="266" r:id="rId14"/>
+    <p:sldId id="275" r:id="rId15"/>
+    <p:sldId id="276" r:id="rId16"/>
   </p:sldIdLst>
   <p:sldSz cx="12192000" cy="6858000"/>
   <p:notesSz cx="6858000" cy="9144000"/>
@@ -250,7 +251,7 @@
             <a:pPr rtl="0"/>
             <a:fld id="{4245C065-7973-41A8-A2CC-441A8BA3384C}" type="datetime1">
               <a:rPr lang="en-GB" smtClean="0"/>
-              <a:t>15/02/2025</a:t>
+              <a:t>20/02/2025</a:t>
             </a:fld>
             <a:endParaRPr lang="en-GB"/>
           </a:p>
@@ -432,7 +433,7 @@
             <a:fld id="{A087A586-3225-45EC-B90F-43F9676D14C2}" type="datetime1">
               <a:rPr lang="en-GB" smtClean="0"/>
               <a:pPr/>
-              <a:t>15/02/2025</a:t>
+              <a:t>20/02/2025</a:t>
             </a:fld>
             <a:endParaRPr lang="en-GB" dirty="0"/>
           </a:p>
@@ -832,57 +833,38 @@
           <a:bodyPr/>
           <a:lstStyle/>
           <a:p>
-            <a:pPr marL="0" marR="0" lvl="0" indent="0" algn="l" defTabSz="914400" rtl="0" eaLnBrk="1" fontAlgn="auto" latinLnBrk="0" hangingPunct="1">
-              <a:lnSpc>
-                <a:spcPct val="100000"/>
-              </a:lnSpc>
-              <a:spcBef>
-                <a:spcPts val="0"/>
-              </a:spcBef>
-              <a:spcAft>
-                <a:spcPts val="0"/>
-              </a:spcAft>
-              <a:buClrTx/>
-              <a:buSzTx/>
-              <a:buFontTx/>
-              <a:buNone/>
-              <a:tabLst/>
-              <a:defRPr/>
-            </a:pPr>
             <a:r>
               <a:rPr lang="en-US" dirty="0"/>
-              <a:t>Looking ahead, the next steps involve completing the implementation of all approximate arithmetic units and integrating them into the RISC-V SoC.</a:t>
+              <a:t>Comparing the progress against the initial aims and objectives:</a:t>
             </a:r>
             <a:br>
               <a:rPr lang="en-US" dirty="0"/>
             </a:br>
             <a:r>
               <a:rPr lang="en-US" dirty="0"/>
-              <a:t>Once integrated, extensive testing will be conducted to evaluate power consumption, processing speed, and accuracy.</a:t>
+              <a:t>We have successfully established a benchmark with the pipelined MAC unit and completed the conceptual design of the AAUD.</a:t>
             </a:r>
             <a:br>
               <a:rPr lang="en-US" dirty="0"/>
             </a:br>
             <a:r>
               <a:rPr lang="en-US" dirty="0"/>
-              <a:t>The results will then be compared to traditional MAC units to assess the trade-offs made by using approximate computing.</a:t>
+              <a:t>Partial implementation of approximate multipliers and adders is ongoing, and initial results are promising.</a:t>
             </a:r>
             <a:br>
               <a:rPr lang="en-US" dirty="0"/>
             </a:br>
             <a:r>
               <a:rPr lang="en-US" dirty="0"/>
-              <a:t>In the long term, this project aims to explore additional approximation methods for further optimizations.</a:t>
+              <a:t>However, we still need to complete the integration of all approximation techniques and conduct comprehensive testing for power, speed, and accuracy.</a:t>
             </a:r>
             <a:br>
               <a:rPr lang="en-US" dirty="0"/>
             </a:br>
             <a:r>
               <a:rPr lang="en-US" dirty="0"/>
-              <a:t>There is also potential to expand this approach to other error-tolerant domains, such as machine learning and data analytics.</a:t>
-            </a:r>
-          </a:p>
-          <a:p>
+              <a:t>This comparison helps us identify gaps and guides our next steps to achieve the project’s full potential.</a:t>
+            </a:r>
             <a:endParaRPr lang="en-GB" dirty="0"/>
           </a:p>
         </p:txBody>
@@ -914,7 +896,7 @@
     </p:spTree>
     <p:extLst>
       <p:ext uri="{BB962C8B-B14F-4D97-AF65-F5344CB8AC3E}">
-        <p14:creationId xmlns:p14="http://schemas.microsoft.com/office/powerpoint/2010/main" val="3772094516"/>
+        <p14:creationId xmlns:p14="http://schemas.microsoft.com/office/powerpoint/2010/main" val="2281875323"/>
       </p:ext>
     </p:extLst>
   </p:cSld>
@@ -968,31 +950,57 @@
           <a:bodyPr/>
           <a:lstStyle/>
           <a:p>
+            <a:pPr marL="0" marR="0" lvl="0" indent="0" algn="l" defTabSz="914400" rtl="0" eaLnBrk="1" fontAlgn="auto" latinLnBrk="0" hangingPunct="1">
+              <a:lnSpc>
+                <a:spcPct val="100000"/>
+              </a:lnSpc>
+              <a:spcBef>
+                <a:spcPts val="0"/>
+              </a:spcBef>
+              <a:spcAft>
+                <a:spcPts val="0"/>
+              </a:spcAft>
+              <a:buClrTx/>
+              <a:buSzTx/>
+              <a:buFontTx/>
+              <a:buNone/>
+              <a:tabLst/>
+              <a:defRPr/>
+            </a:pPr>
             <a:r>
               <a:rPr lang="en-US" dirty="0"/>
-              <a:t>In conclusion, approximate computing offers a strategic solution to the growing demands for high-performance and energy-efficient computing.</a:t>
+              <a:t>Looking ahead, the next steps involve completing the implementation of all approximate arithmetic units and integrating them into the RISC-V SoC.</a:t>
             </a:r>
             <a:br>
               <a:rPr lang="en-US" dirty="0"/>
             </a:br>
             <a:r>
               <a:rPr lang="en-US" dirty="0"/>
-              <a:t>By allowing controlled inaccuracies, it balances efficiency with acceptable error rates, making it ideal for error-tolerant applications like image processing.</a:t>
+              <a:t>Once integrated, extensive testing will be conducted to evaluate power consumption, processing speed, and accuracy.</a:t>
             </a:r>
             <a:br>
               <a:rPr lang="en-US" dirty="0"/>
             </a:br>
             <a:r>
               <a:rPr lang="en-US" dirty="0"/>
-              <a:t>This project demonstrates the potential of integrating approximate arithmetic units into RISC-V SoC, significantly improving performance and power efficiency.</a:t>
+              <a:t>The results will then be compared to traditional MAC units to assess the trade-offs made by using approximate computing.</a:t>
             </a:r>
             <a:br>
               <a:rPr lang="en-US" dirty="0"/>
             </a:br>
             <a:r>
               <a:rPr lang="en-US" dirty="0"/>
-              <a:t>Moving forward, the successful implementation and testing of this design could pave the way for a new generation of energy-efficient digital systems.</a:t>
-            </a:r>
+              <a:t>In the long term, this project aims to explore additional approximation methods for further optimizations.</a:t>
+            </a:r>
+            <a:br>
+              <a:rPr lang="en-US" dirty="0"/>
+            </a:br>
+            <a:r>
+              <a:rPr lang="en-US" dirty="0"/>
+              <a:t>There is also potential to expand this approach to other error-tolerant domains, such as machine learning and data analytics.</a:t>
+            </a:r>
+          </a:p>
+          <a:p>
             <a:endParaRPr lang="en-GB" dirty="0"/>
           </a:p>
         </p:txBody>
@@ -1016,6 +1024,116 @@
             <a:fld id="{D4B9A9E5-4F7F-4A7D-9DE1-899232329269}" type="slidenum">
               <a:rPr lang="en-GB" smtClean="0"/>
               <a:t>11</a:t>
+            </a:fld>
+            <a:endParaRPr lang="en-GB"/>
+          </a:p>
+        </p:txBody>
+      </p:sp>
+    </p:spTree>
+    <p:extLst>
+      <p:ext uri="{BB962C8B-B14F-4D97-AF65-F5344CB8AC3E}">
+        <p14:creationId xmlns:p14="http://schemas.microsoft.com/office/powerpoint/2010/main" val="3772094516"/>
+      </p:ext>
+    </p:extLst>
+  </p:cSld>
+  <p:clrMapOvr>
+    <a:masterClrMapping/>
+  </p:clrMapOvr>
+</p:notes>
+</file>
+
+<file path=ppt/notesSlides/notesSlide12.xml><?xml version="1.0" encoding="utf-8"?>
+<p:notes xmlns:a="http://schemas.openxmlformats.org/drawingml/2006/main" xmlns:r="http://schemas.openxmlformats.org/officeDocument/2006/relationships" xmlns:p="http://schemas.openxmlformats.org/presentationml/2006/main">
+  <p:cSld>
+    <p:spTree>
+      <p:nvGrpSpPr>
+        <p:cNvPr id="1" name=""/>
+        <p:cNvGrpSpPr/>
+        <p:nvPr/>
+      </p:nvGrpSpPr>
+      <p:grpSpPr>
+        <a:xfrm>
+          <a:off x="0" y="0"/>
+          <a:ext cx="0" cy="0"/>
+          <a:chOff x="0" y="0"/>
+          <a:chExt cx="0" cy="0"/>
+        </a:xfrm>
+      </p:grpSpPr>
+      <p:sp>
+        <p:nvSpPr>
+          <p:cNvPr id="2" name="Slide Image Placeholder 1"/>
+          <p:cNvSpPr>
+            <a:spLocks noGrp="1" noRot="1" noChangeAspect="1"/>
+          </p:cNvSpPr>
+          <p:nvPr>
+            <p:ph type="sldImg"/>
+          </p:nvPr>
+        </p:nvSpPr>
+        <p:spPr/>
+      </p:sp>
+      <p:sp>
+        <p:nvSpPr>
+          <p:cNvPr id="3" name="Notes Placeholder 2"/>
+          <p:cNvSpPr>
+            <a:spLocks noGrp="1"/>
+          </p:cNvSpPr>
+          <p:nvPr>
+            <p:ph type="body" idx="1"/>
+          </p:nvPr>
+        </p:nvSpPr>
+        <p:spPr/>
+        <p:txBody>
+          <a:bodyPr/>
+          <a:lstStyle/>
+          <a:p>
+            <a:r>
+              <a:rPr lang="en-US" dirty="0"/>
+              <a:t>In conclusion, approximate computing offers a strategic solution to the growing demands for high-performance and energy-efficient computing.</a:t>
+            </a:r>
+            <a:br>
+              <a:rPr lang="en-US" dirty="0"/>
+            </a:br>
+            <a:r>
+              <a:rPr lang="en-US" dirty="0"/>
+              <a:t>By allowing controlled inaccuracies, it balances efficiency with acceptable error rates, making it ideal for error-tolerant applications like image processing.</a:t>
+            </a:r>
+            <a:br>
+              <a:rPr lang="en-US" dirty="0"/>
+            </a:br>
+            <a:r>
+              <a:rPr lang="en-US" dirty="0"/>
+              <a:t>This project demonstrates the potential of integrating approximate arithmetic units into RISC-V SoC, significantly improving performance and power efficiency.</a:t>
+            </a:r>
+            <a:br>
+              <a:rPr lang="en-US" dirty="0"/>
+            </a:br>
+            <a:r>
+              <a:rPr lang="en-US" dirty="0"/>
+              <a:t>Moving forward, the successful implementation and testing of this design could pave the way for a new generation of energy-efficient digital systems.</a:t>
+            </a:r>
+            <a:endParaRPr lang="en-GB" dirty="0"/>
+          </a:p>
+        </p:txBody>
+      </p:sp>
+      <p:sp>
+        <p:nvSpPr>
+          <p:cNvPr id="4" name="Slide Number Placeholder 3"/>
+          <p:cNvSpPr>
+            <a:spLocks noGrp="1"/>
+          </p:cNvSpPr>
+          <p:nvPr>
+            <p:ph type="sldNum" sz="quarter" idx="5"/>
+          </p:nvPr>
+        </p:nvSpPr>
+        <p:spPr/>
+        <p:txBody>
+          <a:bodyPr/>
+          <a:lstStyle/>
+          <a:p>
+            <a:pPr rtl="0"/>
+            <a:fld id="{D4B9A9E5-4F7F-4A7D-9DE1-899232329269}" type="slidenum">
+              <a:rPr lang="en-GB" smtClean="0"/>
+              <a:t>12</a:t>
             </a:fld>
             <a:endParaRPr lang="en-GB"/>
           </a:p>
@@ -1534,7 +1652,13 @@
   <p:cSld>
     <p:spTree>
       <p:nvGrpSpPr>
-        <p:cNvPr id="1" name=""/>
+        <p:cNvPr id="1" name="">
+          <a:extLst>
+            <a:ext uri="{FF2B5EF4-FFF2-40B4-BE49-F238E27FC236}">
+              <a16:creationId xmlns:a16="http://schemas.microsoft.com/office/drawing/2014/main" id="{2D6E5DFA-DFAD-9132-1DD6-DCC08503B8B2}"/>
+            </a:ext>
+          </a:extLst>
+        </p:cNvPr>
         <p:cNvGrpSpPr/>
         <p:nvPr/>
       </p:nvGrpSpPr>
@@ -1548,7 +1672,13 @@
       </p:grpSpPr>
       <p:sp>
         <p:nvSpPr>
-          <p:cNvPr id="2" name="Slide Image Placeholder 1"/>
+          <p:cNvPr id="2" name="Slide Image Placeholder 1">
+            <a:extLst>
+              <a:ext uri="{FF2B5EF4-FFF2-40B4-BE49-F238E27FC236}">
+                <a16:creationId xmlns:a16="http://schemas.microsoft.com/office/drawing/2014/main" id="{EA309CE0-585A-2530-CFCB-D59130D26667}"/>
+              </a:ext>
+            </a:extLst>
+          </p:cNvPr>
           <p:cNvSpPr>
             <a:spLocks noGrp="1" noRot="1" noChangeAspect="1"/>
           </p:cNvSpPr>
@@ -1560,7 +1690,13 @@
       </p:sp>
       <p:sp>
         <p:nvSpPr>
-          <p:cNvPr id="3" name="Notes Placeholder 2"/>
+          <p:cNvPr id="3" name="Notes Placeholder 2">
+            <a:extLst>
+              <a:ext uri="{FF2B5EF4-FFF2-40B4-BE49-F238E27FC236}">
+                <a16:creationId xmlns:a16="http://schemas.microsoft.com/office/drawing/2014/main" id="{34482E8B-DF2C-3088-7C34-9C54357F49C7}"/>
+              </a:ext>
+            </a:extLst>
+          </p:cNvPr>
           <p:cNvSpPr>
             <a:spLocks noGrp="1"/>
           </p:cNvSpPr>
@@ -1575,36 +1711,14 @@
           <a:p>
             <a:r>
               <a:rPr lang="en-US" dirty="0"/>
-              <a:t>This project specifically addresses the challenge of balancing accuracy, power consumption, and speed in arithmetic units.</a:t>
+              <a:t>The primary aim of this project is to design and implement a 32-bit Multiply-Accumulate (MAC) unit using approximate computing techniques for integration into a RISC-V SoC.</a:t>
             </a:r>
             <a:br>
               <a:rPr lang="en-US" dirty="0"/>
             </a:br>
             <a:r>
               <a:rPr lang="en-US" dirty="0"/>
-              <a:t>In this context, we’re working within the RISC-V SoC framework using the Nexys-A7 FPGA and Xilinx </a:t>
-            </a:r>
-            <a:r>
-              <a:rPr lang="en-US" dirty="0" err="1"/>
-              <a:t>Vivado</a:t>
-            </a:r>
-            <a:r>
-              <a:rPr lang="en-US" dirty="0"/>
-              <a:t> Design Suite for simulations and testing.</a:t>
-            </a:r>
-            <a:br>
-              <a:rPr lang="en-US" dirty="0"/>
-            </a:br>
-            <a:r>
-              <a:rPr lang="en-US" dirty="0"/>
-              <a:t>The goal is to achieve enhanced computational efficiency while maintaining minimal accuracy loss.</a:t>
-            </a:r>
-            <a:br>
-              <a:rPr lang="en-US" dirty="0"/>
-            </a:br>
-            <a:r>
-              <a:rPr lang="en-US" dirty="0"/>
-              <a:t>To do this, we are implementing three key techniques:</a:t>
+              <a:t>To achieve this, the project follows several specific objectives:</a:t>
             </a:r>
           </a:p>
           <a:p>
@@ -1614,7 +1728,7 @@
             </a:pPr>
             <a:r>
               <a:rPr lang="en-US" dirty="0"/>
-              <a:t>Lower-Part OR-based Approximate Multipliers for faster partial product calculations.</a:t>
+              <a:t>Conduct a comprehensive literature review to select suitable approximation methods.</a:t>
             </a:r>
           </a:p>
           <a:p>
@@ -1624,7 +1738,7 @@
             </a:pPr>
             <a:r>
               <a:rPr lang="en-US" dirty="0"/>
-              <a:t>Approximate Adders to accumulate results efficiently.</a:t>
+              <a:t>Design and simulate the MAC unit using Verilog and test it on FPGA hardware.</a:t>
             </a:r>
           </a:p>
           <a:p>
@@ -1634,22 +1748,17 @@
             </a:pPr>
             <a:r>
               <a:rPr lang="en-US" dirty="0"/>
-              <a:t>Fuzzy </a:t>
-            </a:r>
-            <a:r>
-              <a:rPr lang="en-US" dirty="0" err="1"/>
-              <a:t>Memoization</a:t>
-            </a:r>
+              <a:t>Integrate the MAC unit into the RISC-V SoC framework, ensuring compatibility and functionality.</a:t>
+            </a:r>
+          </a:p>
+          <a:p>
+            <a:pPr>
+              <a:buFont typeface="+mj-lt"/>
+              <a:buAutoNum type="arabicPeriod"/>
+            </a:pPr>
             <a:r>
               <a:rPr lang="en-US" dirty="0"/>
-              <a:t> to cache and reuse results in repetitive calculations, reducing redundant computations.</a:t>
-            </a:r>
-            <a:br>
-              <a:rPr lang="en-US" dirty="0"/>
-            </a:br>
-            <a:r>
-              <a:rPr lang="en-US" dirty="0"/>
-              <a:t>Together, these techniques form a powerful combination for building efficient, error-tolerant arithmetic units.</a:t>
+              <a:t>Finally, evaluate its performance, power consumption, and accuracy against traditional designs to measure the trade-off between efficiency and precision.</a:t>
             </a:r>
           </a:p>
           <a:p>
@@ -1659,7 +1768,13 @@
       </p:sp>
       <p:sp>
         <p:nvSpPr>
-          <p:cNvPr id="4" name="Slide Number Placeholder 3"/>
+          <p:cNvPr id="4" name="Slide Number Placeholder 3">
+            <a:extLst>
+              <a:ext uri="{FF2B5EF4-FFF2-40B4-BE49-F238E27FC236}">
+                <a16:creationId xmlns:a16="http://schemas.microsoft.com/office/drawing/2014/main" id="{10F290E1-03AE-4A7E-70AC-9E49ACD7C259}"/>
+              </a:ext>
+            </a:extLst>
+          </p:cNvPr>
           <p:cNvSpPr>
             <a:spLocks noGrp="1"/>
           </p:cNvSpPr>
@@ -1684,7 +1799,7 @@
     </p:spTree>
     <p:extLst>
       <p:ext uri="{BB962C8B-B14F-4D97-AF65-F5344CB8AC3E}">
-        <p14:creationId xmlns:p14="http://schemas.microsoft.com/office/powerpoint/2010/main" val="2063318680"/>
+        <p14:creationId xmlns:p14="http://schemas.microsoft.com/office/powerpoint/2010/main" val="3774989527"/>
       </p:ext>
     </p:extLst>
   </p:cSld>
@@ -1740,36 +1855,84 @@
           <a:p>
             <a:r>
               <a:rPr lang="en-US" dirty="0"/>
-              <a:t>So far, significant technical progress has been made.</a:t>
+              <a:t>This project specifically addresses the challenge of balancing accuracy, power consumption, and speed in arithmetic units.</a:t>
             </a:r>
             <a:br>
               <a:rPr lang="en-US" dirty="0"/>
             </a:br>
             <a:r>
               <a:rPr lang="en-US" dirty="0"/>
-              <a:t>We began by implementing and testing a pipelined MAC unit on FPGA, which serves as a benchmark to measure the improvements made by the approximate designs.</a:t>
+              <a:t>In this context, we’re working within the RISC-V SoC framework using the Nexys-A7 FPGA and Xilinx </a:t>
+            </a:r>
+            <a:r>
+              <a:rPr lang="en-US" dirty="0" err="1"/>
+              <a:t>Vivado</a:t>
+            </a:r>
+            <a:r>
+              <a:rPr lang="en-US" dirty="0"/>
+              <a:t> Design Suite for simulations and testing.</a:t>
             </a:r>
             <a:br>
               <a:rPr lang="en-US" dirty="0"/>
             </a:br>
             <a:r>
               <a:rPr lang="en-US" dirty="0"/>
-              <a:t>Following this, the conceptual design of the Approximate Arithmetic Unit Design (AAUD) was completed, and initial implementation of approximate multipliers and adders is underway.</a:t>
+              <a:t>The goal is to achieve enhanced computational efficiency while maintaining minimal accuracy loss.</a:t>
             </a:r>
             <a:br>
               <a:rPr lang="en-US" dirty="0"/>
             </a:br>
             <a:r>
               <a:rPr lang="en-US" dirty="0"/>
-              <a:t>Preliminary results show that the pipelined MAC unit achieves promising throughput and power efficiency.</a:t>
+              <a:t>To do this, we are implementing three key techniques:</a:t>
+            </a:r>
+          </a:p>
+          <a:p>
+            <a:pPr>
+              <a:buFont typeface="+mj-lt"/>
+              <a:buAutoNum type="arabicPeriod"/>
+            </a:pPr>
+            <a:r>
+              <a:rPr lang="en-US" dirty="0"/>
+              <a:t>Lower-Part OR-based Approximate Multipliers for faster partial product calculations.</a:t>
+            </a:r>
+          </a:p>
+          <a:p>
+            <a:pPr>
+              <a:buFont typeface="+mj-lt"/>
+              <a:buAutoNum type="arabicPeriod"/>
+            </a:pPr>
+            <a:r>
+              <a:rPr lang="en-US" dirty="0"/>
+              <a:t>Approximate Adders to accumulate results efficiently.</a:t>
+            </a:r>
+          </a:p>
+          <a:p>
+            <a:pPr>
+              <a:buFont typeface="+mj-lt"/>
+              <a:buAutoNum type="arabicPeriod"/>
+            </a:pPr>
+            <a:r>
+              <a:rPr lang="en-US" dirty="0"/>
+              <a:t>Fuzzy </a:t>
+            </a:r>
+            <a:r>
+              <a:rPr lang="en-US" dirty="0" err="1"/>
+              <a:t>Memoization</a:t>
+            </a:r>
+            <a:r>
+              <a:rPr lang="en-US" dirty="0"/>
+              <a:t> to cache and reuse results in repetitive calculations, reducing redundant computations.</a:t>
             </a:r>
             <a:br>
               <a:rPr lang="en-US" dirty="0"/>
             </a:br>
             <a:r>
               <a:rPr lang="en-US" dirty="0"/>
-              <a:t>However, we are continuously refining the design to fully integrate the approximation techniques for better performance.</a:t>
-            </a:r>
+              <a:t>Together, these techniques form a powerful combination for building efficient, error-tolerant arithmetic units.</a:t>
+            </a:r>
+          </a:p>
+          <a:p>
             <a:endParaRPr lang="en-GB" dirty="0"/>
           </a:p>
         </p:txBody>
@@ -1801,7 +1964,7 @@
     </p:spTree>
     <p:extLst>
       <p:ext uri="{BB962C8B-B14F-4D97-AF65-F5344CB8AC3E}">
-        <p14:creationId xmlns:p14="http://schemas.microsoft.com/office/powerpoint/2010/main" val="72864625"/>
+        <p14:creationId xmlns:p14="http://schemas.microsoft.com/office/powerpoint/2010/main" val="2063318680"/>
       </p:ext>
     </p:extLst>
   </p:cSld>
@@ -1857,43 +2020,35 @@
           <a:p>
             <a:r>
               <a:rPr lang="en-US" dirty="0"/>
-              <a:t>The key finding so far is the trade-off between accuracy and efficiency.</a:t>
+              <a:t>So far, significant technical progress has been made.</a:t>
             </a:r>
             <a:br>
               <a:rPr lang="en-US" dirty="0"/>
             </a:br>
             <a:r>
               <a:rPr lang="en-US" dirty="0"/>
-              <a:t>By introducing controlled errors, we can significantly reduce power consumption and increase speed.</a:t>
+              <a:t>We began by implementing and testing a pipelined MAC unit on FPGA, which serves as a benchmark to measure the improvements made by the approximate designs.</a:t>
             </a:r>
             <a:br>
               <a:rPr lang="en-US" dirty="0"/>
             </a:br>
             <a:r>
               <a:rPr lang="en-US" dirty="0"/>
-              <a:t>Fuzzy </a:t>
-            </a:r>
-            <a:r>
-              <a:rPr lang="en-US" dirty="0" err="1"/>
-              <a:t>memoization</a:t>
-            </a:r>
-            <a:r>
-              <a:rPr lang="en-US" dirty="0"/>
-              <a:t>, in particular, has shown great potential in reducing redundant calculations in image processing tasks.</a:t>
+              <a:t>Following this, the conceptual design of the Approximate Arithmetic Unit Design (AAUD) was completed, and initial implementation of approximate multipliers and adders is underway.</a:t>
             </a:r>
             <a:br>
               <a:rPr lang="en-US" dirty="0"/>
             </a:br>
             <a:r>
               <a:rPr lang="en-US" dirty="0"/>
-              <a:t>The significance of this project lies in its ability to create scalable, energy-efficient arithmetic units.</a:t>
+              <a:t>Preliminary results show that the pipelined MAC unit achieves promising throughput and power efficiency.</a:t>
             </a:r>
             <a:br>
               <a:rPr lang="en-US" dirty="0"/>
             </a:br>
             <a:r>
               <a:rPr lang="en-US" dirty="0"/>
-              <a:t>It provides a solution to the limitations of traditional computing scaling methods and paves the way for more efficient digital systems.</a:t>
+              <a:t>However, we are continuously refining the design to fully integrate the approximation techniques for better performance.</a:t>
             </a:r>
             <a:endParaRPr lang="en-GB" dirty="0"/>
           </a:p>
@@ -1926,7 +2081,7 @@
     </p:spTree>
     <p:extLst>
       <p:ext uri="{BB962C8B-B14F-4D97-AF65-F5344CB8AC3E}">
-        <p14:creationId xmlns:p14="http://schemas.microsoft.com/office/powerpoint/2010/main" val="277097546"/>
+        <p14:creationId xmlns:p14="http://schemas.microsoft.com/office/powerpoint/2010/main" val="72864625"/>
       </p:ext>
     </p:extLst>
   </p:cSld>
@@ -1982,35 +2137,43 @@
           <a:p>
             <a:r>
               <a:rPr lang="en-US" dirty="0"/>
-              <a:t>Comparing the progress against the initial aims and objectives:</a:t>
+              <a:t>The key finding so far is the trade-off between accuracy and efficiency.</a:t>
             </a:r>
             <a:br>
               <a:rPr lang="en-US" dirty="0"/>
             </a:br>
             <a:r>
               <a:rPr lang="en-US" dirty="0"/>
-              <a:t>We have successfully established a benchmark with the pipelined MAC unit and completed the conceptual design of the AAUD.</a:t>
+              <a:t>By introducing controlled errors, we can significantly reduce power consumption and increase speed.</a:t>
             </a:r>
             <a:br>
               <a:rPr lang="en-US" dirty="0"/>
             </a:br>
             <a:r>
               <a:rPr lang="en-US" dirty="0"/>
-              <a:t>Partial implementation of approximate multipliers and adders is ongoing, and initial results are promising.</a:t>
+              <a:t>Fuzzy </a:t>
+            </a:r>
+            <a:r>
+              <a:rPr lang="en-US" dirty="0" err="1"/>
+              <a:t>memoization</a:t>
+            </a:r>
+            <a:r>
+              <a:rPr lang="en-US" dirty="0"/>
+              <a:t>, in particular, has shown great potential in reducing redundant calculations in image processing tasks.</a:t>
             </a:r>
             <a:br>
               <a:rPr lang="en-US" dirty="0"/>
             </a:br>
             <a:r>
               <a:rPr lang="en-US" dirty="0"/>
-              <a:t>However, we still need to complete the integration of all approximation techniques and conduct comprehensive testing for power, speed, and accuracy.</a:t>
+              <a:t>The significance of this project lies in its ability to create scalable, energy-efficient arithmetic units.</a:t>
             </a:r>
             <a:br>
               <a:rPr lang="en-US" dirty="0"/>
             </a:br>
             <a:r>
               <a:rPr lang="en-US" dirty="0"/>
-              <a:t>This comparison helps us identify gaps and guides our next steps to achieve the project’s full potential.</a:t>
+              <a:t>It provides a solution to the limitations of traditional computing scaling methods and paves the way for more efficient digital systems.</a:t>
             </a:r>
             <a:endParaRPr lang="en-GB" dirty="0"/>
           </a:p>
@@ -2043,7 +2206,7 @@
     </p:spTree>
     <p:extLst>
       <p:ext uri="{BB962C8B-B14F-4D97-AF65-F5344CB8AC3E}">
-        <p14:creationId xmlns:p14="http://schemas.microsoft.com/office/powerpoint/2010/main" val="2281875323"/>
+        <p14:creationId xmlns:p14="http://schemas.microsoft.com/office/powerpoint/2010/main" val="277097546"/>
       </p:ext>
     </p:extLst>
   </p:cSld>
@@ -17103,7 +17266,7 @@
           <p:cNvPr id="2" name="Title 1">
             <a:extLst>
               <a:ext uri="{FF2B5EF4-FFF2-40B4-BE49-F238E27FC236}">
-                <a16:creationId xmlns:a16="http://schemas.microsoft.com/office/drawing/2014/main" id="{38FFA191-5CCC-43CB-BD83-4F80ED362608}"/>
+                <a16:creationId xmlns:a16="http://schemas.microsoft.com/office/drawing/2014/main" id="{5CE54ABB-4929-4810-950B-2DAEA0A5BAB4}"/>
               </a:ext>
             </a:extLst>
           </p:cNvPr>
@@ -17116,8 +17279,8 @@
         </p:nvSpPr>
         <p:spPr>
           <a:xfrm>
-            <a:off x="5476875" y="1671639"/>
-            <a:ext cx="5111750" cy="1204912"/>
+            <a:off x="1885156" y="892177"/>
+            <a:ext cx="8421688" cy="1325563"/>
           </a:xfrm>
         </p:spPr>
         <p:txBody>
@@ -17127,17 +17290,161 @@
             <a:pPr rtl="0"/>
             <a:r>
               <a:rPr lang="en-GB" dirty="0"/>
-              <a:t>Conclusion</a:t>
-            </a:r>
-          </a:p>
-        </p:txBody>
-      </p:sp>
-      <p:sp>
-        <p:nvSpPr>
-          <p:cNvPr id="6" name="Slide Number Placeholder 5">
-            <a:extLst>
-              <a:ext uri="{FF2B5EF4-FFF2-40B4-BE49-F238E27FC236}">
-                <a16:creationId xmlns:a16="http://schemas.microsoft.com/office/drawing/2014/main" id="{BAEFF51B-0E28-4171-AE7C-A31AAB42BC73}"/>
+              <a:t>Future Work Plan</a:t>
+            </a:r>
+          </a:p>
+        </p:txBody>
+      </p:sp>
+      <p:sp>
+        <p:nvSpPr>
+          <p:cNvPr id="4" name="Text Placeholder 3">
+            <a:extLst>
+              <a:ext uri="{FF2B5EF4-FFF2-40B4-BE49-F238E27FC236}">
+                <a16:creationId xmlns:a16="http://schemas.microsoft.com/office/drawing/2014/main" id="{A112B089-A8F9-45B1-BE6E-EAC10163F082}"/>
+              </a:ext>
+            </a:extLst>
+          </p:cNvPr>
+          <p:cNvSpPr>
+            <a:spLocks noGrp="1"/>
+          </p:cNvSpPr>
+          <p:nvPr>
+            <p:ph type="body" idx="1"/>
+          </p:nvPr>
+        </p:nvSpPr>
+        <p:spPr>
+          <a:xfrm>
+            <a:off x="1163094" y="1826025"/>
+            <a:ext cx="2882475" cy="823912"/>
+          </a:xfrm>
+        </p:spPr>
+        <p:txBody>
+          <a:bodyPr rtlCol="0"/>
+          <a:lstStyle/>
+          <a:p>
+            <a:pPr rtl="0"/>
+            <a:r>
+              <a:rPr lang="en-GB" dirty="0"/>
+              <a:t>Next steps</a:t>
+            </a:r>
+          </a:p>
+        </p:txBody>
+      </p:sp>
+      <p:sp>
+        <p:nvSpPr>
+          <p:cNvPr id="7" name="Content Placeholder 6">
+            <a:extLst>
+              <a:ext uri="{FF2B5EF4-FFF2-40B4-BE49-F238E27FC236}">
+                <a16:creationId xmlns:a16="http://schemas.microsoft.com/office/drawing/2014/main" id="{6B35F89A-6CDF-41F7-BD87-18B45BD7330B}"/>
+              </a:ext>
+            </a:extLst>
+          </p:cNvPr>
+          <p:cNvSpPr>
+            <a:spLocks noGrp="1"/>
+          </p:cNvSpPr>
+          <p:nvPr>
+            <p:ph sz="half" idx="2"/>
+          </p:nvPr>
+        </p:nvSpPr>
+        <p:spPr>
+          <a:xfrm>
+            <a:off x="1163094" y="2883695"/>
+            <a:ext cx="2882475" cy="1997867"/>
+          </a:xfrm>
+        </p:spPr>
+        <p:txBody>
+          <a:bodyPr vert="horz" lIns="91440" tIns="45720" rIns="91440" bIns="45720" rtlCol="0" anchor="t">
+            <a:normAutofit/>
+          </a:bodyPr>
+          <a:lstStyle/>
+          <a:p>
+            <a:pPr rtl="0"/>
+            <a:r>
+              <a:rPr lang="en-US" dirty="0"/>
+              <a:t>Complete implementation of approximate arithmetic units</a:t>
+            </a:r>
+            <a:endParaRPr lang="en-GB" noProof="1"/>
+          </a:p>
+        </p:txBody>
+      </p:sp>
+      <p:sp>
+        <p:nvSpPr>
+          <p:cNvPr id="3" name="Text Placeholder 2">
+            <a:extLst>
+              <a:ext uri="{FF2B5EF4-FFF2-40B4-BE49-F238E27FC236}">
+                <a16:creationId xmlns:a16="http://schemas.microsoft.com/office/drawing/2014/main" id="{D5E1C399-8F48-44F5-9461-3C89866D4CE1}"/>
+              </a:ext>
+            </a:extLst>
+          </p:cNvPr>
+          <p:cNvSpPr>
+            <a:spLocks noGrp="1"/>
+          </p:cNvSpPr>
+          <p:nvPr>
+            <p:ph sz="quarter" idx="4"/>
+          </p:nvPr>
+        </p:nvSpPr>
+        <p:spPr>
+          <a:xfrm>
+            <a:off x="4567655" y="2883695"/>
+            <a:ext cx="2896671" cy="1997867"/>
+          </a:xfrm>
+        </p:spPr>
+        <p:txBody>
+          <a:bodyPr rtlCol="0"/>
+          <a:lstStyle/>
+          <a:p>
+            <a:pPr rtl="0"/>
+            <a:r>
+              <a:rPr lang="en-US" dirty="0"/>
+              <a:t>Integrate AAUD into RISC-V SoC and conduct full system testing</a:t>
+            </a:r>
+            <a:endParaRPr lang="en-GB" dirty="0"/>
+          </a:p>
+        </p:txBody>
+      </p:sp>
+      <p:sp>
+        <p:nvSpPr>
+          <p:cNvPr id="8" name="Text Placeholder 7">
+            <a:extLst>
+              <a:ext uri="{FF2B5EF4-FFF2-40B4-BE49-F238E27FC236}">
+                <a16:creationId xmlns:a16="http://schemas.microsoft.com/office/drawing/2014/main" id="{E92B9716-8D44-4864-8986-720957B34362}"/>
+              </a:ext>
+            </a:extLst>
+          </p:cNvPr>
+          <p:cNvSpPr>
+            <a:spLocks noGrp="1"/>
+          </p:cNvSpPr>
+          <p:nvPr>
+            <p:ph sz="half" idx="14"/>
+          </p:nvPr>
+        </p:nvSpPr>
+        <p:spPr>
+          <a:xfrm>
+            <a:off x="7986411" y="2883695"/>
+            <a:ext cx="2882475" cy="1997867"/>
+          </a:xfrm>
+        </p:spPr>
+        <p:txBody>
+          <a:bodyPr rtlCol="0"/>
+          <a:lstStyle/>
+          <a:p>
+            <a:pPr rtl="0"/>
+            <a:r>
+              <a:rPr lang="en-GB" noProof="1"/>
+              <a:t>E</a:t>
+            </a:r>
+            <a:r>
+              <a:rPr lang="en-GB" dirty="0"/>
+              <a:t>valuate performance against traditional MAC units</a:t>
+            </a:r>
+          </a:p>
+        </p:txBody>
+      </p:sp>
+      <p:sp>
+        <p:nvSpPr>
+          <p:cNvPr id="11" name="Slide Number Placeholder 10">
+            <a:extLst>
+              <a:ext uri="{FF2B5EF4-FFF2-40B4-BE49-F238E27FC236}">
+                <a16:creationId xmlns:a16="http://schemas.microsoft.com/office/drawing/2014/main" id="{BAD5B6F4-0A90-447A-A1AE-D75C934B6B29}"/>
               </a:ext>
             </a:extLst>
           </p:cNvPr>
@@ -17164,16 +17471,615 @@
               <a:pPr rtl="0"/>
               <a:t>10</a:t>
             </a:fld>
-            <a:endParaRPr lang="en-GB"/>
+            <a:endParaRPr lang="en-GB" dirty="0"/>
+          </a:p>
+        </p:txBody>
+      </p:sp>
+      <p:sp>
+        <p:nvSpPr>
+          <p:cNvPr id="16" name="Text Placeholder 3">
+            <a:extLst>
+              <a:ext uri="{FF2B5EF4-FFF2-40B4-BE49-F238E27FC236}">
+                <a16:creationId xmlns:a16="http://schemas.microsoft.com/office/drawing/2014/main" id="{8C953D19-D175-5382-EB78-41B258DFDB10}"/>
+              </a:ext>
+            </a:extLst>
+          </p:cNvPr>
+          <p:cNvSpPr txBox="1">
+            <a:spLocks/>
+          </p:cNvSpPr>
+          <p:nvPr/>
+        </p:nvSpPr>
+        <p:spPr>
+          <a:xfrm>
+            <a:off x="1163093" y="3209133"/>
+            <a:ext cx="2882475" cy="823912"/>
+          </a:xfrm>
+          <a:prstGeom prst="rect">
+            <a:avLst/>
+          </a:prstGeom>
+        </p:spPr>
+        <p:txBody>
+          <a:bodyPr vert="horz" lIns="91440" tIns="45720" rIns="91440" bIns="45720" rtlCol="0" anchor="b">
+            <a:noAutofit/>
+          </a:bodyPr>
+          <a:lstStyle>
+            <a:lvl1pPr marL="0" indent="0" algn="l" defTabSz="914400" rtl="0" eaLnBrk="1" latinLnBrk="0" hangingPunct="1">
+              <a:lnSpc>
+                <a:spcPct val="90000"/>
+              </a:lnSpc>
+              <a:spcBef>
+                <a:spcPts val="1000"/>
+              </a:spcBef>
+              <a:buFont typeface="Arial" panose="020B0604020202020204" pitchFamily="34" charset="0"/>
+              <a:buNone/>
+              <a:defRPr lang="en-US" sz="2000" kern="1200" cap="all" spc="150" baseline="0" dirty="0" smtClean="0">
+                <a:solidFill>
+                  <a:schemeClr val="tx1"/>
+                </a:solidFill>
+                <a:latin typeface="+mj-lt"/>
+                <a:ea typeface="+mj-ea"/>
+                <a:cs typeface="+mj-cs"/>
+              </a:defRPr>
+            </a:lvl1pPr>
+            <a:lvl2pPr marL="457200" indent="0" algn="l" defTabSz="914400" rtl="0" eaLnBrk="1" latinLnBrk="0" hangingPunct="1">
+              <a:lnSpc>
+                <a:spcPct val="90000"/>
+              </a:lnSpc>
+              <a:spcBef>
+                <a:spcPts val="500"/>
+              </a:spcBef>
+              <a:buFont typeface="Arial" panose="020B0604020202020204" pitchFamily="34" charset="0"/>
+              <a:buNone/>
+              <a:defRPr sz="2000" b="1" kern="1200">
+                <a:solidFill>
+                  <a:schemeClr val="tx1"/>
+                </a:solidFill>
+                <a:latin typeface="+mn-lt"/>
+                <a:ea typeface="+mn-ea"/>
+                <a:cs typeface="+mn-cs"/>
+              </a:defRPr>
+            </a:lvl2pPr>
+            <a:lvl3pPr marL="914400" indent="0" algn="l" defTabSz="914400" rtl="0" eaLnBrk="1" latinLnBrk="0" hangingPunct="1">
+              <a:lnSpc>
+                <a:spcPct val="90000"/>
+              </a:lnSpc>
+              <a:spcBef>
+                <a:spcPts val="500"/>
+              </a:spcBef>
+              <a:buFont typeface="Arial" panose="020B0604020202020204" pitchFamily="34" charset="0"/>
+              <a:buNone/>
+              <a:defRPr sz="1800" b="1" kern="1200">
+                <a:solidFill>
+                  <a:schemeClr val="tx1"/>
+                </a:solidFill>
+                <a:latin typeface="+mn-lt"/>
+                <a:ea typeface="+mn-ea"/>
+                <a:cs typeface="+mn-cs"/>
+              </a:defRPr>
+            </a:lvl3pPr>
+            <a:lvl4pPr marL="1371600" indent="0" algn="l" defTabSz="914400" rtl="0" eaLnBrk="1" latinLnBrk="0" hangingPunct="1">
+              <a:lnSpc>
+                <a:spcPct val="90000"/>
+              </a:lnSpc>
+              <a:spcBef>
+                <a:spcPts val="500"/>
+              </a:spcBef>
+              <a:buFont typeface="Arial" panose="020B0604020202020204" pitchFamily="34" charset="0"/>
+              <a:buNone/>
+              <a:defRPr sz="1600" b="1" kern="1200">
+                <a:solidFill>
+                  <a:schemeClr val="tx1"/>
+                </a:solidFill>
+                <a:latin typeface="+mn-lt"/>
+                <a:ea typeface="+mn-ea"/>
+                <a:cs typeface="+mn-cs"/>
+              </a:defRPr>
+            </a:lvl4pPr>
+            <a:lvl5pPr marL="1828800" indent="0" algn="l" defTabSz="914400" rtl="0" eaLnBrk="1" latinLnBrk="0" hangingPunct="1">
+              <a:lnSpc>
+                <a:spcPct val="90000"/>
+              </a:lnSpc>
+              <a:spcBef>
+                <a:spcPts val="500"/>
+              </a:spcBef>
+              <a:buFont typeface="Arial" panose="020B0604020202020204" pitchFamily="34" charset="0"/>
+              <a:buNone/>
+              <a:defRPr sz="1600" b="1" kern="1200">
+                <a:solidFill>
+                  <a:schemeClr val="tx1"/>
+                </a:solidFill>
+                <a:latin typeface="+mn-lt"/>
+                <a:ea typeface="+mn-ea"/>
+                <a:cs typeface="+mn-cs"/>
+              </a:defRPr>
+            </a:lvl5pPr>
+            <a:lvl6pPr marL="2286000" indent="0" algn="l" defTabSz="914400" rtl="0" eaLnBrk="1" latinLnBrk="0" hangingPunct="1">
+              <a:lnSpc>
+                <a:spcPct val="90000"/>
+              </a:lnSpc>
+              <a:spcBef>
+                <a:spcPts val="500"/>
+              </a:spcBef>
+              <a:buFont typeface="Arial" panose="020B0604020202020204" pitchFamily="34" charset="0"/>
+              <a:buNone/>
+              <a:defRPr sz="1600" b="1" kern="1200">
+                <a:solidFill>
+                  <a:schemeClr val="tx1"/>
+                </a:solidFill>
+                <a:latin typeface="+mn-lt"/>
+                <a:ea typeface="+mn-ea"/>
+                <a:cs typeface="+mn-cs"/>
+              </a:defRPr>
+            </a:lvl6pPr>
+            <a:lvl7pPr marL="2743200" indent="0" algn="l" defTabSz="914400" rtl="0" eaLnBrk="1" latinLnBrk="0" hangingPunct="1">
+              <a:lnSpc>
+                <a:spcPct val="90000"/>
+              </a:lnSpc>
+              <a:spcBef>
+                <a:spcPts val="500"/>
+              </a:spcBef>
+              <a:buFont typeface="Arial" panose="020B0604020202020204" pitchFamily="34" charset="0"/>
+              <a:buNone/>
+              <a:defRPr sz="1600" b="1" kern="1200">
+                <a:solidFill>
+                  <a:schemeClr val="tx1"/>
+                </a:solidFill>
+                <a:latin typeface="+mn-lt"/>
+                <a:ea typeface="+mn-ea"/>
+                <a:cs typeface="+mn-cs"/>
+              </a:defRPr>
+            </a:lvl7pPr>
+            <a:lvl8pPr marL="3200400" indent="0" algn="l" defTabSz="914400" rtl="0" eaLnBrk="1" latinLnBrk="0" hangingPunct="1">
+              <a:lnSpc>
+                <a:spcPct val="90000"/>
+              </a:lnSpc>
+              <a:spcBef>
+                <a:spcPts val="500"/>
+              </a:spcBef>
+              <a:buFont typeface="Arial" panose="020B0604020202020204" pitchFamily="34" charset="0"/>
+              <a:buNone/>
+              <a:defRPr sz="1600" b="1" kern="1200">
+                <a:solidFill>
+                  <a:schemeClr val="tx1"/>
+                </a:solidFill>
+                <a:latin typeface="+mn-lt"/>
+                <a:ea typeface="+mn-ea"/>
+                <a:cs typeface="+mn-cs"/>
+              </a:defRPr>
+            </a:lvl8pPr>
+            <a:lvl9pPr marL="3657600" indent="0" algn="l" defTabSz="914400" rtl="0" eaLnBrk="1" latinLnBrk="0" hangingPunct="1">
+              <a:lnSpc>
+                <a:spcPct val="90000"/>
+              </a:lnSpc>
+              <a:spcBef>
+                <a:spcPts val="500"/>
+              </a:spcBef>
+              <a:buFont typeface="Arial" panose="020B0604020202020204" pitchFamily="34" charset="0"/>
+              <a:buNone/>
+              <a:defRPr sz="1600" b="1" kern="1200">
+                <a:solidFill>
+                  <a:schemeClr val="tx1"/>
+                </a:solidFill>
+                <a:latin typeface="+mn-lt"/>
+                <a:ea typeface="+mn-ea"/>
+                <a:cs typeface="+mn-cs"/>
+              </a:defRPr>
+            </a:lvl9pPr>
+          </a:lstStyle>
+          <a:p>
+            <a:r>
+              <a:rPr lang="en-GB" dirty="0"/>
+              <a:t>Long-term</a:t>
+            </a:r>
+          </a:p>
+        </p:txBody>
+      </p:sp>
+      <p:sp>
+        <p:nvSpPr>
+          <p:cNvPr id="18" name="Text Placeholder 2">
+            <a:extLst>
+              <a:ext uri="{FF2B5EF4-FFF2-40B4-BE49-F238E27FC236}">
+                <a16:creationId xmlns:a16="http://schemas.microsoft.com/office/drawing/2014/main" id="{F65663E9-8AB0-0BAE-4CAD-3518BBAB522C}"/>
+              </a:ext>
+            </a:extLst>
+          </p:cNvPr>
+          <p:cNvSpPr txBox="1">
+            <a:spLocks/>
+          </p:cNvSpPr>
+          <p:nvPr/>
+        </p:nvSpPr>
+        <p:spPr>
+          <a:xfrm>
+            <a:off x="1163093" y="4358483"/>
+            <a:ext cx="2896671" cy="1997867"/>
+          </a:xfrm>
+          <a:prstGeom prst="rect">
+            <a:avLst/>
+          </a:prstGeom>
+        </p:spPr>
+        <p:txBody>
+          <a:bodyPr vert="horz" lIns="91440" tIns="45720" rIns="91440" bIns="45720" rtlCol="0">
+            <a:normAutofit/>
+          </a:bodyPr>
+          <a:lstStyle>
+            <a:lvl1pPr marL="0" indent="0" algn="l" defTabSz="914400" rtl="0" eaLnBrk="1" latinLnBrk="0" hangingPunct="1">
+              <a:lnSpc>
+                <a:spcPct val="100000"/>
+              </a:lnSpc>
+              <a:spcBef>
+                <a:spcPts val="1000"/>
+              </a:spcBef>
+              <a:buFont typeface="Arial" panose="020B0604020202020204" pitchFamily="34" charset="0"/>
+              <a:buNone/>
+              <a:defRPr sz="1400" kern="1200" spc="50" baseline="0">
+                <a:solidFill>
+                  <a:schemeClr val="tx1"/>
+                </a:solidFill>
+                <a:latin typeface="+mn-lt"/>
+                <a:ea typeface="+mn-ea"/>
+                <a:cs typeface="+mn-cs"/>
+              </a:defRPr>
+            </a:lvl1pPr>
+            <a:lvl2pPr marL="457200" indent="0" algn="l" defTabSz="914400" rtl="0" eaLnBrk="1" latinLnBrk="0" hangingPunct="1">
+              <a:lnSpc>
+                <a:spcPct val="100000"/>
+              </a:lnSpc>
+              <a:spcBef>
+                <a:spcPts val="500"/>
+              </a:spcBef>
+              <a:buFont typeface="Arial" panose="020B0604020202020204" pitchFamily="34" charset="0"/>
+              <a:buNone/>
+              <a:defRPr sz="1400" kern="1200" spc="50" baseline="0">
+                <a:solidFill>
+                  <a:schemeClr val="tx1"/>
+                </a:solidFill>
+                <a:latin typeface="+mn-lt"/>
+                <a:ea typeface="+mn-ea"/>
+                <a:cs typeface="+mn-cs"/>
+              </a:defRPr>
+            </a:lvl2pPr>
+            <a:lvl3pPr marL="914400" indent="0" algn="l" defTabSz="914400" rtl="0" eaLnBrk="1" latinLnBrk="0" hangingPunct="1">
+              <a:lnSpc>
+                <a:spcPct val="100000"/>
+              </a:lnSpc>
+              <a:spcBef>
+                <a:spcPts val="500"/>
+              </a:spcBef>
+              <a:buFont typeface="Arial" panose="020B0604020202020204" pitchFamily="34" charset="0"/>
+              <a:buNone/>
+              <a:defRPr sz="1400" kern="1200" spc="50" baseline="0">
+                <a:solidFill>
+                  <a:schemeClr val="tx1"/>
+                </a:solidFill>
+                <a:latin typeface="+mn-lt"/>
+                <a:ea typeface="+mn-ea"/>
+                <a:cs typeface="+mn-cs"/>
+              </a:defRPr>
+            </a:lvl3pPr>
+            <a:lvl4pPr marL="1371600" indent="0" algn="l" defTabSz="914400" rtl="0" eaLnBrk="1" latinLnBrk="0" hangingPunct="1">
+              <a:lnSpc>
+                <a:spcPct val="100000"/>
+              </a:lnSpc>
+              <a:spcBef>
+                <a:spcPts val="500"/>
+              </a:spcBef>
+              <a:buFont typeface="Arial" panose="020B0604020202020204" pitchFamily="34" charset="0"/>
+              <a:buNone/>
+              <a:defRPr sz="1400" kern="1200" spc="50" baseline="0">
+                <a:solidFill>
+                  <a:schemeClr val="tx1"/>
+                </a:solidFill>
+                <a:latin typeface="+mn-lt"/>
+                <a:ea typeface="+mn-ea"/>
+                <a:cs typeface="+mn-cs"/>
+              </a:defRPr>
+            </a:lvl4pPr>
+            <a:lvl5pPr marL="1828800" indent="0" algn="l" defTabSz="914400" rtl="0" eaLnBrk="1" latinLnBrk="0" hangingPunct="1">
+              <a:lnSpc>
+                <a:spcPct val="100000"/>
+              </a:lnSpc>
+              <a:spcBef>
+                <a:spcPts val="500"/>
+              </a:spcBef>
+              <a:buFont typeface="Arial" panose="020B0604020202020204" pitchFamily="34" charset="0"/>
+              <a:buNone/>
+              <a:defRPr sz="1400" kern="1200" spc="50" baseline="0">
+                <a:solidFill>
+                  <a:schemeClr val="tx1"/>
+                </a:solidFill>
+                <a:latin typeface="+mn-lt"/>
+                <a:ea typeface="+mn-ea"/>
+                <a:cs typeface="+mn-cs"/>
+              </a:defRPr>
+            </a:lvl5pPr>
+            <a:lvl6pPr marL="2514600" indent="-228600" algn="l" defTabSz="914400" rtl="0" eaLnBrk="1" latinLnBrk="0" hangingPunct="1">
+              <a:lnSpc>
+                <a:spcPct val="90000"/>
+              </a:lnSpc>
+              <a:spcBef>
+                <a:spcPts val="500"/>
+              </a:spcBef>
+              <a:buFont typeface="Arial" panose="020B0604020202020204" pitchFamily="34" charset="0"/>
+              <a:buChar char="•"/>
+              <a:defRPr sz="1800" kern="1200">
+                <a:solidFill>
+                  <a:schemeClr val="tx1"/>
+                </a:solidFill>
+                <a:latin typeface="+mn-lt"/>
+                <a:ea typeface="+mn-ea"/>
+                <a:cs typeface="+mn-cs"/>
+              </a:defRPr>
+            </a:lvl6pPr>
+            <a:lvl7pPr marL="2971800" indent="-228600" algn="l" defTabSz="914400" rtl="0" eaLnBrk="1" latinLnBrk="0" hangingPunct="1">
+              <a:lnSpc>
+                <a:spcPct val="90000"/>
+              </a:lnSpc>
+              <a:spcBef>
+                <a:spcPts val="500"/>
+              </a:spcBef>
+              <a:buFont typeface="Arial" panose="020B0604020202020204" pitchFamily="34" charset="0"/>
+              <a:buChar char="•"/>
+              <a:defRPr sz="1800" kern="1200">
+                <a:solidFill>
+                  <a:schemeClr val="tx1"/>
+                </a:solidFill>
+                <a:latin typeface="+mn-lt"/>
+                <a:ea typeface="+mn-ea"/>
+                <a:cs typeface="+mn-cs"/>
+              </a:defRPr>
+            </a:lvl7pPr>
+            <a:lvl8pPr marL="3429000" indent="-228600" algn="l" defTabSz="914400" rtl="0" eaLnBrk="1" latinLnBrk="0" hangingPunct="1">
+              <a:lnSpc>
+                <a:spcPct val="90000"/>
+              </a:lnSpc>
+              <a:spcBef>
+                <a:spcPts val="500"/>
+              </a:spcBef>
+              <a:buFont typeface="Arial" panose="020B0604020202020204" pitchFamily="34" charset="0"/>
+              <a:buChar char="•"/>
+              <a:defRPr sz="1800" kern="1200">
+                <a:solidFill>
+                  <a:schemeClr val="tx1"/>
+                </a:solidFill>
+                <a:latin typeface="+mn-lt"/>
+                <a:ea typeface="+mn-ea"/>
+                <a:cs typeface="+mn-cs"/>
+              </a:defRPr>
+            </a:lvl8pPr>
+            <a:lvl9pPr marL="3886200" indent="-228600" algn="l" defTabSz="914400" rtl="0" eaLnBrk="1" latinLnBrk="0" hangingPunct="1">
+              <a:lnSpc>
+                <a:spcPct val="90000"/>
+              </a:lnSpc>
+              <a:spcBef>
+                <a:spcPts val="500"/>
+              </a:spcBef>
+              <a:buFont typeface="Arial" panose="020B0604020202020204" pitchFamily="34" charset="0"/>
+              <a:buChar char="•"/>
+              <a:defRPr sz="1800" kern="1200">
+                <a:solidFill>
+                  <a:schemeClr val="tx1"/>
+                </a:solidFill>
+                <a:latin typeface="+mn-lt"/>
+                <a:ea typeface="+mn-ea"/>
+                <a:cs typeface="+mn-cs"/>
+              </a:defRPr>
+            </a:lvl9pPr>
+          </a:lstStyle>
+          <a:p>
+            <a:r>
+              <a:rPr lang="en-US" dirty="0"/>
+              <a:t>Explore further optimizations with different approximation methods</a:t>
+            </a:r>
+            <a:endParaRPr lang="en-GB" dirty="0"/>
+          </a:p>
+        </p:txBody>
+      </p:sp>
+      <p:sp>
+        <p:nvSpPr>
+          <p:cNvPr id="19" name="Text Placeholder 2">
+            <a:extLst>
+              <a:ext uri="{FF2B5EF4-FFF2-40B4-BE49-F238E27FC236}">
+                <a16:creationId xmlns:a16="http://schemas.microsoft.com/office/drawing/2014/main" id="{E06A98AF-0802-6D9F-FF99-A7CC94BF662E}"/>
+              </a:ext>
+            </a:extLst>
+          </p:cNvPr>
+          <p:cNvSpPr txBox="1">
+            <a:spLocks/>
+          </p:cNvSpPr>
+          <p:nvPr/>
+        </p:nvSpPr>
+        <p:spPr>
+          <a:xfrm>
+            <a:off x="4581849" y="4358482"/>
+            <a:ext cx="2896671" cy="1997867"/>
+          </a:xfrm>
+          <a:prstGeom prst="rect">
+            <a:avLst/>
+          </a:prstGeom>
+        </p:spPr>
+        <p:txBody>
+          <a:bodyPr vert="horz" lIns="91440" tIns="45720" rIns="91440" bIns="45720" rtlCol="0">
+            <a:normAutofit/>
+          </a:bodyPr>
+          <a:lstStyle>
+            <a:lvl1pPr marL="0" indent="0" algn="l" defTabSz="914400" rtl="0" eaLnBrk="1" latinLnBrk="0" hangingPunct="1">
+              <a:lnSpc>
+                <a:spcPct val="100000"/>
+              </a:lnSpc>
+              <a:spcBef>
+                <a:spcPts val="1000"/>
+              </a:spcBef>
+              <a:buFont typeface="Arial" panose="020B0604020202020204" pitchFamily="34" charset="0"/>
+              <a:buNone/>
+              <a:defRPr sz="1400" kern="1200" spc="50" baseline="0">
+                <a:solidFill>
+                  <a:schemeClr val="tx1"/>
+                </a:solidFill>
+                <a:latin typeface="+mn-lt"/>
+                <a:ea typeface="+mn-ea"/>
+                <a:cs typeface="+mn-cs"/>
+              </a:defRPr>
+            </a:lvl1pPr>
+            <a:lvl2pPr marL="457200" indent="0" algn="l" defTabSz="914400" rtl="0" eaLnBrk="1" latinLnBrk="0" hangingPunct="1">
+              <a:lnSpc>
+                <a:spcPct val="100000"/>
+              </a:lnSpc>
+              <a:spcBef>
+                <a:spcPts val="500"/>
+              </a:spcBef>
+              <a:buFont typeface="Arial" panose="020B0604020202020204" pitchFamily="34" charset="0"/>
+              <a:buNone/>
+              <a:defRPr sz="1400" kern="1200" spc="50" baseline="0">
+                <a:solidFill>
+                  <a:schemeClr val="tx1"/>
+                </a:solidFill>
+                <a:latin typeface="+mn-lt"/>
+                <a:ea typeface="+mn-ea"/>
+                <a:cs typeface="+mn-cs"/>
+              </a:defRPr>
+            </a:lvl2pPr>
+            <a:lvl3pPr marL="914400" indent="0" algn="l" defTabSz="914400" rtl="0" eaLnBrk="1" latinLnBrk="0" hangingPunct="1">
+              <a:lnSpc>
+                <a:spcPct val="100000"/>
+              </a:lnSpc>
+              <a:spcBef>
+                <a:spcPts val="500"/>
+              </a:spcBef>
+              <a:buFont typeface="Arial" panose="020B0604020202020204" pitchFamily="34" charset="0"/>
+              <a:buNone/>
+              <a:defRPr sz="1400" kern="1200" spc="50" baseline="0">
+                <a:solidFill>
+                  <a:schemeClr val="tx1"/>
+                </a:solidFill>
+                <a:latin typeface="+mn-lt"/>
+                <a:ea typeface="+mn-ea"/>
+                <a:cs typeface="+mn-cs"/>
+              </a:defRPr>
+            </a:lvl3pPr>
+            <a:lvl4pPr marL="1371600" indent="0" algn="l" defTabSz="914400" rtl="0" eaLnBrk="1" latinLnBrk="0" hangingPunct="1">
+              <a:lnSpc>
+                <a:spcPct val="100000"/>
+              </a:lnSpc>
+              <a:spcBef>
+                <a:spcPts val="500"/>
+              </a:spcBef>
+              <a:buFont typeface="Arial" panose="020B0604020202020204" pitchFamily="34" charset="0"/>
+              <a:buNone/>
+              <a:defRPr sz="1400" kern="1200" spc="50" baseline="0">
+                <a:solidFill>
+                  <a:schemeClr val="tx1"/>
+                </a:solidFill>
+                <a:latin typeface="+mn-lt"/>
+                <a:ea typeface="+mn-ea"/>
+                <a:cs typeface="+mn-cs"/>
+              </a:defRPr>
+            </a:lvl4pPr>
+            <a:lvl5pPr marL="1828800" indent="0" algn="l" defTabSz="914400" rtl="0" eaLnBrk="1" latinLnBrk="0" hangingPunct="1">
+              <a:lnSpc>
+                <a:spcPct val="100000"/>
+              </a:lnSpc>
+              <a:spcBef>
+                <a:spcPts val="500"/>
+              </a:spcBef>
+              <a:buFont typeface="Arial" panose="020B0604020202020204" pitchFamily="34" charset="0"/>
+              <a:buNone/>
+              <a:defRPr sz="1400" kern="1200" spc="50" baseline="0">
+                <a:solidFill>
+                  <a:schemeClr val="tx1"/>
+                </a:solidFill>
+                <a:latin typeface="+mn-lt"/>
+                <a:ea typeface="+mn-ea"/>
+                <a:cs typeface="+mn-cs"/>
+              </a:defRPr>
+            </a:lvl5pPr>
+            <a:lvl6pPr marL="2514600" indent="-228600" algn="l" defTabSz="914400" rtl="0" eaLnBrk="1" latinLnBrk="0" hangingPunct="1">
+              <a:lnSpc>
+                <a:spcPct val="90000"/>
+              </a:lnSpc>
+              <a:spcBef>
+                <a:spcPts val="500"/>
+              </a:spcBef>
+              <a:buFont typeface="Arial" panose="020B0604020202020204" pitchFamily="34" charset="0"/>
+              <a:buChar char="•"/>
+              <a:defRPr sz="1800" kern="1200">
+                <a:solidFill>
+                  <a:schemeClr val="tx1"/>
+                </a:solidFill>
+                <a:latin typeface="+mn-lt"/>
+                <a:ea typeface="+mn-ea"/>
+                <a:cs typeface="+mn-cs"/>
+              </a:defRPr>
+            </a:lvl6pPr>
+            <a:lvl7pPr marL="2971800" indent="-228600" algn="l" defTabSz="914400" rtl="0" eaLnBrk="1" latinLnBrk="0" hangingPunct="1">
+              <a:lnSpc>
+                <a:spcPct val="90000"/>
+              </a:lnSpc>
+              <a:spcBef>
+                <a:spcPts val="500"/>
+              </a:spcBef>
+              <a:buFont typeface="Arial" panose="020B0604020202020204" pitchFamily="34" charset="0"/>
+              <a:buChar char="•"/>
+              <a:defRPr sz="1800" kern="1200">
+                <a:solidFill>
+                  <a:schemeClr val="tx1"/>
+                </a:solidFill>
+                <a:latin typeface="+mn-lt"/>
+                <a:ea typeface="+mn-ea"/>
+                <a:cs typeface="+mn-cs"/>
+              </a:defRPr>
+            </a:lvl7pPr>
+            <a:lvl8pPr marL="3429000" indent="-228600" algn="l" defTabSz="914400" rtl="0" eaLnBrk="1" latinLnBrk="0" hangingPunct="1">
+              <a:lnSpc>
+                <a:spcPct val="90000"/>
+              </a:lnSpc>
+              <a:spcBef>
+                <a:spcPts val="500"/>
+              </a:spcBef>
+              <a:buFont typeface="Arial" panose="020B0604020202020204" pitchFamily="34" charset="0"/>
+              <a:buChar char="•"/>
+              <a:defRPr sz="1800" kern="1200">
+                <a:solidFill>
+                  <a:schemeClr val="tx1"/>
+                </a:solidFill>
+                <a:latin typeface="+mn-lt"/>
+                <a:ea typeface="+mn-ea"/>
+                <a:cs typeface="+mn-cs"/>
+              </a:defRPr>
+            </a:lvl8pPr>
+            <a:lvl9pPr marL="3886200" indent="-228600" algn="l" defTabSz="914400" rtl="0" eaLnBrk="1" latinLnBrk="0" hangingPunct="1">
+              <a:lnSpc>
+                <a:spcPct val="90000"/>
+              </a:lnSpc>
+              <a:spcBef>
+                <a:spcPts val="500"/>
+              </a:spcBef>
+              <a:buFont typeface="Arial" panose="020B0604020202020204" pitchFamily="34" charset="0"/>
+              <a:buChar char="•"/>
+              <a:defRPr sz="1800" kern="1200">
+                <a:solidFill>
+                  <a:schemeClr val="tx1"/>
+                </a:solidFill>
+                <a:latin typeface="+mn-lt"/>
+                <a:ea typeface="+mn-ea"/>
+                <a:cs typeface="+mn-cs"/>
+              </a:defRPr>
+            </a:lvl9pPr>
+          </a:lstStyle>
+          <a:p>
+            <a:r>
+              <a:rPr lang="en-US" dirty="0"/>
+              <a:t>Investigate potential applications in other error-tolerant domains, such as machine learning</a:t>
+            </a:r>
+            <a:endParaRPr lang="en-GB" dirty="0"/>
           </a:p>
         </p:txBody>
       </p:sp>
       <p:pic>
         <p:nvPicPr>
-          <p:cNvPr id="11" name="Picture 10" descr="A purple text on a black background&#10;&#10;AI-generated content may be incorrect.">
-            <a:extLst>
-              <a:ext uri="{FF2B5EF4-FFF2-40B4-BE49-F238E27FC236}">
-                <a16:creationId xmlns:a16="http://schemas.microsoft.com/office/drawing/2014/main" id="{6B90DE6C-5CE3-1860-5CB3-41C78633DAC3}"/>
+          <p:cNvPr id="20" name="Picture 19" descr="A purple text on a black background&#10;&#10;AI-generated content may be incorrect.">
+            <a:extLst>
+              <a:ext uri="{FF2B5EF4-FFF2-40B4-BE49-F238E27FC236}">
+                <a16:creationId xmlns:a16="http://schemas.microsoft.com/office/drawing/2014/main" id="{D0EB5FBE-78EE-E772-CF91-89700EBDE3BC}"/>
               </a:ext>
             </a:extLst>
           </p:cNvPr>
@@ -17201,7 +18107,7 @@
     </p:spTree>
     <p:extLst>
       <p:ext uri="{BB962C8B-B14F-4D97-AF65-F5344CB8AC3E}">
-        <p14:creationId xmlns:p14="http://schemas.microsoft.com/office/powerpoint/2010/main" val="920173932"/>
+        <p14:creationId xmlns:p14="http://schemas.microsoft.com/office/powerpoint/2010/main" val="2121178069"/>
       </p:ext>
     </p:extLst>
   </p:cSld>
@@ -17233,21 +18139,21 @@
           <p:cNvPr id="2" name="Title 1">
             <a:extLst>
               <a:ext uri="{FF2B5EF4-FFF2-40B4-BE49-F238E27FC236}">
-                <a16:creationId xmlns:a16="http://schemas.microsoft.com/office/drawing/2014/main" id="{BCCAEE93-8585-46D4-A7EC-F184E317CB2E}"/>
-              </a:ext>
-            </a:extLst>
-          </p:cNvPr>
-          <p:cNvSpPr>
-            <a:spLocks noGrp="1"/>
-          </p:cNvSpPr>
-          <p:nvPr>
-            <p:ph type="ctrTitle"/>
-          </p:nvPr>
-        </p:nvSpPr>
-        <p:spPr>
-          <a:xfrm>
-            <a:off x="4267200" y="1615736"/>
-            <a:ext cx="4179570" cy="1524735"/>
+                <a16:creationId xmlns:a16="http://schemas.microsoft.com/office/drawing/2014/main" id="{38FFA191-5CCC-43CB-BD83-4F80ED362608}"/>
+              </a:ext>
+            </a:extLst>
+          </p:cNvPr>
+          <p:cNvSpPr>
+            <a:spLocks noGrp="1"/>
+          </p:cNvSpPr>
+          <p:nvPr>
+            <p:ph type="title"/>
+          </p:nvPr>
+        </p:nvSpPr>
+        <p:spPr>
+          <a:xfrm>
+            <a:off x="5476875" y="1671639"/>
+            <a:ext cx="5111750" cy="1204912"/>
           </a:xfrm>
         </p:spPr>
         <p:txBody>
@@ -17256,58 +18162,8 @@
           <a:p>
             <a:pPr rtl="0"/>
             <a:r>
-              <a:rPr lang="en-GB"/>
-              <a:t>THANK YOU</a:t>
-            </a:r>
-          </a:p>
-        </p:txBody>
-      </p:sp>
-      <p:sp>
-        <p:nvSpPr>
-          <p:cNvPr id="3" name="Content Placeholder 2">
-            <a:extLst>
-              <a:ext uri="{FF2B5EF4-FFF2-40B4-BE49-F238E27FC236}">
-                <a16:creationId xmlns:a16="http://schemas.microsoft.com/office/drawing/2014/main" id="{24AFFC60-19C3-4901-93F7-7AAF4C09F8C6}"/>
-              </a:ext>
-            </a:extLst>
-          </p:cNvPr>
-          <p:cNvSpPr>
-            <a:spLocks noGrp="1"/>
-          </p:cNvSpPr>
-          <p:nvPr>
-            <p:ph type="subTitle" idx="1"/>
-          </p:nvPr>
-        </p:nvSpPr>
-        <p:spPr>
-          <a:xfrm>
-            <a:off x="4267200" y="3238103"/>
-            <a:ext cx="5814060" cy="2004161"/>
-          </a:xfrm>
-        </p:spPr>
-        <p:txBody>
-          <a:bodyPr rtlCol="0">
-            <a:normAutofit/>
-          </a:bodyPr>
-          <a:lstStyle/>
-          <a:p>
-            <a:pPr rtl="0"/>
-            <a:r>
               <a:rPr lang="en-GB" dirty="0"/>
-              <a:t>Amaan Mujawar​</a:t>
-            </a:r>
-          </a:p>
-          <a:p>
-            <a:pPr rtl="0"/>
-            <a:r>
-              <a:rPr lang="en-GB" dirty="0"/>
-              <a:t>aurmujawar1@sheffield.ac.uk</a:t>
-            </a:r>
-          </a:p>
-          <a:p>
-            <a:pPr rtl="0"/>
-            <a:r>
-              <a:rPr lang="en-GB" dirty="0"/>
-              <a:t>The University of Sheffield – Electronics and Computer Engineering</a:t>
+              <a:t>Conclusion</a:t>
             </a:r>
           </a:p>
         </p:txBody>
@@ -17317,7 +18173,7 @@
           <p:cNvPr id="6" name="Slide Number Placeholder 5">
             <a:extLst>
               <a:ext uri="{FF2B5EF4-FFF2-40B4-BE49-F238E27FC236}">
-                <a16:creationId xmlns:a16="http://schemas.microsoft.com/office/drawing/2014/main" id="{5EDCFF82-B70F-4971-9182-7C3AEA3CFD26}"/>
+                <a16:creationId xmlns:a16="http://schemas.microsoft.com/office/drawing/2014/main" id="{BAEFF51B-0E28-4171-AE7C-A31AAB42BC73}"/>
               </a:ext>
             </a:extLst>
           </p:cNvPr>
@@ -17330,8 +18186,8 @@
         </p:nvSpPr>
         <p:spPr>
           <a:xfrm>
-            <a:off x="9579428" y="6356350"/>
-            <a:ext cx="1774371" cy="365125"/>
+            <a:off x="8610600" y="6356350"/>
+            <a:ext cx="2743200" cy="365125"/>
           </a:xfrm>
         </p:spPr>
         <p:txBody>
@@ -17345,6 +18201,218 @@
               <a:t>11</a:t>
             </a:fld>
             <a:endParaRPr lang="en-GB"/>
+          </a:p>
+        </p:txBody>
+      </p:sp>
+      <p:pic>
+        <p:nvPicPr>
+          <p:cNvPr id="11" name="Picture 10" descr="A purple text on a black background&#10;&#10;AI-generated content may be incorrect.">
+            <a:extLst>
+              <a:ext uri="{FF2B5EF4-FFF2-40B4-BE49-F238E27FC236}">
+                <a16:creationId xmlns:a16="http://schemas.microsoft.com/office/drawing/2014/main" id="{6B90DE6C-5CE3-1860-5CB3-41C78633DAC3}"/>
+              </a:ext>
+            </a:extLst>
+          </p:cNvPr>
+          <p:cNvPicPr>
+            <a:picLocks noChangeAspect="1"/>
+          </p:cNvPicPr>
+          <p:nvPr/>
+        </p:nvPicPr>
+        <p:blipFill>
+          <a:blip r:embed="rId3"/>
+          <a:stretch>
+            <a:fillRect/>
+          </a:stretch>
+        </p:blipFill>
+        <p:spPr>
+          <a:xfrm>
+            <a:off x="65368" y="6089513"/>
+            <a:ext cx="2536261" cy="768487"/>
+          </a:xfrm>
+          <a:prstGeom prst="rect">
+            <a:avLst/>
+          </a:prstGeom>
+        </p:spPr>
+      </p:pic>
+    </p:spTree>
+    <p:extLst>
+      <p:ext uri="{BB962C8B-B14F-4D97-AF65-F5344CB8AC3E}">
+        <p14:creationId xmlns:p14="http://schemas.microsoft.com/office/powerpoint/2010/main" val="920173932"/>
+      </p:ext>
+    </p:extLst>
+  </p:cSld>
+  <p:clrMapOvr>
+    <a:masterClrMapping/>
+  </p:clrMapOvr>
+</p:sld>
+</file>
+
+<file path=ppt/slides/slide12.xml><?xml version="1.0" encoding="utf-8"?>
+<p:sld xmlns:a="http://schemas.openxmlformats.org/drawingml/2006/main" xmlns:r="http://schemas.openxmlformats.org/officeDocument/2006/relationships" xmlns:p="http://schemas.openxmlformats.org/presentationml/2006/main">
+  <p:cSld>
+    <p:bg>
+      <p:bgPr>
+        <a:solidFill>
+          <a:schemeClr val="accent1"/>
+        </a:solidFill>
+        <a:effectLst/>
+      </p:bgPr>
+    </p:bg>
+    <p:spTree>
+      <p:nvGrpSpPr>
+        <p:cNvPr id="1" name=""/>
+        <p:cNvGrpSpPr/>
+        <p:nvPr/>
+      </p:nvGrpSpPr>
+      <p:grpSpPr>
+        <a:xfrm>
+          <a:off x="0" y="0"/>
+          <a:ext cx="0" cy="0"/>
+          <a:chOff x="0" y="0"/>
+          <a:chExt cx="0" cy="0"/>
+        </a:xfrm>
+      </p:grpSpPr>
+      <p:sp>
+        <p:nvSpPr>
+          <p:cNvPr id="2" name="Title 1">
+            <a:extLst>
+              <a:ext uri="{FF2B5EF4-FFF2-40B4-BE49-F238E27FC236}">
+                <a16:creationId xmlns:a16="http://schemas.microsoft.com/office/drawing/2014/main" id="{BCCAEE93-8585-46D4-A7EC-F184E317CB2E}"/>
+              </a:ext>
+            </a:extLst>
+          </p:cNvPr>
+          <p:cNvSpPr>
+            <a:spLocks noGrp="1"/>
+          </p:cNvSpPr>
+          <p:nvPr>
+            <p:ph type="ctrTitle"/>
+          </p:nvPr>
+        </p:nvSpPr>
+        <p:spPr>
+          <a:xfrm>
+            <a:off x="4267200" y="1615736"/>
+            <a:ext cx="4179570" cy="1524735"/>
+          </a:xfrm>
+        </p:spPr>
+        <p:txBody>
+          <a:bodyPr rtlCol="0"/>
+          <a:lstStyle/>
+          <a:p>
+            <a:pPr rtl="0"/>
+            <a:r>
+              <a:rPr lang="en-GB">
+                <a:solidFill>
+                  <a:schemeClr val="tx1"/>
+                </a:solidFill>
+              </a:rPr>
+              <a:t>THANK YOU</a:t>
+            </a:r>
+          </a:p>
+        </p:txBody>
+      </p:sp>
+      <p:sp>
+        <p:nvSpPr>
+          <p:cNvPr id="3" name="Content Placeholder 2">
+            <a:extLst>
+              <a:ext uri="{FF2B5EF4-FFF2-40B4-BE49-F238E27FC236}">
+                <a16:creationId xmlns:a16="http://schemas.microsoft.com/office/drawing/2014/main" id="{24AFFC60-19C3-4901-93F7-7AAF4C09F8C6}"/>
+              </a:ext>
+            </a:extLst>
+          </p:cNvPr>
+          <p:cNvSpPr>
+            <a:spLocks noGrp="1"/>
+          </p:cNvSpPr>
+          <p:nvPr>
+            <p:ph type="subTitle" idx="1"/>
+          </p:nvPr>
+        </p:nvSpPr>
+        <p:spPr>
+          <a:xfrm>
+            <a:off x="4267200" y="3238103"/>
+            <a:ext cx="5814060" cy="2004161"/>
+          </a:xfrm>
+        </p:spPr>
+        <p:txBody>
+          <a:bodyPr rtlCol="0">
+            <a:normAutofit/>
+          </a:bodyPr>
+          <a:lstStyle/>
+          <a:p>
+            <a:pPr rtl="0"/>
+            <a:r>
+              <a:rPr lang="en-GB" dirty="0">
+                <a:solidFill>
+                  <a:schemeClr val="tx1"/>
+                </a:solidFill>
+              </a:rPr>
+              <a:t>Amaan Mujawar​</a:t>
+            </a:r>
+          </a:p>
+          <a:p>
+            <a:pPr rtl="0"/>
+            <a:r>
+              <a:rPr lang="en-GB" dirty="0">
+                <a:solidFill>
+                  <a:schemeClr val="tx1"/>
+                </a:solidFill>
+              </a:rPr>
+              <a:t>aurmujawar1@sheffield.ac.uk</a:t>
+            </a:r>
+          </a:p>
+          <a:p>
+            <a:pPr rtl="0"/>
+            <a:r>
+              <a:rPr lang="en-GB" dirty="0">
+                <a:solidFill>
+                  <a:schemeClr val="tx1"/>
+                </a:solidFill>
+              </a:rPr>
+              <a:t>The University of Sheffield – Electronics and Computer Engineering</a:t>
+            </a:r>
+          </a:p>
+        </p:txBody>
+      </p:sp>
+      <p:sp>
+        <p:nvSpPr>
+          <p:cNvPr id="6" name="Slide Number Placeholder 5">
+            <a:extLst>
+              <a:ext uri="{FF2B5EF4-FFF2-40B4-BE49-F238E27FC236}">
+                <a16:creationId xmlns:a16="http://schemas.microsoft.com/office/drawing/2014/main" id="{5EDCFF82-B70F-4971-9182-7C3AEA3CFD26}"/>
+              </a:ext>
+            </a:extLst>
+          </p:cNvPr>
+          <p:cNvSpPr>
+            <a:spLocks noGrp="1"/>
+          </p:cNvSpPr>
+          <p:nvPr>
+            <p:ph type="sldNum" sz="quarter" idx="12"/>
+          </p:nvPr>
+        </p:nvSpPr>
+        <p:spPr>
+          <a:xfrm>
+            <a:off x="9579428" y="6356350"/>
+            <a:ext cx="1774371" cy="365125"/>
+          </a:xfrm>
+        </p:spPr>
+        <p:txBody>
+          <a:bodyPr rtlCol="0"/>
+          <a:lstStyle/>
+          <a:p>
+            <a:pPr rtl="0"/>
+            <a:fld id="{B5CEABB6-07DC-46E8-9B57-56EC44A396E5}" type="slidenum">
+              <a:rPr lang="en-GB" smtClean="0">
+                <a:solidFill>
+                  <a:schemeClr val="tx1"/>
+                </a:solidFill>
+              </a:rPr>
+              <a:pPr rtl="0"/>
+              <a:t>12</a:t>
+            </a:fld>
+            <a:endParaRPr lang="en-GB">
+              <a:solidFill>
+                <a:schemeClr val="tx1"/>
+              </a:solidFill>
+            </a:endParaRPr>
           </a:p>
         </p:txBody>
       </p:sp>
@@ -17394,6 +18462,14 @@
 <file path=ppt/slides/slide2.xml><?xml version="1.0" encoding="utf-8"?>
 <p:sld xmlns:a="http://schemas.openxmlformats.org/drawingml/2006/main" xmlns:r="http://schemas.openxmlformats.org/officeDocument/2006/relationships" xmlns:p="http://schemas.openxmlformats.org/presentationml/2006/main">
   <p:cSld>
+    <p:bg>
+      <p:bgPr>
+        <a:solidFill>
+          <a:schemeClr val="accent1"/>
+        </a:solidFill>
+        <a:effectLst/>
+      </p:bgPr>
+    </p:bg>
     <p:spTree>
       <p:nvGrpSpPr>
         <p:cNvPr id="1" name=""/>
@@ -17439,7 +18515,11 @@
           <a:p>
             <a:pPr rtl="0"/>
             <a:r>
-              <a:rPr lang="en-GB" dirty="0"/>
+              <a:rPr lang="en-GB" dirty="0">
+                <a:solidFill>
+                  <a:schemeClr val="tx1"/>
+                </a:solidFill>
+              </a:rPr>
               <a:t>ABOUT the project</a:t>
             </a:r>
           </a:p>
@@ -17481,7 +18561,11 @@
               <a:buChar char="•"/>
             </a:pPr>
             <a:r>
-              <a:rPr lang="en-US" b="1" dirty="0"/>
+              <a:rPr lang="en-US" b="1" dirty="0">
+                <a:solidFill>
+                  <a:schemeClr val="tx1"/>
+                </a:solidFill>
+              </a:rPr>
               <a:t>Implement an Arithmetic Unit Utilizing Approximate Computing into RISC-V SoC.</a:t>
             </a:r>
           </a:p>
@@ -17491,7 +18575,11 @@
               <a:buChar char="•"/>
             </a:pPr>
             <a:r>
-              <a:rPr lang="en-GB" b="1" dirty="0"/>
+              <a:rPr lang="en-GB" b="1" dirty="0">
+                <a:solidFill>
+                  <a:schemeClr val="tx1"/>
+                </a:solidFill>
+              </a:rPr>
               <a:t>Supervisor: Mr. Neil Powell</a:t>
             </a:r>
           </a:p>
@@ -17525,11 +18613,19 @@
           <a:p>
             <a:pPr rtl="0"/>
             <a:fld id="{19B51A1E-902D-48AF-9020-955120F399B6}" type="slidenum">
-              <a:rPr lang="en-GB" smtClean="0"/>
+              <a:rPr lang="en-GB" smtClean="0">
+                <a:solidFill>
+                  <a:schemeClr val="tx1"/>
+                </a:solidFill>
+              </a:rPr>
               <a:pPr/>
               <a:t>2</a:t>
             </a:fld>
-            <a:endParaRPr lang="en-GB"/>
+            <a:endParaRPr lang="en-GB">
+              <a:solidFill>
+                <a:schemeClr val="tx1"/>
+              </a:solidFill>
+            </a:endParaRPr>
           </a:p>
         </p:txBody>
       </p:sp>
@@ -17991,31 +19087,9 @@
   <p:cSld>
     <p:bg>
       <p:bgPr>
-        <a:gradFill flip="none" rotWithShape="1">
-          <a:gsLst>
-            <a:gs pos="0">
-              <a:schemeClr val="accent1">
-                <a:lumMod val="0"/>
-                <a:lumOff val="100000"/>
-              </a:schemeClr>
-            </a:gs>
-            <a:gs pos="35000">
-              <a:schemeClr val="accent1">
-                <a:lumMod val="0"/>
-                <a:lumOff val="100000"/>
-              </a:schemeClr>
-            </a:gs>
-            <a:gs pos="100000">
-              <a:schemeClr val="accent1">
-                <a:lumMod val="100000"/>
-              </a:schemeClr>
-            </a:gs>
-          </a:gsLst>
-          <a:path path="circle">
-            <a:fillToRect l="50000" t="-80000" r="50000" b="180000"/>
-          </a:path>
-          <a:tileRect/>
-        </a:gradFill>
+        <a:solidFill>
+          <a:schemeClr val="accent1"/>
+        </a:solidFill>
         <a:effectLst/>
       </p:bgPr>
     </p:bg>
@@ -18404,7 +19478,7 @@
                   <a:schemeClr val="tx1"/>
                 </a:solidFill>
               </a:rPr>
-              <a:pPr/>
+              <a:pPr rtl="0"/>
               <a:t>4</a:t>
             </a:fld>
             <a:endParaRPr lang="en-GB">
@@ -18724,7 +19798,7 @@
             <a:pPr rtl="0"/>
             <a:fld id="{B5CEABB6-07DC-46E8-9B57-56EC44A396E5}" type="slidenum">
               <a:rPr lang="en-GB" smtClean="0"/>
-              <a:pPr/>
+              <a:pPr rtl="0"/>
               <a:t>5</a:t>
             </a:fld>
             <a:endParaRPr lang="en-GB"/>
@@ -18779,7 +19853,13 @@
   <p:cSld>
     <p:spTree>
       <p:nvGrpSpPr>
-        <p:cNvPr id="1" name=""/>
+        <p:cNvPr id="1" name="">
+          <a:extLst>
+            <a:ext uri="{FF2B5EF4-FFF2-40B4-BE49-F238E27FC236}">
+              <a16:creationId xmlns:a16="http://schemas.microsoft.com/office/drawing/2014/main" id="{21E03235-2E12-B2D6-FF12-C0DF019ED511}"/>
+            </a:ext>
+          </a:extLst>
+        </p:cNvPr>
         <p:cNvGrpSpPr/>
         <p:nvPr/>
       </p:nvGrpSpPr>
@@ -18793,187 +19873,24 @@
       </p:grpSpPr>
       <p:sp>
         <p:nvSpPr>
-          <p:cNvPr id="2" name="Title 1">
-            <a:extLst>
-              <a:ext uri="{FF2B5EF4-FFF2-40B4-BE49-F238E27FC236}">
-                <a16:creationId xmlns:a16="http://schemas.microsoft.com/office/drawing/2014/main" id="{537E1C88-627C-4655-A4FB-0BB02EDB078A}"/>
-              </a:ext>
-            </a:extLst>
-          </p:cNvPr>
-          <p:cNvSpPr>
-            <a:spLocks noGrp="1"/>
-          </p:cNvSpPr>
-          <p:nvPr>
-            <p:ph type="title"/>
-          </p:nvPr>
-        </p:nvSpPr>
-        <p:spPr>
-          <a:xfrm>
-            <a:off x="1362075" y="1671639"/>
-            <a:ext cx="5111750" cy="1204912"/>
-          </a:xfrm>
-        </p:spPr>
-        <p:txBody>
-          <a:bodyPr rtlCol="0"/>
-          <a:lstStyle/>
-          <a:p>
-            <a:pPr rtl="0"/>
-            <a:r>
-              <a:rPr lang="en-GB" dirty="0"/>
-              <a:t>Problem specification</a:t>
-            </a:r>
-          </a:p>
-        </p:txBody>
-      </p:sp>
-      <p:sp>
-        <p:nvSpPr>
-          <p:cNvPr id="3" name="Content Placeholder 2">
-            <a:extLst>
-              <a:ext uri="{FF2B5EF4-FFF2-40B4-BE49-F238E27FC236}">
-                <a16:creationId xmlns:a16="http://schemas.microsoft.com/office/drawing/2014/main" id="{033634FE-ADF0-4BC3-A0A9-447EA9DD096B}"/>
-              </a:ext>
-            </a:extLst>
-          </p:cNvPr>
-          <p:cNvSpPr>
-            <a:spLocks noGrp="1"/>
-          </p:cNvSpPr>
-          <p:nvPr>
-            <p:ph type="body" idx="1"/>
-          </p:nvPr>
-        </p:nvSpPr>
-        <p:spPr>
-          <a:xfrm>
-            <a:off x="1362074" y="3429000"/>
-            <a:ext cx="7404735" cy="2660512"/>
-          </a:xfrm>
-        </p:spPr>
-        <p:txBody>
-          <a:bodyPr vert="horz" lIns="91440" tIns="45720" rIns="91440" bIns="45720" rtlCol="0" anchor="t">
-            <a:normAutofit lnSpcReduction="10000"/>
-          </a:bodyPr>
-          <a:lstStyle/>
-          <a:p>
-            <a:pPr rtl="0"/>
-            <a:r>
-              <a:rPr lang="en-US" b="1" dirty="0"/>
-              <a:t>Problem</a:t>
-            </a:r>
-            <a:r>
-              <a:rPr lang="en-US" dirty="0"/>
-              <a:t>: </a:t>
-            </a:r>
-          </a:p>
-          <a:p>
-            <a:pPr marL="285750" indent="-285750" rtl="0">
-              <a:buFont typeface="Arial" panose="020B0604020202020204" pitchFamily="34" charset="0"/>
-              <a:buChar char="•"/>
-            </a:pPr>
-            <a:r>
-              <a:rPr lang="en-US" dirty="0"/>
-              <a:t>Balancing accuracy, power consumption, and speed in arithmetic units</a:t>
-            </a:r>
-          </a:p>
-          <a:p>
-            <a:r>
-              <a:rPr lang="en-US" b="1" dirty="0"/>
-              <a:t>Expected Results</a:t>
-            </a:r>
-            <a:r>
-              <a:rPr lang="en-US" dirty="0"/>
-              <a:t>:</a:t>
-            </a:r>
-          </a:p>
-          <a:p>
-            <a:pPr marL="285750" indent="-285750">
-              <a:buFont typeface="Arial" panose="020B0604020202020204" pitchFamily="34" charset="0"/>
-              <a:buChar char="•"/>
-            </a:pPr>
-            <a:r>
-              <a:rPr lang="en-US" dirty="0"/>
-              <a:t>Enhanced computational efficiency with minimal accuracy loss</a:t>
-            </a:r>
-          </a:p>
-          <a:p>
-            <a:pPr marL="285750" indent="-285750">
-              <a:buFont typeface="Arial" panose="020B0604020202020204" pitchFamily="34" charset="0"/>
-              <a:buChar char="•"/>
-            </a:pPr>
-            <a:r>
-              <a:rPr lang="en-US" dirty="0"/>
-              <a:t>Reduced power consumption and chip area</a:t>
-            </a:r>
-          </a:p>
-          <a:p>
-            <a:r>
-              <a:rPr lang="en-GB" b="1" dirty="0"/>
-              <a:t>Methodology</a:t>
-            </a:r>
-            <a:r>
-              <a:rPr lang="en-GB" dirty="0"/>
-              <a:t>:</a:t>
-            </a:r>
-          </a:p>
-          <a:p>
-            <a:pPr marL="285750" indent="-285750">
-              <a:buFont typeface="Arial" panose="020B0604020202020204" pitchFamily="34" charset="0"/>
-              <a:buChar char="•"/>
-            </a:pPr>
-            <a:r>
-              <a:rPr lang="en-GB" dirty="0"/>
-              <a:t>Using Verilog for implementation and FPGA simulations</a:t>
-            </a:r>
-          </a:p>
-          <a:p>
-            <a:pPr marL="285750" indent="-285750">
-              <a:buFont typeface="Arial" panose="020B0604020202020204" pitchFamily="34" charset="0"/>
-              <a:buChar char="•"/>
-            </a:pPr>
-            <a:r>
-              <a:rPr lang="en-US" dirty="0"/>
-              <a:t>Implementing Approximate Adders and Approximate Multipliers</a:t>
-            </a:r>
-            <a:endParaRPr lang="en-GB" dirty="0"/>
-          </a:p>
-          <a:p>
-            <a:pPr marL="285750" indent="-285750">
-              <a:buFont typeface="Arial" panose="020B0604020202020204" pitchFamily="34" charset="0"/>
-              <a:buChar char="•"/>
-            </a:pPr>
-            <a:endParaRPr lang="en-GB" dirty="0"/>
-          </a:p>
-          <a:p>
-            <a:pPr marL="285750" indent="-285750">
-              <a:buFont typeface="Arial" panose="020B0604020202020204" pitchFamily="34" charset="0"/>
-              <a:buChar char="•"/>
-            </a:pPr>
-            <a:endParaRPr lang="en-US" dirty="0"/>
-          </a:p>
-          <a:p>
-            <a:pPr rtl="0"/>
-            <a:endParaRPr lang="en-GB" noProof="1"/>
-          </a:p>
-        </p:txBody>
-      </p:sp>
-      <p:sp>
-        <p:nvSpPr>
-          <p:cNvPr id="6" name="Slide Number Placeholder 5">
-            <a:extLst>
-              <a:ext uri="{FF2B5EF4-FFF2-40B4-BE49-F238E27FC236}">
-                <a16:creationId xmlns:a16="http://schemas.microsoft.com/office/drawing/2014/main" id="{C23C3221-5F04-4CA7-A86A-EEA8566A1735}"/>
-              </a:ext>
-            </a:extLst>
-          </p:cNvPr>
-          <p:cNvSpPr>
-            <a:spLocks noGrp="1"/>
-          </p:cNvSpPr>
-          <p:nvPr>
-            <p:ph type="sldNum" sz="quarter" idx="12"/>
-          </p:nvPr>
-        </p:nvSpPr>
-        <p:spPr>
-          <a:xfrm>
-            <a:off x="8610600" y="6356350"/>
-            <a:ext cx="2743200" cy="365125"/>
+          <p:cNvPr id="22" name="Slide Number Placeholder 21">
+            <a:extLst>
+              <a:ext uri="{FF2B5EF4-FFF2-40B4-BE49-F238E27FC236}">
+                <a16:creationId xmlns:a16="http://schemas.microsoft.com/office/drawing/2014/main" id="{15850B96-8188-C18A-5850-E90C83C5D05E}"/>
+              </a:ext>
+            </a:extLst>
+          </p:cNvPr>
+          <p:cNvSpPr>
+            <a:spLocks noGrp="1"/>
+          </p:cNvSpPr>
+          <p:nvPr>
+            <p:ph type="sldNum" sz="quarter" idx="22"/>
+          </p:nvPr>
+        </p:nvSpPr>
+        <p:spPr>
+          <a:xfrm>
+            <a:off x="10700656" y="6356350"/>
+            <a:ext cx="653143" cy="365125"/>
           </a:xfrm>
         </p:spPr>
         <p:txBody>
@@ -18983,19 +19900,19 @@
             <a:pPr rtl="0"/>
             <a:fld id="{B5CEABB6-07DC-46E8-9B57-56EC44A396E5}" type="slidenum">
               <a:rPr lang="en-GB" smtClean="0"/>
-              <a:pPr/>
+              <a:pPr rtl="0"/>
               <a:t>6</a:t>
             </a:fld>
-            <a:endParaRPr lang="en-GB" dirty="0"/>
+            <a:endParaRPr lang="en-GB"/>
           </a:p>
         </p:txBody>
       </p:sp>
       <p:pic>
         <p:nvPicPr>
-          <p:cNvPr id="7" name="Picture 6" descr="A purple text on a black background&#10;&#10;AI-generated content may be incorrect.">
-            <a:extLst>
-              <a:ext uri="{FF2B5EF4-FFF2-40B4-BE49-F238E27FC236}">
-                <a16:creationId xmlns:a16="http://schemas.microsoft.com/office/drawing/2014/main" id="{94E43E32-1EBB-00D6-C8B5-74596A9FD54A}"/>
+          <p:cNvPr id="19" name="Picture 18" descr="A purple text on a black background&#10;&#10;AI-generated content may be incorrect.">
+            <a:extLst>
+              <a:ext uri="{FF2B5EF4-FFF2-40B4-BE49-F238E27FC236}">
+                <a16:creationId xmlns:a16="http://schemas.microsoft.com/office/drawing/2014/main" id="{F55C19B2-C66B-541F-F71E-20E8B05152D4}"/>
               </a:ext>
             </a:extLst>
           </p:cNvPr>
@@ -19023,7 +19940,7 @@
     </p:spTree>
     <p:extLst>
       <p:ext uri="{BB962C8B-B14F-4D97-AF65-F5344CB8AC3E}">
-        <p14:creationId xmlns:p14="http://schemas.microsoft.com/office/powerpoint/2010/main" val="1346372204"/>
+        <p14:creationId xmlns:p14="http://schemas.microsoft.com/office/powerpoint/2010/main" val="3345524636"/>
       </p:ext>
     </p:extLst>
   </p:cSld>
@@ -19055,21 +19972,21 @@
           <p:cNvPr id="2" name="Title 1">
             <a:extLst>
               <a:ext uri="{FF2B5EF4-FFF2-40B4-BE49-F238E27FC236}">
-                <a16:creationId xmlns:a16="http://schemas.microsoft.com/office/drawing/2014/main" id="{A29DE7F2-E890-4744-88DD-A75F5E300513}"/>
-              </a:ext>
-            </a:extLst>
-          </p:cNvPr>
-          <p:cNvSpPr>
-            <a:spLocks noGrp="1"/>
-          </p:cNvSpPr>
-          <p:nvPr>
-            <p:ph type="ctrTitle"/>
-          </p:nvPr>
-        </p:nvSpPr>
-        <p:spPr>
-          <a:xfrm>
-            <a:off x="6991350" y="2571235"/>
-            <a:ext cx="4179570" cy="1715531"/>
+                <a16:creationId xmlns:a16="http://schemas.microsoft.com/office/drawing/2014/main" id="{537E1C88-627C-4655-A4FB-0BB02EDB078A}"/>
+              </a:ext>
+            </a:extLst>
+          </p:cNvPr>
+          <p:cNvSpPr>
+            <a:spLocks noGrp="1"/>
+          </p:cNvSpPr>
+          <p:nvPr>
+            <p:ph type="title"/>
+          </p:nvPr>
+        </p:nvSpPr>
+        <p:spPr>
+          <a:xfrm>
+            <a:off x="1362075" y="1671639"/>
+            <a:ext cx="5111750" cy="1204912"/>
           </a:xfrm>
         </p:spPr>
         <p:txBody>
@@ -19079,17 +19996,182 @@
             <a:pPr rtl="0"/>
             <a:r>
               <a:rPr lang="en-GB" dirty="0"/>
-              <a:t>Analysis and Significance</a:t>
-            </a:r>
+              <a:t>Problem specification</a:t>
+            </a:r>
+          </a:p>
+        </p:txBody>
+      </p:sp>
+      <p:sp>
+        <p:nvSpPr>
+          <p:cNvPr id="3" name="Content Placeholder 2">
+            <a:extLst>
+              <a:ext uri="{FF2B5EF4-FFF2-40B4-BE49-F238E27FC236}">
+                <a16:creationId xmlns:a16="http://schemas.microsoft.com/office/drawing/2014/main" id="{033634FE-ADF0-4BC3-A0A9-447EA9DD096B}"/>
+              </a:ext>
+            </a:extLst>
+          </p:cNvPr>
+          <p:cNvSpPr>
+            <a:spLocks noGrp="1"/>
+          </p:cNvSpPr>
+          <p:nvPr>
+            <p:ph type="body" idx="1"/>
+          </p:nvPr>
+        </p:nvSpPr>
+        <p:spPr>
+          <a:xfrm>
+            <a:off x="1362074" y="3429000"/>
+            <a:ext cx="7404735" cy="2660512"/>
+          </a:xfrm>
+        </p:spPr>
+        <p:txBody>
+          <a:bodyPr vert="horz" lIns="91440" tIns="45720" rIns="91440" bIns="45720" rtlCol="0" anchor="t">
+            <a:normAutofit lnSpcReduction="10000"/>
+          </a:bodyPr>
+          <a:lstStyle/>
+          <a:p>
+            <a:pPr rtl="0"/>
+            <a:r>
+              <a:rPr lang="en-US" b="1" dirty="0"/>
+              <a:t>Problem</a:t>
+            </a:r>
+            <a:r>
+              <a:rPr lang="en-US" dirty="0"/>
+              <a:t>: </a:t>
+            </a:r>
+          </a:p>
+          <a:p>
+            <a:pPr marL="285750" indent="-285750" rtl="0">
+              <a:buFont typeface="Arial" panose="020B0604020202020204" pitchFamily="34" charset="0"/>
+              <a:buChar char="•"/>
+            </a:pPr>
+            <a:r>
+              <a:rPr lang="en-US" dirty="0"/>
+              <a:t>Balancing accuracy, power consumption, and speed in arithmetic units</a:t>
+            </a:r>
+          </a:p>
+          <a:p>
+            <a:r>
+              <a:rPr lang="en-US" b="1" dirty="0"/>
+              <a:t>Expected Results</a:t>
+            </a:r>
+            <a:r>
+              <a:rPr lang="en-US" dirty="0"/>
+              <a:t>:</a:t>
+            </a:r>
+          </a:p>
+          <a:p>
+            <a:pPr marL="285750" indent="-285750">
+              <a:buFont typeface="Arial" panose="020B0604020202020204" pitchFamily="34" charset="0"/>
+              <a:buChar char="•"/>
+            </a:pPr>
+            <a:r>
+              <a:rPr lang="en-US" dirty="0"/>
+              <a:t>Enhanced computational efficiency with minimal accuracy loss</a:t>
+            </a:r>
+          </a:p>
+          <a:p>
+            <a:pPr marL="285750" indent="-285750">
+              <a:buFont typeface="Arial" panose="020B0604020202020204" pitchFamily="34" charset="0"/>
+              <a:buChar char="•"/>
+            </a:pPr>
+            <a:r>
+              <a:rPr lang="en-US" dirty="0"/>
+              <a:t>Reduced power consumption and chip area</a:t>
+            </a:r>
+          </a:p>
+          <a:p>
+            <a:r>
+              <a:rPr lang="en-GB" b="1" dirty="0"/>
+              <a:t>Methodology</a:t>
+            </a:r>
+            <a:r>
+              <a:rPr lang="en-GB" dirty="0"/>
+              <a:t>:</a:t>
+            </a:r>
+          </a:p>
+          <a:p>
+            <a:pPr marL="285750" indent="-285750">
+              <a:buFont typeface="Arial" panose="020B0604020202020204" pitchFamily="34" charset="0"/>
+              <a:buChar char="•"/>
+            </a:pPr>
+            <a:r>
+              <a:rPr lang="en-GB" dirty="0"/>
+              <a:t>Using Verilog for implementation and FPGA simulations</a:t>
+            </a:r>
+          </a:p>
+          <a:p>
+            <a:pPr marL="285750" indent="-285750">
+              <a:buFont typeface="Arial" panose="020B0604020202020204" pitchFamily="34" charset="0"/>
+              <a:buChar char="•"/>
+            </a:pPr>
+            <a:r>
+              <a:rPr lang="en-US" dirty="0"/>
+              <a:t>Implementing Approximate Adders and Approximate Multipliers</a:t>
+            </a:r>
+            <a:endParaRPr lang="en-GB" dirty="0"/>
+          </a:p>
+          <a:p>
+            <a:pPr marL="285750" indent="-285750">
+              <a:buFont typeface="Arial" panose="020B0604020202020204" pitchFamily="34" charset="0"/>
+              <a:buChar char="•"/>
+            </a:pPr>
+            <a:endParaRPr lang="en-GB" dirty="0"/>
+          </a:p>
+          <a:p>
+            <a:pPr marL="285750" indent="-285750">
+              <a:buFont typeface="Arial" panose="020B0604020202020204" pitchFamily="34" charset="0"/>
+              <a:buChar char="•"/>
+            </a:pPr>
+            <a:endParaRPr lang="en-US" dirty="0"/>
+          </a:p>
+          <a:p>
+            <a:pPr rtl="0"/>
+            <a:endParaRPr lang="en-GB" noProof="1"/>
+          </a:p>
+        </p:txBody>
+      </p:sp>
+      <p:sp>
+        <p:nvSpPr>
+          <p:cNvPr id="6" name="Slide Number Placeholder 5">
+            <a:extLst>
+              <a:ext uri="{FF2B5EF4-FFF2-40B4-BE49-F238E27FC236}">
+                <a16:creationId xmlns:a16="http://schemas.microsoft.com/office/drawing/2014/main" id="{C23C3221-5F04-4CA7-A86A-EEA8566A1735}"/>
+              </a:ext>
+            </a:extLst>
+          </p:cNvPr>
+          <p:cNvSpPr>
+            <a:spLocks noGrp="1"/>
+          </p:cNvSpPr>
+          <p:nvPr>
+            <p:ph type="sldNum" sz="quarter" idx="12"/>
+          </p:nvPr>
+        </p:nvSpPr>
+        <p:spPr>
+          <a:xfrm>
+            <a:off x="8610600" y="6356350"/>
+            <a:ext cx="2743200" cy="365125"/>
+          </a:xfrm>
+        </p:spPr>
+        <p:txBody>
+          <a:bodyPr rtlCol="0"/>
+          <a:lstStyle/>
+          <a:p>
+            <a:pPr rtl="0"/>
+            <a:fld id="{B5CEABB6-07DC-46E8-9B57-56EC44A396E5}" type="slidenum">
+              <a:rPr lang="en-GB" smtClean="0"/>
+              <a:pPr rtl="0"/>
+              <a:t>7</a:t>
+            </a:fld>
+            <a:endParaRPr lang="en-GB" dirty="0"/>
           </a:p>
         </p:txBody>
       </p:sp>
       <p:pic>
         <p:nvPicPr>
-          <p:cNvPr id="3" name="Picture 2" descr="A purple text on a black background&#10;&#10;AI-generated content may be incorrect.">
-            <a:extLst>
-              <a:ext uri="{FF2B5EF4-FFF2-40B4-BE49-F238E27FC236}">
-                <a16:creationId xmlns:a16="http://schemas.microsoft.com/office/drawing/2014/main" id="{2346C13E-31C1-C201-7D60-10520AE5D187}"/>
+          <p:cNvPr id="7" name="Picture 6" descr="A purple text on a black background&#10;&#10;AI-generated content may be incorrect.">
+            <a:extLst>
+              <a:ext uri="{FF2B5EF4-FFF2-40B4-BE49-F238E27FC236}">
+                <a16:creationId xmlns:a16="http://schemas.microsoft.com/office/drawing/2014/main" id="{94E43E32-1EBB-00D6-C8B5-74596A9FD54A}"/>
               </a:ext>
             </a:extLst>
           </p:cNvPr>
@@ -19106,7 +20188,7 @@
         </p:blipFill>
         <p:spPr>
           <a:xfrm>
-            <a:off x="65368" y="6100943"/>
+            <a:off x="65368" y="6089513"/>
             <a:ext cx="2536261" cy="768487"/>
           </a:xfrm>
           <a:prstGeom prst="rect">
@@ -19117,7 +20199,7 @@
     </p:spTree>
     <p:extLst>
       <p:ext uri="{BB962C8B-B14F-4D97-AF65-F5344CB8AC3E}">
-        <p14:creationId xmlns:p14="http://schemas.microsoft.com/office/powerpoint/2010/main" val="707789176"/>
+        <p14:creationId xmlns:p14="http://schemas.microsoft.com/office/powerpoint/2010/main" val="1346372204"/>
       </p:ext>
     </p:extLst>
   </p:cSld>
@@ -19130,6 +20212,14 @@
 <file path=ppt/slides/slide8.xml><?xml version="1.0" encoding="utf-8"?>
 <p:sld xmlns:a="http://schemas.openxmlformats.org/drawingml/2006/main" xmlns:r="http://schemas.openxmlformats.org/officeDocument/2006/relationships" xmlns:p="http://schemas.openxmlformats.org/presentationml/2006/main">
   <p:cSld>
+    <p:bg>
+      <p:bgPr>
+        <a:solidFill>
+          <a:schemeClr val="accent1"/>
+        </a:solidFill>
+        <a:effectLst/>
+      </p:bgPr>
+    </p:bg>
     <p:spTree>
       <p:nvGrpSpPr>
         <p:cNvPr id="1" name=""/>
@@ -19149,132 +20239,21 @@
           <p:cNvPr id="2" name="Title 1">
             <a:extLst>
               <a:ext uri="{FF2B5EF4-FFF2-40B4-BE49-F238E27FC236}">
-                <a16:creationId xmlns:a16="http://schemas.microsoft.com/office/drawing/2014/main" id="{8A4E0A63-A388-49B1-A04E-27CE9BD622EF}"/>
-              </a:ext>
-            </a:extLst>
-          </p:cNvPr>
-          <p:cNvSpPr>
-            <a:spLocks noGrp="1"/>
-          </p:cNvSpPr>
-          <p:nvPr>
-            <p:ph type="title"/>
-          </p:nvPr>
-        </p:nvSpPr>
-        <p:spPr>
-          <a:xfrm>
-            <a:off x="5920169" y="1152771"/>
-            <a:ext cx="5431971" cy="846301"/>
-          </a:xfrm>
-        </p:spPr>
-        <p:txBody>
-          <a:bodyPr rtlCol="0">
-            <a:normAutofit fontScale="90000"/>
-          </a:bodyPr>
-          <a:lstStyle/>
-          <a:p>
-            <a:pPr rtl="0"/>
-            <a:r>
-              <a:rPr lang="en-US" dirty="0"/>
-              <a:t>Comparison Against Aims and Objectives</a:t>
-            </a:r>
-            <a:endParaRPr lang="en-GB" dirty="0"/>
-          </a:p>
-        </p:txBody>
-      </p:sp>
-      <p:sp>
-        <p:nvSpPr>
-          <p:cNvPr id="6" name="Text Placeholder 5">
-            <a:extLst>
-              <a:ext uri="{FF2B5EF4-FFF2-40B4-BE49-F238E27FC236}">
-                <a16:creationId xmlns:a16="http://schemas.microsoft.com/office/drawing/2014/main" id="{7640DF9D-0C9E-4C5D-9635-6B4DE10CCEE5}"/>
-              </a:ext>
-            </a:extLst>
-          </p:cNvPr>
-          <p:cNvSpPr>
-            <a:spLocks noGrp="1"/>
-          </p:cNvSpPr>
-          <p:nvPr>
-            <p:ph type="body" sz="quarter" idx="13"/>
-          </p:nvPr>
-        </p:nvSpPr>
-        <p:spPr>
-          <a:xfrm>
-            <a:off x="5922254" y="2469515"/>
-            <a:ext cx="5433204" cy="365125"/>
-          </a:xfrm>
-        </p:spPr>
-        <p:txBody>
-          <a:bodyPr vert="horz" lIns="91440" tIns="45720" rIns="91440" bIns="45720" rtlCol="0" anchor="t">
-            <a:noAutofit/>
-          </a:bodyPr>
-          <a:lstStyle/>
-          <a:p>
-            <a:pPr rtl="0"/>
-            <a:r>
-              <a:rPr lang="en-GB" dirty="0"/>
-              <a:t>Achievements</a:t>
-            </a:r>
-            <a:endParaRPr lang="en-GB" noProof="1"/>
-          </a:p>
-        </p:txBody>
-      </p:sp>
-      <p:sp>
-        <p:nvSpPr>
-          <p:cNvPr id="8" name="Text Placeholder 7">
-            <a:extLst>
-              <a:ext uri="{FF2B5EF4-FFF2-40B4-BE49-F238E27FC236}">
-                <a16:creationId xmlns:a16="http://schemas.microsoft.com/office/drawing/2014/main" id="{F5C3A7BE-F7FC-4942-A31A-491A8A806103}"/>
-              </a:ext>
-            </a:extLst>
-          </p:cNvPr>
-          <p:cNvSpPr>
-            <a:spLocks noGrp="1"/>
-          </p:cNvSpPr>
-          <p:nvPr>
-            <p:ph type="body" sz="quarter" idx="23"/>
-          </p:nvPr>
-        </p:nvSpPr>
-        <p:spPr>
-          <a:xfrm>
-            <a:off x="5922254" y="3569311"/>
-            <a:ext cx="5433204" cy="365125"/>
-          </a:xfrm>
-        </p:spPr>
-        <p:txBody>
-          <a:bodyPr vert="horz" lIns="91440" tIns="45720" rIns="91440" bIns="45720" rtlCol="0" anchor="t">
-            <a:noAutofit/>
-          </a:bodyPr>
-          <a:lstStyle/>
-          <a:p>
-            <a:pPr rtl="0"/>
-            <a:r>
-              <a:rPr lang="en-GB" dirty="0"/>
-              <a:t>Pending Tasks</a:t>
-            </a:r>
-            <a:endParaRPr lang="en-GB" noProof="1"/>
-          </a:p>
-        </p:txBody>
-      </p:sp>
-      <p:sp>
-        <p:nvSpPr>
-          <p:cNvPr id="4" name="Slide Number Placeholder 3">
-            <a:extLst>
-              <a:ext uri="{FF2B5EF4-FFF2-40B4-BE49-F238E27FC236}">
-                <a16:creationId xmlns:a16="http://schemas.microsoft.com/office/drawing/2014/main" id="{79ED4A67-3A46-4F54-A12A-EAE1B53E6457}"/>
-              </a:ext>
-            </a:extLst>
-          </p:cNvPr>
-          <p:cNvSpPr>
-            <a:spLocks noGrp="1"/>
-          </p:cNvSpPr>
-          <p:nvPr>
-            <p:ph type="sldNum" sz="quarter" idx="22"/>
-          </p:nvPr>
-        </p:nvSpPr>
-        <p:spPr>
-          <a:xfrm>
-            <a:off x="10700656" y="6356350"/>
-            <a:ext cx="653143" cy="365125"/>
+                <a16:creationId xmlns:a16="http://schemas.microsoft.com/office/drawing/2014/main" id="{A29DE7F2-E890-4744-88DD-A75F5E300513}"/>
+              </a:ext>
+            </a:extLst>
+          </p:cNvPr>
+          <p:cNvSpPr>
+            <a:spLocks noGrp="1"/>
+          </p:cNvSpPr>
+          <p:nvPr>
+            <p:ph type="ctrTitle"/>
+          </p:nvPr>
+        </p:nvSpPr>
+        <p:spPr>
+          <a:xfrm>
+            <a:off x="6991350" y="2571235"/>
+            <a:ext cx="4179570" cy="1715531"/>
           </a:xfrm>
         </p:spPr>
         <p:txBody>
@@ -19282,268 +20261,23 @@
           <a:lstStyle/>
           <a:p>
             <a:pPr rtl="0"/>
-            <a:fld id="{19B51A1E-902D-48AF-9020-955120F399B6}" type="slidenum">
-              <a:rPr lang="en-GB" smtClean="0"/>
-              <a:pPr/>
-              <a:t>8</a:t>
-            </a:fld>
-            <a:endParaRPr lang="en-GB" dirty="0"/>
-          </a:p>
-        </p:txBody>
-      </p:sp>
-      <p:sp>
-        <p:nvSpPr>
-          <p:cNvPr id="12" name="Rectangle 2">
-            <a:extLst>
-              <a:ext uri="{FF2B5EF4-FFF2-40B4-BE49-F238E27FC236}">
-                <a16:creationId xmlns:a16="http://schemas.microsoft.com/office/drawing/2014/main" id="{FFBB44AA-D826-FEBA-A1EB-06BE549E3C1A}"/>
-              </a:ext>
-            </a:extLst>
-          </p:cNvPr>
-          <p:cNvSpPr>
-            <a:spLocks noGrp="1" noChangeArrowheads="1"/>
-          </p:cNvSpPr>
-          <p:nvPr>
-            <p:ph type="body" sz="quarter" idx="15"/>
-          </p:nvPr>
-        </p:nvSpPr>
-        <p:spPr bwMode="auto">
-          <a:xfrm>
-            <a:off x="5921375" y="2816552"/>
-            <a:ext cx="4989636" cy="523220"/>
-          </a:xfrm>
-          <a:prstGeom prst="rect">
-            <a:avLst/>
-          </a:prstGeom>
-          <a:noFill/>
-          <a:ln>
-            <a:noFill/>
-          </a:ln>
-          <a:effectLst/>
-          <a:extLst>
-            <a:ext uri="{909E8E84-426E-40DD-AFC4-6F175D3DCCD1}">
-              <a14:hiddenFill xmlns:a14="http://schemas.microsoft.com/office/drawing/2010/main">
-                <a:solidFill>
-                  <a:schemeClr val="accent1"/>
-                </a:solidFill>
-              </a14:hiddenFill>
-            </a:ext>
-            <a:ext uri="{91240B29-F687-4F45-9708-019B960494DF}">
-              <a14:hiddenLine xmlns:a14="http://schemas.microsoft.com/office/drawing/2010/main" w="9525">
+            <a:r>
+              <a:rPr lang="en-GB" dirty="0">
                 <a:solidFill>
                   <a:schemeClr val="tx1"/>
                 </a:solidFill>
-                <a:miter lim="800000"/>
-                <a:headEnd/>
-                <a:tailEnd/>
-              </a14:hiddenLine>
-            </a:ext>
-            <a:ext uri="{AF507438-7753-43E0-B8FC-AC1667EBCBE1}">
-              <a14:hiddenEffects xmlns:a14="http://schemas.microsoft.com/office/drawing/2010/main">
-                <a:effectLst>
-                  <a:outerShdw dist="35921" dir="2700000" algn="ctr" rotWithShape="0">
-                    <a:schemeClr val="bg2"/>
-                  </a:outerShdw>
-                </a:effectLst>
-              </a14:hiddenEffects>
-            </a:ext>
-          </a:extLst>
-        </p:spPr>
-        <p:txBody>
-          <a:bodyPr vert="horz" wrap="none" lIns="91440" tIns="45720" rIns="91440" bIns="45720" numCol="1" anchor="ctr" anchorCtr="0" compatLnSpc="1">
-            <a:prstTxWarp prst="textNoShape">
-              <a:avLst/>
-            </a:prstTxWarp>
-            <a:spAutoFit/>
-          </a:bodyPr>
-          <a:lstStyle/>
-          <a:p>
-            <a:pPr marL="0" marR="0" lvl="0" indent="0" algn="l" defTabSz="914400" rtl="0" eaLnBrk="0" fontAlgn="base" latinLnBrk="0" hangingPunct="0">
-              <a:lnSpc>
-                <a:spcPct val="100000"/>
-              </a:lnSpc>
-              <a:spcBef>
-                <a:spcPct val="0"/>
-              </a:spcBef>
-              <a:spcAft>
-                <a:spcPct val="0"/>
-              </a:spcAft>
-              <a:buClrTx/>
-              <a:buSzTx/>
-              <a:buFontTx/>
-              <a:buChar char="•"/>
-              <a:tabLst/>
-            </a:pPr>
-            <a:r>
-              <a:rPr lang="en-US" altLang="en-US" dirty="0"/>
-              <a:t>Established a benchmark with a pipelined MAC unit</a:t>
-            </a:r>
-          </a:p>
-          <a:p>
-            <a:pPr marL="0" marR="0" lvl="0" indent="0" algn="l" defTabSz="914400" rtl="0" eaLnBrk="0" fontAlgn="base" latinLnBrk="0" hangingPunct="0">
-              <a:lnSpc>
-                <a:spcPct val="100000"/>
-              </a:lnSpc>
-              <a:spcBef>
-                <a:spcPct val="0"/>
-              </a:spcBef>
-              <a:spcAft>
-                <a:spcPct val="0"/>
-              </a:spcAft>
-              <a:buClrTx/>
-              <a:buSzTx/>
-              <a:buFontTx/>
-              <a:buChar char="•"/>
-              <a:tabLst/>
-            </a:pPr>
-            <a:r>
-              <a:rPr lang="en-US" altLang="en-US" dirty="0"/>
-              <a:t>Conceptual and partial implementation of AAUD architecture</a:t>
-            </a:r>
-            <a:endParaRPr kumimoji="0" lang="en-US" altLang="en-US" sz="1800" b="0" i="0" u="none" strike="noStrike" cap="none" normalizeH="0" baseline="0" dirty="0">
-              <a:ln>
-                <a:noFill/>
-              </a:ln>
-              <a:solidFill>
-                <a:schemeClr val="tx1"/>
-              </a:solidFill>
-              <a:effectLst/>
-              <a:latin typeface="Arial" panose="020B0604020202020204" pitchFamily="34" charset="0"/>
-            </a:endParaRPr>
-          </a:p>
-        </p:txBody>
-      </p:sp>
-      <p:sp>
-        <p:nvSpPr>
-          <p:cNvPr id="14" name="Rectangle 4">
-            <a:extLst>
-              <a:ext uri="{FF2B5EF4-FFF2-40B4-BE49-F238E27FC236}">
-                <a16:creationId xmlns:a16="http://schemas.microsoft.com/office/drawing/2014/main" id="{C4C25FFF-01A9-75AF-C09C-C09B33E1A65C}"/>
-              </a:ext>
-            </a:extLst>
-          </p:cNvPr>
-          <p:cNvSpPr>
-            <a:spLocks noGrp="1" noChangeArrowheads="1"/>
-          </p:cNvSpPr>
-          <p:nvPr>
-            <p:ph type="body" sz="quarter" idx="24"/>
-          </p:nvPr>
-        </p:nvSpPr>
-        <p:spPr bwMode="auto">
-          <a:xfrm>
-            <a:off x="5921375" y="3885119"/>
-            <a:ext cx="5275675" cy="584775"/>
-          </a:xfrm>
-          <a:prstGeom prst="rect">
-            <a:avLst/>
-          </a:prstGeom>
-          <a:noFill/>
-          <a:ln>
-            <a:noFill/>
-          </a:ln>
-          <a:effectLst/>
-          <a:extLst>
-            <a:ext uri="{909E8E84-426E-40DD-AFC4-6F175D3DCCD1}">
-              <a14:hiddenFill xmlns:a14="http://schemas.microsoft.com/office/drawing/2010/main">
-                <a:solidFill>
-                  <a:schemeClr val="accent1"/>
-                </a:solidFill>
-              </a14:hiddenFill>
-            </a:ext>
-            <a:ext uri="{91240B29-F687-4F45-9708-019B960494DF}">
-              <a14:hiddenLine xmlns:a14="http://schemas.microsoft.com/office/drawing/2010/main" w="9525">
-                <a:solidFill>
-                  <a:schemeClr val="tx1"/>
-                </a:solidFill>
-                <a:miter lim="800000"/>
-                <a:headEnd/>
-                <a:tailEnd/>
-              </a14:hiddenLine>
-            </a:ext>
-            <a:ext uri="{AF507438-7753-43E0-B8FC-AC1667EBCBE1}">
-              <a14:hiddenEffects xmlns:a14="http://schemas.microsoft.com/office/drawing/2010/main">
-                <a:effectLst>
-                  <a:outerShdw dist="35921" dir="2700000" algn="ctr" rotWithShape="0">
-                    <a:schemeClr val="bg2"/>
-                  </a:outerShdw>
-                </a:effectLst>
-              </a14:hiddenEffects>
-            </a:ext>
-          </a:extLst>
-        </p:spPr>
-        <p:txBody>
-          <a:bodyPr vert="horz" wrap="none" lIns="91440" tIns="45720" rIns="91440" bIns="45720" numCol="1" anchor="ctr" anchorCtr="0" compatLnSpc="1">
-            <a:prstTxWarp prst="textNoShape">
-              <a:avLst/>
-            </a:prstTxWarp>
-            <a:spAutoFit/>
-          </a:bodyPr>
-          <a:lstStyle/>
-          <a:p>
-            <a:pPr marL="0" marR="0" lvl="0" indent="0" algn="l" defTabSz="914400" rtl="0" eaLnBrk="0" fontAlgn="base" latinLnBrk="0" hangingPunct="0">
-              <a:lnSpc>
-                <a:spcPct val="100000"/>
-              </a:lnSpc>
-              <a:spcBef>
-                <a:spcPct val="0"/>
-              </a:spcBef>
-              <a:spcAft>
-                <a:spcPct val="0"/>
-              </a:spcAft>
-              <a:buClrTx/>
-              <a:buSzTx/>
-              <a:buFontTx/>
-              <a:buChar char="•"/>
-              <a:tabLst/>
-            </a:pPr>
-            <a:r>
-              <a:rPr lang="en-US" altLang="en-US" dirty="0"/>
-              <a:t>Complete integration of approximate multipliers and adders.</a:t>
-            </a:r>
-          </a:p>
-          <a:p>
-            <a:pPr marL="0" marR="0" lvl="0" indent="0" algn="l" defTabSz="914400" rtl="0" eaLnBrk="0" fontAlgn="base" latinLnBrk="0" hangingPunct="0">
-              <a:lnSpc>
-                <a:spcPct val="100000"/>
-              </a:lnSpc>
-              <a:spcBef>
-                <a:spcPct val="0"/>
-              </a:spcBef>
-              <a:spcAft>
-                <a:spcPct val="0"/>
-              </a:spcAft>
-              <a:buClrTx/>
-              <a:buSzTx/>
-              <a:buFontTx/>
-              <a:buChar char="•"/>
-              <a:tabLst/>
-            </a:pPr>
-            <a:r>
-              <a:rPr lang="en-US" altLang="en-US" dirty="0"/>
-              <a:t>Conduct comprehensive testing for power, speed, and accuracy</a:t>
-            </a:r>
-            <a:r>
-              <a:rPr kumimoji="0" lang="en-US" altLang="en-US" sz="1800" b="0" i="0" u="none" strike="noStrike" cap="none" normalizeH="0" baseline="0" dirty="0">
-                <a:ln>
-                  <a:noFill/>
-                </a:ln>
-                <a:solidFill>
-                  <a:schemeClr val="tx1"/>
-                </a:solidFill>
-                <a:effectLst/>
-                <a:latin typeface="Arial" panose="020B0604020202020204" pitchFamily="34" charset="0"/>
               </a:rPr>
-              <a:t>. </a:t>
+              <a:t>Analysis and Significance</a:t>
             </a:r>
           </a:p>
         </p:txBody>
       </p:sp>
       <p:pic>
         <p:nvPicPr>
-          <p:cNvPr id="19" name="Picture 18" descr="A purple text on a black background&#10;&#10;AI-generated content may be incorrect.">
-            <a:extLst>
-              <a:ext uri="{FF2B5EF4-FFF2-40B4-BE49-F238E27FC236}">
-                <a16:creationId xmlns:a16="http://schemas.microsoft.com/office/drawing/2014/main" id="{B1AE466D-B9A8-8094-BDF0-CE6832E35870}"/>
+          <p:cNvPr id="3" name="Picture 2" descr="A purple text on a black background&#10;&#10;AI-generated content may be incorrect.">
+            <a:extLst>
+              <a:ext uri="{FF2B5EF4-FFF2-40B4-BE49-F238E27FC236}">
+                <a16:creationId xmlns:a16="http://schemas.microsoft.com/office/drawing/2014/main" id="{2346C13E-31C1-C201-7D60-10520AE5D187}"/>
               </a:ext>
             </a:extLst>
           </p:cNvPr>
@@ -19571,7 +20305,7 @@
     </p:spTree>
     <p:extLst>
       <p:ext uri="{BB962C8B-B14F-4D97-AF65-F5344CB8AC3E}">
-        <p14:creationId xmlns:p14="http://schemas.microsoft.com/office/powerpoint/2010/main" val="2069393026"/>
+        <p14:creationId xmlns:p14="http://schemas.microsoft.com/office/powerpoint/2010/main" val="707789176"/>
       </p:ext>
     </p:extLst>
   </p:cSld>
@@ -19603,7 +20337,7 @@
           <p:cNvPr id="2" name="Title 1">
             <a:extLst>
               <a:ext uri="{FF2B5EF4-FFF2-40B4-BE49-F238E27FC236}">
-                <a16:creationId xmlns:a16="http://schemas.microsoft.com/office/drawing/2014/main" id="{5CE54ABB-4929-4810-950B-2DAEA0A5BAB4}"/>
+                <a16:creationId xmlns:a16="http://schemas.microsoft.com/office/drawing/2014/main" id="{8A4E0A63-A388-49B1-A04E-27CE9BD622EF}"/>
               </a:ext>
             </a:extLst>
           </p:cNvPr>
@@ -19616,8 +20350,119 @@
         </p:nvSpPr>
         <p:spPr>
           <a:xfrm>
-            <a:off x="1885156" y="892177"/>
-            <a:ext cx="8421688" cy="1325563"/>
+            <a:off x="5920169" y="1152771"/>
+            <a:ext cx="5431971" cy="846301"/>
+          </a:xfrm>
+        </p:spPr>
+        <p:txBody>
+          <a:bodyPr rtlCol="0">
+            <a:normAutofit fontScale="90000"/>
+          </a:bodyPr>
+          <a:lstStyle/>
+          <a:p>
+            <a:pPr rtl="0"/>
+            <a:r>
+              <a:rPr lang="en-US" dirty="0"/>
+              <a:t>Comparison Against Aims and Objectives</a:t>
+            </a:r>
+            <a:endParaRPr lang="en-GB" dirty="0"/>
+          </a:p>
+        </p:txBody>
+      </p:sp>
+      <p:sp>
+        <p:nvSpPr>
+          <p:cNvPr id="6" name="Text Placeholder 5">
+            <a:extLst>
+              <a:ext uri="{FF2B5EF4-FFF2-40B4-BE49-F238E27FC236}">
+                <a16:creationId xmlns:a16="http://schemas.microsoft.com/office/drawing/2014/main" id="{7640DF9D-0C9E-4C5D-9635-6B4DE10CCEE5}"/>
+              </a:ext>
+            </a:extLst>
+          </p:cNvPr>
+          <p:cNvSpPr>
+            <a:spLocks noGrp="1"/>
+          </p:cNvSpPr>
+          <p:nvPr>
+            <p:ph type="body" sz="quarter" idx="13"/>
+          </p:nvPr>
+        </p:nvSpPr>
+        <p:spPr>
+          <a:xfrm>
+            <a:off x="5922254" y="2469515"/>
+            <a:ext cx="5433204" cy="365125"/>
+          </a:xfrm>
+        </p:spPr>
+        <p:txBody>
+          <a:bodyPr vert="horz" lIns="91440" tIns="45720" rIns="91440" bIns="45720" rtlCol="0" anchor="t">
+            <a:noAutofit/>
+          </a:bodyPr>
+          <a:lstStyle/>
+          <a:p>
+            <a:pPr rtl="0"/>
+            <a:r>
+              <a:rPr lang="en-GB" dirty="0"/>
+              <a:t>Achievements</a:t>
+            </a:r>
+            <a:endParaRPr lang="en-GB" noProof="1"/>
+          </a:p>
+        </p:txBody>
+      </p:sp>
+      <p:sp>
+        <p:nvSpPr>
+          <p:cNvPr id="8" name="Text Placeholder 7">
+            <a:extLst>
+              <a:ext uri="{FF2B5EF4-FFF2-40B4-BE49-F238E27FC236}">
+                <a16:creationId xmlns:a16="http://schemas.microsoft.com/office/drawing/2014/main" id="{F5C3A7BE-F7FC-4942-A31A-491A8A806103}"/>
+              </a:ext>
+            </a:extLst>
+          </p:cNvPr>
+          <p:cNvSpPr>
+            <a:spLocks noGrp="1"/>
+          </p:cNvSpPr>
+          <p:nvPr>
+            <p:ph type="body" sz="quarter" idx="23"/>
+          </p:nvPr>
+        </p:nvSpPr>
+        <p:spPr>
+          <a:xfrm>
+            <a:off x="5922254" y="3569311"/>
+            <a:ext cx="5433204" cy="365125"/>
+          </a:xfrm>
+        </p:spPr>
+        <p:txBody>
+          <a:bodyPr vert="horz" lIns="91440" tIns="45720" rIns="91440" bIns="45720" rtlCol="0" anchor="t">
+            <a:noAutofit/>
+          </a:bodyPr>
+          <a:lstStyle/>
+          <a:p>
+            <a:pPr rtl="0"/>
+            <a:r>
+              <a:rPr lang="en-GB" dirty="0"/>
+              <a:t>Pending Tasks</a:t>
+            </a:r>
+            <a:endParaRPr lang="en-GB" noProof="1"/>
+          </a:p>
+        </p:txBody>
+      </p:sp>
+      <p:sp>
+        <p:nvSpPr>
+          <p:cNvPr id="4" name="Slide Number Placeholder 3">
+            <a:extLst>
+              <a:ext uri="{FF2B5EF4-FFF2-40B4-BE49-F238E27FC236}">
+                <a16:creationId xmlns:a16="http://schemas.microsoft.com/office/drawing/2014/main" id="{79ED4A67-3A46-4F54-A12A-EAE1B53E6457}"/>
+              </a:ext>
+            </a:extLst>
+          </p:cNvPr>
+          <p:cNvSpPr>
+            <a:spLocks noGrp="1"/>
+          </p:cNvSpPr>
+          <p:nvPr>
+            <p:ph type="sldNum" sz="quarter" idx="22"/>
+          </p:nvPr>
+        </p:nvSpPr>
+        <p:spPr>
+          <a:xfrm>
+            <a:off x="10700656" y="6356350"/>
+            <a:ext cx="653143" cy="365125"/>
           </a:xfrm>
         </p:spPr>
         <p:txBody>
@@ -19625,187 +20470,9 @@
           <a:lstStyle/>
           <a:p>
             <a:pPr rtl="0"/>
-            <a:r>
-              <a:rPr lang="en-GB" dirty="0"/>
-              <a:t>Future Work Plan</a:t>
-            </a:r>
-          </a:p>
-        </p:txBody>
-      </p:sp>
-      <p:sp>
-        <p:nvSpPr>
-          <p:cNvPr id="4" name="Text Placeholder 3">
-            <a:extLst>
-              <a:ext uri="{FF2B5EF4-FFF2-40B4-BE49-F238E27FC236}">
-                <a16:creationId xmlns:a16="http://schemas.microsoft.com/office/drawing/2014/main" id="{A112B089-A8F9-45B1-BE6E-EAC10163F082}"/>
-              </a:ext>
-            </a:extLst>
-          </p:cNvPr>
-          <p:cNvSpPr>
-            <a:spLocks noGrp="1"/>
-          </p:cNvSpPr>
-          <p:nvPr>
-            <p:ph type="body" idx="1"/>
-          </p:nvPr>
-        </p:nvSpPr>
-        <p:spPr>
-          <a:xfrm>
-            <a:off x="1163094" y="1826025"/>
-            <a:ext cx="2882475" cy="823912"/>
-          </a:xfrm>
-        </p:spPr>
-        <p:txBody>
-          <a:bodyPr rtlCol="0"/>
-          <a:lstStyle/>
-          <a:p>
-            <a:pPr rtl="0"/>
-            <a:r>
-              <a:rPr lang="en-GB" dirty="0"/>
-              <a:t>Next steps</a:t>
-            </a:r>
-          </a:p>
-        </p:txBody>
-      </p:sp>
-      <p:sp>
-        <p:nvSpPr>
-          <p:cNvPr id="7" name="Content Placeholder 6">
-            <a:extLst>
-              <a:ext uri="{FF2B5EF4-FFF2-40B4-BE49-F238E27FC236}">
-                <a16:creationId xmlns:a16="http://schemas.microsoft.com/office/drawing/2014/main" id="{6B35F89A-6CDF-41F7-BD87-18B45BD7330B}"/>
-              </a:ext>
-            </a:extLst>
-          </p:cNvPr>
-          <p:cNvSpPr>
-            <a:spLocks noGrp="1"/>
-          </p:cNvSpPr>
-          <p:nvPr>
-            <p:ph sz="half" idx="2"/>
-          </p:nvPr>
-        </p:nvSpPr>
-        <p:spPr>
-          <a:xfrm>
-            <a:off x="1163094" y="2883695"/>
-            <a:ext cx="2882475" cy="1997867"/>
-          </a:xfrm>
-        </p:spPr>
-        <p:txBody>
-          <a:bodyPr vert="horz" lIns="91440" tIns="45720" rIns="91440" bIns="45720" rtlCol="0" anchor="t">
-            <a:normAutofit/>
-          </a:bodyPr>
-          <a:lstStyle/>
-          <a:p>
-            <a:pPr rtl="0"/>
-            <a:r>
-              <a:rPr lang="en-US" dirty="0"/>
-              <a:t>Complete implementation of approximate arithmetic units</a:t>
-            </a:r>
-            <a:endParaRPr lang="en-GB" noProof="1"/>
-          </a:p>
-        </p:txBody>
-      </p:sp>
-      <p:sp>
-        <p:nvSpPr>
-          <p:cNvPr id="3" name="Text Placeholder 2">
-            <a:extLst>
-              <a:ext uri="{FF2B5EF4-FFF2-40B4-BE49-F238E27FC236}">
-                <a16:creationId xmlns:a16="http://schemas.microsoft.com/office/drawing/2014/main" id="{D5E1C399-8F48-44F5-9461-3C89866D4CE1}"/>
-              </a:ext>
-            </a:extLst>
-          </p:cNvPr>
-          <p:cNvSpPr>
-            <a:spLocks noGrp="1"/>
-          </p:cNvSpPr>
-          <p:nvPr>
-            <p:ph sz="quarter" idx="4"/>
-          </p:nvPr>
-        </p:nvSpPr>
-        <p:spPr>
-          <a:xfrm>
-            <a:off x="4567655" y="2883695"/>
-            <a:ext cx="2896671" cy="1997867"/>
-          </a:xfrm>
-        </p:spPr>
-        <p:txBody>
-          <a:bodyPr rtlCol="0"/>
-          <a:lstStyle/>
-          <a:p>
-            <a:pPr rtl="0"/>
-            <a:r>
-              <a:rPr lang="en-US" dirty="0"/>
-              <a:t>Integrate AAUD into RISC-V SoC and conduct full system testing</a:t>
-            </a:r>
-            <a:endParaRPr lang="en-GB" dirty="0"/>
-          </a:p>
-        </p:txBody>
-      </p:sp>
-      <p:sp>
-        <p:nvSpPr>
-          <p:cNvPr id="8" name="Text Placeholder 7">
-            <a:extLst>
-              <a:ext uri="{FF2B5EF4-FFF2-40B4-BE49-F238E27FC236}">
-                <a16:creationId xmlns:a16="http://schemas.microsoft.com/office/drawing/2014/main" id="{E92B9716-8D44-4864-8986-720957B34362}"/>
-              </a:ext>
-            </a:extLst>
-          </p:cNvPr>
-          <p:cNvSpPr>
-            <a:spLocks noGrp="1"/>
-          </p:cNvSpPr>
-          <p:nvPr>
-            <p:ph sz="half" idx="14"/>
-          </p:nvPr>
-        </p:nvSpPr>
-        <p:spPr>
-          <a:xfrm>
-            <a:off x="7986411" y="2883695"/>
-            <a:ext cx="2882475" cy="1997867"/>
-          </a:xfrm>
-        </p:spPr>
-        <p:txBody>
-          <a:bodyPr rtlCol="0"/>
-          <a:lstStyle/>
-          <a:p>
-            <a:pPr rtl="0"/>
-            <a:r>
-              <a:rPr lang="en-GB" noProof="1"/>
-              <a:t>E</a:t>
-            </a:r>
-            <a:r>
-              <a:rPr lang="en-GB" dirty="0"/>
-              <a:t>valuate performance against traditional MAC units</a:t>
-            </a:r>
-          </a:p>
-        </p:txBody>
-      </p:sp>
-      <p:sp>
-        <p:nvSpPr>
-          <p:cNvPr id="11" name="Slide Number Placeholder 10">
-            <a:extLst>
-              <a:ext uri="{FF2B5EF4-FFF2-40B4-BE49-F238E27FC236}">
-                <a16:creationId xmlns:a16="http://schemas.microsoft.com/office/drawing/2014/main" id="{BAD5B6F4-0A90-447A-A1AE-D75C934B6B29}"/>
-              </a:ext>
-            </a:extLst>
-          </p:cNvPr>
-          <p:cNvSpPr>
-            <a:spLocks noGrp="1"/>
-          </p:cNvSpPr>
-          <p:nvPr>
-            <p:ph type="sldNum" sz="quarter" idx="12"/>
-          </p:nvPr>
-        </p:nvSpPr>
-        <p:spPr>
-          <a:xfrm>
-            <a:off x="8610600" y="6356350"/>
-            <a:ext cx="2743200" cy="365125"/>
-          </a:xfrm>
-        </p:spPr>
-        <p:txBody>
-          <a:bodyPr rtlCol="0"/>
-          <a:lstStyle/>
-          <a:p>
-            <a:pPr rtl="0"/>
-            <a:fld id="{B5CEABB6-07DC-46E8-9B57-56EC44A396E5}" type="slidenum">
+            <a:fld id="{19B51A1E-902D-48AF-9020-955120F399B6}" type="slidenum">
               <a:rPr lang="en-GB" smtClean="0"/>
-              <a:pPr/>
+              <a:pPr rtl="0"/>
               <a:t>9</a:t>
             </a:fld>
             <a:endParaRPr lang="en-GB" dirty="0"/>
@@ -19814,609 +20481,257 @@
       </p:sp>
       <p:sp>
         <p:nvSpPr>
-          <p:cNvPr id="16" name="Text Placeholder 3">
-            <a:extLst>
-              <a:ext uri="{FF2B5EF4-FFF2-40B4-BE49-F238E27FC236}">
-                <a16:creationId xmlns:a16="http://schemas.microsoft.com/office/drawing/2014/main" id="{8C953D19-D175-5382-EB78-41B258DFDB10}"/>
-              </a:ext>
-            </a:extLst>
-          </p:cNvPr>
-          <p:cNvSpPr txBox="1">
-            <a:spLocks/>
-          </p:cNvSpPr>
-          <p:nvPr/>
-        </p:nvSpPr>
-        <p:spPr>
-          <a:xfrm>
-            <a:off x="1163093" y="3209133"/>
-            <a:ext cx="2882475" cy="823912"/>
+          <p:cNvPr id="12" name="Rectangle 2">
+            <a:extLst>
+              <a:ext uri="{FF2B5EF4-FFF2-40B4-BE49-F238E27FC236}">
+                <a16:creationId xmlns:a16="http://schemas.microsoft.com/office/drawing/2014/main" id="{FFBB44AA-D826-FEBA-A1EB-06BE549E3C1A}"/>
+              </a:ext>
+            </a:extLst>
+          </p:cNvPr>
+          <p:cNvSpPr>
+            <a:spLocks noGrp="1" noChangeArrowheads="1"/>
+          </p:cNvSpPr>
+          <p:nvPr>
+            <p:ph type="body" sz="quarter" idx="15"/>
+          </p:nvPr>
+        </p:nvSpPr>
+        <p:spPr bwMode="auto">
+          <a:xfrm>
+            <a:off x="5921375" y="2816552"/>
+            <a:ext cx="4989636" cy="523220"/>
           </a:xfrm>
           <a:prstGeom prst="rect">
             <a:avLst/>
           </a:prstGeom>
-        </p:spPr>
-        <p:txBody>
-          <a:bodyPr vert="horz" lIns="91440" tIns="45720" rIns="91440" bIns="45720" rtlCol="0" anchor="b">
-            <a:noAutofit/>
+          <a:noFill/>
+          <a:ln>
+            <a:noFill/>
+          </a:ln>
+          <a:effectLst/>
+          <a:extLst>
+            <a:ext uri="{909E8E84-426E-40DD-AFC4-6F175D3DCCD1}">
+              <a14:hiddenFill xmlns:a14="http://schemas.microsoft.com/office/drawing/2010/main">
+                <a:solidFill>
+                  <a:schemeClr val="accent1"/>
+                </a:solidFill>
+              </a14:hiddenFill>
+            </a:ext>
+            <a:ext uri="{91240B29-F687-4F45-9708-019B960494DF}">
+              <a14:hiddenLine xmlns:a14="http://schemas.microsoft.com/office/drawing/2010/main" w="9525">
+                <a:solidFill>
+                  <a:schemeClr val="tx1"/>
+                </a:solidFill>
+                <a:miter lim="800000"/>
+                <a:headEnd/>
+                <a:tailEnd/>
+              </a14:hiddenLine>
+            </a:ext>
+            <a:ext uri="{AF507438-7753-43E0-B8FC-AC1667EBCBE1}">
+              <a14:hiddenEffects xmlns:a14="http://schemas.microsoft.com/office/drawing/2010/main">
+                <a:effectLst>
+                  <a:outerShdw dist="35921" dir="2700000" algn="ctr" rotWithShape="0">
+                    <a:schemeClr val="bg2"/>
+                  </a:outerShdw>
+                </a:effectLst>
+              </a14:hiddenEffects>
+            </a:ext>
+          </a:extLst>
+        </p:spPr>
+        <p:txBody>
+          <a:bodyPr vert="horz" wrap="none" lIns="91440" tIns="45720" rIns="91440" bIns="45720" numCol="1" anchor="ctr" anchorCtr="0" compatLnSpc="1">
+            <a:prstTxWarp prst="textNoShape">
+              <a:avLst/>
+            </a:prstTxWarp>
+            <a:spAutoFit/>
           </a:bodyPr>
-          <a:lstStyle>
-            <a:lvl1pPr marL="0" indent="0" algn="l" defTabSz="914400" rtl="0" eaLnBrk="1" latinLnBrk="0" hangingPunct="1">
-              <a:lnSpc>
-                <a:spcPct val="90000"/>
-              </a:lnSpc>
-              <a:spcBef>
-                <a:spcPts val="1000"/>
-              </a:spcBef>
-              <a:buFont typeface="Arial" panose="020B0604020202020204" pitchFamily="34" charset="0"/>
-              <a:buNone/>
-              <a:defRPr lang="en-US" sz="2000" kern="1200" cap="all" spc="150" baseline="0" dirty="0" smtClean="0">
-                <a:solidFill>
-                  <a:schemeClr val="tx1"/>
-                </a:solidFill>
-                <a:latin typeface="+mj-lt"/>
-                <a:ea typeface="+mj-ea"/>
-                <a:cs typeface="+mj-cs"/>
-              </a:defRPr>
-            </a:lvl1pPr>
-            <a:lvl2pPr marL="457200" indent="0" algn="l" defTabSz="914400" rtl="0" eaLnBrk="1" latinLnBrk="0" hangingPunct="1">
-              <a:lnSpc>
-                <a:spcPct val="90000"/>
-              </a:lnSpc>
-              <a:spcBef>
-                <a:spcPts val="500"/>
-              </a:spcBef>
-              <a:buFont typeface="Arial" panose="020B0604020202020204" pitchFamily="34" charset="0"/>
-              <a:buNone/>
-              <a:defRPr sz="2000" b="1" kern="1200">
-                <a:solidFill>
-                  <a:schemeClr val="tx1"/>
-                </a:solidFill>
-                <a:latin typeface="+mn-lt"/>
-                <a:ea typeface="+mn-ea"/>
-                <a:cs typeface="+mn-cs"/>
-              </a:defRPr>
-            </a:lvl2pPr>
-            <a:lvl3pPr marL="914400" indent="0" algn="l" defTabSz="914400" rtl="0" eaLnBrk="1" latinLnBrk="0" hangingPunct="1">
-              <a:lnSpc>
-                <a:spcPct val="90000"/>
-              </a:lnSpc>
-              <a:spcBef>
-                <a:spcPts val="500"/>
-              </a:spcBef>
-              <a:buFont typeface="Arial" panose="020B0604020202020204" pitchFamily="34" charset="0"/>
-              <a:buNone/>
-              <a:defRPr sz="1800" b="1" kern="1200">
-                <a:solidFill>
-                  <a:schemeClr val="tx1"/>
-                </a:solidFill>
-                <a:latin typeface="+mn-lt"/>
-                <a:ea typeface="+mn-ea"/>
-                <a:cs typeface="+mn-cs"/>
-              </a:defRPr>
-            </a:lvl3pPr>
-            <a:lvl4pPr marL="1371600" indent="0" algn="l" defTabSz="914400" rtl="0" eaLnBrk="1" latinLnBrk="0" hangingPunct="1">
-              <a:lnSpc>
-                <a:spcPct val="90000"/>
-              </a:lnSpc>
-              <a:spcBef>
-                <a:spcPts val="500"/>
-              </a:spcBef>
-              <a:buFont typeface="Arial" panose="020B0604020202020204" pitchFamily="34" charset="0"/>
-              <a:buNone/>
-              <a:defRPr sz="1600" b="1" kern="1200">
-                <a:solidFill>
-                  <a:schemeClr val="tx1"/>
-                </a:solidFill>
-                <a:latin typeface="+mn-lt"/>
-                <a:ea typeface="+mn-ea"/>
-                <a:cs typeface="+mn-cs"/>
-              </a:defRPr>
-            </a:lvl4pPr>
-            <a:lvl5pPr marL="1828800" indent="0" algn="l" defTabSz="914400" rtl="0" eaLnBrk="1" latinLnBrk="0" hangingPunct="1">
-              <a:lnSpc>
-                <a:spcPct val="90000"/>
-              </a:lnSpc>
-              <a:spcBef>
-                <a:spcPts val="500"/>
-              </a:spcBef>
-              <a:buFont typeface="Arial" panose="020B0604020202020204" pitchFamily="34" charset="0"/>
-              <a:buNone/>
-              <a:defRPr sz="1600" b="1" kern="1200">
-                <a:solidFill>
-                  <a:schemeClr val="tx1"/>
-                </a:solidFill>
-                <a:latin typeface="+mn-lt"/>
-                <a:ea typeface="+mn-ea"/>
-                <a:cs typeface="+mn-cs"/>
-              </a:defRPr>
-            </a:lvl5pPr>
-            <a:lvl6pPr marL="2286000" indent="0" algn="l" defTabSz="914400" rtl="0" eaLnBrk="1" latinLnBrk="0" hangingPunct="1">
-              <a:lnSpc>
-                <a:spcPct val="90000"/>
-              </a:lnSpc>
-              <a:spcBef>
-                <a:spcPts val="500"/>
-              </a:spcBef>
-              <a:buFont typeface="Arial" panose="020B0604020202020204" pitchFamily="34" charset="0"/>
-              <a:buNone/>
-              <a:defRPr sz="1600" b="1" kern="1200">
-                <a:solidFill>
-                  <a:schemeClr val="tx1"/>
-                </a:solidFill>
-                <a:latin typeface="+mn-lt"/>
-                <a:ea typeface="+mn-ea"/>
-                <a:cs typeface="+mn-cs"/>
-              </a:defRPr>
-            </a:lvl6pPr>
-            <a:lvl7pPr marL="2743200" indent="0" algn="l" defTabSz="914400" rtl="0" eaLnBrk="1" latinLnBrk="0" hangingPunct="1">
-              <a:lnSpc>
-                <a:spcPct val="90000"/>
-              </a:lnSpc>
-              <a:spcBef>
-                <a:spcPts val="500"/>
-              </a:spcBef>
-              <a:buFont typeface="Arial" panose="020B0604020202020204" pitchFamily="34" charset="0"/>
-              <a:buNone/>
-              <a:defRPr sz="1600" b="1" kern="1200">
-                <a:solidFill>
-                  <a:schemeClr val="tx1"/>
-                </a:solidFill>
-                <a:latin typeface="+mn-lt"/>
-                <a:ea typeface="+mn-ea"/>
-                <a:cs typeface="+mn-cs"/>
-              </a:defRPr>
-            </a:lvl7pPr>
-            <a:lvl8pPr marL="3200400" indent="0" algn="l" defTabSz="914400" rtl="0" eaLnBrk="1" latinLnBrk="0" hangingPunct="1">
-              <a:lnSpc>
-                <a:spcPct val="90000"/>
-              </a:lnSpc>
-              <a:spcBef>
-                <a:spcPts val="500"/>
-              </a:spcBef>
-              <a:buFont typeface="Arial" panose="020B0604020202020204" pitchFamily="34" charset="0"/>
-              <a:buNone/>
-              <a:defRPr sz="1600" b="1" kern="1200">
-                <a:solidFill>
-                  <a:schemeClr val="tx1"/>
-                </a:solidFill>
-                <a:latin typeface="+mn-lt"/>
-                <a:ea typeface="+mn-ea"/>
-                <a:cs typeface="+mn-cs"/>
-              </a:defRPr>
-            </a:lvl8pPr>
-            <a:lvl9pPr marL="3657600" indent="0" algn="l" defTabSz="914400" rtl="0" eaLnBrk="1" latinLnBrk="0" hangingPunct="1">
-              <a:lnSpc>
-                <a:spcPct val="90000"/>
-              </a:lnSpc>
-              <a:spcBef>
-                <a:spcPts val="500"/>
-              </a:spcBef>
-              <a:buFont typeface="Arial" panose="020B0604020202020204" pitchFamily="34" charset="0"/>
-              <a:buNone/>
-              <a:defRPr sz="1600" b="1" kern="1200">
-                <a:solidFill>
-                  <a:schemeClr val="tx1"/>
-                </a:solidFill>
-                <a:latin typeface="+mn-lt"/>
-                <a:ea typeface="+mn-ea"/>
-                <a:cs typeface="+mn-cs"/>
-              </a:defRPr>
-            </a:lvl9pPr>
-          </a:lstStyle>
-          <a:p>
-            <a:r>
-              <a:rPr lang="en-GB" dirty="0"/>
-              <a:t>Long-term</a:t>
-            </a:r>
-          </a:p>
-        </p:txBody>
-      </p:sp>
-      <p:sp>
-        <p:nvSpPr>
-          <p:cNvPr id="18" name="Text Placeholder 2">
-            <a:extLst>
-              <a:ext uri="{FF2B5EF4-FFF2-40B4-BE49-F238E27FC236}">
-                <a16:creationId xmlns:a16="http://schemas.microsoft.com/office/drawing/2014/main" id="{F65663E9-8AB0-0BAE-4CAD-3518BBAB522C}"/>
-              </a:ext>
-            </a:extLst>
-          </p:cNvPr>
-          <p:cNvSpPr txBox="1">
-            <a:spLocks/>
-          </p:cNvSpPr>
-          <p:nvPr/>
-        </p:nvSpPr>
-        <p:spPr>
-          <a:xfrm>
-            <a:off x="1163093" y="4358483"/>
-            <a:ext cx="2896671" cy="1997867"/>
-          </a:xfrm>
-          <a:prstGeom prst="rect">
-            <a:avLst/>
-          </a:prstGeom>
-        </p:spPr>
-        <p:txBody>
-          <a:bodyPr vert="horz" lIns="91440" tIns="45720" rIns="91440" bIns="45720" rtlCol="0">
-            <a:normAutofit/>
-          </a:bodyPr>
-          <a:lstStyle>
-            <a:lvl1pPr marL="0" indent="0" algn="l" defTabSz="914400" rtl="0" eaLnBrk="1" latinLnBrk="0" hangingPunct="1">
+          <a:lstStyle/>
+          <a:p>
+            <a:pPr marL="0" marR="0" lvl="0" indent="0" algn="l" defTabSz="914400" rtl="0" eaLnBrk="0" fontAlgn="base" latinLnBrk="0" hangingPunct="0">
               <a:lnSpc>
                 <a:spcPct val="100000"/>
               </a:lnSpc>
               <a:spcBef>
-                <a:spcPts val="1000"/>
+                <a:spcPct val="0"/>
               </a:spcBef>
-              <a:buFont typeface="Arial" panose="020B0604020202020204" pitchFamily="34" charset="0"/>
-              <a:buNone/>
-              <a:defRPr sz="1400" kern="1200" spc="50" baseline="0">
-                <a:solidFill>
-                  <a:schemeClr val="tx1"/>
-                </a:solidFill>
-                <a:latin typeface="+mn-lt"/>
-                <a:ea typeface="+mn-ea"/>
-                <a:cs typeface="+mn-cs"/>
-              </a:defRPr>
-            </a:lvl1pPr>
-            <a:lvl2pPr marL="457200" indent="0" algn="l" defTabSz="914400" rtl="0" eaLnBrk="1" latinLnBrk="0" hangingPunct="1">
+              <a:spcAft>
+                <a:spcPct val="0"/>
+              </a:spcAft>
+              <a:buClrTx/>
+              <a:buSzTx/>
+              <a:buFontTx/>
+              <a:buChar char="•"/>
+              <a:tabLst/>
+            </a:pPr>
+            <a:r>
+              <a:rPr lang="en-US" altLang="en-US" dirty="0"/>
+              <a:t>Established a benchmark with a pipelined MAC unit</a:t>
+            </a:r>
+          </a:p>
+          <a:p>
+            <a:pPr marL="0" marR="0" lvl="0" indent="0" algn="l" defTabSz="914400" rtl="0" eaLnBrk="0" fontAlgn="base" latinLnBrk="0" hangingPunct="0">
               <a:lnSpc>
                 <a:spcPct val="100000"/>
               </a:lnSpc>
               <a:spcBef>
-                <a:spcPts val="500"/>
+                <a:spcPct val="0"/>
               </a:spcBef>
-              <a:buFont typeface="Arial" panose="020B0604020202020204" pitchFamily="34" charset="0"/>
-              <a:buNone/>
-              <a:defRPr sz="1400" kern="1200" spc="50" baseline="0">
+              <a:spcAft>
+                <a:spcPct val="0"/>
+              </a:spcAft>
+              <a:buClrTx/>
+              <a:buSzTx/>
+              <a:buFontTx/>
+              <a:buChar char="•"/>
+              <a:tabLst/>
+            </a:pPr>
+            <a:r>
+              <a:rPr lang="en-US" altLang="en-US" dirty="0"/>
+              <a:t>Conceptual and partial implementation of AAUD architecture</a:t>
+            </a:r>
+            <a:endParaRPr kumimoji="0" lang="en-US" altLang="en-US" sz="1800" b="0" i="0" u="none" strike="noStrike" cap="none" normalizeH="0" baseline="0" dirty="0">
+              <a:ln>
+                <a:noFill/>
+              </a:ln>
+              <a:solidFill>
+                <a:schemeClr val="tx1"/>
+              </a:solidFill>
+              <a:effectLst/>
+              <a:latin typeface="Arial" panose="020B0604020202020204" pitchFamily="34" charset="0"/>
+            </a:endParaRPr>
+          </a:p>
+        </p:txBody>
+      </p:sp>
+      <p:sp>
+        <p:nvSpPr>
+          <p:cNvPr id="14" name="Rectangle 4">
+            <a:extLst>
+              <a:ext uri="{FF2B5EF4-FFF2-40B4-BE49-F238E27FC236}">
+                <a16:creationId xmlns:a16="http://schemas.microsoft.com/office/drawing/2014/main" id="{C4C25FFF-01A9-75AF-C09C-C09B33E1A65C}"/>
+              </a:ext>
+            </a:extLst>
+          </p:cNvPr>
+          <p:cNvSpPr>
+            <a:spLocks noGrp="1" noChangeArrowheads="1"/>
+          </p:cNvSpPr>
+          <p:nvPr>
+            <p:ph type="body" sz="quarter" idx="24"/>
+          </p:nvPr>
+        </p:nvSpPr>
+        <p:spPr bwMode="auto">
+          <a:xfrm>
+            <a:off x="5921375" y="3885119"/>
+            <a:ext cx="5275675" cy="584775"/>
+          </a:xfrm>
+          <a:prstGeom prst="rect">
+            <a:avLst/>
+          </a:prstGeom>
+          <a:noFill/>
+          <a:ln>
+            <a:noFill/>
+          </a:ln>
+          <a:effectLst/>
+          <a:extLst>
+            <a:ext uri="{909E8E84-426E-40DD-AFC4-6F175D3DCCD1}">
+              <a14:hiddenFill xmlns:a14="http://schemas.microsoft.com/office/drawing/2010/main">
+                <a:solidFill>
+                  <a:schemeClr val="accent1"/>
+                </a:solidFill>
+              </a14:hiddenFill>
+            </a:ext>
+            <a:ext uri="{91240B29-F687-4F45-9708-019B960494DF}">
+              <a14:hiddenLine xmlns:a14="http://schemas.microsoft.com/office/drawing/2010/main" w="9525">
                 <a:solidFill>
                   <a:schemeClr val="tx1"/>
                 </a:solidFill>
-                <a:latin typeface="+mn-lt"/>
-                <a:ea typeface="+mn-ea"/>
-                <a:cs typeface="+mn-cs"/>
-              </a:defRPr>
-            </a:lvl2pPr>
-            <a:lvl3pPr marL="914400" indent="0" algn="l" defTabSz="914400" rtl="0" eaLnBrk="1" latinLnBrk="0" hangingPunct="1">
+                <a:miter lim="800000"/>
+                <a:headEnd/>
+                <a:tailEnd/>
+              </a14:hiddenLine>
+            </a:ext>
+            <a:ext uri="{AF507438-7753-43E0-B8FC-AC1667EBCBE1}">
+              <a14:hiddenEffects xmlns:a14="http://schemas.microsoft.com/office/drawing/2010/main">
+                <a:effectLst>
+                  <a:outerShdw dist="35921" dir="2700000" algn="ctr" rotWithShape="0">
+                    <a:schemeClr val="bg2"/>
+                  </a:outerShdw>
+                </a:effectLst>
+              </a14:hiddenEffects>
+            </a:ext>
+          </a:extLst>
+        </p:spPr>
+        <p:txBody>
+          <a:bodyPr vert="horz" wrap="none" lIns="91440" tIns="45720" rIns="91440" bIns="45720" numCol="1" anchor="ctr" anchorCtr="0" compatLnSpc="1">
+            <a:prstTxWarp prst="textNoShape">
+              <a:avLst/>
+            </a:prstTxWarp>
+            <a:spAutoFit/>
+          </a:bodyPr>
+          <a:lstStyle/>
+          <a:p>
+            <a:pPr marL="0" marR="0" lvl="0" indent="0" algn="l" defTabSz="914400" rtl="0" eaLnBrk="0" fontAlgn="base" latinLnBrk="0" hangingPunct="0">
               <a:lnSpc>
                 <a:spcPct val="100000"/>
               </a:lnSpc>
               <a:spcBef>
-                <a:spcPts val="500"/>
+                <a:spcPct val="0"/>
               </a:spcBef>
-              <a:buFont typeface="Arial" panose="020B0604020202020204" pitchFamily="34" charset="0"/>
-              <a:buNone/>
-              <a:defRPr sz="1400" kern="1200" spc="50" baseline="0">
-                <a:solidFill>
-                  <a:schemeClr val="tx1"/>
-                </a:solidFill>
-                <a:latin typeface="+mn-lt"/>
-                <a:ea typeface="+mn-ea"/>
-                <a:cs typeface="+mn-cs"/>
-              </a:defRPr>
-            </a:lvl3pPr>
-            <a:lvl4pPr marL="1371600" indent="0" algn="l" defTabSz="914400" rtl="0" eaLnBrk="1" latinLnBrk="0" hangingPunct="1">
+              <a:spcAft>
+                <a:spcPct val="0"/>
+              </a:spcAft>
+              <a:buClrTx/>
+              <a:buSzTx/>
+              <a:buFontTx/>
+              <a:buChar char="•"/>
+              <a:tabLst/>
+            </a:pPr>
+            <a:r>
+              <a:rPr lang="en-US" altLang="en-US" dirty="0"/>
+              <a:t>Complete integration of approximate multipliers and adders.</a:t>
+            </a:r>
+          </a:p>
+          <a:p>
+            <a:pPr marL="0" marR="0" lvl="0" indent="0" algn="l" defTabSz="914400" rtl="0" eaLnBrk="0" fontAlgn="base" latinLnBrk="0" hangingPunct="0">
               <a:lnSpc>
                 <a:spcPct val="100000"/>
               </a:lnSpc>
               <a:spcBef>
-                <a:spcPts val="500"/>
+                <a:spcPct val="0"/>
               </a:spcBef>
-              <a:buFont typeface="Arial" panose="020B0604020202020204" pitchFamily="34" charset="0"/>
-              <a:buNone/>
-              <a:defRPr sz="1400" kern="1200" spc="50" baseline="0">
+              <a:spcAft>
+                <a:spcPct val="0"/>
+              </a:spcAft>
+              <a:buClrTx/>
+              <a:buSzTx/>
+              <a:buFontTx/>
+              <a:buChar char="•"/>
+              <a:tabLst/>
+            </a:pPr>
+            <a:r>
+              <a:rPr lang="en-US" altLang="en-US" dirty="0"/>
+              <a:t>Conduct comprehensive testing for power, speed, and accuracy</a:t>
+            </a:r>
+            <a:r>
+              <a:rPr kumimoji="0" lang="en-US" altLang="en-US" sz="1800" b="0" i="0" u="none" strike="noStrike" cap="none" normalizeH="0" baseline="0" dirty="0">
+                <a:ln>
+                  <a:noFill/>
+                </a:ln>
                 <a:solidFill>
                   <a:schemeClr val="tx1"/>
                 </a:solidFill>
-                <a:latin typeface="+mn-lt"/>
-                <a:ea typeface="+mn-ea"/>
-                <a:cs typeface="+mn-cs"/>
-              </a:defRPr>
-            </a:lvl4pPr>
-            <a:lvl5pPr marL="1828800" indent="0" algn="l" defTabSz="914400" rtl="0" eaLnBrk="1" latinLnBrk="0" hangingPunct="1">
-              <a:lnSpc>
-                <a:spcPct val="100000"/>
-              </a:lnSpc>
-              <a:spcBef>
-                <a:spcPts val="500"/>
-              </a:spcBef>
-              <a:buFont typeface="Arial" panose="020B0604020202020204" pitchFamily="34" charset="0"/>
-              <a:buNone/>
-              <a:defRPr sz="1400" kern="1200" spc="50" baseline="0">
-                <a:solidFill>
-                  <a:schemeClr val="tx1"/>
-                </a:solidFill>
-                <a:latin typeface="+mn-lt"/>
-                <a:ea typeface="+mn-ea"/>
-                <a:cs typeface="+mn-cs"/>
-              </a:defRPr>
-            </a:lvl5pPr>
-            <a:lvl6pPr marL="2514600" indent="-228600" algn="l" defTabSz="914400" rtl="0" eaLnBrk="1" latinLnBrk="0" hangingPunct="1">
-              <a:lnSpc>
-                <a:spcPct val="90000"/>
-              </a:lnSpc>
-              <a:spcBef>
-                <a:spcPts val="500"/>
-              </a:spcBef>
-              <a:buFont typeface="Arial" panose="020B0604020202020204" pitchFamily="34" charset="0"/>
-              <a:buChar char="•"/>
-              <a:defRPr sz="1800" kern="1200">
-                <a:solidFill>
-                  <a:schemeClr val="tx1"/>
-                </a:solidFill>
-                <a:latin typeface="+mn-lt"/>
-                <a:ea typeface="+mn-ea"/>
-                <a:cs typeface="+mn-cs"/>
-              </a:defRPr>
-            </a:lvl6pPr>
-            <a:lvl7pPr marL="2971800" indent="-228600" algn="l" defTabSz="914400" rtl="0" eaLnBrk="1" latinLnBrk="0" hangingPunct="1">
-              <a:lnSpc>
-                <a:spcPct val="90000"/>
-              </a:lnSpc>
-              <a:spcBef>
-                <a:spcPts val="500"/>
-              </a:spcBef>
-              <a:buFont typeface="Arial" panose="020B0604020202020204" pitchFamily="34" charset="0"/>
-              <a:buChar char="•"/>
-              <a:defRPr sz="1800" kern="1200">
-                <a:solidFill>
-                  <a:schemeClr val="tx1"/>
-                </a:solidFill>
-                <a:latin typeface="+mn-lt"/>
-                <a:ea typeface="+mn-ea"/>
-                <a:cs typeface="+mn-cs"/>
-              </a:defRPr>
-            </a:lvl7pPr>
-            <a:lvl8pPr marL="3429000" indent="-228600" algn="l" defTabSz="914400" rtl="0" eaLnBrk="1" latinLnBrk="0" hangingPunct="1">
-              <a:lnSpc>
-                <a:spcPct val="90000"/>
-              </a:lnSpc>
-              <a:spcBef>
-                <a:spcPts val="500"/>
-              </a:spcBef>
-              <a:buFont typeface="Arial" panose="020B0604020202020204" pitchFamily="34" charset="0"/>
-              <a:buChar char="•"/>
-              <a:defRPr sz="1800" kern="1200">
-                <a:solidFill>
-                  <a:schemeClr val="tx1"/>
-                </a:solidFill>
-                <a:latin typeface="+mn-lt"/>
-                <a:ea typeface="+mn-ea"/>
-                <a:cs typeface="+mn-cs"/>
-              </a:defRPr>
-            </a:lvl8pPr>
-            <a:lvl9pPr marL="3886200" indent="-228600" algn="l" defTabSz="914400" rtl="0" eaLnBrk="1" latinLnBrk="0" hangingPunct="1">
-              <a:lnSpc>
-                <a:spcPct val="90000"/>
-              </a:lnSpc>
-              <a:spcBef>
-                <a:spcPts val="500"/>
-              </a:spcBef>
-              <a:buFont typeface="Arial" panose="020B0604020202020204" pitchFamily="34" charset="0"/>
-              <a:buChar char="•"/>
-              <a:defRPr sz="1800" kern="1200">
-                <a:solidFill>
-                  <a:schemeClr val="tx1"/>
-                </a:solidFill>
-                <a:latin typeface="+mn-lt"/>
-                <a:ea typeface="+mn-ea"/>
-                <a:cs typeface="+mn-cs"/>
-              </a:defRPr>
-            </a:lvl9pPr>
-          </a:lstStyle>
-          <a:p>
-            <a:r>
-              <a:rPr lang="en-US" dirty="0"/>
-              <a:t>Explore further optimizations with different approximation methods</a:t>
-            </a:r>
-            <a:endParaRPr lang="en-GB" dirty="0"/>
-          </a:p>
-        </p:txBody>
-      </p:sp>
-      <p:sp>
-        <p:nvSpPr>
-          <p:cNvPr id="19" name="Text Placeholder 2">
-            <a:extLst>
-              <a:ext uri="{FF2B5EF4-FFF2-40B4-BE49-F238E27FC236}">
-                <a16:creationId xmlns:a16="http://schemas.microsoft.com/office/drawing/2014/main" id="{E06A98AF-0802-6D9F-FF99-A7CC94BF662E}"/>
-              </a:ext>
-            </a:extLst>
-          </p:cNvPr>
-          <p:cNvSpPr txBox="1">
-            <a:spLocks/>
-          </p:cNvSpPr>
-          <p:nvPr/>
-        </p:nvSpPr>
-        <p:spPr>
-          <a:xfrm>
-            <a:off x="4581849" y="4358482"/>
-            <a:ext cx="2896671" cy="1997867"/>
-          </a:xfrm>
-          <a:prstGeom prst="rect">
-            <a:avLst/>
-          </a:prstGeom>
-        </p:spPr>
-        <p:txBody>
-          <a:bodyPr vert="horz" lIns="91440" tIns="45720" rIns="91440" bIns="45720" rtlCol="0">
-            <a:normAutofit/>
-          </a:bodyPr>
-          <a:lstStyle>
-            <a:lvl1pPr marL="0" indent="0" algn="l" defTabSz="914400" rtl="0" eaLnBrk="1" latinLnBrk="0" hangingPunct="1">
-              <a:lnSpc>
-                <a:spcPct val="100000"/>
-              </a:lnSpc>
-              <a:spcBef>
-                <a:spcPts val="1000"/>
-              </a:spcBef>
-              <a:buFont typeface="Arial" panose="020B0604020202020204" pitchFamily="34" charset="0"/>
-              <a:buNone/>
-              <a:defRPr sz="1400" kern="1200" spc="50" baseline="0">
-                <a:solidFill>
-                  <a:schemeClr val="tx1"/>
-                </a:solidFill>
-                <a:latin typeface="+mn-lt"/>
-                <a:ea typeface="+mn-ea"/>
-                <a:cs typeface="+mn-cs"/>
-              </a:defRPr>
-            </a:lvl1pPr>
-            <a:lvl2pPr marL="457200" indent="0" algn="l" defTabSz="914400" rtl="0" eaLnBrk="1" latinLnBrk="0" hangingPunct="1">
-              <a:lnSpc>
-                <a:spcPct val="100000"/>
-              </a:lnSpc>
-              <a:spcBef>
-                <a:spcPts val="500"/>
-              </a:spcBef>
-              <a:buFont typeface="Arial" panose="020B0604020202020204" pitchFamily="34" charset="0"/>
-              <a:buNone/>
-              <a:defRPr sz="1400" kern="1200" spc="50" baseline="0">
-                <a:solidFill>
-                  <a:schemeClr val="tx1"/>
-                </a:solidFill>
-                <a:latin typeface="+mn-lt"/>
-                <a:ea typeface="+mn-ea"/>
-                <a:cs typeface="+mn-cs"/>
-              </a:defRPr>
-            </a:lvl2pPr>
-            <a:lvl3pPr marL="914400" indent="0" algn="l" defTabSz="914400" rtl="0" eaLnBrk="1" latinLnBrk="0" hangingPunct="1">
-              <a:lnSpc>
-                <a:spcPct val="100000"/>
-              </a:lnSpc>
-              <a:spcBef>
-                <a:spcPts val="500"/>
-              </a:spcBef>
-              <a:buFont typeface="Arial" panose="020B0604020202020204" pitchFamily="34" charset="0"/>
-              <a:buNone/>
-              <a:defRPr sz="1400" kern="1200" spc="50" baseline="0">
-                <a:solidFill>
-                  <a:schemeClr val="tx1"/>
-                </a:solidFill>
-                <a:latin typeface="+mn-lt"/>
-                <a:ea typeface="+mn-ea"/>
-                <a:cs typeface="+mn-cs"/>
-              </a:defRPr>
-            </a:lvl3pPr>
-            <a:lvl4pPr marL="1371600" indent="0" algn="l" defTabSz="914400" rtl="0" eaLnBrk="1" latinLnBrk="0" hangingPunct="1">
-              <a:lnSpc>
-                <a:spcPct val="100000"/>
-              </a:lnSpc>
-              <a:spcBef>
-                <a:spcPts val="500"/>
-              </a:spcBef>
-              <a:buFont typeface="Arial" panose="020B0604020202020204" pitchFamily="34" charset="0"/>
-              <a:buNone/>
-              <a:defRPr sz="1400" kern="1200" spc="50" baseline="0">
-                <a:solidFill>
-                  <a:schemeClr val="tx1"/>
-                </a:solidFill>
-                <a:latin typeface="+mn-lt"/>
-                <a:ea typeface="+mn-ea"/>
-                <a:cs typeface="+mn-cs"/>
-              </a:defRPr>
-            </a:lvl4pPr>
-            <a:lvl5pPr marL="1828800" indent="0" algn="l" defTabSz="914400" rtl="0" eaLnBrk="1" latinLnBrk="0" hangingPunct="1">
-              <a:lnSpc>
-                <a:spcPct val="100000"/>
-              </a:lnSpc>
-              <a:spcBef>
-                <a:spcPts val="500"/>
-              </a:spcBef>
-              <a:buFont typeface="Arial" panose="020B0604020202020204" pitchFamily="34" charset="0"/>
-              <a:buNone/>
-              <a:defRPr sz="1400" kern="1200" spc="50" baseline="0">
-                <a:solidFill>
-                  <a:schemeClr val="tx1"/>
-                </a:solidFill>
-                <a:latin typeface="+mn-lt"/>
-                <a:ea typeface="+mn-ea"/>
-                <a:cs typeface="+mn-cs"/>
-              </a:defRPr>
-            </a:lvl5pPr>
-            <a:lvl6pPr marL="2514600" indent="-228600" algn="l" defTabSz="914400" rtl="0" eaLnBrk="1" latinLnBrk="0" hangingPunct="1">
-              <a:lnSpc>
-                <a:spcPct val="90000"/>
-              </a:lnSpc>
-              <a:spcBef>
-                <a:spcPts val="500"/>
-              </a:spcBef>
-              <a:buFont typeface="Arial" panose="020B0604020202020204" pitchFamily="34" charset="0"/>
-              <a:buChar char="•"/>
-              <a:defRPr sz="1800" kern="1200">
-                <a:solidFill>
-                  <a:schemeClr val="tx1"/>
-                </a:solidFill>
-                <a:latin typeface="+mn-lt"/>
-                <a:ea typeface="+mn-ea"/>
-                <a:cs typeface="+mn-cs"/>
-              </a:defRPr>
-            </a:lvl6pPr>
-            <a:lvl7pPr marL="2971800" indent="-228600" algn="l" defTabSz="914400" rtl="0" eaLnBrk="1" latinLnBrk="0" hangingPunct="1">
-              <a:lnSpc>
-                <a:spcPct val="90000"/>
-              </a:lnSpc>
-              <a:spcBef>
-                <a:spcPts val="500"/>
-              </a:spcBef>
-              <a:buFont typeface="Arial" panose="020B0604020202020204" pitchFamily="34" charset="0"/>
-              <a:buChar char="•"/>
-              <a:defRPr sz="1800" kern="1200">
-                <a:solidFill>
-                  <a:schemeClr val="tx1"/>
-                </a:solidFill>
-                <a:latin typeface="+mn-lt"/>
-                <a:ea typeface="+mn-ea"/>
-                <a:cs typeface="+mn-cs"/>
-              </a:defRPr>
-            </a:lvl7pPr>
-            <a:lvl8pPr marL="3429000" indent="-228600" algn="l" defTabSz="914400" rtl="0" eaLnBrk="1" latinLnBrk="0" hangingPunct="1">
-              <a:lnSpc>
-                <a:spcPct val="90000"/>
-              </a:lnSpc>
-              <a:spcBef>
-                <a:spcPts val="500"/>
-              </a:spcBef>
-              <a:buFont typeface="Arial" panose="020B0604020202020204" pitchFamily="34" charset="0"/>
-              <a:buChar char="•"/>
-              <a:defRPr sz="1800" kern="1200">
-                <a:solidFill>
-                  <a:schemeClr val="tx1"/>
-                </a:solidFill>
-                <a:latin typeface="+mn-lt"/>
-                <a:ea typeface="+mn-ea"/>
-                <a:cs typeface="+mn-cs"/>
-              </a:defRPr>
-            </a:lvl8pPr>
-            <a:lvl9pPr marL="3886200" indent="-228600" algn="l" defTabSz="914400" rtl="0" eaLnBrk="1" latinLnBrk="0" hangingPunct="1">
-              <a:lnSpc>
-                <a:spcPct val="90000"/>
-              </a:lnSpc>
-              <a:spcBef>
-                <a:spcPts val="500"/>
-              </a:spcBef>
-              <a:buFont typeface="Arial" panose="020B0604020202020204" pitchFamily="34" charset="0"/>
-              <a:buChar char="•"/>
-              <a:defRPr sz="1800" kern="1200">
-                <a:solidFill>
-                  <a:schemeClr val="tx1"/>
-                </a:solidFill>
-                <a:latin typeface="+mn-lt"/>
-                <a:ea typeface="+mn-ea"/>
-                <a:cs typeface="+mn-cs"/>
-              </a:defRPr>
-            </a:lvl9pPr>
-          </a:lstStyle>
-          <a:p>
-            <a:r>
-              <a:rPr lang="en-US" dirty="0"/>
-              <a:t>Investigate potential applications in other error-tolerant domains, such as machine learning</a:t>
-            </a:r>
-            <a:endParaRPr lang="en-GB" dirty="0"/>
+                <a:effectLst/>
+                <a:latin typeface="Arial" panose="020B0604020202020204" pitchFamily="34" charset="0"/>
+              </a:rPr>
+              <a:t>. </a:t>
+            </a:r>
           </a:p>
         </p:txBody>
       </p:sp>
       <p:pic>
         <p:nvPicPr>
-          <p:cNvPr id="20" name="Picture 19" descr="A purple text on a black background&#10;&#10;AI-generated content may be incorrect.">
-            <a:extLst>
-              <a:ext uri="{FF2B5EF4-FFF2-40B4-BE49-F238E27FC236}">
-                <a16:creationId xmlns:a16="http://schemas.microsoft.com/office/drawing/2014/main" id="{D0EB5FBE-78EE-E772-CF91-89700EBDE3BC}"/>
+          <p:cNvPr id="19" name="Picture 18" descr="A purple text on a black background&#10;&#10;AI-generated content may be incorrect.">
+            <a:extLst>
+              <a:ext uri="{FF2B5EF4-FFF2-40B4-BE49-F238E27FC236}">
+                <a16:creationId xmlns:a16="http://schemas.microsoft.com/office/drawing/2014/main" id="{B1AE466D-B9A8-8094-BDF0-CE6832E35870}"/>
               </a:ext>
             </a:extLst>
           </p:cNvPr>
@@ -20433,7 +20748,7 @@
         </p:blipFill>
         <p:spPr>
           <a:xfrm>
-            <a:off x="65368" y="6089513"/>
+            <a:off x="65368" y="6100943"/>
             <a:ext cx="2536261" cy="768487"/>
           </a:xfrm>
           <a:prstGeom prst="rect">
@@ -20444,7 +20759,7 @@
     </p:spTree>
     <p:extLst>
       <p:ext uri="{BB962C8B-B14F-4D97-AF65-F5344CB8AC3E}">
-        <p14:creationId xmlns:p14="http://schemas.microsoft.com/office/powerpoint/2010/main" val="2121178069"/>
+        <p14:creationId xmlns:p14="http://schemas.microsoft.com/office/powerpoint/2010/main" val="2069393026"/>
       </p:ext>
     </p:extLst>
   </p:cSld>

</xml_diff>

<commit_message>
[PublicEngagement] Completed slides structure pending image screenshots of waveforms and testing
</commit_message>
<xml_diff>
--- a/Documents/Public Engagement/PublicEngagementActivity.pptx
+++ b/Documents/Public Engagement/PublicEngagementActivity.pptx
@@ -5,10 +5,10 @@
     <p:sldMasterId id="2147483666" r:id="rId4"/>
   </p:sldMasterIdLst>
   <p:notesMasterIdLst>
-    <p:notesMasterId r:id="rId22"/>
+    <p:notesMasterId r:id="rId21"/>
   </p:notesMasterIdLst>
   <p:handoutMasterIdLst>
-    <p:handoutMasterId r:id="rId23"/>
+    <p:handoutMasterId r:id="rId22"/>
   </p:handoutMasterIdLst>
   <p:sldIdLst>
     <p:sldId id="256" r:id="rId5"/>
@@ -17,17 +17,16 @@
     <p:sldId id="291" r:id="rId8"/>
     <p:sldId id="262" r:id="rId9"/>
     <p:sldId id="289" r:id="rId10"/>
-    <p:sldId id="292" r:id="rId11"/>
-    <p:sldId id="264" r:id="rId12"/>
-    <p:sldId id="293" r:id="rId13"/>
+    <p:sldId id="264" r:id="rId11"/>
+    <p:sldId id="293" r:id="rId12"/>
+    <p:sldId id="296" r:id="rId13"/>
     <p:sldId id="258" r:id="rId14"/>
     <p:sldId id="294" r:id="rId15"/>
     <p:sldId id="295" r:id="rId16"/>
     <p:sldId id="278" r:id="rId17"/>
     <p:sldId id="266" r:id="rId18"/>
     <p:sldId id="290" r:id="rId19"/>
-    <p:sldId id="275" r:id="rId20"/>
-    <p:sldId id="276" r:id="rId21"/>
+    <p:sldId id="276" r:id="rId20"/>
   </p:sldIdLst>
   <p:sldSz cx="12192000" cy="6858000"/>
   <p:notesSz cx="6858000" cy="9144000"/>
@@ -256,7 +255,7 @@
             <a:pPr rtl="0"/>
             <a:fld id="{4245C065-7973-41A8-A2CC-441A8BA3384C}" type="datetime1">
               <a:rPr lang="en-GB" smtClean="0"/>
-              <a:t>26/02/2025</a:t>
+              <a:t>27/02/2025</a:t>
             </a:fld>
             <a:endParaRPr lang="en-GB"/>
           </a:p>
@@ -438,7 +437,7 @@
             <a:fld id="{A087A586-3225-45EC-B90F-43F9676D14C2}" type="datetime1">
               <a:rPr lang="en-GB" smtClean="0"/>
               <a:pPr/>
-              <a:t>26/02/2025</a:t>
+              <a:t>27/02/2025</a:t>
             </a:fld>
             <a:endParaRPr lang="en-GB" dirty="0"/>
           </a:p>
@@ -1641,57 +1640,31 @@
           <a:bodyPr/>
           <a:lstStyle/>
           <a:p>
-            <a:pPr marL="0" marR="0" lvl="0" indent="0" algn="l" defTabSz="914400" rtl="0" eaLnBrk="1" fontAlgn="auto" latinLnBrk="0" hangingPunct="1">
-              <a:lnSpc>
-                <a:spcPct val="100000"/>
-              </a:lnSpc>
-              <a:spcBef>
-                <a:spcPts val="0"/>
-              </a:spcBef>
-              <a:spcAft>
-                <a:spcPts val="0"/>
-              </a:spcAft>
-              <a:buClrTx/>
-              <a:buSzTx/>
-              <a:buFontTx/>
-              <a:buNone/>
-              <a:tabLst/>
-              <a:defRPr/>
-            </a:pPr>
             <a:r>
               <a:rPr lang="en-US" dirty="0"/>
-              <a:t>Looking ahead, the next steps involve completing the implementation of all approximate arithmetic units and integrating them into the RISC-V SoC.</a:t>
+              <a:t>In conclusion, approximate computing offers a strategic solution to the growing demands for high-performance and energy-efficient computing.</a:t>
             </a:r>
             <a:br>
               <a:rPr lang="en-US" dirty="0"/>
             </a:br>
             <a:r>
               <a:rPr lang="en-US" dirty="0"/>
-              <a:t>Once integrated, extensive testing will be conducted to evaluate power consumption, processing speed, and accuracy.</a:t>
+              <a:t>By allowing controlled inaccuracies, it balances efficiency with acceptable error rates, making it ideal for error-tolerant applications like image processing.</a:t>
             </a:r>
             <a:br>
               <a:rPr lang="en-US" dirty="0"/>
             </a:br>
             <a:r>
               <a:rPr lang="en-US" dirty="0"/>
-              <a:t>The results will then be compared to traditional MAC units to assess the trade-offs made by using approximate computing.</a:t>
+              <a:t>This project demonstrates the potential of integrating approximate arithmetic units into RISC-V SoC, significantly improving performance and power efficiency.</a:t>
             </a:r>
             <a:br>
               <a:rPr lang="en-US" dirty="0"/>
             </a:br>
             <a:r>
               <a:rPr lang="en-US" dirty="0"/>
-              <a:t>In the long term, this project aims to explore additional approximation methods for further optimizations.</a:t>
-            </a:r>
-            <a:br>
-              <a:rPr lang="en-US" dirty="0"/>
-            </a:br>
-            <a:r>
-              <a:rPr lang="en-US" dirty="0"/>
-              <a:t>There is also potential to expand this approach to other error-tolerant domains, such as machine learning and data analytics.</a:t>
-            </a:r>
-          </a:p>
-          <a:p>
+              <a:t>Moving forward, the successful implementation and testing of this design could pave the way for a new generation of energy-efficient digital systems.</a:t>
+            </a:r>
             <a:endParaRPr lang="en-GB" dirty="0"/>
           </a:p>
         </p:txBody>
@@ -1715,116 +1688,6 @@
             <a:fld id="{D4B9A9E5-4F7F-4A7D-9DE1-899232329269}" type="slidenum">
               <a:rPr lang="en-GB" smtClean="0"/>
               <a:t>16</a:t>
-            </a:fld>
-            <a:endParaRPr lang="en-GB"/>
-          </a:p>
-        </p:txBody>
-      </p:sp>
-    </p:spTree>
-    <p:extLst>
-      <p:ext uri="{BB962C8B-B14F-4D97-AF65-F5344CB8AC3E}">
-        <p14:creationId xmlns:p14="http://schemas.microsoft.com/office/powerpoint/2010/main" val="3772094516"/>
-      </p:ext>
-    </p:extLst>
-  </p:cSld>
-  <p:clrMapOvr>
-    <a:masterClrMapping/>
-  </p:clrMapOvr>
-</p:notes>
-</file>
-
-<file path=ppt/notesSlides/notesSlide17.xml><?xml version="1.0" encoding="utf-8"?>
-<p:notes xmlns:a="http://schemas.openxmlformats.org/drawingml/2006/main" xmlns:r="http://schemas.openxmlformats.org/officeDocument/2006/relationships" xmlns:p="http://schemas.openxmlformats.org/presentationml/2006/main">
-  <p:cSld>
-    <p:spTree>
-      <p:nvGrpSpPr>
-        <p:cNvPr id="1" name=""/>
-        <p:cNvGrpSpPr/>
-        <p:nvPr/>
-      </p:nvGrpSpPr>
-      <p:grpSpPr>
-        <a:xfrm>
-          <a:off x="0" y="0"/>
-          <a:ext cx="0" cy="0"/>
-          <a:chOff x="0" y="0"/>
-          <a:chExt cx="0" cy="0"/>
-        </a:xfrm>
-      </p:grpSpPr>
-      <p:sp>
-        <p:nvSpPr>
-          <p:cNvPr id="2" name="Slide Image Placeholder 1"/>
-          <p:cNvSpPr>
-            <a:spLocks noGrp="1" noRot="1" noChangeAspect="1"/>
-          </p:cNvSpPr>
-          <p:nvPr>
-            <p:ph type="sldImg"/>
-          </p:nvPr>
-        </p:nvSpPr>
-        <p:spPr/>
-      </p:sp>
-      <p:sp>
-        <p:nvSpPr>
-          <p:cNvPr id="3" name="Notes Placeholder 2"/>
-          <p:cNvSpPr>
-            <a:spLocks noGrp="1"/>
-          </p:cNvSpPr>
-          <p:nvPr>
-            <p:ph type="body" idx="1"/>
-          </p:nvPr>
-        </p:nvSpPr>
-        <p:spPr/>
-        <p:txBody>
-          <a:bodyPr/>
-          <a:lstStyle/>
-          <a:p>
-            <a:r>
-              <a:rPr lang="en-US" dirty="0"/>
-              <a:t>In conclusion, approximate computing offers a strategic solution to the growing demands for high-performance and energy-efficient computing.</a:t>
-            </a:r>
-            <a:br>
-              <a:rPr lang="en-US" dirty="0"/>
-            </a:br>
-            <a:r>
-              <a:rPr lang="en-US" dirty="0"/>
-              <a:t>By allowing controlled inaccuracies, it balances efficiency with acceptable error rates, making it ideal for error-tolerant applications like image processing.</a:t>
-            </a:r>
-            <a:br>
-              <a:rPr lang="en-US" dirty="0"/>
-            </a:br>
-            <a:r>
-              <a:rPr lang="en-US" dirty="0"/>
-              <a:t>This project demonstrates the potential of integrating approximate arithmetic units into RISC-V SoC, significantly improving performance and power efficiency.</a:t>
-            </a:r>
-            <a:br>
-              <a:rPr lang="en-US" dirty="0"/>
-            </a:br>
-            <a:r>
-              <a:rPr lang="en-US" dirty="0"/>
-              <a:t>Moving forward, the successful implementation and testing of this design could pave the way for a new generation of energy-efficient digital systems.</a:t>
-            </a:r>
-            <a:endParaRPr lang="en-GB" dirty="0"/>
-          </a:p>
-        </p:txBody>
-      </p:sp>
-      <p:sp>
-        <p:nvSpPr>
-          <p:cNvPr id="4" name="Slide Number Placeholder 3"/>
-          <p:cNvSpPr>
-            <a:spLocks noGrp="1"/>
-          </p:cNvSpPr>
-          <p:nvPr>
-            <p:ph type="sldNum" sz="quarter" idx="5"/>
-          </p:nvPr>
-        </p:nvSpPr>
-        <p:spPr/>
-        <p:txBody>
-          <a:bodyPr/>
-          <a:lstStyle/>
-          <a:p>
-            <a:pPr rtl="0"/>
-            <a:fld id="{D4B9A9E5-4F7F-4A7D-9DE1-899232329269}" type="slidenum">
-              <a:rPr lang="en-GB" smtClean="0"/>
-              <a:t>17</a:t>
             </a:fld>
             <a:endParaRPr lang="en-GB"/>
           </a:p>
@@ -2524,187 +2387,6 @@
   <p:cSld>
     <p:spTree>
       <p:nvGrpSpPr>
-        <p:cNvPr id="1" name="">
-          <a:extLst>
-            <a:ext uri="{FF2B5EF4-FFF2-40B4-BE49-F238E27FC236}">
-              <a16:creationId xmlns:a16="http://schemas.microsoft.com/office/drawing/2014/main" id="{D48DF261-C48A-6AED-47BC-D591D57D0748}"/>
-            </a:ext>
-          </a:extLst>
-        </p:cNvPr>
-        <p:cNvGrpSpPr/>
-        <p:nvPr/>
-      </p:nvGrpSpPr>
-      <p:grpSpPr>
-        <a:xfrm>
-          <a:off x="0" y="0"/>
-          <a:ext cx="0" cy="0"/>
-          <a:chOff x="0" y="0"/>
-          <a:chExt cx="0" cy="0"/>
-        </a:xfrm>
-      </p:grpSpPr>
-      <p:sp>
-        <p:nvSpPr>
-          <p:cNvPr id="2" name="Slide Image Placeholder 1">
-            <a:extLst>
-              <a:ext uri="{FF2B5EF4-FFF2-40B4-BE49-F238E27FC236}">
-                <a16:creationId xmlns:a16="http://schemas.microsoft.com/office/drawing/2014/main" id="{52138B97-DD16-8628-7F7C-8DB4D1088439}"/>
-              </a:ext>
-            </a:extLst>
-          </p:cNvPr>
-          <p:cNvSpPr>
-            <a:spLocks noGrp="1" noRot="1" noChangeAspect="1"/>
-          </p:cNvSpPr>
-          <p:nvPr>
-            <p:ph type="sldImg"/>
-          </p:nvPr>
-        </p:nvSpPr>
-        <p:spPr/>
-      </p:sp>
-      <p:sp>
-        <p:nvSpPr>
-          <p:cNvPr id="3" name="Notes Placeholder 2">
-            <a:extLst>
-              <a:ext uri="{FF2B5EF4-FFF2-40B4-BE49-F238E27FC236}">
-                <a16:creationId xmlns:a16="http://schemas.microsoft.com/office/drawing/2014/main" id="{DC1B9721-BCBC-599C-3557-B4F2FC09C9A4}"/>
-              </a:ext>
-            </a:extLst>
-          </p:cNvPr>
-          <p:cNvSpPr>
-            <a:spLocks noGrp="1"/>
-          </p:cNvSpPr>
-          <p:nvPr>
-            <p:ph type="body" idx="1"/>
-          </p:nvPr>
-        </p:nvSpPr>
-        <p:spPr/>
-        <p:txBody>
-          <a:bodyPr/>
-          <a:lstStyle/>
-          <a:p>
-            <a:r>
-              <a:rPr lang="en-US" dirty="0"/>
-              <a:t>This project specifically addresses the challenge of balancing accuracy, power consumption, and speed in arithmetic units.</a:t>
-            </a:r>
-            <a:br>
-              <a:rPr lang="en-US" dirty="0"/>
-            </a:br>
-            <a:r>
-              <a:rPr lang="en-US" dirty="0"/>
-              <a:t>In this context, we’re using the Nexys-A7 FPGA and Xilinx Vivado Design Suite for simulations and testing.</a:t>
-            </a:r>
-            <a:br>
-              <a:rPr lang="en-US" dirty="0"/>
-            </a:br>
-            <a:r>
-              <a:rPr lang="en-US" dirty="0"/>
-              <a:t>The goal is to achieve enhanced computational efficiency while maintaining minimal accuracy loss.</a:t>
-            </a:r>
-            <a:br>
-              <a:rPr lang="en-US" dirty="0"/>
-            </a:br>
-            <a:r>
-              <a:rPr lang="en-US" dirty="0"/>
-              <a:t>To do this, we are implementing three key techniques:</a:t>
-            </a:r>
-          </a:p>
-          <a:p>
-            <a:pPr>
-              <a:buFont typeface="+mj-lt"/>
-              <a:buAutoNum type="arabicPeriod"/>
-            </a:pPr>
-            <a:r>
-              <a:rPr lang="en-US" dirty="0"/>
-              <a:t>Lower-Part OR-based Approximate Multipliers for faster partial product calculations.</a:t>
-            </a:r>
-          </a:p>
-          <a:p>
-            <a:pPr>
-              <a:buFont typeface="+mj-lt"/>
-              <a:buAutoNum type="arabicPeriod"/>
-            </a:pPr>
-            <a:r>
-              <a:rPr lang="en-US" dirty="0"/>
-              <a:t>Approximate Adders to accumulate results efficiently.</a:t>
-            </a:r>
-          </a:p>
-          <a:p>
-            <a:pPr>
-              <a:buFont typeface="+mj-lt"/>
-              <a:buAutoNum type="arabicPeriod"/>
-            </a:pPr>
-            <a:r>
-              <a:rPr lang="en-US" dirty="0"/>
-              <a:t>Fuzzy </a:t>
-            </a:r>
-            <a:r>
-              <a:rPr lang="en-US" dirty="0" err="1"/>
-              <a:t>Memoization</a:t>
-            </a:r>
-            <a:r>
-              <a:rPr lang="en-US" dirty="0"/>
-              <a:t> to cache and reuse results in repetitive calculations, reducing redundant computations.</a:t>
-            </a:r>
-            <a:br>
-              <a:rPr lang="en-US" dirty="0"/>
-            </a:br>
-            <a:r>
-              <a:rPr lang="en-US" dirty="0"/>
-              <a:t>Together, these techniques form a powerful combination for building efficient, error-tolerant arithmetic units.</a:t>
-            </a:r>
-          </a:p>
-          <a:p>
-            <a:endParaRPr lang="en-GB" dirty="0"/>
-          </a:p>
-        </p:txBody>
-      </p:sp>
-      <p:sp>
-        <p:nvSpPr>
-          <p:cNvPr id="4" name="Slide Number Placeholder 3">
-            <a:extLst>
-              <a:ext uri="{FF2B5EF4-FFF2-40B4-BE49-F238E27FC236}">
-                <a16:creationId xmlns:a16="http://schemas.microsoft.com/office/drawing/2014/main" id="{E798DF25-E759-3499-A8A1-90B3A171B29A}"/>
-              </a:ext>
-            </a:extLst>
-          </p:cNvPr>
-          <p:cNvSpPr>
-            <a:spLocks noGrp="1"/>
-          </p:cNvSpPr>
-          <p:nvPr>
-            <p:ph type="sldNum" sz="quarter" idx="5"/>
-          </p:nvPr>
-        </p:nvSpPr>
-        <p:spPr/>
-        <p:txBody>
-          <a:bodyPr/>
-          <a:lstStyle/>
-          <a:p>
-            <a:pPr rtl="0"/>
-            <a:fld id="{D4B9A9E5-4F7F-4A7D-9DE1-899232329269}" type="slidenum">
-              <a:rPr lang="en-GB" smtClean="0"/>
-              <a:t>7</a:t>
-            </a:fld>
-            <a:endParaRPr lang="en-GB"/>
-          </a:p>
-        </p:txBody>
-      </p:sp>
-    </p:spTree>
-    <p:extLst>
-      <p:ext uri="{BB962C8B-B14F-4D97-AF65-F5344CB8AC3E}">
-        <p14:creationId xmlns:p14="http://schemas.microsoft.com/office/powerpoint/2010/main" val="683474148"/>
-      </p:ext>
-    </p:extLst>
-  </p:cSld>
-  <p:clrMapOvr>
-    <a:masterClrMapping/>
-  </p:clrMapOvr>
-</p:notes>
-</file>
-
-<file path=ppt/notesSlides/notesSlide8.xml><?xml version="1.0" encoding="utf-8"?>
-<p:notes xmlns:a="http://schemas.openxmlformats.org/drawingml/2006/main" xmlns:r="http://schemas.openxmlformats.org/officeDocument/2006/relationships" xmlns:p="http://schemas.openxmlformats.org/presentationml/2006/main">
-  <p:cSld>
-    <p:spTree>
-      <p:nvGrpSpPr>
         <p:cNvPr id="1" name=""/>
         <p:cNvGrpSpPr/>
         <p:nvPr/>
@@ -2838,7 +2520,7 @@
             <a:pPr rtl="0"/>
             <a:fld id="{D4B9A9E5-4F7F-4A7D-9DE1-899232329269}" type="slidenum">
               <a:rPr lang="en-GB" smtClean="0"/>
-              <a:t>8</a:t>
+              <a:t>7</a:t>
             </a:fld>
             <a:endParaRPr lang="en-GB"/>
           </a:p>
@@ -2857,7 +2539,7 @@
 </p:notes>
 </file>
 
-<file path=ppt/notesSlides/notesSlide9.xml><?xml version="1.0" encoding="utf-8"?>
+<file path=ppt/notesSlides/notesSlide8.xml><?xml version="1.0" encoding="utf-8"?>
 <p:notes xmlns:a="http://schemas.openxmlformats.org/drawingml/2006/main" xmlns:r="http://schemas.openxmlformats.org/officeDocument/2006/relationships" xmlns:p="http://schemas.openxmlformats.org/presentationml/2006/main">
   <p:cSld>
     <p:spTree>
@@ -2979,7 +2661,7 @@
             <a:pPr rtl="0"/>
             <a:fld id="{D4B9A9E5-4F7F-4A7D-9DE1-899232329269}" type="slidenum">
               <a:rPr lang="en-GB" smtClean="0"/>
-              <a:t>9</a:t>
+              <a:t>8</a:t>
             </a:fld>
             <a:endParaRPr lang="en-GB"/>
           </a:p>
@@ -2989,6 +2671,147 @@
     <p:extLst>
       <p:ext uri="{BB962C8B-B14F-4D97-AF65-F5344CB8AC3E}">
         <p14:creationId xmlns:p14="http://schemas.microsoft.com/office/powerpoint/2010/main" val="272319258"/>
+      </p:ext>
+    </p:extLst>
+  </p:cSld>
+  <p:clrMapOvr>
+    <a:masterClrMapping/>
+  </p:clrMapOvr>
+</p:notes>
+</file>
+
+<file path=ppt/notesSlides/notesSlide9.xml><?xml version="1.0" encoding="utf-8"?>
+<p:notes xmlns:a="http://schemas.openxmlformats.org/drawingml/2006/main" xmlns:r="http://schemas.openxmlformats.org/officeDocument/2006/relationships" xmlns:p="http://schemas.openxmlformats.org/presentationml/2006/main">
+  <p:cSld>
+    <p:spTree>
+      <p:nvGrpSpPr>
+        <p:cNvPr id="1" name="">
+          <a:extLst>
+            <a:ext uri="{FF2B5EF4-FFF2-40B4-BE49-F238E27FC236}">
+              <a16:creationId xmlns:a16="http://schemas.microsoft.com/office/drawing/2014/main" id="{64E76671-72A5-DEAA-813D-767C0F5DDAF8}"/>
+            </a:ext>
+          </a:extLst>
+        </p:cNvPr>
+        <p:cNvGrpSpPr/>
+        <p:nvPr/>
+      </p:nvGrpSpPr>
+      <p:grpSpPr>
+        <a:xfrm>
+          <a:off x="0" y="0"/>
+          <a:ext cx="0" cy="0"/>
+          <a:chOff x="0" y="0"/>
+          <a:chExt cx="0" cy="0"/>
+        </a:xfrm>
+      </p:grpSpPr>
+      <p:sp>
+        <p:nvSpPr>
+          <p:cNvPr id="2" name="Slide Image Placeholder 1">
+            <a:extLst>
+              <a:ext uri="{FF2B5EF4-FFF2-40B4-BE49-F238E27FC236}">
+                <a16:creationId xmlns:a16="http://schemas.microsoft.com/office/drawing/2014/main" id="{E75F16A7-914D-0C7C-6361-85987DCD5167}"/>
+              </a:ext>
+            </a:extLst>
+          </p:cNvPr>
+          <p:cNvSpPr>
+            <a:spLocks noGrp="1" noRot="1" noChangeAspect="1"/>
+          </p:cNvSpPr>
+          <p:nvPr>
+            <p:ph type="sldImg"/>
+          </p:nvPr>
+        </p:nvSpPr>
+        <p:spPr/>
+      </p:sp>
+      <p:sp>
+        <p:nvSpPr>
+          <p:cNvPr id="3" name="Notes Placeholder 2">
+            <a:extLst>
+              <a:ext uri="{FF2B5EF4-FFF2-40B4-BE49-F238E27FC236}">
+                <a16:creationId xmlns:a16="http://schemas.microsoft.com/office/drawing/2014/main" id="{6052D866-4671-0F66-AE0E-D8E12A29A13F}"/>
+              </a:ext>
+            </a:extLst>
+          </p:cNvPr>
+          <p:cNvSpPr>
+            <a:spLocks noGrp="1"/>
+          </p:cNvSpPr>
+          <p:nvPr>
+            <p:ph type="body" idx="1"/>
+          </p:nvPr>
+        </p:nvSpPr>
+        <p:spPr/>
+        <p:txBody>
+          <a:bodyPr/>
+          <a:lstStyle/>
+          <a:p>
+            <a:r>
+              <a:rPr lang="en-US" dirty="0"/>
+              <a:t>So far, significant technical progress has been made.</a:t>
+            </a:r>
+            <a:br>
+              <a:rPr lang="en-US" dirty="0"/>
+            </a:br>
+            <a:r>
+              <a:rPr lang="en-US" dirty="0"/>
+              <a:t>We began by implementing and testing a pipelined MAC unit on FPGA, which serves as a benchmark to measure the improvements made by the approximate designs.</a:t>
+            </a:r>
+            <a:br>
+              <a:rPr lang="en-US" dirty="0"/>
+            </a:br>
+            <a:r>
+              <a:rPr lang="en-US" dirty="0"/>
+              <a:t>Following this, the conceptual design of the Approximate Arithmetic Unit Design (AAUD) was completed, and initial implementation of approximate multipliers and adders is underway.</a:t>
+            </a:r>
+            <a:br>
+              <a:rPr lang="en-US" dirty="0"/>
+            </a:br>
+            <a:r>
+              <a:rPr lang="en-US" dirty="0"/>
+              <a:t>Preliminary results show that the pipelined MAC unit achieves promising throughput and power efficiency.</a:t>
+            </a:r>
+            <a:br>
+              <a:rPr lang="en-US" dirty="0"/>
+            </a:br>
+            <a:r>
+              <a:rPr lang="en-US" dirty="0"/>
+              <a:t>However, we are continuously refining the design to fully integrate the approximation techniques for better performance.</a:t>
+            </a:r>
+            <a:endParaRPr lang="en-GB" dirty="0"/>
+          </a:p>
+        </p:txBody>
+      </p:sp>
+      <p:sp>
+        <p:nvSpPr>
+          <p:cNvPr id="4" name="Slide Number Placeholder 3">
+            <a:extLst>
+              <a:ext uri="{FF2B5EF4-FFF2-40B4-BE49-F238E27FC236}">
+                <a16:creationId xmlns:a16="http://schemas.microsoft.com/office/drawing/2014/main" id="{7DC118BE-C647-EB8D-05D2-3C32D3EC1B02}"/>
+              </a:ext>
+            </a:extLst>
+          </p:cNvPr>
+          <p:cNvSpPr>
+            <a:spLocks noGrp="1"/>
+          </p:cNvSpPr>
+          <p:nvPr>
+            <p:ph type="sldNum" sz="quarter" idx="5"/>
+          </p:nvPr>
+        </p:nvSpPr>
+        <p:spPr/>
+        <p:txBody>
+          <a:bodyPr/>
+          <a:lstStyle/>
+          <a:p>
+            <a:pPr rtl="0"/>
+            <a:fld id="{D4B9A9E5-4F7F-4A7D-9DE1-899232329269}" type="slidenum">
+              <a:rPr lang="en-GB" smtClean="0"/>
+              <a:t>9</a:t>
+            </a:fld>
+            <a:endParaRPr lang="en-GB"/>
+          </a:p>
+        </p:txBody>
+      </p:sp>
+    </p:spTree>
+    <p:extLst>
+      <p:ext uri="{BB962C8B-B14F-4D97-AF65-F5344CB8AC3E}">
+        <p14:creationId xmlns:p14="http://schemas.microsoft.com/office/powerpoint/2010/main" val="4235604726"/>
       </p:ext>
     </p:extLst>
   </p:cSld>
@@ -17983,229 +17806,6 @@
           </a:prstGeom>
         </p:spPr>
       </p:pic>
-      <p:sp>
-        <p:nvSpPr>
-          <p:cNvPr id="7" name="Subtitle 2">
-            <a:extLst>
-              <a:ext uri="{FF2B5EF4-FFF2-40B4-BE49-F238E27FC236}">
-                <a16:creationId xmlns:a16="http://schemas.microsoft.com/office/drawing/2014/main" id="{7A2DAF7F-4D3E-81CD-9447-B3E804EA1662}"/>
-              </a:ext>
-            </a:extLst>
-          </p:cNvPr>
-          <p:cNvSpPr txBox="1">
-            <a:spLocks/>
-          </p:cNvSpPr>
-          <p:nvPr/>
-        </p:nvSpPr>
-        <p:spPr>
-          <a:xfrm>
-            <a:off x="6416040" y="477789"/>
-            <a:ext cx="4941770" cy="3663905"/>
-          </a:xfrm>
-          <a:prstGeom prst="rect">
-            <a:avLst/>
-          </a:prstGeom>
-        </p:spPr>
-        <p:txBody>
-          <a:bodyPr vert="horz" lIns="91440" tIns="45720" rIns="91440" bIns="45720" rtlCol="0">
-            <a:normAutofit/>
-          </a:bodyPr>
-          <a:lstStyle>
-            <a:lvl1pPr marL="0" indent="0" algn="l" defTabSz="914400" rtl="0" eaLnBrk="1" latinLnBrk="0" hangingPunct="1">
-              <a:lnSpc>
-                <a:spcPct val="100000"/>
-              </a:lnSpc>
-              <a:spcBef>
-                <a:spcPts val="1000"/>
-              </a:spcBef>
-              <a:buFont typeface="Arial" panose="020B0604020202020204" pitchFamily="34" charset="0"/>
-              <a:buNone/>
-              <a:defRPr sz="1600" kern="1200">
-                <a:solidFill>
-                  <a:schemeClr val="tx1"/>
-                </a:solidFill>
-                <a:latin typeface="+mn-lt"/>
-                <a:ea typeface="+mn-ea"/>
-                <a:cs typeface="+mn-cs"/>
-              </a:defRPr>
-            </a:lvl1pPr>
-            <a:lvl2pPr marL="457200" indent="0" algn="ctr" defTabSz="914400" rtl="0" eaLnBrk="1" latinLnBrk="0" hangingPunct="1">
-              <a:lnSpc>
-                <a:spcPct val="90000"/>
-              </a:lnSpc>
-              <a:spcBef>
-                <a:spcPts val="500"/>
-              </a:spcBef>
-              <a:buFont typeface="Arial" panose="020B0604020202020204" pitchFamily="34" charset="0"/>
-              <a:buNone/>
-              <a:defRPr sz="2000" kern="1200">
-                <a:solidFill>
-                  <a:schemeClr val="tx1"/>
-                </a:solidFill>
-                <a:latin typeface="+mn-lt"/>
-                <a:ea typeface="+mn-ea"/>
-                <a:cs typeface="+mn-cs"/>
-              </a:defRPr>
-            </a:lvl2pPr>
-            <a:lvl3pPr marL="914400" indent="0" algn="ctr" defTabSz="914400" rtl="0" eaLnBrk="1" latinLnBrk="0" hangingPunct="1">
-              <a:lnSpc>
-                <a:spcPct val="90000"/>
-              </a:lnSpc>
-              <a:spcBef>
-                <a:spcPts val="500"/>
-              </a:spcBef>
-              <a:buFont typeface="Arial" panose="020B0604020202020204" pitchFamily="34" charset="0"/>
-              <a:buNone/>
-              <a:defRPr sz="1800" kern="1200">
-                <a:solidFill>
-                  <a:schemeClr val="tx1"/>
-                </a:solidFill>
-                <a:latin typeface="+mn-lt"/>
-                <a:ea typeface="+mn-ea"/>
-                <a:cs typeface="+mn-cs"/>
-              </a:defRPr>
-            </a:lvl3pPr>
-            <a:lvl4pPr marL="1371600" indent="0" algn="ctr" defTabSz="914400" rtl="0" eaLnBrk="1" latinLnBrk="0" hangingPunct="1">
-              <a:lnSpc>
-                <a:spcPct val="90000"/>
-              </a:lnSpc>
-              <a:spcBef>
-                <a:spcPts val="500"/>
-              </a:spcBef>
-              <a:buFont typeface="Arial" panose="020B0604020202020204" pitchFamily="34" charset="0"/>
-              <a:buNone/>
-              <a:defRPr sz="1600" kern="1200">
-                <a:solidFill>
-                  <a:schemeClr val="tx1"/>
-                </a:solidFill>
-                <a:latin typeface="+mn-lt"/>
-                <a:ea typeface="+mn-ea"/>
-                <a:cs typeface="+mn-cs"/>
-              </a:defRPr>
-            </a:lvl4pPr>
-            <a:lvl5pPr marL="1828800" indent="0" algn="ctr" defTabSz="914400" rtl="0" eaLnBrk="1" latinLnBrk="0" hangingPunct="1">
-              <a:lnSpc>
-                <a:spcPct val="90000"/>
-              </a:lnSpc>
-              <a:spcBef>
-                <a:spcPts val="500"/>
-              </a:spcBef>
-              <a:buFont typeface="Arial" panose="020B0604020202020204" pitchFamily="34" charset="0"/>
-              <a:buNone/>
-              <a:defRPr sz="1600" kern="1200">
-                <a:solidFill>
-                  <a:schemeClr val="tx1"/>
-                </a:solidFill>
-                <a:latin typeface="+mn-lt"/>
-                <a:ea typeface="+mn-ea"/>
-                <a:cs typeface="+mn-cs"/>
-              </a:defRPr>
-            </a:lvl5pPr>
-            <a:lvl6pPr marL="2286000" indent="0" algn="ctr" defTabSz="914400" rtl="0" eaLnBrk="1" latinLnBrk="0" hangingPunct="1">
-              <a:lnSpc>
-                <a:spcPct val="90000"/>
-              </a:lnSpc>
-              <a:spcBef>
-                <a:spcPts val="500"/>
-              </a:spcBef>
-              <a:buFont typeface="Arial" panose="020B0604020202020204" pitchFamily="34" charset="0"/>
-              <a:buNone/>
-              <a:defRPr sz="1600" kern="1200">
-                <a:solidFill>
-                  <a:schemeClr val="tx1"/>
-                </a:solidFill>
-                <a:latin typeface="+mn-lt"/>
-                <a:ea typeface="+mn-ea"/>
-                <a:cs typeface="+mn-cs"/>
-              </a:defRPr>
-            </a:lvl6pPr>
-            <a:lvl7pPr marL="2743200" indent="0" algn="ctr" defTabSz="914400" rtl="0" eaLnBrk="1" latinLnBrk="0" hangingPunct="1">
-              <a:lnSpc>
-                <a:spcPct val="90000"/>
-              </a:lnSpc>
-              <a:spcBef>
-                <a:spcPts val="500"/>
-              </a:spcBef>
-              <a:buFont typeface="Arial" panose="020B0604020202020204" pitchFamily="34" charset="0"/>
-              <a:buNone/>
-              <a:defRPr sz="1600" kern="1200">
-                <a:solidFill>
-                  <a:schemeClr val="tx1"/>
-                </a:solidFill>
-                <a:latin typeface="+mn-lt"/>
-                <a:ea typeface="+mn-ea"/>
-                <a:cs typeface="+mn-cs"/>
-              </a:defRPr>
-            </a:lvl7pPr>
-            <a:lvl8pPr marL="3200400" indent="0" algn="ctr" defTabSz="914400" rtl="0" eaLnBrk="1" latinLnBrk="0" hangingPunct="1">
-              <a:lnSpc>
-                <a:spcPct val="90000"/>
-              </a:lnSpc>
-              <a:spcBef>
-                <a:spcPts val="500"/>
-              </a:spcBef>
-              <a:buFont typeface="Arial" panose="020B0604020202020204" pitchFamily="34" charset="0"/>
-              <a:buNone/>
-              <a:defRPr sz="1600" kern="1200">
-                <a:solidFill>
-                  <a:schemeClr val="tx1"/>
-                </a:solidFill>
-                <a:latin typeface="+mn-lt"/>
-                <a:ea typeface="+mn-ea"/>
-                <a:cs typeface="+mn-cs"/>
-              </a:defRPr>
-            </a:lvl8pPr>
-            <a:lvl9pPr marL="3657600" indent="0" algn="ctr" defTabSz="914400" rtl="0" eaLnBrk="1" latinLnBrk="0" hangingPunct="1">
-              <a:lnSpc>
-                <a:spcPct val="90000"/>
-              </a:lnSpc>
-              <a:spcBef>
-                <a:spcPts val="500"/>
-              </a:spcBef>
-              <a:buFont typeface="Arial" panose="020B0604020202020204" pitchFamily="34" charset="0"/>
-              <a:buNone/>
-              <a:defRPr sz="1600" kern="1200">
-                <a:solidFill>
-                  <a:schemeClr val="tx1"/>
-                </a:solidFill>
-                <a:latin typeface="+mn-lt"/>
-                <a:ea typeface="+mn-ea"/>
-                <a:cs typeface="+mn-cs"/>
-              </a:defRPr>
-            </a:lvl9pPr>
-          </a:lstStyle>
-          <a:p>
-            <a:r>
-              <a:rPr lang="en-GB" dirty="0"/>
-              <a:t>● who may not be familiar with the specific details behind your project.</a:t>
-            </a:r>
-          </a:p>
-          <a:p>
-            <a:r>
-              <a:rPr lang="en-GB" dirty="0"/>
-              <a:t>●What is given, and what are the expected results? What methodology are you using?</a:t>
-            </a:r>
-          </a:p>
-          <a:p>
-            <a:r>
-              <a:rPr lang="en-GB" dirty="0"/>
-              <a:t>● Technical progress achieved so far, preliminary experimental/simulation/theoretical</a:t>
-            </a:r>
-          </a:p>
-          <a:p>
-            <a:r>
-              <a:rPr lang="en-GB" dirty="0"/>
-              <a:t>results, along with your analysis of them. Significance of the results achieved.</a:t>
-            </a:r>
-          </a:p>
-          <a:p>
-            <a:r>
-              <a:rPr lang="en-GB" dirty="0"/>
-              <a:t>● Comparison against aims and objectives, and future work plan milestones</a:t>
-            </a:r>
-          </a:p>
-        </p:txBody>
-      </p:sp>
     </p:spTree>
     <p:extLst>
       <p:ext uri="{BB962C8B-B14F-4D97-AF65-F5344CB8AC3E}">
@@ -18314,539 +17914,132 @@
       </p:pic>
       <p:sp>
         <p:nvSpPr>
-          <p:cNvPr id="5" name="Rectangle 1">
-            <a:extLst>
-              <a:ext uri="{FF2B5EF4-FFF2-40B4-BE49-F238E27FC236}">
-                <a16:creationId xmlns:a16="http://schemas.microsoft.com/office/drawing/2014/main" id="{7C69B027-4B5B-08D9-7821-B546E1456D8E}"/>
-              </a:ext>
-            </a:extLst>
-          </p:cNvPr>
-          <p:cNvSpPr>
-            <a:spLocks noChangeArrowheads="1"/>
+          <p:cNvPr id="4" name="Slide Number Placeholder 5">
+            <a:extLst>
+              <a:ext uri="{FF2B5EF4-FFF2-40B4-BE49-F238E27FC236}">
+                <a16:creationId xmlns:a16="http://schemas.microsoft.com/office/drawing/2014/main" id="{F0A137BA-C4AD-D7E3-F69E-6E27562AD158}"/>
+              </a:ext>
+            </a:extLst>
+          </p:cNvPr>
+          <p:cNvSpPr txBox="1">
+            <a:spLocks/>
           </p:cNvSpPr>
           <p:nvPr/>
         </p:nvSpPr>
-        <p:spPr bwMode="auto">
-          <a:xfrm>
-            <a:off x="65368" y="1514588"/>
-            <a:ext cx="5980922" cy="1815882"/>
+        <p:spPr>
+          <a:xfrm>
+            <a:off x="8610600" y="6356350"/>
+            <a:ext cx="2743200" cy="365125"/>
           </a:xfrm>
           <a:prstGeom prst="rect">
             <a:avLst/>
           </a:prstGeom>
-          <a:noFill/>
-          <a:ln>
-            <a:noFill/>
-          </a:ln>
-          <a:effectLst/>
-          <a:extLst>
-            <a:ext uri="{909E8E84-426E-40DD-AFC4-6F175D3DCCD1}">
-              <a14:hiddenFill xmlns:a14="http://schemas.microsoft.com/office/drawing/2010/main">
-                <a:solidFill>
-                  <a:schemeClr val="accent1"/>
-                </a:solidFill>
-              </a14:hiddenFill>
-            </a:ext>
-            <a:ext uri="{91240B29-F687-4F45-9708-019B960494DF}">
-              <a14:hiddenLine xmlns:a14="http://schemas.microsoft.com/office/drawing/2010/main" w="9525">
+        </p:spPr>
+        <p:txBody>
+          <a:bodyPr rtlCol="0"/>
+          <a:lstStyle>
+            <a:defPPr rtl="0">
+              <a:defRPr lang="en-GB"/>
+            </a:defPPr>
+            <a:lvl1pPr marL="0" algn="l" defTabSz="914400" rtl="0" eaLnBrk="1" latinLnBrk="0" hangingPunct="1">
+              <a:defRPr sz="1800" kern="1200">
                 <a:solidFill>
                   <a:schemeClr val="tx1"/>
                 </a:solidFill>
-                <a:miter lim="800000"/>
-                <a:headEnd/>
-                <a:tailEnd/>
-              </a14:hiddenLine>
-            </a:ext>
-            <a:ext uri="{AF507438-7753-43E0-B8FC-AC1667EBCBE1}">
-              <a14:hiddenEffects xmlns:a14="http://schemas.microsoft.com/office/drawing/2010/main">
-                <a:effectLst>
-                  <a:outerShdw dist="35921" dir="2700000" algn="ctr" rotWithShape="0">
-                    <a:schemeClr val="bg2"/>
-                  </a:outerShdw>
-                </a:effectLst>
-              </a14:hiddenEffects>
-            </a:ext>
-          </a:extLst>
-        </p:spPr>
-        <p:txBody>
-          <a:bodyPr vert="horz" wrap="square" lIns="91440" tIns="45720" rIns="91440" bIns="45720" numCol="1" anchor="ctr" anchorCtr="0" compatLnSpc="1">
-            <a:prstTxWarp prst="textNoShape">
-              <a:avLst/>
-            </a:prstTxWarp>
-            <a:spAutoFit/>
-          </a:bodyPr>
-          <a:lstStyle/>
-          <a:p>
-            <a:pPr marL="0" marR="0" lvl="0" indent="0" algn="l" defTabSz="914400" rtl="0" eaLnBrk="0" fontAlgn="base" latinLnBrk="0" hangingPunct="0">
-              <a:lnSpc>
-                <a:spcPct val="100000"/>
-              </a:lnSpc>
-              <a:spcBef>
-                <a:spcPct val="0"/>
-              </a:spcBef>
-              <a:spcAft>
-                <a:spcPct val="0"/>
-              </a:spcAft>
-              <a:buClrTx/>
-              <a:buSzTx/>
-              <a:buFontTx/>
-              <a:buNone/>
-              <a:tabLst/>
-            </a:pPr>
-            <a:r>
-              <a:rPr kumimoji="0" lang="en-US" altLang="en-US" sz="1400" b="1" i="0" u="none" strike="noStrike" cap="none" normalizeH="0" baseline="0" dirty="0">
-                <a:ln>
-                  <a:noFill/>
-                </a:ln>
+                <a:latin typeface="+mn-lt"/>
+                <a:ea typeface="+mn-ea"/>
+                <a:cs typeface="+mn-cs"/>
+              </a:defRPr>
+            </a:lvl1pPr>
+            <a:lvl2pPr marL="457200" algn="l" defTabSz="914400" rtl="0" eaLnBrk="1" latinLnBrk="0" hangingPunct="1">
+              <a:defRPr sz="1800" kern="1200">
                 <a:solidFill>
                   <a:schemeClr val="tx1"/>
                 </a:solidFill>
-                <a:effectLst/>
-                <a:latin typeface="Arial" panose="020B0604020202020204" pitchFamily="34" charset="0"/>
-              </a:rPr>
-              <a:t>Performance Analysis</a:t>
-            </a:r>
-            <a:endParaRPr kumimoji="0" lang="en-US" altLang="en-US" sz="1400" b="0" i="0" u="none" strike="noStrike" cap="none" normalizeH="0" baseline="0" dirty="0">
-              <a:ln>
-                <a:noFill/>
-              </a:ln>
-              <a:solidFill>
-                <a:schemeClr val="tx1"/>
-              </a:solidFill>
-              <a:effectLst/>
-              <a:latin typeface="Arial" panose="020B0604020202020204" pitchFamily="34" charset="0"/>
-            </a:endParaRPr>
-          </a:p>
-          <a:p>
-            <a:pPr marL="0" marR="0" lvl="0" indent="0" algn="l" defTabSz="914400" rtl="0" eaLnBrk="0" fontAlgn="base" latinLnBrk="0" hangingPunct="0">
-              <a:lnSpc>
-                <a:spcPct val="100000"/>
-              </a:lnSpc>
-              <a:spcBef>
-                <a:spcPct val="0"/>
-              </a:spcBef>
-              <a:spcAft>
-                <a:spcPct val="0"/>
-              </a:spcAft>
-              <a:buClrTx/>
-              <a:buSzTx/>
-              <a:buFontTx/>
-              <a:buNone/>
-              <a:tabLst/>
-            </a:pPr>
-            <a:r>
-              <a:rPr kumimoji="0" lang="en-US" altLang="en-US" sz="1400" b="0" i="0" u="none" strike="noStrike" cap="none" normalizeH="0" baseline="0" dirty="0">
-                <a:ln>
-                  <a:noFill/>
-                </a:ln>
+                <a:latin typeface="+mn-lt"/>
+                <a:ea typeface="+mn-ea"/>
+                <a:cs typeface="+mn-cs"/>
+              </a:defRPr>
+            </a:lvl2pPr>
+            <a:lvl3pPr marL="914400" algn="l" defTabSz="914400" rtl="0" eaLnBrk="1" latinLnBrk="0" hangingPunct="1">
+              <a:defRPr sz="1800" kern="1200">
                 <a:solidFill>
                   <a:schemeClr val="tx1"/>
                 </a:solidFill>
-                <a:effectLst/>
-                <a:latin typeface="Arial" panose="020B0604020202020204" pitchFamily="34" charset="0"/>
-              </a:rPr>
-              <a:t>✅ </a:t>
-            </a:r>
-            <a:r>
-              <a:rPr kumimoji="0" lang="en-US" altLang="en-US" sz="1400" b="1" i="0" u="none" strike="noStrike" cap="none" normalizeH="0" baseline="0" dirty="0">
-                <a:ln>
-                  <a:noFill/>
-                </a:ln>
+                <a:latin typeface="+mn-lt"/>
+                <a:ea typeface="+mn-ea"/>
+                <a:cs typeface="+mn-cs"/>
+              </a:defRPr>
+            </a:lvl3pPr>
+            <a:lvl4pPr marL="1371600" algn="l" defTabSz="914400" rtl="0" eaLnBrk="1" latinLnBrk="0" hangingPunct="1">
+              <a:defRPr sz="1800" kern="1200">
                 <a:solidFill>
                   <a:schemeClr val="tx1"/>
                 </a:solidFill>
-                <a:effectLst/>
-                <a:latin typeface="Arial" panose="020B0604020202020204" pitchFamily="34" charset="0"/>
-              </a:rPr>
-              <a:t>Power Efficiency</a:t>
-            </a:r>
-            <a:r>
-              <a:rPr kumimoji="0" lang="en-US" altLang="en-US" sz="1400" b="0" i="0" u="none" strike="noStrike" cap="none" normalizeH="0" baseline="0" dirty="0">
-                <a:ln>
-                  <a:noFill/>
-                </a:ln>
+                <a:latin typeface="+mn-lt"/>
+                <a:ea typeface="+mn-ea"/>
+                <a:cs typeface="+mn-cs"/>
+              </a:defRPr>
+            </a:lvl4pPr>
+            <a:lvl5pPr marL="1828800" algn="l" defTabSz="914400" rtl="0" eaLnBrk="1" latinLnBrk="0" hangingPunct="1">
+              <a:defRPr sz="1800" kern="1200">
                 <a:solidFill>
                   <a:schemeClr val="tx1"/>
                 </a:solidFill>
-                <a:effectLst/>
-                <a:latin typeface="Arial" panose="020B0604020202020204" pitchFamily="34" charset="0"/>
-              </a:rPr>
-              <a:t> – Reduces power using OR-based adders &amp; compressor-based multipliers. ✅ </a:t>
-            </a:r>
-            <a:r>
-              <a:rPr kumimoji="0" lang="en-US" altLang="en-US" sz="1400" b="1" i="0" u="none" strike="noStrike" cap="none" normalizeH="0" baseline="0" dirty="0">
-                <a:ln>
-                  <a:noFill/>
-                </a:ln>
+                <a:latin typeface="+mn-lt"/>
+                <a:ea typeface="+mn-ea"/>
+                <a:cs typeface="+mn-cs"/>
+              </a:defRPr>
+            </a:lvl5pPr>
+            <a:lvl6pPr marL="2286000" algn="l" defTabSz="914400" rtl="0" eaLnBrk="1" latinLnBrk="0" hangingPunct="1">
+              <a:defRPr sz="1800" kern="1200">
                 <a:solidFill>
                   <a:schemeClr val="tx1"/>
                 </a:solidFill>
-                <a:effectLst/>
-                <a:latin typeface="Arial" panose="020B0604020202020204" pitchFamily="34" charset="0"/>
-              </a:rPr>
-              <a:t>Area Reduction</a:t>
-            </a:r>
-            <a:r>
-              <a:rPr kumimoji="0" lang="en-US" altLang="en-US" sz="1400" b="0" i="0" u="none" strike="noStrike" cap="none" normalizeH="0" baseline="0" dirty="0">
-                <a:ln>
-                  <a:noFill/>
-                </a:ln>
+                <a:latin typeface="+mn-lt"/>
+                <a:ea typeface="+mn-ea"/>
+                <a:cs typeface="+mn-cs"/>
+              </a:defRPr>
+            </a:lvl6pPr>
+            <a:lvl7pPr marL="2743200" algn="l" defTabSz="914400" rtl="0" eaLnBrk="1" latinLnBrk="0" hangingPunct="1">
+              <a:defRPr sz="1800" kern="1200">
                 <a:solidFill>
                   <a:schemeClr val="tx1"/>
                 </a:solidFill>
-                <a:effectLst/>
-                <a:latin typeface="Arial" panose="020B0604020202020204" pitchFamily="34" charset="0"/>
-              </a:rPr>
-              <a:t> – Lower transistor count, optimized for FPGA/</a:t>
-            </a:r>
-            <a:r>
-              <a:rPr kumimoji="0" lang="en-US" altLang="en-US" sz="1400" b="0" i="0" u="none" strike="noStrike" cap="none" normalizeH="0" baseline="0" dirty="0" err="1">
-                <a:ln>
-                  <a:noFill/>
-                </a:ln>
+                <a:latin typeface="+mn-lt"/>
+                <a:ea typeface="+mn-ea"/>
+                <a:cs typeface="+mn-cs"/>
+              </a:defRPr>
+            </a:lvl7pPr>
+            <a:lvl8pPr marL="3200400" algn="l" defTabSz="914400" rtl="0" eaLnBrk="1" latinLnBrk="0" hangingPunct="1">
+              <a:defRPr sz="1800" kern="1200">
                 <a:solidFill>
                   <a:schemeClr val="tx1"/>
                 </a:solidFill>
-                <a:effectLst/>
-                <a:latin typeface="Arial" panose="020B0604020202020204" pitchFamily="34" charset="0"/>
-              </a:rPr>
-              <a:t>SoC.</a:t>
-            </a:r>
-            <a:r>
-              <a:rPr kumimoji="0" lang="en-US" altLang="en-US" sz="1400" b="0" i="0" u="none" strike="noStrike" cap="none" normalizeH="0" baseline="0" dirty="0">
-                <a:ln>
-                  <a:noFill/>
-                </a:ln>
+                <a:latin typeface="+mn-lt"/>
+                <a:ea typeface="+mn-ea"/>
+                <a:cs typeface="+mn-cs"/>
+              </a:defRPr>
+            </a:lvl8pPr>
+            <a:lvl9pPr marL="3657600" algn="l" defTabSz="914400" rtl="0" eaLnBrk="1" latinLnBrk="0" hangingPunct="1">
+              <a:defRPr sz="1800" kern="1200">
                 <a:solidFill>
                   <a:schemeClr val="tx1"/>
                 </a:solidFill>
-                <a:effectLst/>
-                <a:latin typeface="Arial" panose="020B0604020202020204" pitchFamily="34" charset="0"/>
-              </a:rPr>
-              <a:t> ✅ </a:t>
-            </a:r>
-            <a:r>
-              <a:rPr kumimoji="0" lang="en-US" altLang="en-US" sz="1400" b="1" i="0" u="none" strike="noStrike" cap="none" normalizeH="0" baseline="0" dirty="0">
-                <a:ln>
-                  <a:noFill/>
-                </a:ln>
-                <a:solidFill>
-                  <a:schemeClr val="tx1"/>
-                </a:solidFill>
-                <a:effectLst/>
-                <a:latin typeface="Arial" panose="020B0604020202020204" pitchFamily="34" charset="0"/>
-              </a:rPr>
-              <a:t>Speed &amp; Latency</a:t>
-            </a:r>
-            <a:r>
-              <a:rPr kumimoji="0" lang="en-US" altLang="en-US" sz="1400" b="0" i="0" u="none" strike="noStrike" cap="none" normalizeH="0" baseline="0" dirty="0">
-                <a:ln>
-                  <a:noFill/>
-                </a:ln>
-                <a:solidFill>
-                  <a:schemeClr val="tx1"/>
-                </a:solidFill>
-                <a:effectLst/>
-                <a:latin typeface="Arial" panose="020B0604020202020204" pitchFamily="34" charset="0"/>
-              </a:rPr>
-              <a:t> – Pipelining improves throughput, approximation speeds computation. ✅ </a:t>
-            </a:r>
-            <a:r>
-              <a:rPr kumimoji="0" lang="en-US" altLang="en-US" sz="1400" b="1" i="0" u="none" strike="noStrike" cap="none" normalizeH="0" baseline="0" dirty="0">
-                <a:ln>
-                  <a:noFill/>
-                </a:ln>
-                <a:solidFill>
-                  <a:schemeClr val="tx1"/>
-                </a:solidFill>
-                <a:effectLst/>
-                <a:latin typeface="Arial" panose="020B0604020202020204" pitchFamily="34" charset="0"/>
-              </a:rPr>
-              <a:t>Accuracy Trade-off</a:t>
-            </a:r>
-            <a:r>
-              <a:rPr kumimoji="0" lang="en-US" altLang="en-US" sz="1400" b="0" i="0" u="none" strike="noStrike" cap="none" normalizeH="0" baseline="0" dirty="0">
-                <a:ln>
-                  <a:noFill/>
-                </a:ln>
-                <a:solidFill>
-                  <a:schemeClr val="tx1"/>
-                </a:solidFill>
-                <a:effectLst/>
-                <a:latin typeface="Arial" panose="020B0604020202020204" pitchFamily="34" charset="0"/>
-              </a:rPr>
-              <a:t> – Small errors measured using MRED; acceptable for image processing.</a:t>
-            </a:r>
-          </a:p>
-          <a:p>
-            <a:pPr marL="0" marR="0" lvl="0" indent="0" algn="l" defTabSz="914400" rtl="0" eaLnBrk="0" fontAlgn="base" latinLnBrk="0" hangingPunct="0">
-              <a:lnSpc>
-                <a:spcPct val="100000"/>
-              </a:lnSpc>
-              <a:spcBef>
-                <a:spcPct val="0"/>
-              </a:spcBef>
-              <a:spcAft>
-                <a:spcPct val="0"/>
-              </a:spcAft>
-              <a:buClrTx/>
-              <a:buSzTx/>
-              <a:buFontTx/>
-              <a:buNone/>
-              <a:tabLst/>
-            </a:pPr>
-            <a:endParaRPr kumimoji="0" lang="en-US" altLang="en-US" sz="1400" b="0" i="0" u="none" strike="noStrike" cap="none" normalizeH="0" baseline="0" dirty="0">
-              <a:ln>
-                <a:noFill/>
-              </a:ln>
-              <a:solidFill>
-                <a:schemeClr val="tx1"/>
-              </a:solidFill>
-              <a:effectLst/>
-              <a:latin typeface="Arial" panose="020B0604020202020204" pitchFamily="34" charset="0"/>
-            </a:endParaRPr>
-          </a:p>
-        </p:txBody>
-      </p:sp>
-      <p:sp>
-        <p:nvSpPr>
-          <p:cNvPr id="7" name="Rectangle 3">
-            <a:extLst>
-              <a:ext uri="{FF2B5EF4-FFF2-40B4-BE49-F238E27FC236}">
-                <a16:creationId xmlns:a16="http://schemas.microsoft.com/office/drawing/2014/main" id="{84D072B2-1F60-9DDD-480C-48DE43E4A0B5}"/>
-              </a:ext>
-            </a:extLst>
-          </p:cNvPr>
-          <p:cNvSpPr>
-            <a:spLocks noChangeArrowheads="1"/>
-          </p:cNvSpPr>
-          <p:nvPr/>
-        </p:nvSpPr>
-        <p:spPr bwMode="auto">
-          <a:xfrm>
-            <a:off x="65368" y="3330470"/>
-            <a:ext cx="6326155" cy="1200329"/>
-          </a:xfrm>
-          <a:prstGeom prst="rect">
-            <a:avLst/>
-          </a:prstGeom>
-          <a:noFill/>
-          <a:ln>
-            <a:noFill/>
-          </a:ln>
-          <a:effectLst/>
-          <a:extLst>
-            <a:ext uri="{909E8E84-426E-40DD-AFC4-6F175D3DCCD1}">
-              <a14:hiddenFill xmlns:a14="http://schemas.microsoft.com/office/drawing/2010/main">
-                <a:solidFill>
-                  <a:schemeClr val="accent1"/>
-                </a:solidFill>
-              </a14:hiddenFill>
-            </a:ext>
-            <a:ext uri="{91240B29-F687-4F45-9708-019B960494DF}">
-              <a14:hiddenLine xmlns:a14="http://schemas.microsoft.com/office/drawing/2010/main" w="9525">
-                <a:solidFill>
-                  <a:schemeClr val="tx1"/>
-                </a:solidFill>
-                <a:miter lim="800000"/>
-                <a:headEnd/>
-                <a:tailEnd/>
-              </a14:hiddenLine>
-            </a:ext>
-            <a:ext uri="{AF507438-7753-43E0-B8FC-AC1667EBCBE1}">
-              <a14:hiddenEffects xmlns:a14="http://schemas.microsoft.com/office/drawing/2010/main">
-                <a:effectLst>
-                  <a:outerShdw dist="35921" dir="2700000" algn="ctr" rotWithShape="0">
-                    <a:schemeClr val="bg2"/>
-                  </a:outerShdw>
-                </a:effectLst>
-              </a14:hiddenEffects>
-            </a:ext>
-          </a:extLst>
-        </p:spPr>
-        <p:txBody>
-          <a:bodyPr vert="horz" wrap="square" lIns="91440" tIns="45720" rIns="91440" bIns="45720" numCol="1" anchor="ctr" anchorCtr="0" compatLnSpc="1">
-            <a:prstTxWarp prst="textNoShape">
-              <a:avLst/>
-            </a:prstTxWarp>
-            <a:spAutoFit/>
-          </a:bodyPr>
-          <a:lstStyle/>
-          <a:p>
-            <a:pPr marL="0" marR="0" lvl="0" indent="0" algn="l" defTabSz="914400" rtl="0" eaLnBrk="0" fontAlgn="base" latinLnBrk="0" hangingPunct="0">
-              <a:lnSpc>
-                <a:spcPct val="100000"/>
-              </a:lnSpc>
-              <a:spcBef>
-                <a:spcPct val="0"/>
-              </a:spcBef>
-              <a:spcAft>
-                <a:spcPct val="0"/>
-              </a:spcAft>
-              <a:buClrTx/>
-              <a:buSzTx/>
-              <a:buFontTx/>
-              <a:buNone/>
-              <a:tabLst/>
-            </a:pPr>
-            <a:r>
-              <a:rPr kumimoji="0" lang="en-US" altLang="en-US" sz="1200" b="1" i="0" u="none" strike="noStrike" cap="none" normalizeH="0" baseline="0" dirty="0">
-                <a:ln>
-                  <a:noFill/>
-                </a:ln>
-                <a:solidFill>
-                  <a:schemeClr val="tx1"/>
-                </a:solidFill>
-                <a:effectLst/>
-                <a:latin typeface="Arial" panose="020B0604020202020204" pitchFamily="34" charset="0"/>
-              </a:rPr>
-              <a:t>2️⃣ Why is this Significant?</a:t>
-            </a:r>
-            <a:endParaRPr kumimoji="0" lang="en-US" altLang="en-US" sz="1200" b="0" i="0" u="none" strike="noStrike" cap="none" normalizeH="0" baseline="0" dirty="0">
-              <a:ln>
-                <a:noFill/>
-              </a:ln>
-              <a:solidFill>
-                <a:schemeClr val="tx1"/>
-              </a:solidFill>
-              <a:effectLst/>
-              <a:latin typeface="Arial" panose="020B0604020202020204" pitchFamily="34" charset="0"/>
-            </a:endParaRPr>
-          </a:p>
-          <a:p>
-            <a:pPr marL="0" marR="0" lvl="0" indent="0" algn="l" defTabSz="914400" rtl="0" eaLnBrk="0" fontAlgn="base" latinLnBrk="0" hangingPunct="0">
-              <a:lnSpc>
-                <a:spcPct val="100000"/>
-              </a:lnSpc>
-              <a:spcBef>
-                <a:spcPct val="0"/>
-              </a:spcBef>
-              <a:spcAft>
-                <a:spcPct val="0"/>
-              </a:spcAft>
-              <a:buClrTx/>
-              <a:buSzTx/>
-              <a:buFontTx/>
-              <a:buNone/>
-              <a:tabLst/>
-            </a:pPr>
-            <a:r>
-              <a:rPr kumimoji="0" lang="en-US" altLang="en-US" sz="1200" b="0" i="0" u="none" strike="noStrike" cap="none" normalizeH="0" baseline="0" dirty="0">
-                <a:ln>
-                  <a:noFill/>
-                </a:ln>
-                <a:solidFill>
-                  <a:schemeClr val="tx1"/>
-                </a:solidFill>
-                <a:effectLst/>
-                <a:latin typeface="Arial" panose="020B0604020202020204" pitchFamily="34" charset="0"/>
-              </a:rPr>
-              <a:t>🔹 </a:t>
-            </a:r>
-            <a:r>
-              <a:rPr kumimoji="0" lang="en-US" altLang="en-US" sz="1200" b="1" i="0" u="none" strike="noStrike" cap="none" normalizeH="0" baseline="0" dirty="0">
-                <a:ln>
-                  <a:noFill/>
-                </a:ln>
-                <a:solidFill>
-                  <a:schemeClr val="tx1"/>
-                </a:solidFill>
-                <a:effectLst/>
-                <a:latin typeface="Arial" panose="020B0604020202020204" pitchFamily="34" charset="0"/>
-              </a:rPr>
-              <a:t>Overcomes Moore’s Law Limitations</a:t>
-            </a:r>
-            <a:r>
-              <a:rPr kumimoji="0" lang="en-US" altLang="en-US" sz="1200" b="0" i="0" u="none" strike="noStrike" cap="none" normalizeH="0" baseline="0" dirty="0">
-                <a:ln>
-                  <a:noFill/>
-                </a:ln>
-                <a:solidFill>
-                  <a:schemeClr val="tx1"/>
-                </a:solidFill>
-                <a:effectLst/>
-                <a:latin typeface="Arial" panose="020B0604020202020204" pitchFamily="34" charset="0"/>
-              </a:rPr>
-              <a:t> – Alternative efficiency technique for post-scaling era. 🔹 </a:t>
-            </a:r>
-            <a:r>
-              <a:rPr kumimoji="0" lang="en-US" altLang="en-US" sz="1200" b="1" i="0" u="none" strike="noStrike" cap="none" normalizeH="0" baseline="0" dirty="0">
-                <a:ln>
-                  <a:noFill/>
-                </a:ln>
-                <a:solidFill>
-                  <a:schemeClr val="tx1"/>
-                </a:solidFill>
-                <a:effectLst/>
-                <a:latin typeface="Arial" panose="020B0604020202020204" pitchFamily="34" charset="0"/>
-              </a:rPr>
-              <a:t>Optimized for Edge Computing &amp; IoT</a:t>
-            </a:r>
-            <a:r>
-              <a:rPr kumimoji="0" lang="en-US" altLang="en-US" sz="1200" b="0" i="0" u="none" strike="noStrike" cap="none" normalizeH="0" baseline="0" dirty="0">
-                <a:ln>
-                  <a:noFill/>
-                </a:ln>
-                <a:solidFill>
-                  <a:schemeClr val="tx1"/>
-                </a:solidFill>
-                <a:effectLst/>
-                <a:latin typeface="Arial" panose="020B0604020202020204" pitchFamily="34" charset="0"/>
-              </a:rPr>
-              <a:t> – Low-power design fits embedded applications. 🔹 </a:t>
-            </a:r>
-            <a:r>
-              <a:rPr kumimoji="0" lang="en-US" altLang="en-US" sz="1200" b="1" i="0" u="none" strike="noStrike" cap="none" normalizeH="0" baseline="0" dirty="0">
-                <a:ln>
-                  <a:noFill/>
-                </a:ln>
-                <a:solidFill>
-                  <a:schemeClr val="tx1"/>
-                </a:solidFill>
-                <a:effectLst/>
-                <a:latin typeface="Arial" panose="020B0604020202020204" pitchFamily="34" charset="0"/>
-              </a:rPr>
-              <a:t>Application in Image Processing</a:t>
-            </a:r>
-            <a:r>
-              <a:rPr kumimoji="0" lang="en-US" altLang="en-US" sz="1200" b="0" i="0" u="none" strike="noStrike" cap="none" normalizeH="0" baseline="0" dirty="0">
-                <a:ln>
-                  <a:noFill/>
-                </a:ln>
-                <a:solidFill>
-                  <a:schemeClr val="tx1"/>
-                </a:solidFill>
-                <a:effectLst/>
-                <a:latin typeface="Arial" panose="020B0604020202020204" pitchFamily="34" charset="0"/>
-              </a:rPr>
-              <a:t> – Used in fuzzy memoized FIR filters for denoising. 🔹 </a:t>
-            </a:r>
-            <a:r>
-              <a:rPr kumimoji="0" lang="en-US" altLang="en-US" sz="1200" b="1" i="0" u="none" strike="noStrike" cap="none" normalizeH="0" baseline="0" dirty="0">
-                <a:ln>
-                  <a:noFill/>
-                </a:ln>
-                <a:solidFill>
-                  <a:schemeClr val="tx1"/>
-                </a:solidFill>
-                <a:effectLst/>
-                <a:latin typeface="Arial" panose="020B0604020202020204" pitchFamily="34" charset="0"/>
-              </a:rPr>
-              <a:t>Future Potential</a:t>
-            </a:r>
-            <a:r>
-              <a:rPr kumimoji="0" lang="en-US" altLang="en-US" sz="1200" b="0" i="0" u="none" strike="noStrike" cap="none" normalizeH="0" baseline="0" dirty="0">
-                <a:ln>
-                  <a:noFill/>
-                </a:ln>
-                <a:solidFill>
-                  <a:schemeClr val="tx1"/>
-                </a:solidFill>
-                <a:effectLst/>
-                <a:latin typeface="Arial" panose="020B0604020202020204" pitchFamily="34" charset="0"/>
-              </a:rPr>
-              <a:t> – Scalable to 16-bit, 32-bit MACs; applicable in AI &amp; DSP.</a:t>
-            </a:r>
+                <a:latin typeface="+mn-lt"/>
+                <a:ea typeface="+mn-ea"/>
+                <a:cs typeface="+mn-cs"/>
+              </a:defRPr>
+            </a:lvl9pPr>
+          </a:lstStyle>
+          <a:p>
+            <a:pPr algn="r"/>
+            <a:fld id="{B5CEABB6-07DC-46E8-9B57-56EC44A396E5}" type="slidenum">
+              <a:rPr lang="en-GB" sz="900" smtClean="0"/>
+              <a:pPr algn="r"/>
+              <a:t>10</a:t>
+            </a:fld>
+            <a:endParaRPr lang="en-GB" dirty="0"/>
           </a:p>
         </p:txBody>
       </p:sp>
@@ -18962,6 +18155,137 @@
           </a:prstGeom>
         </p:spPr>
       </p:pic>
+      <p:sp>
+        <p:nvSpPr>
+          <p:cNvPr id="4" name="Slide Number Placeholder 5">
+            <a:extLst>
+              <a:ext uri="{FF2B5EF4-FFF2-40B4-BE49-F238E27FC236}">
+                <a16:creationId xmlns:a16="http://schemas.microsoft.com/office/drawing/2014/main" id="{E2BED2BA-07EB-3732-851F-5E194980FCC7}"/>
+              </a:ext>
+            </a:extLst>
+          </p:cNvPr>
+          <p:cNvSpPr txBox="1">
+            <a:spLocks/>
+          </p:cNvSpPr>
+          <p:nvPr/>
+        </p:nvSpPr>
+        <p:spPr>
+          <a:xfrm>
+            <a:off x="8610600" y="6356350"/>
+            <a:ext cx="2743200" cy="365125"/>
+          </a:xfrm>
+          <a:prstGeom prst="rect">
+            <a:avLst/>
+          </a:prstGeom>
+        </p:spPr>
+        <p:txBody>
+          <a:bodyPr rtlCol="0"/>
+          <a:lstStyle>
+            <a:defPPr rtl="0">
+              <a:defRPr lang="en-GB"/>
+            </a:defPPr>
+            <a:lvl1pPr marL="0" algn="l" defTabSz="914400" rtl="0" eaLnBrk="1" latinLnBrk="0" hangingPunct="1">
+              <a:defRPr sz="1800" kern="1200">
+                <a:solidFill>
+                  <a:schemeClr val="tx1"/>
+                </a:solidFill>
+                <a:latin typeface="+mn-lt"/>
+                <a:ea typeface="+mn-ea"/>
+                <a:cs typeface="+mn-cs"/>
+              </a:defRPr>
+            </a:lvl1pPr>
+            <a:lvl2pPr marL="457200" algn="l" defTabSz="914400" rtl="0" eaLnBrk="1" latinLnBrk="0" hangingPunct="1">
+              <a:defRPr sz="1800" kern="1200">
+                <a:solidFill>
+                  <a:schemeClr val="tx1"/>
+                </a:solidFill>
+                <a:latin typeface="+mn-lt"/>
+                <a:ea typeface="+mn-ea"/>
+                <a:cs typeface="+mn-cs"/>
+              </a:defRPr>
+            </a:lvl2pPr>
+            <a:lvl3pPr marL="914400" algn="l" defTabSz="914400" rtl="0" eaLnBrk="1" latinLnBrk="0" hangingPunct="1">
+              <a:defRPr sz="1800" kern="1200">
+                <a:solidFill>
+                  <a:schemeClr val="tx1"/>
+                </a:solidFill>
+                <a:latin typeface="+mn-lt"/>
+                <a:ea typeface="+mn-ea"/>
+                <a:cs typeface="+mn-cs"/>
+              </a:defRPr>
+            </a:lvl3pPr>
+            <a:lvl4pPr marL="1371600" algn="l" defTabSz="914400" rtl="0" eaLnBrk="1" latinLnBrk="0" hangingPunct="1">
+              <a:defRPr sz="1800" kern="1200">
+                <a:solidFill>
+                  <a:schemeClr val="tx1"/>
+                </a:solidFill>
+                <a:latin typeface="+mn-lt"/>
+                <a:ea typeface="+mn-ea"/>
+                <a:cs typeface="+mn-cs"/>
+              </a:defRPr>
+            </a:lvl4pPr>
+            <a:lvl5pPr marL="1828800" algn="l" defTabSz="914400" rtl="0" eaLnBrk="1" latinLnBrk="0" hangingPunct="1">
+              <a:defRPr sz="1800" kern="1200">
+                <a:solidFill>
+                  <a:schemeClr val="tx1"/>
+                </a:solidFill>
+                <a:latin typeface="+mn-lt"/>
+                <a:ea typeface="+mn-ea"/>
+                <a:cs typeface="+mn-cs"/>
+              </a:defRPr>
+            </a:lvl5pPr>
+            <a:lvl6pPr marL="2286000" algn="l" defTabSz="914400" rtl="0" eaLnBrk="1" latinLnBrk="0" hangingPunct="1">
+              <a:defRPr sz="1800" kern="1200">
+                <a:solidFill>
+                  <a:schemeClr val="tx1"/>
+                </a:solidFill>
+                <a:latin typeface="+mn-lt"/>
+                <a:ea typeface="+mn-ea"/>
+                <a:cs typeface="+mn-cs"/>
+              </a:defRPr>
+            </a:lvl6pPr>
+            <a:lvl7pPr marL="2743200" algn="l" defTabSz="914400" rtl="0" eaLnBrk="1" latinLnBrk="0" hangingPunct="1">
+              <a:defRPr sz="1800" kern="1200">
+                <a:solidFill>
+                  <a:schemeClr val="tx1"/>
+                </a:solidFill>
+                <a:latin typeface="+mn-lt"/>
+                <a:ea typeface="+mn-ea"/>
+                <a:cs typeface="+mn-cs"/>
+              </a:defRPr>
+            </a:lvl7pPr>
+            <a:lvl8pPr marL="3200400" algn="l" defTabSz="914400" rtl="0" eaLnBrk="1" latinLnBrk="0" hangingPunct="1">
+              <a:defRPr sz="1800" kern="1200">
+                <a:solidFill>
+                  <a:schemeClr val="tx1"/>
+                </a:solidFill>
+                <a:latin typeface="+mn-lt"/>
+                <a:ea typeface="+mn-ea"/>
+                <a:cs typeface="+mn-cs"/>
+              </a:defRPr>
+            </a:lvl8pPr>
+            <a:lvl9pPr marL="3657600" algn="l" defTabSz="914400" rtl="0" eaLnBrk="1" latinLnBrk="0" hangingPunct="1">
+              <a:defRPr sz="1800" kern="1200">
+                <a:solidFill>
+                  <a:schemeClr val="tx1"/>
+                </a:solidFill>
+                <a:latin typeface="+mn-lt"/>
+                <a:ea typeface="+mn-ea"/>
+                <a:cs typeface="+mn-cs"/>
+              </a:defRPr>
+            </a:lvl9pPr>
+          </a:lstStyle>
+          <a:p>
+            <a:pPr algn="r"/>
+            <a:fld id="{B5CEABB6-07DC-46E8-9B57-56EC44A396E5}" type="slidenum">
+              <a:rPr lang="en-GB" sz="900" smtClean="0"/>
+              <a:pPr algn="r"/>
+              <a:t>11</a:t>
+            </a:fld>
+            <a:endParaRPr lang="en-GB" dirty="0"/>
+          </a:p>
+        </p:txBody>
+      </p:sp>
     </p:spTree>
     <p:extLst>
       <p:ext uri="{BB962C8B-B14F-4D97-AF65-F5344CB8AC3E}">
@@ -19074,6 +18398,137 @@
           </a:prstGeom>
         </p:spPr>
       </p:pic>
+      <p:sp>
+        <p:nvSpPr>
+          <p:cNvPr id="4" name="Slide Number Placeholder 5">
+            <a:extLst>
+              <a:ext uri="{FF2B5EF4-FFF2-40B4-BE49-F238E27FC236}">
+                <a16:creationId xmlns:a16="http://schemas.microsoft.com/office/drawing/2014/main" id="{9913E7A2-21EC-45F7-8688-7A2CC04C96FC}"/>
+              </a:ext>
+            </a:extLst>
+          </p:cNvPr>
+          <p:cNvSpPr txBox="1">
+            <a:spLocks/>
+          </p:cNvSpPr>
+          <p:nvPr/>
+        </p:nvSpPr>
+        <p:spPr>
+          <a:xfrm>
+            <a:off x="8610600" y="6356350"/>
+            <a:ext cx="2743200" cy="365125"/>
+          </a:xfrm>
+          <a:prstGeom prst="rect">
+            <a:avLst/>
+          </a:prstGeom>
+        </p:spPr>
+        <p:txBody>
+          <a:bodyPr rtlCol="0"/>
+          <a:lstStyle>
+            <a:defPPr rtl="0">
+              <a:defRPr lang="en-GB"/>
+            </a:defPPr>
+            <a:lvl1pPr marL="0" algn="l" defTabSz="914400" rtl="0" eaLnBrk="1" latinLnBrk="0" hangingPunct="1">
+              <a:defRPr sz="1800" kern="1200">
+                <a:solidFill>
+                  <a:schemeClr val="tx1"/>
+                </a:solidFill>
+                <a:latin typeface="+mn-lt"/>
+                <a:ea typeface="+mn-ea"/>
+                <a:cs typeface="+mn-cs"/>
+              </a:defRPr>
+            </a:lvl1pPr>
+            <a:lvl2pPr marL="457200" algn="l" defTabSz="914400" rtl="0" eaLnBrk="1" latinLnBrk="0" hangingPunct="1">
+              <a:defRPr sz="1800" kern="1200">
+                <a:solidFill>
+                  <a:schemeClr val="tx1"/>
+                </a:solidFill>
+                <a:latin typeface="+mn-lt"/>
+                <a:ea typeface="+mn-ea"/>
+                <a:cs typeface="+mn-cs"/>
+              </a:defRPr>
+            </a:lvl2pPr>
+            <a:lvl3pPr marL="914400" algn="l" defTabSz="914400" rtl="0" eaLnBrk="1" latinLnBrk="0" hangingPunct="1">
+              <a:defRPr sz="1800" kern="1200">
+                <a:solidFill>
+                  <a:schemeClr val="tx1"/>
+                </a:solidFill>
+                <a:latin typeface="+mn-lt"/>
+                <a:ea typeface="+mn-ea"/>
+                <a:cs typeface="+mn-cs"/>
+              </a:defRPr>
+            </a:lvl3pPr>
+            <a:lvl4pPr marL="1371600" algn="l" defTabSz="914400" rtl="0" eaLnBrk="1" latinLnBrk="0" hangingPunct="1">
+              <a:defRPr sz="1800" kern="1200">
+                <a:solidFill>
+                  <a:schemeClr val="tx1"/>
+                </a:solidFill>
+                <a:latin typeface="+mn-lt"/>
+                <a:ea typeface="+mn-ea"/>
+                <a:cs typeface="+mn-cs"/>
+              </a:defRPr>
+            </a:lvl4pPr>
+            <a:lvl5pPr marL="1828800" algn="l" defTabSz="914400" rtl="0" eaLnBrk="1" latinLnBrk="0" hangingPunct="1">
+              <a:defRPr sz="1800" kern="1200">
+                <a:solidFill>
+                  <a:schemeClr val="tx1"/>
+                </a:solidFill>
+                <a:latin typeface="+mn-lt"/>
+                <a:ea typeface="+mn-ea"/>
+                <a:cs typeface="+mn-cs"/>
+              </a:defRPr>
+            </a:lvl5pPr>
+            <a:lvl6pPr marL="2286000" algn="l" defTabSz="914400" rtl="0" eaLnBrk="1" latinLnBrk="0" hangingPunct="1">
+              <a:defRPr sz="1800" kern="1200">
+                <a:solidFill>
+                  <a:schemeClr val="tx1"/>
+                </a:solidFill>
+                <a:latin typeface="+mn-lt"/>
+                <a:ea typeface="+mn-ea"/>
+                <a:cs typeface="+mn-cs"/>
+              </a:defRPr>
+            </a:lvl6pPr>
+            <a:lvl7pPr marL="2743200" algn="l" defTabSz="914400" rtl="0" eaLnBrk="1" latinLnBrk="0" hangingPunct="1">
+              <a:defRPr sz="1800" kern="1200">
+                <a:solidFill>
+                  <a:schemeClr val="tx1"/>
+                </a:solidFill>
+                <a:latin typeface="+mn-lt"/>
+                <a:ea typeface="+mn-ea"/>
+                <a:cs typeface="+mn-cs"/>
+              </a:defRPr>
+            </a:lvl7pPr>
+            <a:lvl8pPr marL="3200400" algn="l" defTabSz="914400" rtl="0" eaLnBrk="1" latinLnBrk="0" hangingPunct="1">
+              <a:defRPr sz="1800" kern="1200">
+                <a:solidFill>
+                  <a:schemeClr val="tx1"/>
+                </a:solidFill>
+                <a:latin typeface="+mn-lt"/>
+                <a:ea typeface="+mn-ea"/>
+                <a:cs typeface="+mn-cs"/>
+              </a:defRPr>
+            </a:lvl8pPr>
+            <a:lvl9pPr marL="3657600" algn="l" defTabSz="914400" rtl="0" eaLnBrk="1" latinLnBrk="0" hangingPunct="1">
+              <a:defRPr sz="1800" kern="1200">
+                <a:solidFill>
+                  <a:schemeClr val="tx1"/>
+                </a:solidFill>
+                <a:latin typeface="+mn-lt"/>
+                <a:ea typeface="+mn-ea"/>
+                <a:cs typeface="+mn-cs"/>
+              </a:defRPr>
+            </a:lvl9pPr>
+          </a:lstStyle>
+          <a:p>
+            <a:pPr algn="r"/>
+            <a:fld id="{B5CEABB6-07DC-46E8-9B57-56EC44A396E5}" type="slidenum">
+              <a:rPr lang="en-GB" sz="900" smtClean="0"/>
+              <a:pPr algn="r"/>
+              <a:t>12</a:t>
+            </a:fld>
+            <a:endParaRPr lang="en-GB" dirty="0"/>
+          </a:p>
+        </p:txBody>
+      </p:sp>
     </p:spTree>
     <p:extLst>
       <p:ext uri="{BB962C8B-B14F-4D97-AF65-F5344CB8AC3E}">
@@ -19123,7 +18578,7 @@
         <p:spPr>
           <a:xfrm>
             <a:off x="5918057" y="461920"/>
-            <a:ext cx="5431971" cy="846301"/>
+            <a:ext cx="5037726" cy="846301"/>
           </a:xfrm>
         </p:spPr>
         <p:txBody>
@@ -19134,8 +18589,12 @@
           <a:p>
             <a:pPr rtl="0"/>
             <a:r>
+              <a:rPr lang="en-US" b="1" dirty="0"/>
+              <a:t>Comparison:</a:t>
+            </a:r>
+            <a:r>
               <a:rPr lang="en-US" dirty="0"/>
-              <a:t>Comparison Against Aims and Objectives</a:t>
+              <a:t> Aims and milestones</a:t>
             </a:r>
             <a:endParaRPr lang="en-GB" dirty="0"/>
           </a:p>
@@ -19159,7 +18618,7 @@
         </p:nvSpPr>
         <p:spPr>
           <a:xfrm>
-            <a:off x="5920169" y="2343705"/>
+            <a:off x="5918936" y="2077664"/>
             <a:ext cx="5433204" cy="365125"/>
           </a:xfrm>
         </p:spPr>
@@ -19243,11 +18702,19 @@
           <a:p>
             <a:pPr rtl="0"/>
             <a:fld id="{19B51A1E-902D-48AF-9020-955120F399B6}" type="slidenum">
-              <a:rPr lang="en-GB" smtClean="0"/>
+              <a:rPr lang="en-GB" smtClean="0">
+                <a:solidFill>
+                  <a:schemeClr val="tx1"/>
+                </a:solidFill>
+              </a:rPr>
               <a:pPr rtl="0"/>
               <a:t>13</a:t>
             </a:fld>
-            <a:endParaRPr lang="en-GB" dirty="0"/>
+            <a:endParaRPr lang="en-GB" dirty="0">
+              <a:solidFill>
+                <a:schemeClr val="tx1"/>
+              </a:solidFill>
+            </a:endParaRPr>
           </a:p>
         </p:txBody>
       </p:sp>
@@ -19269,8 +18736,8 @@
         </p:nvSpPr>
         <p:spPr bwMode="auto">
           <a:xfrm>
-            <a:off x="5921375" y="2708830"/>
-            <a:ext cx="5037726" cy="738664"/>
+            <a:off x="5921375" y="2601109"/>
+            <a:ext cx="5033750" cy="954107"/>
           </a:xfrm>
           <a:prstGeom prst="rect">
             <a:avLst/>
@@ -19380,77 +18847,9 @@
             </a:pPr>
             <a:r>
               <a:rPr lang="en-US" altLang="en-US" dirty="0"/>
-              <a:t> I</a:t>
-            </a:r>
-          </a:p>
-        </p:txBody>
-      </p:sp>
-      <p:sp>
-        <p:nvSpPr>
-          <p:cNvPr id="14" name="Rectangle 4">
-            <a:extLst>
-              <a:ext uri="{FF2B5EF4-FFF2-40B4-BE49-F238E27FC236}">
-                <a16:creationId xmlns:a16="http://schemas.microsoft.com/office/drawing/2014/main" id="{C4C25FFF-01A9-75AF-C09C-C09B33E1A65C}"/>
-              </a:ext>
-            </a:extLst>
-          </p:cNvPr>
-          <p:cNvSpPr>
-            <a:spLocks noGrp="1" noChangeArrowheads="1"/>
-          </p:cNvSpPr>
-          <p:nvPr>
-            <p:ph type="body" sz="quarter" idx="24"/>
-          </p:nvPr>
-        </p:nvSpPr>
-        <p:spPr bwMode="auto">
-          <a:xfrm>
-            <a:off x="5918057" y="4398106"/>
-            <a:ext cx="5275675" cy="584775"/>
-          </a:xfrm>
-          <a:prstGeom prst="rect">
-            <a:avLst/>
-          </a:prstGeom>
-          <a:noFill/>
-          <a:ln>
-            <a:noFill/>
-          </a:ln>
-          <a:effectLst/>
-          <a:extLst>
-            <a:ext uri="{909E8E84-426E-40DD-AFC4-6F175D3DCCD1}">
-              <a14:hiddenFill xmlns:a14="http://schemas.microsoft.com/office/drawing/2010/main">
-                <a:solidFill>
-                  <a:schemeClr val="accent1"/>
-                </a:solidFill>
-              </a14:hiddenFill>
-            </a:ext>
-            <a:ext uri="{91240B29-F687-4F45-9708-019B960494DF}">
-              <a14:hiddenLine xmlns:a14="http://schemas.microsoft.com/office/drawing/2010/main" w="9525">
-                <a:solidFill>
-                  <a:schemeClr val="tx1"/>
-                </a:solidFill>
-                <a:miter lim="800000"/>
-                <a:headEnd/>
-                <a:tailEnd/>
-              </a14:hiddenLine>
-            </a:ext>
-            <a:ext uri="{AF507438-7753-43E0-B8FC-AC1667EBCBE1}">
-              <a14:hiddenEffects xmlns:a14="http://schemas.microsoft.com/office/drawing/2010/main">
-                <a:effectLst>
-                  <a:outerShdw dist="35921" dir="2700000" algn="ctr" rotWithShape="0">
-                    <a:schemeClr val="bg2"/>
-                  </a:outerShdw>
-                </a:effectLst>
-              </a14:hiddenEffects>
-            </a:ext>
-          </a:extLst>
-        </p:spPr>
-        <p:txBody>
-          <a:bodyPr vert="horz" wrap="none" lIns="91440" tIns="45720" rIns="91440" bIns="45720" numCol="1" anchor="ctr" anchorCtr="0" compatLnSpc="1">
-            <a:prstTxWarp prst="textNoShape">
-              <a:avLst/>
-            </a:prstTxWarp>
-            <a:spAutoFit/>
-          </a:bodyPr>
-          <a:lstStyle/>
+              <a:t> Implemented Approximate Adder and Approximate Multiplier</a:t>
+            </a:r>
+          </a:p>
           <a:p>
             <a:pPr marL="0" marR="0" lvl="0" indent="0" algn="l" defTabSz="914400" rtl="0" eaLnBrk="0" fontAlgn="base" latinLnBrk="0" hangingPunct="0">
               <a:lnSpc>
@@ -19470,9 +18869,77 @@
             </a:pPr>
             <a:r>
               <a:rPr lang="en-US" altLang="en-US" dirty="0"/>
-              <a:t>Complete integration of approximate multipliers and adders.</a:t>
-            </a:r>
-          </a:p>
+              <a:t> Unit testing completed and modules validated</a:t>
+            </a:r>
+          </a:p>
+        </p:txBody>
+      </p:sp>
+      <p:sp>
+        <p:nvSpPr>
+          <p:cNvPr id="14" name="Rectangle 4">
+            <a:extLst>
+              <a:ext uri="{FF2B5EF4-FFF2-40B4-BE49-F238E27FC236}">
+                <a16:creationId xmlns:a16="http://schemas.microsoft.com/office/drawing/2014/main" id="{C4C25FFF-01A9-75AF-C09C-C09B33E1A65C}"/>
+              </a:ext>
+            </a:extLst>
+          </p:cNvPr>
+          <p:cNvSpPr>
+            <a:spLocks noGrp="1" noChangeArrowheads="1"/>
+          </p:cNvSpPr>
+          <p:nvPr>
+            <p:ph type="body" sz="quarter" idx="24"/>
+          </p:nvPr>
+        </p:nvSpPr>
+        <p:spPr bwMode="auto">
+          <a:xfrm>
+            <a:off x="5918057" y="4498022"/>
+            <a:ext cx="5987072" cy="954107"/>
+          </a:xfrm>
+          <a:prstGeom prst="rect">
+            <a:avLst/>
+          </a:prstGeom>
+          <a:noFill/>
+          <a:ln>
+            <a:noFill/>
+          </a:ln>
+          <a:effectLst/>
+          <a:extLst>
+            <a:ext uri="{909E8E84-426E-40DD-AFC4-6F175D3DCCD1}">
+              <a14:hiddenFill xmlns:a14="http://schemas.microsoft.com/office/drawing/2010/main">
+                <a:solidFill>
+                  <a:schemeClr val="accent1"/>
+                </a:solidFill>
+              </a14:hiddenFill>
+            </a:ext>
+            <a:ext uri="{91240B29-F687-4F45-9708-019B960494DF}">
+              <a14:hiddenLine xmlns:a14="http://schemas.microsoft.com/office/drawing/2010/main" w="9525">
+                <a:solidFill>
+                  <a:schemeClr val="tx1"/>
+                </a:solidFill>
+                <a:miter lim="800000"/>
+                <a:headEnd/>
+                <a:tailEnd/>
+              </a14:hiddenLine>
+            </a:ext>
+            <a:ext uri="{AF507438-7753-43E0-B8FC-AC1667EBCBE1}">
+              <a14:hiddenEffects xmlns:a14="http://schemas.microsoft.com/office/drawing/2010/main">
+                <a:effectLst>
+                  <a:outerShdw dist="35921" dir="2700000" algn="ctr" rotWithShape="0">
+                    <a:schemeClr val="bg2"/>
+                  </a:outerShdw>
+                </a:effectLst>
+              </a14:hiddenEffects>
+            </a:ext>
+          </a:extLst>
+        </p:spPr>
+        <p:txBody>
+          <a:bodyPr vert="horz" wrap="square" lIns="91440" tIns="45720" rIns="91440" bIns="45720" numCol="1" anchor="ctr" anchorCtr="0" compatLnSpc="1">
+            <a:prstTxWarp prst="textNoShape">
+              <a:avLst/>
+            </a:prstTxWarp>
+            <a:spAutoFit/>
+          </a:bodyPr>
+          <a:lstStyle/>
           <a:p>
             <a:pPr marL="0" marR="0" lvl="0" indent="0" algn="l" defTabSz="914400" rtl="0" eaLnBrk="0" fontAlgn="base" latinLnBrk="0" hangingPunct="0">
               <a:lnSpc>
@@ -19492,20 +18959,69 @@
             </a:pPr>
             <a:r>
               <a:rPr lang="en-US" altLang="en-US" dirty="0"/>
-              <a:t>Conduct comprehensive testing for power, speed, and accuracy</a:t>
-            </a:r>
-            <a:r>
-              <a:rPr kumimoji="0" lang="en-US" altLang="en-US" sz="1800" b="0" i="0" u="none" strike="noStrike" cap="none" normalizeH="0" baseline="0" dirty="0">
-                <a:ln>
-                  <a:noFill/>
-                </a:ln>
-                <a:solidFill>
-                  <a:schemeClr val="tx1"/>
-                </a:solidFill>
-                <a:effectLst/>
-                <a:latin typeface="Arial" panose="020B0604020202020204" pitchFamily="34" charset="0"/>
+              <a:t> Complete integration of approximate multipliers and adders</a:t>
+            </a:r>
+          </a:p>
+          <a:p>
+            <a:pPr marL="0" marR="0" lvl="0" indent="0" algn="l" defTabSz="914400" rtl="0" eaLnBrk="0" fontAlgn="base" latinLnBrk="0" hangingPunct="0">
+              <a:lnSpc>
+                <a:spcPct val="100000"/>
+              </a:lnSpc>
+              <a:spcBef>
+                <a:spcPct val="0"/>
+              </a:spcBef>
+              <a:spcAft>
+                <a:spcPct val="0"/>
+              </a:spcAft>
+              <a:buClrTx/>
+              <a:buSzTx/>
+              <a:buFontTx/>
+              <a:buChar char="•"/>
+              <a:tabLst/>
+            </a:pPr>
+            <a:r>
+              <a:rPr lang="en-US" altLang="en-US" dirty="0"/>
+              <a:t> Explore Fuzzy memoization implementation</a:t>
+            </a:r>
+          </a:p>
+          <a:p>
+            <a:pPr marL="0" marR="0" lvl="0" indent="0" algn="l" defTabSz="914400" rtl="0" eaLnBrk="0" fontAlgn="base" latinLnBrk="0" hangingPunct="0">
+              <a:lnSpc>
+                <a:spcPct val="100000"/>
+              </a:lnSpc>
+              <a:spcBef>
+                <a:spcPct val="0"/>
+              </a:spcBef>
+              <a:spcAft>
+                <a:spcPct val="0"/>
+              </a:spcAft>
+              <a:buClrTx/>
+              <a:buSzTx/>
+              <a:buFontTx/>
+              <a:buChar char="•"/>
+              <a:tabLst/>
+            </a:pPr>
+            <a:r>
+              <a:rPr lang="en-US" altLang="en-US" dirty="0"/>
+              <a:t> Conduct comprehensive testing for power, speed, and accuracy</a:t>
+            </a:r>
+          </a:p>
+          <a:p>
+            <a:pPr eaLnBrk="0" fontAlgn="base" hangingPunct="0">
+              <a:spcBef>
+                <a:spcPct val="0"/>
+              </a:spcBef>
+              <a:spcAft>
+                <a:spcPct val="0"/>
+              </a:spcAft>
+              <a:buFontTx/>
+              <a:buChar char="•"/>
+            </a:pPr>
+            <a:r>
+              <a:rPr lang="en-US" altLang="en-US" dirty="0">
+                <a:latin typeface="Tenorite (Body)"/>
               </a:rPr>
-              <a:t>. </a:t>
+              <a:t> Compare against other approximation units to evaluate performance</a:t>
             </a:r>
           </a:p>
         </p:txBody>
@@ -19776,11 +19292,19 @@
           <a:p>
             <a:pPr rtl="0"/>
             <a:fld id="{B5CEABB6-07DC-46E8-9B57-56EC44A396E5}" type="slidenum">
-              <a:rPr lang="en-GB" smtClean="0"/>
+              <a:rPr lang="en-GB" smtClean="0">
+                <a:solidFill>
+                  <a:schemeClr val="tx1"/>
+                </a:solidFill>
+              </a:rPr>
               <a:pPr rtl="0"/>
               <a:t>14</a:t>
             </a:fld>
-            <a:endParaRPr lang="en-GB" dirty="0"/>
+            <a:endParaRPr lang="en-GB" dirty="0">
+              <a:solidFill>
+                <a:schemeClr val="tx1"/>
+              </a:solidFill>
+            </a:endParaRPr>
           </a:p>
         </p:txBody>
       </p:sp>
@@ -20561,136 +20085,6 @@
 <file path=ppt/slides/slide16.xml><?xml version="1.0" encoding="utf-8"?>
 <p:sld xmlns:a="http://schemas.openxmlformats.org/drawingml/2006/main" xmlns:r="http://schemas.openxmlformats.org/officeDocument/2006/relationships" xmlns:p="http://schemas.openxmlformats.org/presentationml/2006/main">
   <p:cSld>
-    <p:spTree>
-      <p:nvGrpSpPr>
-        <p:cNvPr id="1" name=""/>
-        <p:cNvGrpSpPr/>
-        <p:nvPr/>
-      </p:nvGrpSpPr>
-      <p:grpSpPr>
-        <a:xfrm>
-          <a:off x="0" y="0"/>
-          <a:ext cx="0" cy="0"/>
-          <a:chOff x="0" y="0"/>
-          <a:chExt cx="0" cy="0"/>
-        </a:xfrm>
-      </p:grpSpPr>
-      <p:sp>
-        <p:nvSpPr>
-          <p:cNvPr id="2" name="Title 1">
-            <a:extLst>
-              <a:ext uri="{FF2B5EF4-FFF2-40B4-BE49-F238E27FC236}">
-                <a16:creationId xmlns:a16="http://schemas.microsoft.com/office/drawing/2014/main" id="{38FFA191-5CCC-43CB-BD83-4F80ED362608}"/>
-              </a:ext>
-            </a:extLst>
-          </p:cNvPr>
-          <p:cNvSpPr>
-            <a:spLocks noGrp="1"/>
-          </p:cNvSpPr>
-          <p:nvPr>
-            <p:ph type="title"/>
-          </p:nvPr>
-        </p:nvSpPr>
-        <p:spPr>
-          <a:xfrm>
-            <a:off x="5476875" y="1671639"/>
-            <a:ext cx="5111750" cy="1204912"/>
-          </a:xfrm>
-        </p:spPr>
-        <p:txBody>
-          <a:bodyPr rtlCol="0"/>
-          <a:lstStyle/>
-          <a:p>
-            <a:pPr rtl="0"/>
-            <a:r>
-              <a:rPr lang="en-GB" dirty="0"/>
-              <a:t>Conclusion</a:t>
-            </a:r>
-          </a:p>
-        </p:txBody>
-      </p:sp>
-      <p:sp>
-        <p:nvSpPr>
-          <p:cNvPr id="6" name="Slide Number Placeholder 5">
-            <a:extLst>
-              <a:ext uri="{FF2B5EF4-FFF2-40B4-BE49-F238E27FC236}">
-                <a16:creationId xmlns:a16="http://schemas.microsoft.com/office/drawing/2014/main" id="{BAEFF51B-0E28-4171-AE7C-A31AAB42BC73}"/>
-              </a:ext>
-            </a:extLst>
-          </p:cNvPr>
-          <p:cNvSpPr>
-            <a:spLocks noGrp="1"/>
-          </p:cNvSpPr>
-          <p:nvPr>
-            <p:ph type="sldNum" sz="quarter" idx="12"/>
-          </p:nvPr>
-        </p:nvSpPr>
-        <p:spPr>
-          <a:xfrm>
-            <a:off x="8610600" y="6356350"/>
-            <a:ext cx="2743200" cy="365125"/>
-          </a:xfrm>
-        </p:spPr>
-        <p:txBody>
-          <a:bodyPr rtlCol="0"/>
-          <a:lstStyle/>
-          <a:p>
-            <a:pPr rtl="0"/>
-            <a:fld id="{B5CEABB6-07DC-46E8-9B57-56EC44A396E5}" type="slidenum">
-              <a:rPr lang="en-GB" smtClean="0"/>
-              <a:pPr rtl="0"/>
-              <a:t>16</a:t>
-            </a:fld>
-            <a:endParaRPr lang="en-GB"/>
-          </a:p>
-        </p:txBody>
-      </p:sp>
-      <p:pic>
-        <p:nvPicPr>
-          <p:cNvPr id="11" name="Picture 10" descr="A purple text on a black background&#10;&#10;AI-generated content may be incorrect.">
-            <a:extLst>
-              <a:ext uri="{FF2B5EF4-FFF2-40B4-BE49-F238E27FC236}">
-                <a16:creationId xmlns:a16="http://schemas.microsoft.com/office/drawing/2014/main" id="{6B90DE6C-5CE3-1860-5CB3-41C78633DAC3}"/>
-              </a:ext>
-            </a:extLst>
-          </p:cNvPr>
-          <p:cNvPicPr>
-            <a:picLocks noChangeAspect="1"/>
-          </p:cNvPicPr>
-          <p:nvPr/>
-        </p:nvPicPr>
-        <p:blipFill>
-          <a:blip r:embed="rId3"/>
-          <a:stretch>
-            <a:fillRect/>
-          </a:stretch>
-        </p:blipFill>
-        <p:spPr>
-          <a:xfrm>
-            <a:off x="65368" y="6089513"/>
-            <a:ext cx="2536261" cy="768487"/>
-          </a:xfrm>
-          <a:prstGeom prst="rect">
-            <a:avLst/>
-          </a:prstGeom>
-        </p:spPr>
-      </p:pic>
-    </p:spTree>
-    <p:extLst>
-      <p:ext uri="{BB962C8B-B14F-4D97-AF65-F5344CB8AC3E}">
-        <p14:creationId xmlns:p14="http://schemas.microsoft.com/office/powerpoint/2010/main" val="920173932"/>
-      </p:ext>
-    </p:extLst>
-  </p:cSld>
-  <p:clrMapOvr>
-    <a:masterClrMapping/>
-  </p:clrMapOvr>
-</p:sld>
-</file>
-
-<file path=ppt/slides/slide17.xml><?xml version="1.0" encoding="utf-8"?>
-<p:sld xmlns:a="http://schemas.openxmlformats.org/drawingml/2006/main" xmlns:r="http://schemas.openxmlformats.org/officeDocument/2006/relationships" xmlns:p="http://schemas.openxmlformats.org/presentationml/2006/main">
-  <p:cSld>
     <p:bg>
       <p:bgPr>
         <a:solidFill>
@@ -20847,9 +20241,9 @@
                 </a:solidFill>
               </a:rPr>
               <a:pPr rtl="0"/>
-              <a:t>17</a:t>
+              <a:t>16</a:t>
             </a:fld>
-            <a:endParaRPr lang="en-GB">
+            <a:endParaRPr lang="en-GB" dirty="0">
               <a:solidFill>
                 <a:schemeClr val="tx1"/>
               </a:solidFill>
@@ -21026,50 +20420,6 @@
           </a:p>
         </p:txBody>
       </p:sp>
-      <p:sp>
-        <p:nvSpPr>
-          <p:cNvPr id="4" name="Slide Number Placeholder 3">
-            <a:extLst>
-              <a:ext uri="{FF2B5EF4-FFF2-40B4-BE49-F238E27FC236}">
-                <a16:creationId xmlns:a16="http://schemas.microsoft.com/office/drawing/2014/main" id="{328F602C-7F98-4C02-99D4-ED65E00D66A4}"/>
-              </a:ext>
-            </a:extLst>
-          </p:cNvPr>
-          <p:cNvSpPr>
-            <a:spLocks noGrp="1"/>
-          </p:cNvSpPr>
-          <p:nvPr>
-            <p:ph type="sldNum" sz="quarter" idx="12"/>
-          </p:nvPr>
-        </p:nvSpPr>
-        <p:spPr>
-          <a:xfrm>
-            <a:off x="5536305" y="6356350"/>
-            <a:ext cx="987552" cy="365125"/>
-          </a:xfrm>
-        </p:spPr>
-        <p:txBody>
-          <a:bodyPr rtlCol="0"/>
-          <a:lstStyle/>
-          <a:p>
-            <a:pPr rtl="0"/>
-            <a:fld id="{19B51A1E-902D-48AF-9020-955120F399B6}" type="slidenum">
-              <a:rPr lang="en-GB" smtClean="0">
-                <a:solidFill>
-                  <a:schemeClr val="tx1"/>
-                </a:solidFill>
-              </a:rPr>
-              <a:pPr/>
-              <a:t>2</a:t>
-            </a:fld>
-            <a:endParaRPr lang="en-GB">
-              <a:solidFill>
-                <a:schemeClr val="tx1"/>
-              </a:solidFill>
-            </a:endParaRPr>
-          </a:p>
-        </p:txBody>
-      </p:sp>
       <p:pic>
         <p:nvPicPr>
           <p:cNvPr id="8" name="Picture 7" descr="A purple text on a black background&#10;&#10;AI-generated content may be incorrect.">
@@ -21190,6 +20540,146 @@
           </a:prstGeom>
         </p:spPr>
       </p:pic>
+      <p:sp>
+        <p:nvSpPr>
+          <p:cNvPr id="5" name="Slide Number Placeholder 12">
+            <a:extLst>
+              <a:ext uri="{FF2B5EF4-FFF2-40B4-BE49-F238E27FC236}">
+                <a16:creationId xmlns:a16="http://schemas.microsoft.com/office/drawing/2014/main" id="{06459749-27A4-9E8A-3D47-2E6BE8DC3A02}"/>
+              </a:ext>
+            </a:extLst>
+          </p:cNvPr>
+          <p:cNvSpPr txBox="1">
+            <a:spLocks/>
+          </p:cNvSpPr>
+          <p:nvPr/>
+        </p:nvSpPr>
+        <p:spPr>
+          <a:xfrm>
+            <a:off x="10810874" y="6356350"/>
+            <a:ext cx="542925" cy="365125"/>
+          </a:xfrm>
+          <a:prstGeom prst="rect">
+            <a:avLst/>
+          </a:prstGeom>
+        </p:spPr>
+        <p:txBody>
+          <a:bodyPr vert="horz" lIns="91440" tIns="45720" rIns="91440" bIns="45720" rtlCol="0" anchor="ctr"/>
+          <a:lstStyle>
+            <a:defPPr rtl="0">
+              <a:defRPr lang="en-GB"/>
+            </a:defPPr>
+            <a:lvl1pPr marL="0" algn="r" defTabSz="914400" rtl="0" eaLnBrk="1" latinLnBrk="0" hangingPunct="1">
+              <a:defRPr sz="900" kern="1200">
+                <a:solidFill>
+                  <a:schemeClr val="tx1">
+                    <a:tint val="75000"/>
+                  </a:schemeClr>
+                </a:solidFill>
+                <a:latin typeface="+mn-lt"/>
+                <a:ea typeface="+mn-ea"/>
+                <a:cs typeface="+mn-cs"/>
+              </a:defRPr>
+            </a:lvl1pPr>
+            <a:lvl2pPr marL="457200" algn="l" defTabSz="914400" rtl="0" eaLnBrk="1" latinLnBrk="0" hangingPunct="1">
+              <a:defRPr sz="1800" kern="1200">
+                <a:solidFill>
+                  <a:schemeClr val="tx1"/>
+                </a:solidFill>
+                <a:latin typeface="+mn-lt"/>
+                <a:ea typeface="+mn-ea"/>
+                <a:cs typeface="+mn-cs"/>
+              </a:defRPr>
+            </a:lvl2pPr>
+            <a:lvl3pPr marL="914400" algn="l" defTabSz="914400" rtl="0" eaLnBrk="1" latinLnBrk="0" hangingPunct="1">
+              <a:defRPr sz="1800" kern="1200">
+                <a:solidFill>
+                  <a:schemeClr val="tx1"/>
+                </a:solidFill>
+                <a:latin typeface="+mn-lt"/>
+                <a:ea typeface="+mn-ea"/>
+                <a:cs typeface="+mn-cs"/>
+              </a:defRPr>
+            </a:lvl3pPr>
+            <a:lvl4pPr marL="1371600" algn="l" defTabSz="914400" rtl="0" eaLnBrk="1" latinLnBrk="0" hangingPunct="1">
+              <a:defRPr sz="1800" kern="1200">
+                <a:solidFill>
+                  <a:schemeClr val="tx1"/>
+                </a:solidFill>
+                <a:latin typeface="+mn-lt"/>
+                <a:ea typeface="+mn-ea"/>
+                <a:cs typeface="+mn-cs"/>
+              </a:defRPr>
+            </a:lvl4pPr>
+            <a:lvl5pPr marL="1828800" algn="l" defTabSz="914400" rtl="0" eaLnBrk="1" latinLnBrk="0" hangingPunct="1">
+              <a:defRPr sz="1800" kern="1200">
+                <a:solidFill>
+                  <a:schemeClr val="tx1"/>
+                </a:solidFill>
+                <a:latin typeface="+mn-lt"/>
+                <a:ea typeface="+mn-ea"/>
+                <a:cs typeface="+mn-cs"/>
+              </a:defRPr>
+            </a:lvl5pPr>
+            <a:lvl6pPr marL="2286000" algn="l" defTabSz="914400" rtl="0" eaLnBrk="1" latinLnBrk="0" hangingPunct="1">
+              <a:defRPr sz="1800" kern="1200">
+                <a:solidFill>
+                  <a:schemeClr val="tx1"/>
+                </a:solidFill>
+                <a:latin typeface="+mn-lt"/>
+                <a:ea typeface="+mn-ea"/>
+                <a:cs typeface="+mn-cs"/>
+              </a:defRPr>
+            </a:lvl6pPr>
+            <a:lvl7pPr marL="2743200" algn="l" defTabSz="914400" rtl="0" eaLnBrk="1" latinLnBrk="0" hangingPunct="1">
+              <a:defRPr sz="1800" kern="1200">
+                <a:solidFill>
+                  <a:schemeClr val="tx1"/>
+                </a:solidFill>
+                <a:latin typeface="+mn-lt"/>
+                <a:ea typeface="+mn-ea"/>
+                <a:cs typeface="+mn-cs"/>
+              </a:defRPr>
+            </a:lvl7pPr>
+            <a:lvl8pPr marL="3200400" algn="l" defTabSz="914400" rtl="0" eaLnBrk="1" latinLnBrk="0" hangingPunct="1">
+              <a:defRPr sz="1800" kern="1200">
+                <a:solidFill>
+                  <a:schemeClr val="tx1"/>
+                </a:solidFill>
+                <a:latin typeface="+mn-lt"/>
+                <a:ea typeface="+mn-ea"/>
+                <a:cs typeface="+mn-cs"/>
+              </a:defRPr>
+            </a:lvl8pPr>
+            <a:lvl9pPr marL="3657600" algn="l" defTabSz="914400" rtl="0" eaLnBrk="1" latinLnBrk="0" hangingPunct="1">
+              <a:defRPr sz="1800" kern="1200">
+                <a:solidFill>
+                  <a:schemeClr val="tx1"/>
+                </a:solidFill>
+                <a:latin typeface="+mn-lt"/>
+                <a:ea typeface="+mn-ea"/>
+                <a:cs typeface="+mn-cs"/>
+              </a:defRPr>
+            </a:lvl9pPr>
+          </a:lstStyle>
+          <a:p>
+            <a:fld id="{B5CEABB6-07DC-46E8-9B57-56EC44A396E5}" type="slidenum">
+              <a:rPr lang="en-GB" smtClean="0">
+                <a:solidFill>
+                  <a:schemeClr val="tx1"/>
+                </a:solidFill>
+              </a:rPr>
+              <a:pPr/>
+              <a:t>2</a:t>
+            </a:fld>
+            <a:endParaRPr lang="en-GB">
+              <a:solidFill>
+                <a:schemeClr val="tx1"/>
+              </a:solidFill>
+            </a:endParaRPr>
+          </a:p>
+        </p:txBody>
+      </p:sp>
     </p:spTree>
     <p:extLst>
       <p:ext uri="{BB962C8B-B14F-4D97-AF65-F5344CB8AC3E}">
@@ -21596,11 +21086,19 @@
           <a:p>
             <a:pPr rtl="0"/>
             <a:fld id="{B5CEABB6-07DC-46E8-9B57-56EC44A396E5}" type="slidenum">
-              <a:rPr lang="en-GB" smtClean="0"/>
+              <a:rPr lang="en-GB" smtClean="0">
+                <a:solidFill>
+                  <a:schemeClr val="tx1"/>
+                </a:solidFill>
+              </a:rPr>
               <a:pPr/>
               <a:t>3</a:t>
             </a:fld>
-            <a:endParaRPr lang="en-GB"/>
+            <a:endParaRPr lang="en-GB">
+              <a:solidFill>
+                <a:schemeClr val="tx1"/>
+              </a:solidFill>
+            </a:endParaRPr>
           </a:p>
         </p:txBody>
       </p:sp>
@@ -21718,8 +21216,44 @@
         </p:nvSpPr>
         <p:spPr>
           <a:xfrm>
-            <a:off x="1333498" y="517476"/>
-            <a:ext cx="5111750" cy="1204912"/>
+            <a:off x="931768" y="396601"/>
+            <a:ext cx="5111750" cy="446735"/>
+          </a:xfrm>
+        </p:spPr>
+        <p:txBody>
+          <a:bodyPr rtlCol="0">
+            <a:normAutofit fontScale="90000"/>
+          </a:bodyPr>
+          <a:lstStyle/>
+          <a:p>
+            <a:pPr rtl="0"/>
+            <a:r>
+              <a:rPr lang="en-GB" dirty="0"/>
+              <a:t>ARCHITECTURE</a:t>
+            </a:r>
+          </a:p>
+        </p:txBody>
+      </p:sp>
+      <p:sp>
+        <p:nvSpPr>
+          <p:cNvPr id="6" name="Slide Number Placeholder 5">
+            <a:extLst>
+              <a:ext uri="{FF2B5EF4-FFF2-40B4-BE49-F238E27FC236}">
+                <a16:creationId xmlns:a16="http://schemas.microsoft.com/office/drawing/2014/main" id="{A58C48BD-E2AF-73B9-B6F6-0CFA3F7EFE0D}"/>
+              </a:ext>
+            </a:extLst>
+          </p:cNvPr>
+          <p:cNvSpPr>
+            <a:spLocks noGrp="1"/>
+          </p:cNvSpPr>
+          <p:nvPr>
+            <p:ph type="sldNum" sz="quarter" idx="12"/>
+          </p:nvPr>
+        </p:nvSpPr>
+        <p:spPr>
+          <a:xfrm>
+            <a:off x="8610600" y="6356350"/>
+            <a:ext cx="2743200" cy="365125"/>
           </a:xfrm>
         </p:spPr>
         <p:txBody>
@@ -21727,46 +21261,20 @@
           <a:lstStyle/>
           <a:p>
             <a:pPr rtl="0"/>
-            <a:r>
-              <a:rPr lang="en-GB" dirty="0"/>
-              <a:t>ARCHITECTURE</a:t>
-            </a:r>
-          </a:p>
-        </p:txBody>
-      </p:sp>
-      <p:sp>
-        <p:nvSpPr>
-          <p:cNvPr id="6" name="Slide Number Placeholder 5">
-            <a:extLst>
-              <a:ext uri="{FF2B5EF4-FFF2-40B4-BE49-F238E27FC236}">
-                <a16:creationId xmlns:a16="http://schemas.microsoft.com/office/drawing/2014/main" id="{A58C48BD-E2AF-73B9-B6F6-0CFA3F7EFE0D}"/>
-              </a:ext>
-            </a:extLst>
-          </p:cNvPr>
-          <p:cNvSpPr>
-            <a:spLocks noGrp="1"/>
-          </p:cNvSpPr>
-          <p:nvPr>
-            <p:ph type="sldNum" sz="quarter" idx="12"/>
-          </p:nvPr>
-        </p:nvSpPr>
-        <p:spPr>
-          <a:xfrm>
-            <a:off x="8610600" y="6356350"/>
-            <a:ext cx="2743200" cy="365125"/>
-          </a:xfrm>
-        </p:spPr>
-        <p:txBody>
-          <a:bodyPr rtlCol="0"/>
-          <a:lstStyle/>
-          <a:p>
-            <a:pPr rtl="0"/>
             <a:fld id="{B5CEABB6-07DC-46E8-9B57-56EC44A396E5}" type="slidenum">
-              <a:rPr lang="en-GB" smtClean="0"/>
+              <a:rPr lang="en-GB" smtClean="0">
+                <a:solidFill>
+                  <a:schemeClr val="tx1"/>
+                </a:solidFill>
+              </a:rPr>
               <a:pPr rtl="0"/>
               <a:t>4</a:t>
             </a:fld>
-            <a:endParaRPr lang="en-GB" dirty="0"/>
+            <a:endParaRPr lang="en-GB" dirty="0">
+              <a:solidFill>
+                <a:schemeClr val="tx1"/>
+              </a:solidFill>
+            </a:endParaRPr>
           </a:p>
         </p:txBody>
       </p:sp>
@@ -21818,8 +21326,8 @@
         </p:nvSpPr>
         <p:spPr bwMode="auto">
           <a:xfrm>
-            <a:off x="1333501" y="1973400"/>
-            <a:ext cx="6788524" cy="1918079"/>
+            <a:off x="931768" y="1165088"/>
+            <a:ext cx="6788524" cy="4924425"/>
           </a:xfrm>
           <a:prstGeom prst="rect">
             <a:avLst/>
@@ -21883,19 +21391,481 @@
               <a:buNone/>
               <a:tabLst/>
             </a:pPr>
-            <a:endParaRPr kumimoji="0" lang="en-US" altLang="en-US" sz="1800" b="0" i="0" u="none" strike="noStrike" cap="none" normalizeH="0" baseline="0" dirty="0">
-              <a:ln>
-                <a:noFill/>
-              </a:ln>
-              <a:solidFill>
-                <a:schemeClr val="tx1"/>
-              </a:solidFill>
-              <a:effectLst/>
+            <a:r>
+              <a:rPr lang="en-US" sz="2000" b="1" dirty="0"/>
+              <a:t>8-bit Approximate MAC Unit</a:t>
+            </a:r>
+          </a:p>
+          <a:p>
+            <a:pPr marL="0" marR="0" lvl="0" indent="0" algn="l" defTabSz="914400" rtl="0" eaLnBrk="0" fontAlgn="base" latinLnBrk="0" hangingPunct="0">
+              <a:lnSpc>
+                <a:spcPct val="100000"/>
+              </a:lnSpc>
+              <a:spcBef>
+                <a:spcPct val="0"/>
+              </a:spcBef>
+              <a:spcAft>
+                <a:spcPct val="0"/>
+              </a:spcAft>
+              <a:buClrTx/>
+              <a:buSzTx/>
+              <a:buFontTx/>
+              <a:buNone/>
+              <a:tabLst/>
+            </a:pPr>
+            <a:endParaRPr lang="en-US" sz="2000" b="1" dirty="0"/>
+          </a:p>
+          <a:p>
+            <a:pPr marL="0" marR="0" lvl="0" indent="0" algn="l" defTabSz="914400" rtl="0" eaLnBrk="0" fontAlgn="base" latinLnBrk="0" hangingPunct="0">
+              <a:lnSpc>
+                <a:spcPct val="100000"/>
+              </a:lnSpc>
+              <a:spcBef>
+                <a:spcPct val="0"/>
+              </a:spcBef>
+              <a:spcAft>
+                <a:spcPct val="0"/>
+              </a:spcAft>
+              <a:buClrTx/>
+              <a:buSzTx/>
+              <a:buFontTx/>
+              <a:buNone/>
+              <a:tabLst/>
+            </a:pPr>
+            <a:r>
+              <a:rPr lang="en-US" sz="1600" b="1" dirty="0"/>
+              <a:t>Input Fetch Stage</a:t>
+            </a:r>
+          </a:p>
+          <a:p>
+            <a:pPr marL="285750" marR="0" lvl="0" indent="-285750" algn="l" defTabSz="914400" rtl="0" eaLnBrk="0" fontAlgn="base" latinLnBrk="0" hangingPunct="0">
+              <a:lnSpc>
+                <a:spcPct val="100000"/>
+              </a:lnSpc>
+              <a:spcBef>
+                <a:spcPct val="0"/>
+              </a:spcBef>
+              <a:spcAft>
+                <a:spcPct val="0"/>
+              </a:spcAft>
+              <a:buClrTx/>
+              <a:buSzTx/>
+              <a:buFont typeface="Arial" panose="020B0604020202020204" pitchFamily="34" charset="0"/>
+              <a:buChar char="•"/>
+              <a:tabLst/>
+            </a:pPr>
+            <a:r>
+              <a:rPr lang="en-GB" b="1" dirty="0"/>
+              <a:t>8-bit operands (A and B)</a:t>
+            </a:r>
+            <a:r>
+              <a:rPr lang="en-GB" dirty="0"/>
+              <a:t> for multiplication</a:t>
+            </a:r>
+          </a:p>
+          <a:p>
+            <a:pPr marL="285750" marR="0" lvl="0" indent="-285750" algn="l" defTabSz="914400" rtl="0" eaLnBrk="0" fontAlgn="base" latinLnBrk="0" hangingPunct="0">
+              <a:lnSpc>
+                <a:spcPct val="100000"/>
+              </a:lnSpc>
+              <a:spcBef>
+                <a:spcPct val="0"/>
+              </a:spcBef>
+              <a:spcAft>
+                <a:spcPct val="0"/>
+              </a:spcAft>
+              <a:buClrTx/>
+              <a:buSzTx/>
+              <a:buFont typeface="Arial" panose="020B0604020202020204" pitchFamily="34" charset="0"/>
+              <a:buChar char="•"/>
+              <a:tabLst/>
+            </a:pPr>
+            <a:r>
+              <a:rPr lang="en-GB" dirty="0"/>
+              <a:t>Inputs are passed into the </a:t>
+            </a:r>
+            <a:r>
+              <a:rPr lang="en-GB" b="1" dirty="0"/>
+              <a:t>fuzzy memoization block</a:t>
+            </a:r>
+            <a:r>
+              <a:rPr lang="en-GB" dirty="0"/>
+              <a:t> to check for stored approximate results</a:t>
+            </a:r>
+          </a:p>
+          <a:p>
+            <a:pPr marR="0" lvl="0" algn="l" defTabSz="914400" rtl="0" eaLnBrk="0" fontAlgn="base" latinLnBrk="0" hangingPunct="0">
+              <a:lnSpc>
+                <a:spcPct val="100000"/>
+              </a:lnSpc>
+              <a:spcBef>
+                <a:spcPct val="0"/>
+              </a:spcBef>
+              <a:spcAft>
+                <a:spcPct val="0"/>
+              </a:spcAft>
+              <a:buClrTx/>
+              <a:buSzTx/>
+              <a:tabLst/>
+            </a:pPr>
+            <a:r>
+              <a:rPr lang="en-US" sz="1600" b="1" dirty="0"/>
+              <a:t>Fuzzy Memoization Block</a:t>
+            </a:r>
+            <a:endParaRPr lang="en-GB" sz="1600" b="1" dirty="0"/>
+          </a:p>
+          <a:p>
+            <a:pPr marL="285750" marR="0" lvl="0" indent="-285750" algn="l" defTabSz="914400" rtl="0" eaLnBrk="0" fontAlgn="base" latinLnBrk="0" hangingPunct="0">
+              <a:lnSpc>
+                <a:spcPct val="100000"/>
+              </a:lnSpc>
+              <a:spcBef>
+                <a:spcPct val="0"/>
+              </a:spcBef>
+              <a:spcAft>
+                <a:spcPct val="0"/>
+              </a:spcAft>
+              <a:buClrTx/>
+              <a:buSzTx/>
+              <a:buFont typeface="Arial" panose="020B0604020202020204" pitchFamily="34" charset="0"/>
+              <a:buChar char="•"/>
+              <a:tabLst/>
+            </a:pPr>
+            <a:r>
+              <a:rPr lang="en-US" b="1" dirty="0"/>
+              <a:t>Caches previous computations</a:t>
+            </a:r>
+            <a:r>
+              <a:rPr lang="en-US" dirty="0"/>
+              <a:t> to avoid redundant calculations</a:t>
+            </a:r>
+          </a:p>
+          <a:p>
+            <a:pPr marL="285750" marR="0" lvl="0" indent="-285750" algn="l" defTabSz="914400" rtl="0" eaLnBrk="0" fontAlgn="base" latinLnBrk="0" hangingPunct="0">
+              <a:lnSpc>
+                <a:spcPct val="100000"/>
+              </a:lnSpc>
+              <a:spcBef>
+                <a:spcPct val="0"/>
+              </a:spcBef>
+              <a:spcAft>
+                <a:spcPct val="0"/>
+              </a:spcAft>
+              <a:buClrTx/>
+              <a:buSzTx/>
+              <a:buFont typeface="Arial" panose="020B0604020202020204" pitchFamily="34" charset="0"/>
+              <a:buChar char="•"/>
+              <a:tabLst/>
+            </a:pPr>
+            <a:r>
+              <a:rPr lang="en-GB" dirty="0"/>
+              <a:t>Uses </a:t>
+            </a:r>
+            <a:r>
+              <a:rPr lang="en-GB" b="1" dirty="0"/>
+              <a:t>Hamming distance</a:t>
+            </a:r>
+            <a:r>
+              <a:rPr lang="en-GB" dirty="0"/>
+              <a:t> to find a similar previously stored input-output pair.</a:t>
+            </a:r>
+            <a:endParaRPr lang="en-US" dirty="0"/>
+          </a:p>
+          <a:p>
+            <a:pPr marL="285750" marR="0" lvl="0" indent="-285750" algn="l" defTabSz="914400" rtl="0" eaLnBrk="0" fontAlgn="base" latinLnBrk="0" hangingPunct="0">
+              <a:lnSpc>
+                <a:spcPct val="100000"/>
+              </a:lnSpc>
+              <a:spcBef>
+                <a:spcPct val="0"/>
+              </a:spcBef>
+              <a:spcAft>
+                <a:spcPct val="0"/>
+              </a:spcAft>
+              <a:buClrTx/>
+              <a:buSzTx/>
+              <a:buFont typeface="Arial" panose="020B0604020202020204" pitchFamily="34" charset="0"/>
+              <a:buChar char="•"/>
+              <a:tabLst/>
+            </a:pPr>
+            <a:r>
+              <a:rPr lang="en-GB" dirty="0"/>
+              <a:t>If a match is found, </a:t>
+            </a:r>
+            <a:r>
+              <a:rPr lang="en-GB" b="1" dirty="0"/>
+              <a:t>cached result is used</a:t>
+            </a:r>
+            <a:r>
+              <a:rPr lang="en-GB" dirty="0"/>
+              <a:t> instead of recalculating.</a:t>
+            </a:r>
+          </a:p>
+          <a:p>
+            <a:pPr marR="0" lvl="0" algn="l" defTabSz="914400" rtl="0" eaLnBrk="0" fontAlgn="base" latinLnBrk="0" hangingPunct="0">
+              <a:lnSpc>
+                <a:spcPct val="100000"/>
+              </a:lnSpc>
+              <a:spcBef>
+                <a:spcPct val="0"/>
+              </a:spcBef>
+              <a:spcAft>
+                <a:spcPct val="0"/>
+              </a:spcAft>
+              <a:buClrTx/>
+              <a:buSzTx/>
+              <a:tabLst/>
+            </a:pPr>
+            <a:r>
+              <a:rPr lang="en-US" sz="1600" b="1" dirty="0"/>
+              <a:t>Approximate Multiplication Stage</a:t>
+            </a:r>
+          </a:p>
+          <a:p>
+            <a:pPr marL="285750" marR="0" lvl="0" indent="-285750" algn="l" defTabSz="914400" rtl="0" eaLnBrk="0" fontAlgn="base" latinLnBrk="0" hangingPunct="0">
+              <a:lnSpc>
+                <a:spcPct val="100000"/>
+              </a:lnSpc>
+              <a:spcBef>
+                <a:spcPct val="0"/>
+              </a:spcBef>
+              <a:spcAft>
+                <a:spcPct val="0"/>
+              </a:spcAft>
+              <a:buClrTx/>
+              <a:buSzTx/>
+              <a:buFont typeface="Arial" panose="020B0604020202020204" pitchFamily="34" charset="0"/>
+              <a:buChar char="•"/>
+              <a:tabLst/>
+            </a:pPr>
+            <a:r>
+              <a:rPr lang="en-US" dirty="0"/>
+              <a:t>Lower-Part OR-based Approximate Multiplier:</a:t>
+            </a:r>
+          </a:p>
+          <a:p>
+            <a:pPr marL="742950" lvl="1" indent="-285750" eaLnBrk="0" fontAlgn="base" hangingPunct="0">
+              <a:lnSpc>
+                <a:spcPct val="100000"/>
+              </a:lnSpc>
+              <a:spcBef>
+                <a:spcPct val="0"/>
+              </a:spcBef>
+              <a:spcAft>
+                <a:spcPct val="0"/>
+              </a:spcAft>
+              <a:buFont typeface="Arial" panose="020B0604020202020204" pitchFamily="34" charset="0"/>
+              <a:buChar char="•"/>
+            </a:pPr>
+            <a:r>
+              <a:rPr lang="en-GB" sz="1400" dirty="0">
+                <a:solidFill>
+                  <a:schemeClr val="tx1"/>
+                </a:solidFill>
+              </a:rPr>
+              <a:t>MSB (Most Significant Bits) handled with a </a:t>
+            </a:r>
+            <a:r>
+              <a:rPr lang="en-GB" sz="1400" dirty="0" err="1">
+                <a:solidFill>
+                  <a:schemeClr val="tx1"/>
+                </a:solidFill>
+              </a:rPr>
+              <a:t>Dadda</a:t>
+            </a:r>
+            <a:r>
+              <a:rPr lang="en-GB" sz="1400" dirty="0">
+                <a:solidFill>
+                  <a:schemeClr val="tx1"/>
+                </a:solidFill>
+              </a:rPr>
+              <a:t> Multiplier</a:t>
+            </a:r>
+          </a:p>
+          <a:p>
+            <a:pPr marL="742950" lvl="1" indent="-285750" eaLnBrk="0" fontAlgn="base" hangingPunct="0">
+              <a:lnSpc>
+                <a:spcPct val="100000"/>
+              </a:lnSpc>
+              <a:spcBef>
+                <a:spcPct val="0"/>
+              </a:spcBef>
+              <a:spcAft>
+                <a:spcPct val="0"/>
+              </a:spcAft>
+              <a:buFont typeface="Arial" panose="020B0604020202020204" pitchFamily="34" charset="0"/>
+              <a:buChar char="•"/>
+            </a:pPr>
+            <a:r>
+              <a:rPr lang="en-GB" sz="1400" dirty="0">
+                <a:solidFill>
+                  <a:schemeClr val="tx1"/>
+                </a:solidFill>
+              </a:rPr>
+              <a:t>LSB (Least Significant Bits) approximated using OR-based logic</a:t>
+            </a:r>
+          </a:p>
+          <a:p>
+            <a:pPr marR="0" lvl="0" algn="l" defTabSz="914400" rtl="0" eaLnBrk="0" fontAlgn="base" latinLnBrk="0" hangingPunct="0">
+              <a:lnSpc>
+                <a:spcPct val="100000"/>
+              </a:lnSpc>
+              <a:spcBef>
+                <a:spcPct val="0"/>
+              </a:spcBef>
+              <a:spcAft>
+                <a:spcPct val="0"/>
+              </a:spcAft>
+              <a:buClrTx/>
+              <a:buSzTx/>
+              <a:tabLst/>
+            </a:pPr>
+            <a:r>
+              <a:rPr lang="en-US" sz="1600" b="1" dirty="0"/>
+              <a:t>Partial Product Reduction Stage</a:t>
+            </a:r>
+            <a:endParaRPr lang="en-US" sz="1700" b="1" dirty="0">
               <a:latin typeface="Arial" panose="020B0604020202020204" pitchFamily="34" charset="0"/>
             </a:endParaRPr>
           </a:p>
-        </p:txBody>
-      </p:sp>
+          <a:p>
+            <a:pPr marL="285750" marR="0" lvl="0" indent="-285750" algn="l" defTabSz="914400" rtl="0" eaLnBrk="0" fontAlgn="base" latinLnBrk="0" hangingPunct="0">
+              <a:lnSpc>
+                <a:spcPct val="100000"/>
+              </a:lnSpc>
+              <a:spcBef>
+                <a:spcPct val="0"/>
+              </a:spcBef>
+              <a:spcAft>
+                <a:spcPct val="0"/>
+              </a:spcAft>
+              <a:buClrTx/>
+              <a:buSzTx/>
+              <a:buFont typeface="Arial" panose="020B0604020202020204" pitchFamily="34" charset="0"/>
+              <a:buChar char="•"/>
+              <a:tabLst/>
+            </a:pPr>
+            <a:r>
+              <a:rPr lang="en-US" dirty="0"/>
+              <a:t>Uses compressor-based approximate multipliers</a:t>
+            </a:r>
+          </a:p>
+          <a:p>
+            <a:pPr marR="0" lvl="0" algn="l" defTabSz="914400" rtl="0" eaLnBrk="0" fontAlgn="base" latinLnBrk="0" hangingPunct="0">
+              <a:lnSpc>
+                <a:spcPct val="100000"/>
+              </a:lnSpc>
+              <a:spcBef>
+                <a:spcPct val="0"/>
+              </a:spcBef>
+              <a:spcAft>
+                <a:spcPct val="0"/>
+              </a:spcAft>
+              <a:buClrTx/>
+              <a:buSzTx/>
+              <a:tabLst/>
+            </a:pPr>
+            <a:r>
+              <a:rPr lang="en-US" sz="1600" b="1" dirty="0"/>
+              <a:t>Approximate Addition Stage</a:t>
+            </a:r>
+          </a:p>
+          <a:p>
+            <a:pPr marL="285750" marR="0" lvl="0" indent="-285750" algn="l" defTabSz="914400" rtl="0" eaLnBrk="0" fontAlgn="base" latinLnBrk="0" hangingPunct="0">
+              <a:lnSpc>
+                <a:spcPct val="100000"/>
+              </a:lnSpc>
+              <a:spcBef>
+                <a:spcPct val="0"/>
+              </a:spcBef>
+              <a:spcAft>
+                <a:spcPct val="0"/>
+              </a:spcAft>
+              <a:buClrTx/>
+              <a:buSzTx/>
+              <a:buFont typeface="Arial" panose="020B0604020202020204" pitchFamily="34" charset="0"/>
+              <a:buChar char="•"/>
+              <a:tabLst/>
+            </a:pPr>
+            <a:r>
+              <a:rPr lang="en-GB" dirty="0"/>
+              <a:t>Accumulation performed using Lower-Part OR-based Approximate Adders</a:t>
+            </a:r>
+          </a:p>
+          <a:p>
+            <a:pPr marL="285750" marR="0" lvl="0" indent="-285750" algn="l" defTabSz="914400" rtl="0" eaLnBrk="0" fontAlgn="base" latinLnBrk="0" hangingPunct="0">
+              <a:lnSpc>
+                <a:spcPct val="100000"/>
+              </a:lnSpc>
+              <a:spcBef>
+                <a:spcPct val="0"/>
+              </a:spcBef>
+              <a:spcAft>
+                <a:spcPct val="0"/>
+              </a:spcAft>
+              <a:buClrTx/>
+              <a:buSzTx/>
+              <a:buFont typeface="Arial" panose="020B0604020202020204" pitchFamily="34" charset="0"/>
+              <a:buChar char="•"/>
+              <a:tabLst/>
+            </a:pPr>
+            <a:endParaRPr lang="en-US" dirty="0"/>
+          </a:p>
+          <a:p>
+            <a:pPr marR="0" lvl="0" algn="l" defTabSz="914400" rtl="0" eaLnBrk="0" fontAlgn="base" latinLnBrk="0" hangingPunct="0">
+              <a:lnSpc>
+                <a:spcPct val="100000"/>
+              </a:lnSpc>
+              <a:spcBef>
+                <a:spcPct val="0"/>
+              </a:spcBef>
+              <a:spcAft>
+                <a:spcPct val="0"/>
+              </a:spcAft>
+              <a:buClrTx/>
+              <a:buSzTx/>
+              <a:tabLst/>
+            </a:pPr>
+            <a:endParaRPr lang="en-GB" sz="1200" b="1" dirty="0"/>
+          </a:p>
+        </p:txBody>
+      </p:sp>
+      <p:pic>
+        <p:nvPicPr>
+          <p:cNvPr id="4" name="Graphic 3">
+            <a:extLst>
+              <a:ext uri="{FF2B5EF4-FFF2-40B4-BE49-F238E27FC236}">
+                <a16:creationId xmlns:a16="http://schemas.microsoft.com/office/drawing/2014/main" id="{17D5BD9B-4E40-E593-0B5F-494E29EC06F6}"/>
+              </a:ext>
+            </a:extLst>
+          </p:cNvPr>
+          <p:cNvPicPr>
+            <a:picLocks noChangeAspect="1"/>
+          </p:cNvPicPr>
+          <p:nvPr/>
+        </p:nvPicPr>
+        <p:blipFill>
+          <a:blip r:embed="rId4">
+            <a:extLst>
+              <a:ext uri="{96DAC541-7B7A-43D3-8B79-37D633B846F1}">
+                <asvg:svgBlip xmlns:asvg="http://schemas.microsoft.com/office/drawing/2016/SVG/main" r:embed="rId5"/>
+              </a:ext>
+            </a:extLst>
+          </a:blip>
+          <a:stretch>
+            <a:fillRect/>
+          </a:stretch>
+        </p:blipFill>
+        <p:spPr>
+          <a:xfrm>
+            <a:off x="8122025" y="365228"/>
+            <a:ext cx="3138207" cy="5991122"/>
+          </a:xfrm>
+          <a:prstGeom prst="rect">
+            <a:avLst/>
+          </a:prstGeom>
+        </p:spPr>
+      </p:pic>
     </p:spTree>
     <p:extLst>
       <p:ext uri="{BB962C8B-B14F-4D97-AF65-F5344CB8AC3E}">
@@ -22148,50 +22118,6 @@
           </a:p>
         </p:txBody>
       </p:sp>
-      <p:sp>
-        <p:nvSpPr>
-          <p:cNvPr id="82" name="Slide Number Placeholder 81">
-            <a:extLst>
-              <a:ext uri="{FF2B5EF4-FFF2-40B4-BE49-F238E27FC236}">
-                <a16:creationId xmlns:a16="http://schemas.microsoft.com/office/drawing/2014/main" id="{CE36A058-BEC2-4BC5-A467-F2EB2A365051}"/>
-              </a:ext>
-            </a:extLst>
-          </p:cNvPr>
-          <p:cNvSpPr>
-            <a:spLocks noGrp="1"/>
-          </p:cNvSpPr>
-          <p:nvPr>
-            <p:ph type="sldNum" sz="quarter" idx="22"/>
-          </p:nvPr>
-        </p:nvSpPr>
-        <p:spPr>
-          <a:xfrm>
-            <a:off x="8610600" y="6356350"/>
-            <a:ext cx="2743200" cy="365125"/>
-          </a:xfrm>
-        </p:spPr>
-        <p:txBody>
-          <a:bodyPr rtlCol="0"/>
-          <a:lstStyle/>
-          <a:p>
-            <a:pPr rtl="0"/>
-            <a:fld id="{B5CEABB6-07DC-46E8-9B57-56EC44A396E5}" type="slidenum">
-              <a:rPr lang="en-GB" smtClean="0">
-                <a:solidFill>
-                  <a:schemeClr val="tx1"/>
-                </a:solidFill>
-              </a:rPr>
-              <a:pPr rtl="0"/>
-              <a:t>5</a:t>
-            </a:fld>
-            <a:endParaRPr lang="en-GB">
-              <a:solidFill>
-                <a:schemeClr val="tx1"/>
-              </a:solidFill>
-            </a:endParaRPr>
-          </a:p>
-        </p:txBody>
-      </p:sp>
       <p:pic>
         <p:nvPicPr>
           <p:cNvPr id="12" name="Picture 11" descr="A purple text on a black background&#10;&#10;AI-generated content may be incorrect.">
@@ -22773,6 +22699,141 @@
               </a:rPr>
               <a:t>Signal processing in embedded systems</a:t>
             </a:r>
+          </a:p>
+        </p:txBody>
+      </p:sp>
+      <p:sp>
+        <p:nvSpPr>
+          <p:cNvPr id="6" name="Slide Number Placeholder 5">
+            <a:extLst>
+              <a:ext uri="{FF2B5EF4-FFF2-40B4-BE49-F238E27FC236}">
+                <a16:creationId xmlns:a16="http://schemas.microsoft.com/office/drawing/2014/main" id="{EF41A154-0C80-F483-0C2C-6FB6C27BF092}"/>
+              </a:ext>
+            </a:extLst>
+          </p:cNvPr>
+          <p:cNvSpPr txBox="1">
+            <a:spLocks/>
+          </p:cNvSpPr>
+          <p:nvPr/>
+        </p:nvSpPr>
+        <p:spPr>
+          <a:xfrm>
+            <a:off x="8610600" y="6356350"/>
+            <a:ext cx="2743200" cy="365125"/>
+          </a:xfrm>
+          <a:prstGeom prst="rect">
+            <a:avLst/>
+          </a:prstGeom>
+        </p:spPr>
+        <p:txBody>
+          <a:bodyPr rtlCol="0"/>
+          <a:lstStyle>
+            <a:defPPr rtl="0">
+              <a:defRPr lang="en-GB"/>
+            </a:defPPr>
+            <a:lvl1pPr marL="0" algn="l" defTabSz="914400" rtl="0" eaLnBrk="1" latinLnBrk="0" hangingPunct="1">
+              <a:defRPr sz="1800" kern="1200">
+                <a:solidFill>
+                  <a:schemeClr val="tx1"/>
+                </a:solidFill>
+                <a:latin typeface="+mn-lt"/>
+                <a:ea typeface="+mn-ea"/>
+                <a:cs typeface="+mn-cs"/>
+              </a:defRPr>
+            </a:lvl1pPr>
+            <a:lvl2pPr marL="457200" algn="l" defTabSz="914400" rtl="0" eaLnBrk="1" latinLnBrk="0" hangingPunct="1">
+              <a:defRPr sz="1800" kern="1200">
+                <a:solidFill>
+                  <a:schemeClr val="tx1"/>
+                </a:solidFill>
+                <a:latin typeface="+mn-lt"/>
+                <a:ea typeface="+mn-ea"/>
+                <a:cs typeface="+mn-cs"/>
+              </a:defRPr>
+            </a:lvl2pPr>
+            <a:lvl3pPr marL="914400" algn="l" defTabSz="914400" rtl="0" eaLnBrk="1" latinLnBrk="0" hangingPunct="1">
+              <a:defRPr sz="1800" kern="1200">
+                <a:solidFill>
+                  <a:schemeClr val="tx1"/>
+                </a:solidFill>
+                <a:latin typeface="+mn-lt"/>
+                <a:ea typeface="+mn-ea"/>
+                <a:cs typeface="+mn-cs"/>
+              </a:defRPr>
+            </a:lvl3pPr>
+            <a:lvl4pPr marL="1371600" algn="l" defTabSz="914400" rtl="0" eaLnBrk="1" latinLnBrk="0" hangingPunct="1">
+              <a:defRPr sz="1800" kern="1200">
+                <a:solidFill>
+                  <a:schemeClr val="tx1"/>
+                </a:solidFill>
+                <a:latin typeface="+mn-lt"/>
+                <a:ea typeface="+mn-ea"/>
+                <a:cs typeface="+mn-cs"/>
+              </a:defRPr>
+            </a:lvl4pPr>
+            <a:lvl5pPr marL="1828800" algn="l" defTabSz="914400" rtl="0" eaLnBrk="1" latinLnBrk="0" hangingPunct="1">
+              <a:defRPr sz="1800" kern="1200">
+                <a:solidFill>
+                  <a:schemeClr val="tx1"/>
+                </a:solidFill>
+                <a:latin typeface="+mn-lt"/>
+                <a:ea typeface="+mn-ea"/>
+                <a:cs typeface="+mn-cs"/>
+              </a:defRPr>
+            </a:lvl5pPr>
+            <a:lvl6pPr marL="2286000" algn="l" defTabSz="914400" rtl="0" eaLnBrk="1" latinLnBrk="0" hangingPunct="1">
+              <a:defRPr sz="1800" kern="1200">
+                <a:solidFill>
+                  <a:schemeClr val="tx1"/>
+                </a:solidFill>
+                <a:latin typeface="+mn-lt"/>
+                <a:ea typeface="+mn-ea"/>
+                <a:cs typeface="+mn-cs"/>
+              </a:defRPr>
+            </a:lvl6pPr>
+            <a:lvl7pPr marL="2743200" algn="l" defTabSz="914400" rtl="0" eaLnBrk="1" latinLnBrk="0" hangingPunct="1">
+              <a:defRPr sz="1800" kern="1200">
+                <a:solidFill>
+                  <a:schemeClr val="tx1"/>
+                </a:solidFill>
+                <a:latin typeface="+mn-lt"/>
+                <a:ea typeface="+mn-ea"/>
+                <a:cs typeface="+mn-cs"/>
+              </a:defRPr>
+            </a:lvl7pPr>
+            <a:lvl8pPr marL="3200400" algn="l" defTabSz="914400" rtl="0" eaLnBrk="1" latinLnBrk="0" hangingPunct="1">
+              <a:defRPr sz="1800" kern="1200">
+                <a:solidFill>
+                  <a:schemeClr val="tx1"/>
+                </a:solidFill>
+                <a:latin typeface="+mn-lt"/>
+                <a:ea typeface="+mn-ea"/>
+                <a:cs typeface="+mn-cs"/>
+              </a:defRPr>
+            </a:lvl8pPr>
+            <a:lvl9pPr marL="3657600" algn="l" defTabSz="914400" rtl="0" eaLnBrk="1" latinLnBrk="0" hangingPunct="1">
+              <a:defRPr sz="1800" kern="1200">
+                <a:solidFill>
+                  <a:schemeClr val="tx1"/>
+                </a:solidFill>
+                <a:latin typeface="+mn-lt"/>
+                <a:ea typeface="+mn-ea"/>
+                <a:cs typeface="+mn-cs"/>
+              </a:defRPr>
+            </a:lvl9pPr>
+          </a:lstStyle>
+          <a:p>
+            <a:pPr algn="r"/>
+            <a:fld id="{B5CEABB6-07DC-46E8-9B57-56EC44A396E5}" type="slidenum">
+              <a:rPr lang="en-GB" sz="900" smtClean="0">
+                <a:latin typeface="Tenorite (Body)"/>
+              </a:rPr>
+              <a:pPr algn="r"/>
+              <a:t>5</a:t>
+            </a:fld>
+            <a:endParaRPr lang="en-GB" sz="900" dirty="0">
+              <a:latin typeface="Tenorite (Body)"/>
+            </a:endParaRPr>
           </a:p>
         </p:txBody>
       </p:sp>
@@ -23099,11 +23160,19 @@
           <a:p>
             <a:pPr rtl="0"/>
             <a:fld id="{B5CEABB6-07DC-46E8-9B57-56EC44A396E5}" type="slidenum">
-              <a:rPr lang="en-GB" smtClean="0"/>
+              <a:rPr lang="en-GB" smtClean="0">
+                <a:solidFill>
+                  <a:schemeClr val="tx1"/>
+                </a:solidFill>
+              </a:rPr>
               <a:pPr rtl="0"/>
               <a:t>6</a:t>
             </a:fld>
-            <a:endParaRPr lang="en-GB"/>
+            <a:endParaRPr lang="en-GB">
+              <a:solidFill>
+                <a:schemeClr val="tx1"/>
+              </a:solidFill>
+            </a:endParaRPr>
           </a:p>
         </p:txBody>
       </p:sp>
@@ -23185,175 +23254,6 @@
   <p:cSld>
     <p:spTree>
       <p:nvGrpSpPr>
-        <p:cNvPr id="1" name="">
-          <a:extLst>
-            <a:ext uri="{FF2B5EF4-FFF2-40B4-BE49-F238E27FC236}">
-              <a16:creationId xmlns:a16="http://schemas.microsoft.com/office/drawing/2014/main" id="{7B8A8F99-7E32-1D7A-C77E-B336EDF570FF}"/>
-            </a:ext>
-          </a:extLst>
-        </p:cNvPr>
-        <p:cNvGrpSpPr/>
-        <p:nvPr/>
-      </p:nvGrpSpPr>
-      <p:grpSpPr>
-        <a:xfrm>
-          <a:off x="0" y="0"/>
-          <a:ext cx="0" cy="0"/>
-          <a:chOff x="0" y="0"/>
-          <a:chExt cx="0" cy="0"/>
-        </a:xfrm>
-      </p:grpSpPr>
-      <p:sp>
-        <p:nvSpPr>
-          <p:cNvPr id="2" name="Title 1">
-            <a:extLst>
-              <a:ext uri="{FF2B5EF4-FFF2-40B4-BE49-F238E27FC236}">
-                <a16:creationId xmlns:a16="http://schemas.microsoft.com/office/drawing/2014/main" id="{4AA2F4AF-8F78-7C47-729B-8454370D8CAA}"/>
-              </a:ext>
-            </a:extLst>
-          </p:cNvPr>
-          <p:cNvSpPr>
-            <a:spLocks noGrp="1"/>
-          </p:cNvSpPr>
-          <p:nvPr>
-            <p:ph type="title"/>
-          </p:nvPr>
-        </p:nvSpPr>
-        <p:spPr>
-          <a:xfrm>
-            <a:off x="1362074" y="768488"/>
-            <a:ext cx="5111750" cy="1204912"/>
-          </a:xfrm>
-        </p:spPr>
-        <p:txBody>
-          <a:bodyPr rtlCol="0"/>
-          <a:lstStyle/>
-          <a:p>
-            <a:pPr rtl="0"/>
-            <a:r>
-              <a:rPr lang="en-GB" dirty="0"/>
-              <a:t>SPECIFICATION</a:t>
-            </a:r>
-          </a:p>
-        </p:txBody>
-      </p:sp>
-      <p:sp>
-        <p:nvSpPr>
-          <p:cNvPr id="3" name="Content Placeholder 2">
-            <a:extLst>
-              <a:ext uri="{FF2B5EF4-FFF2-40B4-BE49-F238E27FC236}">
-                <a16:creationId xmlns:a16="http://schemas.microsoft.com/office/drawing/2014/main" id="{15DBD16E-DD5C-3BBF-BBFB-CA35C47636B1}"/>
-              </a:ext>
-            </a:extLst>
-          </p:cNvPr>
-          <p:cNvSpPr>
-            <a:spLocks noGrp="1"/>
-          </p:cNvSpPr>
-          <p:nvPr>
-            <p:ph type="body" idx="1"/>
-          </p:nvPr>
-        </p:nvSpPr>
-        <p:spPr>
-          <a:xfrm>
-            <a:off x="1333498" y="2052918"/>
-            <a:ext cx="7404735" cy="3308794"/>
-          </a:xfrm>
-        </p:spPr>
-        <p:txBody>
-          <a:bodyPr vert="horz" lIns="91440" tIns="45720" rIns="91440" bIns="45720" rtlCol="0" anchor="t">
-            <a:normAutofit/>
-          </a:bodyPr>
-          <a:lstStyle/>
-          <a:p>
-            <a:pPr rtl="0"/>
-            <a:endParaRPr lang="en-GB" noProof="1"/>
-          </a:p>
-        </p:txBody>
-      </p:sp>
-      <p:sp>
-        <p:nvSpPr>
-          <p:cNvPr id="6" name="Slide Number Placeholder 5">
-            <a:extLst>
-              <a:ext uri="{FF2B5EF4-FFF2-40B4-BE49-F238E27FC236}">
-                <a16:creationId xmlns:a16="http://schemas.microsoft.com/office/drawing/2014/main" id="{AD8E3BE6-465A-EB70-F84A-13E9B7E766EF}"/>
-              </a:ext>
-            </a:extLst>
-          </p:cNvPr>
-          <p:cNvSpPr>
-            <a:spLocks noGrp="1"/>
-          </p:cNvSpPr>
-          <p:nvPr>
-            <p:ph type="sldNum" sz="quarter" idx="12"/>
-          </p:nvPr>
-        </p:nvSpPr>
-        <p:spPr>
-          <a:xfrm>
-            <a:off x="8610600" y="6356350"/>
-            <a:ext cx="2743200" cy="365125"/>
-          </a:xfrm>
-        </p:spPr>
-        <p:txBody>
-          <a:bodyPr rtlCol="0"/>
-          <a:lstStyle/>
-          <a:p>
-            <a:pPr rtl="0"/>
-            <a:fld id="{B5CEABB6-07DC-46E8-9B57-56EC44A396E5}" type="slidenum">
-              <a:rPr lang="en-GB" smtClean="0"/>
-              <a:pPr rtl="0"/>
-              <a:t>7</a:t>
-            </a:fld>
-            <a:endParaRPr lang="en-GB" dirty="0"/>
-          </a:p>
-        </p:txBody>
-      </p:sp>
-      <p:pic>
-        <p:nvPicPr>
-          <p:cNvPr id="7" name="Picture 6" descr="A purple text on a black background&#10;&#10;AI-generated content may be incorrect.">
-            <a:extLst>
-              <a:ext uri="{FF2B5EF4-FFF2-40B4-BE49-F238E27FC236}">
-                <a16:creationId xmlns:a16="http://schemas.microsoft.com/office/drawing/2014/main" id="{E27EE49D-9950-8FE0-B8BA-7123D0301462}"/>
-              </a:ext>
-            </a:extLst>
-          </p:cNvPr>
-          <p:cNvPicPr>
-            <a:picLocks noChangeAspect="1"/>
-          </p:cNvPicPr>
-          <p:nvPr/>
-        </p:nvPicPr>
-        <p:blipFill>
-          <a:blip r:embed="rId3"/>
-          <a:stretch>
-            <a:fillRect/>
-          </a:stretch>
-        </p:blipFill>
-        <p:spPr>
-          <a:xfrm>
-            <a:off x="65368" y="6089513"/>
-            <a:ext cx="2536261" cy="768487"/>
-          </a:xfrm>
-          <a:prstGeom prst="rect">
-            <a:avLst/>
-          </a:prstGeom>
-        </p:spPr>
-      </p:pic>
-    </p:spTree>
-    <p:extLst>
-      <p:ext uri="{BB962C8B-B14F-4D97-AF65-F5344CB8AC3E}">
-        <p14:creationId xmlns:p14="http://schemas.microsoft.com/office/powerpoint/2010/main" val="546234521"/>
-      </p:ext>
-    </p:extLst>
-  </p:cSld>
-  <p:clrMapOvr>
-    <a:masterClrMapping/>
-  </p:clrMapOvr>
-</p:sld>
-</file>
-
-<file path=ppt/slides/slide8.xml><?xml version="1.0" encoding="utf-8"?>
-<p:sld xmlns:a="http://schemas.openxmlformats.org/drawingml/2006/main" xmlns:r="http://schemas.openxmlformats.org/officeDocument/2006/relationships" xmlns:p="http://schemas.openxmlformats.org/presentationml/2006/main">
-  <p:cSld>
-    <p:spTree>
-      <p:nvGrpSpPr>
         <p:cNvPr id="1" name=""/>
         <p:cNvGrpSpPr/>
         <p:nvPr/>
@@ -23384,8 +23284,8 @@
         </p:nvSpPr>
         <p:spPr>
           <a:xfrm>
-            <a:off x="1362075" y="1671639"/>
-            <a:ext cx="5111750" cy="1204912"/>
+            <a:off x="1362074" y="781287"/>
+            <a:ext cx="5111750" cy="608481"/>
           </a:xfrm>
         </p:spPr>
         <p:txBody>
@@ -23418,13 +23318,13 @@
         </p:nvSpPr>
         <p:spPr>
           <a:xfrm>
-            <a:off x="1362074" y="3429000"/>
-            <a:ext cx="7404735" cy="2660512"/>
+            <a:off x="1333498" y="2409384"/>
+            <a:ext cx="6958855" cy="2660512"/>
           </a:xfrm>
         </p:spPr>
         <p:txBody>
           <a:bodyPr vert="horz" lIns="91440" tIns="45720" rIns="91440" bIns="45720" rtlCol="0" anchor="t">
-            <a:normAutofit lnSpcReduction="10000"/>
+            <a:normAutofit fontScale="92500" lnSpcReduction="10000"/>
           </a:bodyPr>
           <a:lstStyle/>
           <a:p>
@@ -23505,7 +23405,7 @@
             </a:pPr>
             <a:r>
               <a:rPr lang="en-US" dirty="0"/>
-              <a:t>Implementing Approximate Adders and Approximate Multipliers</a:t>
+              <a:t>Implementing Approximate Adders and Approximate Multipliers based on existing designs</a:t>
             </a:r>
             <a:endParaRPr lang="en-GB" dirty="0"/>
           </a:p>
@@ -23557,11 +23457,19 @@
           <a:p>
             <a:pPr rtl="0"/>
             <a:fld id="{B5CEABB6-07DC-46E8-9B57-56EC44A396E5}" type="slidenum">
-              <a:rPr lang="en-GB" smtClean="0"/>
+              <a:rPr lang="en-GB" smtClean="0">
+                <a:solidFill>
+                  <a:schemeClr val="tx1"/>
+                </a:solidFill>
+              </a:rPr>
               <a:pPr rtl="0"/>
-              <a:t>8</a:t>
+              <a:t>7</a:t>
             </a:fld>
-            <a:endParaRPr lang="en-GB" dirty="0"/>
+            <a:endParaRPr lang="en-GB" dirty="0">
+              <a:solidFill>
+                <a:schemeClr val="tx1"/>
+              </a:solidFill>
+            </a:endParaRPr>
           </a:p>
         </p:txBody>
       </p:sp>
@@ -23608,7 +23516,7 @@
 </p:sld>
 </file>
 
-<file path=ppt/slides/slide9.xml><?xml version="1.0" encoding="utf-8"?>
+<file path=ppt/slides/slide8.xml><?xml version="1.0" encoding="utf-8"?>
 <p:sld xmlns:a="http://schemas.openxmlformats.org/drawingml/2006/main" xmlns:r="http://schemas.openxmlformats.org/officeDocument/2006/relationships" xmlns:p="http://schemas.openxmlformats.org/presentationml/2006/main">
   <p:cSld>
     <p:bg>
@@ -23658,7 +23566,7 @@
         <p:spPr>
           <a:xfrm>
             <a:off x="6991350" y="2571235"/>
-            <a:ext cx="4179570" cy="1715531"/>
+            <a:ext cx="5200650" cy="1715531"/>
           </a:xfrm>
         </p:spPr>
         <p:txBody>
@@ -23672,7 +23580,7 @@
                   <a:schemeClr val="tx1"/>
                 </a:solidFill>
               </a:rPr>
-              <a:t>SIMULATION RESULTS</a:t>
+              <a:t>SIMULATION RESULTS - ADDER</a:t>
             </a:r>
           </a:p>
         </p:txBody>
@@ -23707,10 +23615,384 @@
           </a:prstGeom>
         </p:spPr>
       </p:pic>
+      <p:sp>
+        <p:nvSpPr>
+          <p:cNvPr id="4" name="Slide Number Placeholder 5">
+            <a:extLst>
+              <a:ext uri="{FF2B5EF4-FFF2-40B4-BE49-F238E27FC236}">
+                <a16:creationId xmlns:a16="http://schemas.microsoft.com/office/drawing/2014/main" id="{CA67B33E-2BE1-B0C8-D35D-88FC2C0F614C}"/>
+              </a:ext>
+            </a:extLst>
+          </p:cNvPr>
+          <p:cNvSpPr txBox="1">
+            <a:spLocks/>
+          </p:cNvSpPr>
+          <p:nvPr/>
+        </p:nvSpPr>
+        <p:spPr>
+          <a:xfrm>
+            <a:off x="8610600" y="6356350"/>
+            <a:ext cx="2743200" cy="365125"/>
+          </a:xfrm>
+          <a:prstGeom prst="rect">
+            <a:avLst/>
+          </a:prstGeom>
+        </p:spPr>
+        <p:txBody>
+          <a:bodyPr rtlCol="0"/>
+          <a:lstStyle>
+            <a:defPPr rtl="0">
+              <a:defRPr lang="en-GB"/>
+            </a:defPPr>
+            <a:lvl1pPr marL="0" algn="l" defTabSz="914400" rtl="0" eaLnBrk="1" latinLnBrk="0" hangingPunct="1">
+              <a:defRPr sz="1800" kern="1200">
+                <a:solidFill>
+                  <a:schemeClr val="tx1"/>
+                </a:solidFill>
+                <a:latin typeface="+mn-lt"/>
+                <a:ea typeface="+mn-ea"/>
+                <a:cs typeface="+mn-cs"/>
+              </a:defRPr>
+            </a:lvl1pPr>
+            <a:lvl2pPr marL="457200" algn="l" defTabSz="914400" rtl="0" eaLnBrk="1" latinLnBrk="0" hangingPunct="1">
+              <a:defRPr sz="1800" kern="1200">
+                <a:solidFill>
+                  <a:schemeClr val="tx1"/>
+                </a:solidFill>
+                <a:latin typeface="+mn-lt"/>
+                <a:ea typeface="+mn-ea"/>
+                <a:cs typeface="+mn-cs"/>
+              </a:defRPr>
+            </a:lvl2pPr>
+            <a:lvl3pPr marL="914400" algn="l" defTabSz="914400" rtl="0" eaLnBrk="1" latinLnBrk="0" hangingPunct="1">
+              <a:defRPr sz="1800" kern="1200">
+                <a:solidFill>
+                  <a:schemeClr val="tx1"/>
+                </a:solidFill>
+                <a:latin typeface="+mn-lt"/>
+                <a:ea typeface="+mn-ea"/>
+                <a:cs typeface="+mn-cs"/>
+              </a:defRPr>
+            </a:lvl3pPr>
+            <a:lvl4pPr marL="1371600" algn="l" defTabSz="914400" rtl="0" eaLnBrk="1" latinLnBrk="0" hangingPunct="1">
+              <a:defRPr sz="1800" kern="1200">
+                <a:solidFill>
+                  <a:schemeClr val="tx1"/>
+                </a:solidFill>
+                <a:latin typeface="+mn-lt"/>
+                <a:ea typeface="+mn-ea"/>
+                <a:cs typeface="+mn-cs"/>
+              </a:defRPr>
+            </a:lvl4pPr>
+            <a:lvl5pPr marL="1828800" algn="l" defTabSz="914400" rtl="0" eaLnBrk="1" latinLnBrk="0" hangingPunct="1">
+              <a:defRPr sz="1800" kern="1200">
+                <a:solidFill>
+                  <a:schemeClr val="tx1"/>
+                </a:solidFill>
+                <a:latin typeface="+mn-lt"/>
+                <a:ea typeface="+mn-ea"/>
+                <a:cs typeface="+mn-cs"/>
+              </a:defRPr>
+            </a:lvl5pPr>
+            <a:lvl6pPr marL="2286000" algn="l" defTabSz="914400" rtl="0" eaLnBrk="1" latinLnBrk="0" hangingPunct="1">
+              <a:defRPr sz="1800" kern="1200">
+                <a:solidFill>
+                  <a:schemeClr val="tx1"/>
+                </a:solidFill>
+                <a:latin typeface="+mn-lt"/>
+                <a:ea typeface="+mn-ea"/>
+                <a:cs typeface="+mn-cs"/>
+              </a:defRPr>
+            </a:lvl6pPr>
+            <a:lvl7pPr marL="2743200" algn="l" defTabSz="914400" rtl="0" eaLnBrk="1" latinLnBrk="0" hangingPunct="1">
+              <a:defRPr sz="1800" kern="1200">
+                <a:solidFill>
+                  <a:schemeClr val="tx1"/>
+                </a:solidFill>
+                <a:latin typeface="+mn-lt"/>
+                <a:ea typeface="+mn-ea"/>
+                <a:cs typeface="+mn-cs"/>
+              </a:defRPr>
+            </a:lvl7pPr>
+            <a:lvl8pPr marL="3200400" algn="l" defTabSz="914400" rtl="0" eaLnBrk="1" latinLnBrk="0" hangingPunct="1">
+              <a:defRPr sz="1800" kern="1200">
+                <a:solidFill>
+                  <a:schemeClr val="tx1"/>
+                </a:solidFill>
+                <a:latin typeface="+mn-lt"/>
+                <a:ea typeface="+mn-ea"/>
+                <a:cs typeface="+mn-cs"/>
+              </a:defRPr>
+            </a:lvl8pPr>
+            <a:lvl9pPr marL="3657600" algn="l" defTabSz="914400" rtl="0" eaLnBrk="1" latinLnBrk="0" hangingPunct="1">
+              <a:defRPr sz="1800" kern="1200">
+                <a:solidFill>
+                  <a:schemeClr val="tx1"/>
+                </a:solidFill>
+                <a:latin typeface="+mn-lt"/>
+                <a:ea typeface="+mn-ea"/>
+                <a:cs typeface="+mn-cs"/>
+              </a:defRPr>
+            </a:lvl9pPr>
+          </a:lstStyle>
+          <a:p>
+            <a:pPr algn="r"/>
+            <a:fld id="{B5CEABB6-07DC-46E8-9B57-56EC44A396E5}" type="slidenum">
+              <a:rPr lang="en-GB" sz="900" smtClean="0"/>
+              <a:pPr algn="r"/>
+              <a:t>8</a:t>
+            </a:fld>
+            <a:endParaRPr lang="en-GB" dirty="0"/>
+          </a:p>
+        </p:txBody>
+      </p:sp>
     </p:spTree>
     <p:extLst>
       <p:ext uri="{BB962C8B-B14F-4D97-AF65-F5344CB8AC3E}">
         <p14:creationId xmlns:p14="http://schemas.microsoft.com/office/powerpoint/2010/main" val="3007507314"/>
+      </p:ext>
+    </p:extLst>
+  </p:cSld>
+  <p:clrMapOvr>
+    <a:masterClrMapping/>
+  </p:clrMapOvr>
+</p:sld>
+</file>
+
+<file path=ppt/slides/slide9.xml><?xml version="1.0" encoding="utf-8"?>
+<p:sld xmlns:a="http://schemas.openxmlformats.org/drawingml/2006/main" xmlns:r="http://schemas.openxmlformats.org/officeDocument/2006/relationships" xmlns:p="http://schemas.openxmlformats.org/presentationml/2006/main">
+  <p:cSld>
+    <p:bg>
+      <p:bgPr>
+        <a:solidFill>
+          <a:schemeClr val="accent1"/>
+        </a:solidFill>
+        <a:effectLst/>
+      </p:bgPr>
+    </p:bg>
+    <p:spTree>
+      <p:nvGrpSpPr>
+        <p:cNvPr id="1" name="">
+          <a:extLst>
+            <a:ext uri="{FF2B5EF4-FFF2-40B4-BE49-F238E27FC236}">
+              <a16:creationId xmlns:a16="http://schemas.microsoft.com/office/drawing/2014/main" id="{0123FABB-3156-19E0-34B5-36241A5EB0EC}"/>
+            </a:ext>
+          </a:extLst>
+        </p:cNvPr>
+        <p:cNvGrpSpPr/>
+        <p:nvPr/>
+      </p:nvGrpSpPr>
+      <p:grpSpPr>
+        <a:xfrm>
+          <a:off x="0" y="0"/>
+          <a:ext cx="0" cy="0"/>
+          <a:chOff x="0" y="0"/>
+          <a:chExt cx="0" cy="0"/>
+        </a:xfrm>
+      </p:grpSpPr>
+      <p:sp>
+        <p:nvSpPr>
+          <p:cNvPr id="2" name="Title 1">
+            <a:extLst>
+              <a:ext uri="{FF2B5EF4-FFF2-40B4-BE49-F238E27FC236}">
+                <a16:creationId xmlns:a16="http://schemas.microsoft.com/office/drawing/2014/main" id="{E19C496A-CE83-B5EB-2C9B-03DDECAEB53C}"/>
+              </a:ext>
+            </a:extLst>
+          </p:cNvPr>
+          <p:cNvSpPr>
+            <a:spLocks noGrp="1"/>
+          </p:cNvSpPr>
+          <p:nvPr>
+            <p:ph type="ctrTitle"/>
+          </p:nvPr>
+        </p:nvSpPr>
+        <p:spPr>
+          <a:xfrm>
+            <a:off x="6991349" y="2571235"/>
+            <a:ext cx="5063801" cy="1715531"/>
+          </a:xfrm>
+        </p:spPr>
+        <p:txBody>
+          <a:bodyPr rtlCol="0"/>
+          <a:lstStyle/>
+          <a:p>
+            <a:pPr rtl="0"/>
+            <a:r>
+              <a:rPr lang="en-GB" dirty="0">
+                <a:solidFill>
+                  <a:schemeClr val="tx1"/>
+                </a:solidFill>
+              </a:rPr>
+              <a:t>SIMULATION RESULTS - Multiplier</a:t>
+            </a:r>
+          </a:p>
+        </p:txBody>
+      </p:sp>
+      <p:pic>
+        <p:nvPicPr>
+          <p:cNvPr id="3" name="Picture 2" descr="A purple text on a black background&#10;&#10;AI-generated content may be incorrect.">
+            <a:extLst>
+              <a:ext uri="{FF2B5EF4-FFF2-40B4-BE49-F238E27FC236}">
+                <a16:creationId xmlns:a16="http://schemas.microsoft.com/office/drawing/2014/main" id="{25EC3485-5910-7D03-7FF5-AA0D492EDCC9}"/>
+              </a:ext>
+            </a:extLst>
+          </p:cNvPr>
+          <p:cNvPicPr>
+            <a:picLocks noChangeAspect="1"/>
+          </p:cNvPicPr>
+          <p:nvPr/>
+        </p:nvPicPr>
+        <p:blipFill>
+          <a:blip r:embed="rId3"/>
+          <a:stretch>
+            <a:fillRect/>
+          </a:stretch>
+        </p:blipFill>
+        <p:spPr>
+          <a:xfrm>
+            <a:off x="65368" y="6100943"/>
+            <a:ext cx="2536261" cy="768487"/>
+          </a:xfrm>
+          <a:prstGeom prst="rect">
+            <a:avLst/>
+          </a:prstGeom>
+        </p:spPr>
+      </p:pic>
+      <p:sp>
+        <p:nvSpPr>
+          <p:cNvPr id="4" name="Slide Number Placeholder 5">
+            <a:extLst>
+              <a:ext uri="{FF2B5EF4-FFF2-40B4-BE49-F238E27FC236}">
+                <a16:creationId xmlns:a16="http://schemas.microsoft.com/office/drawing/2014/main" id="{17C511B7-38D9-A586-7FE5-5B08538DD8E4}"/>
+              </a:ext>
+            </a:extLst>
+          </p:cNvPr>
+          <p:cNvSpPr txBox="1">
+            <a:spLocks/>
+          </p:cNvSpPr>
+          <p:nvPr/>
+        </p:nvSpPr>
+        <p:spPr>
+          <a:xfrm>
+            <a:off x="8610600" y="6356350"/>
+            <a:ext cx="2743200" cy="365125"/>
+          </a:xfrm>
+          <a:prstGeom prst="rect">
+            <a:avLst/>
+          </a:prstGeom>
+        </p:spPr>
+        <p:txBody>
+          <a:bodyPr rtlCol="0"/>
+          <a:lstStyle>
+            <a:defPPr rtl="0">
+              <a:defRPr lang="en-GB"/>
+            </a:defPPr>
+            <a:lvl1pPr marL="0" algn="l" defTabSz="914400" rtl="0" eaLnBrk="1" latinLnBrk="0" hangingPunct="1">
+              <a:defRPr sz="1800" kern="1200">
+                <a:solidFill>
+                  <a:schemeClr val="tx1"/>
+                </a:solidFill>
+                <a:latin typeface="+mn-lt"/>
+                <a:ea typeface="+mn-ea"/>
+                <a:cs typeface="+mn-cs"/>
+              </a:defRPr>
+            </a:lvl1pPr>
+            <a:lvl2pPr marL="457200" algn="l" defTabSz="914400" rtl="0" eaLnBrk="1" latinLnBrk="0" hangingPunct="1">
+              <a:defRPr sz="1800" kern="1200">
+                <a:solidFill>
+                  <a:schemeClr val="tx1"/>
+                </a:solidFill>
+                <a:latin typeface="+mn-lt"/>
+                <a:ea typeface="+mn-ea"/>
+                <a:cs typeface="+mn-cs"/>
+              </a:defRPr>
+            </a:lvl2pPr>
+            <a:lvl3pPr marL="914400" algn="l" defTabSz="914400" rtl="0" eaLnBrk="1" latinLnBrk="0" hangingPunct="1">
+              <a:defRPr sz="1800" kern="1200">
+                <a:solidFill>
+                  <a:schemeClr val="tx1"/>
+                </a:solidFill>
+                <a:latin typeface="+mn-lt"/>
+                <a:ea typeface="+mn-ea"/>
+                <a:cs typeface="+mn-cs"/>
+              </a:defRPr>
+            </a:lvl3pPr>
+            <a:lvl4pPr marL="1371600" algn="l" defTabSz="914400" rtl="0" eaLnBrk="1" latinLnBrk="0" hangingPunct="1">
+              <a:defRPr sz="1800" kern="1200">
+                <a:solidFill>
+                  <a:schemeClr val="tx1"/>
+                </a:solidFill>
+                <a:latin typeface="+mn-lt"/>
+                <a:ea typeface="+mn-ea"/>
+                <a:cs typeface="+mn-cs"/>
+              </a:defRPr>
+            </a:lvl4pPr>
+            <a:lvl5pPr marL="1828800" algn="l" defTabSz="914400" rtl="0" eaLnBrk="1" latinLnBrk="0" hangingPunct="1">
+              <a:defRPr sz="1800" kern="1200">
+                <a:solidFill>
+                  <a:schemeClr val="tx1"/>
+                </a:solidFill>
+                <a:latin typeface="+mn-lt"/>
+                <a:ea typeface="+mn-ea"/>
+                <a:cs typeface="+mn-cs"/>
+              </a:defRPr>
+            </a:lvl5pPr>
+            <a:lvl6pPr marL="2286000" algn="l" defTabSz="914400" rtl="0" eaLnBrk="1" latinLnBrk="0" hangingPunct="1">
+              <a:defRPr sz="1800" kern="1200">
+                <a:solidFill>
+                  <a:schemeClr val="tx1"/>
+                </a:solidFill>
+                <a:latin typeface="+mn-lt"/>
+                <a:ea typeface="+mn-ea"/>
+                <a:cs typeface="+mn-cs"/>
+              </a:defRPr>
+            </a:lvl6pPr>
+            <a:lvl7pPr marL="2743200" algn="l" defTabSz="914400" rtl="0" eaLnBrk="1" latinLnBrk="0" hangingPunct="1">
+              <a:defRPr sz="1800" kern="1200">
+                <a:solidFill>
+                  <a:schemeClr val="tx1"/>
+                </a:solidFill>
+                <a:latin typeface="+mn-lt"/>
+                <a:ea typeface="+mn-ea"/>
+                <a:cs typeface="+mn-cs"/>
+              </a:defRPr>
+            </a:lvl7pPr>
+            <a:lvl8pPr marL="3200400" algn="l" defTabSz="914400" rtl="0" eaLnBrk="1" latinLnBrk="0" hangingPunct="1">
+              <a:defRPr sz="1800" kern="1200">
+                <a:solidFill>
+                  <a:schemeClr val="tx1"/>
+                </a:solidFill>
+                <a:latin typeface="+mn-lt"/>
+                <a:ea typeface="+mn-ea"/>
+                <a:cs typeface="+mn-cs"/>
+              </a:defRPr>
+            </a:lvl8pPr>
+            <a:lvl9pPr marL="3657600" algn="l" defTabSz="914400" rtl="0" eaLnBrk="1" latinLnBrk="0" hangingPunct="1">
+              <a:defRPr sz="1800" kern="1200">
+                <a:solidFill>
+                  <a:schemeClr val="tx1"/>
+                </a:solidFill>
+                <a:latin typeface="+mn-lt"/>
+                <a:ea typeface="+mn-ea"/>
+                <a:cs typeface="+mn-cs"/>
+              </a:defRPr>
+            </a:lvl9pPr>
+          </a:lstStyle>
+          <a:p>
+            <a:pPr algn="r"/>
+            <a:fld id="{B5CEABB6-07DC-46E8-9B57-56EC44A396E5}" type="slidenum">
+              <a:rPr lang="en-GB" sz="900" smtClean="0"/>
+              <a:pPr algn="r"/>
+              <a:t>9</a:t>
+            </a:fld>
+            <a:endParaRPr lang="en-GB" dirty="0"/>
+          </a:p>
+        </p:txBody>
+      </p:sp>
+    </p:spTree>
+    <p:extLst>
+      <p:ext uri="{BB962C8B-B14F-4D97-AF65-F5344CB8AC3E}">
+        <p14:creationId xmlns:p14="http://schemas.microsoft.com/office/powerpoint/2010/main" val="874077177"/>
       </p:ext>
     </p:extLst>
   </p:cSld>
@@ -24512,15 +24794,6 @@
 </file>
 
 <file path=customXml/item1.xml><?xml version="1.0" encoding="utf-8"?>
-<?mso-contentType ?>
-<FormTemplates xmlns="http://schemas.microsoft.com/sharepoint/v3/contenttype/forms">
-  <Display>DocumentLibraryForm</Display>
-  <Edit>DocumentLibraryForm</Edit>
-  <New>DocumentLibraryForm</New>
-</FormTemplates>
-</file>
-
-<file path=customXml/item2.xml><?xml version="1.0" encoding="utf-8"?>
 <p:properties xmlns:p="http://schemas.microsoft.com/office/2006/metadata/properties" xmlns:xsi="http://www.w3.org/2001/XMLSchema-instance" xmlns:pc="http://schemas.microsoft.com/office/infopath/2007/PartnerControls">
   <documentManagement>
     <_ip_UnifiedCompliancePolicyUIAction xmlns="http://schemas.microsoft.com/sharepoint/v3" xsi:nil="true"/>
@@ -24537,6 +24810,15 @@
     <MediaServiceKeyPoints xmlns="71af3243-3dd4-4a8d-8c0d-dd76da1f02a5" xsi:nil="true"/>
   </documentManagement>
 </p:properties>
+</file>
+
+<file path=customXml/item2.xml><?xml version="1.0" encoding="utf-8"?>
+<?mso-contentType ?>
+<FormTemplates xmlns="http://schemas.microsoft.com/sharepoint/v3/contenttype/forms">
+  <Display>DocumentLibraryForm</Display>
+  <Edit>DocumentLibraryForm</Edit>
+  <New>DocumentLibraryForm</New>
+</FormTemplates>
 </file>
 
 <file path=customXml/item3.xml><?xml version="1.0" encoding="utf-8"?>
@@ -24816,14 +25098,6 @@
 </file>
 
 <file path=customXml/itemProps1.xml><?xml version="1.0" encoding="utf-8"?>
-<ds:datastoreItem xmlns:ds="http://schemas.openxmlformats.org/officeDocument/2006/customXml" ds:itemID="{2D446390-8521-40A2-A462-EA068123BED9}">
-  <ds:schemaRefs>
-    <ds:schemaRef ds:uri="http://schemas.microsoft.com/sharepoint/v3/contenttype/forms"/>
-  </ds:schemaRefs>
-</ds:datastoreItem>
-</file>
-
-<file path=customXml/itemProps2.xml><?xml version="1.0" encoding="utf-8"?>
 <ds:datastoreItem xmlns:ds="http://schemas.openxmlformats.org/officeDocument/2006/customXml" ds:itemID="{B5BA3906-9696-4247-AC0D-DD5C26B2A70A}">
   <ds:schemaRefs>
     <ds:schemaRef ds:uri="http://schemas.microsoft.com/office/2006/metadata/properties"/>
@@ -24831,6 +25105,14 @@
     <ds:schemaRef ds:uri="http://schemas.microsoft.com/sharepoint/v3"/>
     <ds:schemaRef ds:uri="71af3243-3dd4-4a8d-8c0d-dd76da1f02a5"/>
     <ds:schemaRef ds:uri="230e9df3-be65-4c73-a93b-d1236ebd677e"/>
+  </ds:schemaRefs>
+</ds:datastoreItem>
+</file>
+
+<file path=customXml/itemProps2.xml><?xml version="1.0" encoding="utf-8"?>
+<ds:datastoreItem xmlns:ds="http://schemas.openxmlformats.org/officeDocument/2006/customXml" ds:itemID="{2D446390-8521-40A2-A462-EA068123BED9}">
+  <ds:schemaRefs>
+    <ds:schemaRef ds:uri="http://schemas.microsoft.com/sharepoint/v3/contenttype/forms"/>
   </ds:schemaRefs>
 </ds:datastoreItem>
 </file>

</xml_diff>

<commit_message>
[PublicEngagement] Completed slides for public engagement
</commit_message>
<xml_diff>
--- a/Documents/Public Engagement/PublicEngagementActivity.pptx
+++ b/Documents/Public Engagement/PublicEngagementActivity.pptx
@@ -837,38 +837,6 @@
           <a:bodyPr/>
           <a:lstStyle/>
           <a:p>
-            <a:r>
-              <a:rPr lang="en-US" dirty="0"/>
-              <a:t>So far, significant technical progress has been made.</a:t>
-            </a:r>
-            <a:br>
-              <a:rPr lang="en-US" dirty="0"/>
-            </a:br>
-            <a:r>
-              <a:rPr lang="en-US" dirty="0"/>
-              <a:t>We began by implementing and testing a pipelined MAC unit on FPGA, which serves as a benchmark to measure the improvements made by the approximate designs.</a:t>
-            </a:r>
-            <a:br>
-              <a:rPr lang="en-US" dirty="0"/>
-            </a:br>
-            <a:r>
-              <a:rPr lang="en-US" dirty="0"/>
-              <a:t>Following this, the conceptual design of the Approximate Arithmetic Unit Design (AAUD) was completed, and initial implementation of approximate multipliers and adders is underway.</a:t>
-            </a:r>
-            <a:br>
-              <a:rPr lang="en-US" dirty="0"/>
-            </a:br>
-            <a:r>
-              <a:rPr lang="en-US" dirty="0"/>
-              <a:t>Preliminary results show that the pipelined MAC unit achieves promising throughput and power efficiency.</a:t>
-            </a:r>
-            <a:br>
-              <a:rPr lang="en-US" dirty="0"/>
-            </a:br>
-            <a:r>
-              <a:rPr lang="en-US" dirty="0"/>
-              <a:t>However, we are continuously refining the design to fully integrate the approximation techniques for better performance.</a:t>
-            </a:r>
             <a:endParaRPr lang="en-GB" dirty="0"/>
           </a:p>
         </p:txBody>
@@ -972,38 +940,6 @@
           <a:bodyPr/>
           <a:lstStyle/>
           <a:p>
-            <a:r>
-              <a:rPr lang="en-US" dirty="0"/>
-              <a:t>So far, significant technical progress has been made.</a:t>
-            </a:r>
-            <a:br>
-              <a:rPr lang="en-US" dirty="0"/>
-            </a:br>
-            <a:r>
-              <a:rPr lang="en-US" dirty="0"/>
-              <a:t>We began by implementing and testing a pipelined MAC unit on FPGA, which serves as a benchmark to measure the improvements made by the approximate designs.</a:t>
-            </a:r>
-            <a:br>
-              <a:rPr lang="en-US" dirty="0"/>
-            </a:br>
-            <a:r>
-              <a:rPr lang="en-US" dirty="0"/>
-              <a:t>Following this, the conceptual design of the Approximate Arithmetic Unit Design (AAUD) was completed, and initial implementation of approximate multipliers and adders is underway.</a:t>
-            </a:r>
-            <a:br>
-              <a:rPr lang="en-US" dirty="0"/>
-            </a:br>
-            <a:r>
-              <a:rPr lang="en-US" dirty="0"/>
-              <a:t>Preliminary results show that the pipelined MAC unit achieves promising throughput and power efficiency.</a:t>
-            </a:r>
-            <a:br>
-              <a:rPr lang="en-US" dirty="0"/>
-            </a:br>
-            <a:r>
-              <a:rPr lang="en-US" dirty="0"/>
-              <a:t>However, we are continuously refining the design to fully integrate the approximation techniques for better performance.</a:t>
-            </a:r>
             <a:endParaRPr lang="en-GB" dirty="0"/>
           </a:p>
         </p:txBody>
@@ -1113,38 +1049,6 @@
           <a:bodyPr/>
           <a:lstStyle/>
           <a:p>
-            <a:r>
-              <a:rPr lang="en-US" dirty="0"/>
-              <a:t>So far, significant technical progress has been made.</a:t>
-            </a:r>
-            <a:br>
-              <a:rPr lang="en-US" dirty="0"/>
-            </a:br>
-            <a:r>
-              <a:rPr lang="en-US" dirty="0"/>
-              <a:t>We began by implementing and testing a pipelined MAC unit on FPGA, which serves as a benchmark to measure the improvements made by the approximate designs.</a:t>
-            </a:r>
-            <a:br>
-              <a:rPr lang="en-US" dirty="0"/>
-            </a:br>
-            <a:r>
-              <a:rPr lang="en-US" dirty="0"/>
-              <a:t>Following this, the conceptual design of the Approximate Arithmetic Unit Design (AAUD) was completed, and initial implementation of approximate multipliers and adders is underway.</a:t>
-            </a:r>
-            <a:br>
-              <a:rPr lang="en-US" dirty="0"/>
-            </a:br>
-            <a:r>
-              <a:rPr lang="en-US" dirty="0"/>
-              <a:t>Preliminary results show that the pipelined MAC unit achieves promising throughput and power efficiency.</a:t>
-            </a:r>
-            <a:br>
-              <a:rPr lang="en-US" dirty="0"/>
-            </a:br>
-            <a:r>
-              <a:rPr lang="en-US" dirty="0"/>
-              <a:t>However, we are continuously refining the design to fully integrate the approximation techniques for better performance.</a:t>
-            </a:r>
             <a:endParaRPr lang="en-GB" dirty="0"/>
           </a:p>
         </p:txBody>
@@ -1236,46 +1140,6 @@
           <a:bodyPr/>
           <a:lstStyle/>
           <a:p>
-            <a:r>
-              <a:rPr lang="en-US" dirty="0"/>
-              <a:t>The key finding so far is the trade-off between accuracy and efficiency.</a:t>
-            </a:r>
-            <a:br>
-              <a:rPr lang="en-US" dirty="0"/>
-            </a:br>
-            <a:r>
-              <a:rPr lang="en-US" dirty="0"/>
-              <a:t>By introducing controlled errors, we can significantly reduce power consumption and increase speed.</a:t>
-            </a:r>
-            <a:br>
-              <a:rPr lang="en-US" dirty="0"/>
-            </a:br>
-            <a:r>
-              <a:rPr lang="en-US" dirty="0"/>
-              <a:t>Fuzzy </a:t>
-            </a:r>
-            <a:r>
-              <a:rPr lang="en-US" dirty="0" err="1"/>
-              <a:t>memoization</a:t>
-            </a:r>
-            <a:r>
-              <a:rPr lang="en-US" dirty="0"/>
-              <a:t>, in particular, has shown great potential in reducing redundant calculations in image processing tasks.</a:t>
-            </a:r>
-            <a:br>
-              <a:rPr lang="en-US" dirty="0"/>
-            </a:br>
-            <a:r>
-              <a:rPr lang="en-US" dirty="0"/>
-              <a:t>The significance of this project lies in its ability to create scalable, energy-efficient arithmetic units.</a:t>
-            </a:r>
-            <a:br>
-              <a:rPr lang="en-US" dirty="0"/>
-            </a:br>
-            <a:r>
-              <a:rPr lang="en-US" dirty="0"/>
-              <a:t>It provides a solution to the limitations of traditional computing scaling methods and paves the way for more efficient digital systems.</a:t>
-            </a:r>
             <a:endParaRPr lang="en-GB" dirty="0"/>
           </a:p>
         </p:txBody>
@@ -1361,38 +1225,6 @@
           <a:bodyPr/>
           <a:lstStyle/>
           <a:p>
-            <a:r>
-              <a:rPr lang="en-US" dirty="0"/>
-              <a:t>Comparing the progress against the initial aims and objectives:</a:t>
-            </a:r>
-            <a:br>
-              <a:rPr lang="en-US" dirty="0"/>
-            </a:br>
-            <a:r>
-              <a:rPr lang="en-US" dirty="0"/>
-              <a:t>We have successfully established a benchmark with the pipelined MAC unit and completed the conceptual design of the AAUD.</a:t>
-            </a:r>
-            <a:br>
-              <a:rPr lang="en-US" dirty="0"/>
-            </a:br>
-            <a:r>
-              <a:rPr lang="en-US" dirty="0"/>
-              <a:t>Partial implementation of approximate multipliers and adders is ongoing, and initial results are promising.</a:t>
-            </a:r>
-            <a:br>
-              <a:rPr lang="en-US" dirty="0"/>
-            </a:br>
-            <a:r>
-              <a:rPr lang="en-US" dirty="0"/>
-              <a:t>However, we still need to complete the integration of all approximation techniques and conduct comprehensive testing for power, speed, and accuracy.</a:t>
-            </a:r>
-            <a:br>
-              <a:rPr lang="en-US" dirty="0"/>
-            </a:br>
-            <a:r>
-              <a:rPr lang="en-US" dirty="0"/>
-              <a:t>This comparison helps us identify gaps and guides our next steps to achieve the project’s full potential.</a:t>
-            </a:r>
             <a:endParaRPr lang="en-GB" dirty="0"/>
           </a:p>
         </p:txBody>
@@ -1496,59 +1328,6 @@
           <a:bodyPr/>
           <a:lstStyle/>
           <a:p>
-            <a:r>
-              <a:rPr lang="en-US" dirty="0"/>
-              <a:t>The primary aim of this project is to design and implement a 32-bit Multiply-Accumulate (MAC) unit using approximate computing techniques for integration into a RISC-V SoC.</a:t>
-            </a:r>
-            <a:br>
-              <a:rPr lang="en-US" dirty="0"/>
-            </a:br>
-            <a:r>
-              <a:rPr lang="en-US" dirty="0"/>
-              <a:t>To achieve this, the project follows several specific objectives:</a:t>
-            </a:r>
-          </a:p>
-          <a:p>
-            <a:pPr>
-              <a:buFont typeface="+mj-lt"/>
-              <a:buAutoNum type="arabicPeriod"/>
-            </a:pPr>
-            <a:r>
-              <a:rPr lang="en-US" dirty="0"/>
-              <a:t>Conduct a comprehensive literature review to select suitable approximation methods.</a:t>
-            </a:r>
-          </a:p>
-          <a:p>
-            <a:pPr>
-              <a:buFont typeface="+mj-lt"/>
-              <a:buAutoNum type="arabicPeriod"/>
-            </a:pPr>
-            <a:r>
-              <a:rPr lang="en-US" dirty="0"/>
-              <a:t>Design and simulate the MAC unit using Verilog and test it on FPGA hardware.</a:t>
-            </a:r>
-          </a:p>
-          <a:p>
-            <a:pPr>
-              <a:buFont typeface="+mj-lt"/>
-              <a:buAutoNum type="arabicPeriod"/>
-            </a:pPr>
-            <a:r>
-              <a:rPr lang="en-US" dirty="0"/>
-              <a:t>Integrate the MAC unit into the RISC-V SoC framework, ensuring compatibility and functionality.</a:t>
-            </a:r>
-          </a:p>
-          <a:p>
-            <a:pPr>
-              <a:buFont typeface="+mj-lt"/>
-              <a:buAutoNum type="arabicPeriod"/>
-            </a:pPr>
-            <a:r>
-              <a:rPr lang="en-US" dirty="0"/>
-              <a:t>Finally, evaluate its performance, power consumption, and accuracy against traditional designs to measure the trade-off between efficiency and precision.</a:t>
-            </a:r>
-          </a:p>
-          <a:p>
             <a:endParaRPr lang="en-GB" dirty="0"/>
           </a:p>
         </p:txBody>
@@ -1640,31 +1419,6 @@
           <a:bodyPr/>
           <a:lstStyle/>
           <a:p>
-            <a:r>
-              <a:rPr lang="en-US" dirty="0"/>
-              <a:t>In conclusion, approximate computing offers a strategic solution to the growing demands for high-performance and energy-efficient computing.</a:t>
-            </a:r>
-            <a:br>
-              <a:rPr lang="en-US" dirty="0"/>
-            </a:br>
-            <a:r>
-              <a:rPr lang="en-US" dirty="0"/>
-              <a:t>By allowing controlled inaccuracies, it balances efficiency with acceptable error rates, making it ideal for error-tolerant applications like image processing.</a:t>
-            </a:r>
-            <a:br>
-              <a:rPr lang="en-US" dirty="0"/>
-            </a:br>
-            <a:r>
-              <a:rPr lang="en-US" dirty="0"/>
-              <a:t>This project demonstrates the potential of integrating approximate arithmetic units into RISC-V SoC, significantly improving performance and power efficiency.</a:t>
-            </a:r>
-            <a:br>
-              <a:rPr lang="en-US" dirty="0"/>
-            </a:br>
-            <a:r>
-              <a:rPr lang="en-US" dirty="0"/>
-              <a:t>Moving forward, the successful implementation and testing of this design could pave the way for a new generation of energy-efficient digital systems.</a:t>
-            </a:r>
             <a:endParaRPr lang="en-GB" dirty="0"/>
           </a:p>
         </p:txBody>
@@ -1750,43 +1504,6 @@
           <a:bodyPr/>
           <a:lstStyle/>
           <a:p>
-            <a:r>
-              <a:rPr lang="en-US" dirty="0"/>
-              <a:t>Hello,</a:t>
-            </a:r>
-            <a:br>
-              <a:rPr lang="en-US" dirty="0"/>
-            </a:br>
-            <a:r>
-              <a:rPr lang="en-US" dirty="0"/>
-              <a:t>My name is Amaan </a:t>
-            </a:r>
-            <a:r>
-              <a:rPr lang="en-US" dirty="0" err="1"/>
-              <a:t>Mujawar</a:t>
-            </a:r>
-            <a:r>
-              <a:rPr lang="en-US" dirty="0"/>
-              <a:t>, and today I’ll be presenting my project titled </a:t>
-            </a:r>
-            <a:r>
-              <a:rPr lang="en-US" b="1" dirty="0"/>
-              <a:t>"Implement an Arithmetic Unit Utilizing Approximate Computing into RISC-V SoC."</a:t>
-            </a:r>
-            <a:br>
-              <a:rPr lang="en-US" dirty="0"/>
-            </a:br>
-            <a:r>
-              <a:rPr lang="en-US" dirty="0"/>
-              <a:t>This project is supervised by Mr. Neil Powell and is part of my work at the University of Sheffield in the Department of Electronics and Electrical Engineering.</a:t>
-            </a:r>
-            <a:br>
-              <a:rPr lang="en-US" dirty="0"/>
-            </a:br>
-            <a:r>
-              <a:rPr lang="en-US" dirty="0"/>
-              <a:t>I’ll be discussing the background, motivation, progress, and future directions of this project.</a:t>
-            </a:r>
             <a:endParaRPr lang="en-GB" dirty="0"/>
           </a:p>
         </p:txBody>
@@ -1872,38 +1589,6 @@
           <a:bodyPr/>
           <a:lstStyle/>
           <a:p>
-            <a:r>
-              <a:rPr lang="en-US" dirty="0"/>
-              <a:t>Approximate computing is an emerging technique that allows a small degree of error in computations to reduce power consumption and execution time.</a:t>
-            </a:r>
-            <a:br>
-              <a:rPr lang="en-US" dirty="0"/>
-            </a:br>
-            <a:r>
-              <a:rPr lang="en-US" dirty="0"/>
-              <a:t>This approach is especially relevant today as the demand for high-performance computing grows rapidly in fields like machine learning, computer vision, and multimedia processing.</a:t>
-            </a:r>
-            <a:br>
-              <a:rPr lang="en-US" dirty="0"/>
-            </a:br>
-            <a:r>
-              <a:rPr lang="en-US" dirty="0"/>
-              <a:t>However, traditional methods are limited by the slowing of Moore's Law, which states that the number of transistors on a chip doubles every two years.</a:t>
-            </a:r>
-            <a:br>
-              <a:rPr lang="en-US" dirty="0"/>
-            </a:br>
-            <a:r>
-              <a:rPr lang="en-US" dirty="0"/>
-              <a:t>As this trend slows, new approaches are needed to achieve performance and energy efficiency gains.</a:t>
-            </a:r>
-            <a:br>
-              <a:rPr lang="en-US" dirty="0"/>
-            </a:br>
-            <a:r>
-              <a:rPr lang="en-US" dirty="0"/>
-              <a:t>Approximate computing offers a solution by introducing controlled errors in non-critical computations, making it ideal for error-tolerant applications like image processing.</a:t>
-            </a:r>
             <a:endParaRPr lang="en-GB" dirty="0"/>
           </a:p>
         </p:txBody>
@@ -2007,78 +1692,6 @@
           <a:bodyPr/>
           <a:lstStyle/>
           <a:p>
-            <a:r>
-              <a:rPr lang="en-US" dirty="0"/>
-              <a:t>This project specifically addresses the challenge of balancing accuracy, power consumption, and speed in arithmetic units.</a:t>
-            </a:r>
-            <a:br>
-              <a:rPr lang="en-US" dirty="0"/>
-            </a:br>
-            <a:r>
-              <a:rPr lang="en-US" dirty="0"/>
-              <a:t>In this context, we’re using the Nexys-A7 FPGA and Xilinx Vivado Design Suite for simulations and testing.</a:t>
-            </a:r>
-            <a:br>
-              <a:rPr lang="en-US" dirty="0"/>
-            </a:br>
-            <a:r>
-              <a:rPr lang="en-US" dirty="0"/>
-              <a:t>The goal is to achieve enhanced computational efficiency while maintaining minimal accuracy loss.</a:t>
-            </a:r>
-            <a:br>
-              <a:rPr lang="en-US" dirty="0"/>
-            </a:br>
-            <a:r>
-              <a:rPr lang="en-US" dirty="0"/>
-              <a:t>To do this, we are implementing three key techniques:</a:t>
-            </a:r>
-          </a:p>
-          <a:p>
-            <a:pPr>
-              <a:buFont typeface="+mj-lt"/>
-              <a:buAutoNum type="arabicPeriod"/>
-            </a:pPr>
-            <a:r>
-              <a:rPr lang="en-US" dirty="0"/>
-              <a:t>Lower-Part OR-based Approximate Multipliers for faster partial product calculations.</a:t>
-            </a:r>
-          </a:p>
-          <a:p>
-            <a:pPr>
-              <a:buFont typeface="+mj-lt"/>
-              <a:buAutoNum type="arabicPeriod"/>
-            </a:pPr>
-            <a:r>
-              <a:rPr lang="en-US" dirty="0"/>
-              <a:t>Approximate Adders to accumulate results efficiently.</a:t>
-            </a:r>
-          </a:p>
-          <a:p>
-            <a:pPr>
-              <a:buFont typeface="+mj-lt"/>
-              <a:buAutoNum type="arabicPeriod"/>
-            </a:pPr>
-            <a:r>
-              <a:rPr lang="en-US" dirty="0"/>
-              <a:t>Fuzzy </a:t>
-            </a:r>
-            <a:r>
-              <a:rPr lang="en-US" dirty="0" err="1"/>
-              <a:t>Memoization</a:t>
-            </a:r>
-            <a:r>
-              <a:rPr lang="en-US" dirty="0"/>
-              <a:t> to cache and reuse results in repetitive calculations, reducing redundant computations.</a:t>
-            </a:r>
-            <a:br>
-              <a:rPr lang="en-US" dirty="0"/>
-            </a:br>
-            <a:r>
-              <a:rPr lang="en-US" dirty="0"/>
-              <a:t>Together, these techniques form a powerful combination for building efficient, error-tolerant arithmetic units.</a:t>
-            </a:r>
-          </a:p>
-          <a:p>
             <a:endParaRPr lang="en-GB" dirty="0"/>
           </a:p>
         </p:txBody>
@@ -2171,38 +1784,6 @@
           <a:lstStyle/>
           <a:p>
             <a:pPr rtl="0"/>
-            <a:r>
-              <a:rPr lang="en-US" dirty="0"/>
-              <a:t>One of the biggest challenges in modern computing is balancing performance with power consumption.</a:t>
-            </a:r>
-            <a:br>
-              <a:rPr lang="en-US" dirty="0"/>
-            </a:br>
-            <a:r>
-              <a:rPr lang="en-US" dirty="0"/>
-              <a:t>Traditional precise computation methods require significant power and resources, making them less efficient for data-intensive tasks.</a:t>
-            </a:r>
-            <a:br>
-              <a:rPr lang="en-US" dirty="0"/>
-            </a:br>
-            <a:r>
-              <a:rPr lang="en-US" dirty="0"/>
-              <a:t>Approximate computing addresses this by allowing minor inaccuracies, leading to faster computations with lower power consumption.</a:t>
-            </a:r>
-            <a:br>
-              <a:rPr lang="en-US" dirty="0"/>
-            </a:br>
-            <a:r>
-              <a:rPr lang="en-US" dirty="0"/>
-              <a:t>This makes it especially useful for tasks where perfect accuracy is not necessary, like image and video processing, where slight inaccuracies are imperceptible to the human eye.</a:t>
-            </a:r>
-            <a:br>
-              <a:rPr lang="en-US" dirty="0"/>
-            </a:br>
-            <a:r>
-              <a:rPr lang="en-US" dirty="0"/>
-              <a:t>By leveraging this, the project aims to design a highly efficient arithmetic unit for a RISC-V System on Chip.</a:t>
-            </a:r>
             <a:endParaRPr lang="en-GB" dirty="0"/>
           </a:p>
         </p:txBody>
@@ -2288,59 +1869,6 @@
           <a:bodyPr/>
           <a:lstStyle/>
           <a:p>
-            <a:r>
-              <a:rPr lang="en-US" dirty="0"/>
-              <a:t>The primary aim of this project is to design and implement a 32-bit Multiply-Accumulate (MAC) unit using approximate computing techniques for integration into a RISC-V SoC.</a:t>
-            </a:r>
-            <a:br>
-              <a:rPr lang="en-US" dirty="0"/>
-            </a:br>
-            <a:r>
-              <a:rPr lang="en-US" dirty="0"/>
-              <a:t>To achieve this, the project follows several specific objectives:</a:t>
-            </a:r>
-          </a:p>
-          <a:p>
-            <a:pPr>
-              <a:buFont typeface="+mj-lt"/>
-              <a:buAutoNum type="arabicPeriod"/>
-            </a:pPr>
-            <a:r>
-              <a:rPr lang="en-US" dirty="0"/>
-              <a:t>Conduct a comprehensive literature review to select suitable approximation methods.</a:t>
-            </a:r>
-          </a:p>
-          <a:p>
-            <a:pPr>
-              <a:buFont typeface="+mj-lt"/>
-              <a:buAutoNum type="arabicPeriod"/>
-            </a:pPr>
-            <a:r>
-              <a:rPr lang="en-US" dirty="0"/>
-              <a:t>Design and simulate the MAC unit using Verilog and test it on FPGA hardware.</a:t>
-            </a:r>
-          </a:p>
-          <a:p>
-            <a:pPr>
-              <a:buFont typeface="+mj-lt"/>
-              <a:buAutoNum type="arabicPeriod"/>
-            </a:pPr>
-            <a:r>
-              <a:rPr lang="en-US" dirty="0"/>
-              <a:t>Integrate the MAC unit into the RISC-V SoC framework, ensuring compatibility and functionality.</a:t>
-            </a:r>
-          </a:p>
-          <a:p>
-            <a:pPr>
-              <a:buFont typeface="+mj-lt"/>
-              <a:buAutoNum type="arabicPeriod"/>
-            </a:pPr>
-            <a:r>
-              <a:rPr lang="en-US" dirty="0"/>
-              <a:t>Finally, evaluate its performance, power consumption, and accuracy against traditional designs to measure the trade-off between efficiency and precision.</a:t>
-            </a:r>
-          </a:p>
-          <a:p>
             <a:endParaRPr lang="en-GB" dirty="0"/>
           </a:p>
         </p:txBody>
@@ -2425,78 +1953,6 @@
         <p:txBody>
           <a:bodyPr/>
           <a:lstStyle/>
-          <a:p>
-            <a:r>
-              <a:rPr lang="en-US" dirty="0"/>
-              <a:t>This project specifically addresses the challenge of balancing accuracy, power consumption, and speed in arithmetic units.</a:t>
-            </a:r>
-            <a:br>
-              <a:rPr lang="en-US" dirty="0"/>
-            </a:br>
-            <a:r>
-              <a:rPr lang="en-US" dirty="0"/>
-              <a:t>In this context, we’re using the Nexys-A7 FPGA and Xilinx Vivado Design Suite for simulations and testing.</a:t>
-            </a:r>
-            <a:br>
-              <a:rPr lang="en-US" dirty="0"/>
-            </a:br>
-            <a:r>
-              <a:rPr lang="en-US" dirty="0"/>
-              <a:t>The goal is to achieve enhanced computational efficiency while maintaining minimal accuracy loss.</a:t>
-            </a:r>
-            <a:br>
-              <a:rPr lang="en-US" dirty="0"/>
-            </a:br>
-            <a:r>
-              <a:rPr lang="en-US" dirty="0"/>
-              <a:t>To do this, we are implementing three key techniques:</a:t>
-            </a:r>
-          </a:p>
-          <a:p>
-            <a:pPr>
-              <a:buFont typeface="+mj-lt"/>
-              <a:buAutoNum type="arabicPeriod"/>
-            </a:pPr>
-            <a:r>
-              <a:rPr lang="en-US" dirty="0"/>
-              <a:t>Lower-Part OR-based Approximate Multipliers for faster partial product calculations.</a:t>
-            </a:r>
-          </a:p>
-          <a:p>
-            <a:pPr>
-              <a:buFont typeface="+mj-lt"/>
-              <a:buAutoNum type="arabicPeriod"/>
-            </a:pPr>
-            <a:r>
-              <a:rPr lang="en-US" dirty="0"/>
-              <a:t>Approximate Adders to accumulate results efficiently.</a:t>
-            </a:r>
-          </a:p>
-          <a:p>
-            <a:pPr>
-              <a:buFont typeface="+mj-lt"/>
-              <a:buAutoNum type="arabicPeriod"/>
-            </a:pPr>
-            <a:r>
-              <a:rPr lang="en-US" dirty="0"/>
-              <a:t>Fuzzy </a:t>
-            </a:r>
-            <a:r>
-              <a:rPr lang="en-US" dirty="0" err="1"/>
-              <a:t>Memoization</a:t>
-            </a:r>
-            <a:r>
-              <a:rPr lang="en-US" dirty="0"/>
-              <a:t> to cache and reuse results in repetitive calculations, reducing redundant computations.</a:t>
-            </a:r>
-            <a:br>
-              <a:rPr lang="en-US" dirty="0"/>
-            </a:br>
-            <a:r>
-              <a:rPr lang="en-US" dirty="0"/>
-              <a:t>Together, these techniques form a powerful combination for building efficient, error-tolerant arithmetic units.</a:t>
-            </a:r>
-          </a:p>
           <a:p>
             <a:endParaRPr lang="en-GB" dirty="0"/>
           </a:p>
@@ -2601,38 +2057,6 @@
           <a:bodyPr/>
           <a:lstStyle/>
           <a:p>
-            <a:r>
-              <a:rPr lang="en-US" dirty="0"/>
-              <a:t>So far, significant technical progress has been made.</a:t>
-            </a:r>
-            <a:br>
-              <a:rPr lang="en-US" dirty="0"/>
-            </a:br>
-            <a:r>
-              <a:rPr lang="en-US" dirty="0"/>
-              <a:t>We began by implementing and testing a pipelined MAC unit on FPGA, which serves as a benchmark to measure the improvements made by the approximate designs.</a:t>
-            </a:r>
-            <a:br>
-              <a:rPr lang="en-US" dirty="0"/>
-            </a:br>
-            <a:r>
-              <a:rPr lang="en-US" dirty="0"/>
-              <a:t>Following this, the conceptual design of the Approximate Arithmetic Unit Design (AAUD) was completed, and initial implementation of approximate multipliers and adders is underway.</a:t>
-            </a:r>
-            <a:br>
-              <a:rPr lang="en-US" dirty="0"/>
-            </a:br>
-            <a:r>
-              <a:rPr lang="en-US" dirty="0"/>
-              <a:t>Preliminary results show that the pipelined MAC unit achieves promising throughput and power efficiency.</a:t>
-            </a:r>
-            <a:br>
-              <a:rPr lang="en-US" dirty="0"/>
-            </a:br>
-            <a:r>
-              <a:rPr lang="en-US" dirty="0"/>
-              <a:t>However, we are continuously refining the design to fully integrate the approximation techniques for better performance.</a:t>
-            </a:r>
             <a:endParaRPr lang="en-GB" dirty="0"/>
           </a:p>
         </p:txBody>
@@ -2742,38 +2166,6 @@
           <a:bodyPr/>
           <a:lstStyle/>
           <a:p>
-            <a:r>
-              <a:rPr lang="en-US" dirty="0"/>
-              <a:t>So far, significant technical progress has been made.</a:t>
-            </a:r>
-            <a:br>
-              <a:rPr lang="en-US" dirty="0"/>
-            </a:br>
-            <a:r>
-              <a:rPr lang="en-US" dirty="0"/>
-              <a:t>We began by implementing and testing a pipelined MAC unit on FPGA, which serves as a benchmark to measure the improvements made by the approximate designs.</a:t>
-            </a:r>
-            <a:br>
-              <a:rPr lang="en-US" dirty="0"/>
-            </a:br>
-            <a:r>
-              <a:rPr lang="en-US" dirty="0"/>
-              <a:t>Following this, the conceptual design of the Approximate Arithmetic Unit Design (AAUD) was completed, and initial implementation of approximate multipliers and adders is underway.</a:t>
-            </a:r>
-            <a:br>
-              <a:rPr lang="en-US" dirty="0"/>
-            </a:br>
-            <a:r>
-              <a:rPr lang="en-US" dirty="0"/>
-              <a:t>Preliminary results show that the pipelined MAC unit achieves promising throughput and power efficiency.</a:t>
-            </a:r>
-            <a:br>
-              <a:rPr lang="en-US" dirty="0"/>
-            </a:br>
-            <a:r>
-              <a:rPr lang="en-US" dirty="0"/>
-              <a:t>However, we are continuously refining the design to fully integrate the approximation techniques for better performance.</a:t>
-            </a:r>
             <a:endParaRPr lang="en-GB" dirty="0"/>
           </a:p>
         </p:txBody>
@@ -18105,7 +17497,7 @@
         </p:nvSpPr>
         <p:spPr>
           <a:xfrm>
-            <a:off x="6991350" y="2571235"/>
+            <a:off x="7892415" y="136525"/>
             <a:ext cx="4179570" cy="1715531"/>
           </a:xfrm>
         </p:spPr>
@@ -18286,6 +17678,66 @@
           </a:p>
         </p:txBody>
       </p:sp>
+      <p:pic>
+        <p:nvPicPr>
+          <p:cNvPr id="5" name="Picture 4">
+            <a:extLst>
+              <a:ext uri="{FF2B5EF4-FFF2-40B4-BE49-F238E27FC236}">
+                <a16:creationId xmlns:a16="http://schemas.microsoft.com/office/drawing/2014/main" id="{CE578871-F038-D8F3-7FDA-F6AD6D1A20B6}"/>
+              </a:ext>
+            </a:extLst>
+          </p:cNvPr>
+          <p:cNvPicPr>
+            <a:picLocks noChangeAspect="1"/>
+          </p:cNvPicPr>
+          <p:nvPr/>
+        </p:nvPicPr>
+        <p:blipFill>
+          <a:blip r:embed="rId4"/>
+          <a:stretch>
+            <a:fillRect/>
+          </a:stretch>
+        </p:blipFill>
+        <p:spPr>
+          <a:xfrm>
+            <a:off x="120014" y="546847"/>
+            <a:ext cx="6205083" cy="5359176"/>
+          </a:xfrm>
+          <a:prstGeom prst="rect">
+            <a:avLst/>
+          </a:prstGeom>
+        </p:spPr>
+      </p:pic>
+      <p:pic>
+        <p:nvPicPr>
+          <p:cNvPr id="6" name="Picture 5">
+            <a:extLst>
+              <a:ext uri="{FF2B5EF4-FFF2-40B4-BE49-F238E27FC236}">
+                <a16:creationId xmlns:a16="http://schemas.microsoft.com/office/drawing/2014/main" id="{3AE45B8B-09BE-E998-CBE0-C4E039118964}"/>
+              </a:ext>
+            </a:extLst>
+          </p:cNvPr>
+          <p:cNvPicPr>
+            <a:picLocks noChangeAspect="1"/>
+          </p:cNvPicPr>
+          <p:nvPr/>
+        </p:nvPicPr>
+        <p:blipFill>
+          <a:blip r:embed="rId5"/>
+          <a:stretch>
+            <a:fillRect/>
+          </a:stretch>
+        </p:blipFill>
+        <p:spPr>
+          <a:xfrm>
+            <a:off x="6624284" y="1744553"/>
+            <a:ext cx="2743199" cy="4115349"/>
+          </a:xfrm>
+          <a:prstGeom prst="rect">
+            <a:avLst/>
+          </a:prstGeom>
+        </p:spPr>
+      </p:pic>
     </p:spTree>
     <p:extLst>
       <p:ext uri="{BB962C8B-B14F-4D97-AF65-F5344CB8AC3E}">
@@ -18348,7 +17800,7 @@
         </p:nvSpPr>
         <p:spPr>
           <a:xfrm>
-            <a:off x="6991350" y="2571235"/>
+            <a:off x="7892415" y="136525"/>
             <a:ext cx="4179570" cy="1715531"/>
           </a:xfrm>
         </p:spPr>
@@ -18529,6 +17981,66 @@
           </a:p>
         </p:txBody>
       </p:sp>
+      <p:pic>
+        <p:nvPicPr>
+          <p:cNvPr id="5" name="Picture 4">
+            <a:extLst>
+              <a:ext uri="{FF2B5EF4-FFF2-40B4-BE49-F238E27FC236}">
+                <a16:creationId xmlns:a16="http://schemas.microsoft.com/office/drawing/2014/main" id="{3FAB8B14-2BA2-3206-471B-743908C86D34}"/>
+              </a:ext>
+            </a:extLst>
+          </p:cNvPr>
+          <p:cNvPicPr>
+            <a:picLocks noChangeAspect="1"/>
+          </p:cNvPicPr>
+          <p:nvPr/>
+        </p:nvPicPr>
+        <p:blipFill>
+          <a:blip r:embed="rId4"/>
+          <a:stretch>
+            <a:fillRect/>
+          </a:stretch>
+        </p:blipFill>
+        <p:spPr>
+          <a:xfrm>
+            <a:off x="120015" y="230205"/>
+            <a:ext cx="5339491" cy="5682907"/>
+          </a:xfrm>
+          <a:prstGeom prst="rect">
+            <a:avLst/>
+          </a:prstGeom>
+        </p:spPr>
+      </p:pic>
+      <p:pic>
+        <p:nvPicPr>
+          <p:cNvPr id="6" name="Picture 5">
+            <a:extLst>
+              <a:ext uri="{FF2B5EF4-FFF2-40B4-BE49-F238E27FC236}">
+                <a16:creationId xmlns:a16="http://schemas.microsoft.com/office/drawing/2014/main" id="{533E9813-1C50-61FF-6FB1-F7640A3F9696}"/>
+              </a:ext>
+            </a:extLst>
+          </p:cNvPr>
+          <p:cNvPicPr>
+            <a:picLocks noChangeAspect="1"/>
+          </p:cNvPicPr>
+          <p:nvPr/>
+        </p:nvPicPr>
+        <p:blipFill>
+          <a:blip r:embed="rId5"/>
+          <a:stretch>
+            <a:fillRect/>
+          </a:stretch>
+        </p:blipFill>
+        <p:spPr>
+          <a:xfrm>
+            <a:off x="5737103" y="1619260"/>
+            <a:ext cx="1877714" cy="4293852"/>
+          </a:xfrm>
+          <a:prstGeom prst="rect">
+            <a:avLst/>
+          </a:prstGeom>
+        </p:spPr>
+      </p:pic>
     </p:spTree>
     <p:extLst>
       <p:ext uri="{BB962C8B-B14F-4D97-AF65-F5344CB8AC3E}">
@@ -23746,6 +23258,36 @@
           </a:p>
         </p:txBody>
       </p:sp>
+      <p:pic>
+        <p:nvPicPr>
+          <p:cNvPr id="5" name="Picture 4">
+            <a:extLst>
+              <a:ext uri="{FF2B5EF4-FFF2-40B4-BE49-F238E27FC236}">
+                <a16:creationId xmlns:a16="http://schemas.microsoft.com/office/drawing/2014/main" id="{0CD57759-D313-A92B-F119-E8EDBD761E3C}"/>
+              </a:ext>
+            </a:extLst>
+          </p:cNvPr>
+          <p:cNvPicPr>
+            <a:picLocks noChangeAspect="1"/>
+          </p:cNvPicPr>
+          <p:nvPr/>
+        </p:nvPicPr>
+        <p:blipFill>
+          <a:blip r:embed="rId4"/>
+          <a:stretch>
+            <a:fillRect/>
+          </a:stretch>
+        </p:blipFill>
+        <p:spPr>
+          <a:xfrm>
+            <a:off x="23021" y="864216"/>
+            <a:ext cx="12145958" cy="1285966"/>
+          </a:xfrm>
+          <a:prstGeom prst="rect">
+            <a:avLst/>
+          </a:prstGeom>
+        </p:spPr>
+      </p:pic>
     </p:spTree>
     <p:extLst>
       <p:ext uri="{BB962C8B-B14F-4D97-AF65-F5344CB8AC3E}">
@@ -23989,6 +23531,36 @@
           </a:p>
         </p:txBody>
       </p:sp>
+      <p:pic>
+        <p:nvPicPr>
+          <p:cNvPr id="5" name="Picture 4">
+            <a:extLst>
+              <a:ext uri="{FF2B5EF4-FFF2-40B4-BE49-F238E27FC236}">
+                <a16:creationId xmlns:a16="http://schemas.microsoft.com/office/drawing/2014/main" id="{086190A1-15C5-955E-EE8A-7F174371A61E}"/>
+              </a:ext>
+            </a:extLst>
+          </p:cNvPr>
+          <p:cNvPicPr>
+            <a:picLocks noChangeAspect="1"/>
+          </p:cNvPicPr>
+          <p:nvPr/>
+        </p:nvPicPr>
+        <p:blipFill>
+          <a:blip r:embed="rId4"/>
+          <a:stretch>
+            <a:fillRect/>
+          </a:stretch>
+        </p:blipFill>
+        <p:spPr>
+          <a:xfrm>
+            <a:off x="62753" y="997012"/>
+            <a:ext cx="12129247" cy="982262"/>
+          </a:xfrm>
+          <a:prstGeom prst="rect">
+            <a:avLst/>
+          </a:prstGeom>
+        </p:spPr>
+      </p:pic>
     </p:spTree>
     <p:extLst>
       <p:ext uri="{BB962C8B-B14F-4D97-AF65-F5344CB8AC3E}">
@@ -24794,6 +24366,15 @@
 </file>
 
 <file path=customXml/item1.xml><?xml version="1.0" encoding="utf-8"?>
+<?mso-contentType ?>
+<FormTemplates xmlns="http://schemas.microsoft.com/sharepoint/v3/contenttype/forms">
+  <Display>DocumentLibraryForm</Display>
+  <Edit>DocumentLibraryForm</Edit>
+  <New>DocumentLibraryForm</New>
+</FormTemplates>
+</file>
+
+<file path=customXml/item2.xml><?xml version="1.0" encoding="utf-8"?>
 <p:properties xmlns:p="http://schemas.microsoft.com/office/2006/metadata/properties" xmlns:xsi="http://www.w3.org/2001/XMLSchema-instance" xmlns:pc="http://schemas.microsoft.com/office/infopath/2007/PartnerControls">
   <documentManagement>
     <_ip_UnifiedCompliancePolicyUIAction xmlns="http://schemas.microsoft.com/sharepoint/v3" xsi:nil="true"/>
@@ -24810,15 +24391,6 @@
     <MediaServiceKeyPoints xmlns="71af3243-3dd4-4a8d-8c0d-dd76da1f02a5" xsi:nil="true"/>
   </documentManagement>
 </p:properties>
-</file>
-
-<file path=customXml/item2.xml><?xml version="1.0" encoding="utf-8"?>
-<?mso-contentType ?>
-<FormTemplates xmlns="http://schemas.microsoft.com/sharepoint/v3/contenttype/forms">
-  <Display>DocumentLibraryForm</Display>
-  <Edit>DocumentLibraryForm</Edit>
-  <New>DocumentLibraryForm</New>
-</FormTemplates>
 </file>
 
 <file path=customXml/item3.xml><?xml version="1.0" encoding="utf-8"?>
@@ -25098,6 +24670,14 @@
 </file>
 
 <file path=customXml/itemProps1.xml><?xml version="1.0" encoding="utf-8"?>
+<ds:datastoreItem xmlns:ds="http://schemas.openxmlformats.org/officeDocument/2006/customXml" ds:itemID="{2D446390-8521-40A2-A462-EA068123BED9}">
+  <ds:schemaRefs>
+    <ds:schemaRef ds:uri="http://schemas.microsoft.com/sharepoint/v3/contenttype/forms"/>
+  </ds:schemaRefs>
+</ds:datastoreItem>
+</file>
+
+<file path=customXml/itemProps2.xml><?xml version="1.0" encoding="utf-8"?>
 <ds:datastoreItem xmlns:ds="http://schemas.openxmlformats.org/officeDocument/2006/customXml" ds:itemID="{B5BA3906-9696-4247-AC0D-DD5C26B2A70A}">
   <ds:schemaRefs>
     <ds:schemaRef ds:uri="http://schemas.microsoft.com/office/2006/metadata/properties"/>
@@ -25105,14 +24685,6 @@
     <ds:schemaRef ds:uri="http://schemas.microsoft.com/sharepoint/v3"/>
     <ds:schemaRef ds:uri="71af3243-3dd4-4a8d-8c0d-dd76da1f02a5"/>
     <ds:schemaRef ds:uri="230e9df3-be65-4c73-a93b-d1236ebd677e"/>
-  </ds:schemaRefs>
-</ds:datastoreItem>
-</file>
-
-<file path=customXml/itemProps2.xml><?xml version="1.0" encoding="utf-8"?>
-<ds:datastoreItem xmlns:ds="http://schemas.openxmlformats.org/officeDocument/2006/customXml" ds:itemID="{2D446390-8521-40A2-A462-EA068123BED9}">
-  <ds:schemaRefs>
-    <ds:schemaRef ds:uri="http://schemas.microsoft.com/sharepoint/v3/contenttype/forms"/>
   </ds:schemaRefs>
 </ds:datastoreItem>
 </file>

</xml_diff>

<commit_message>
[PublicEngagement] Added speaker notes to presentation
</commit_message>
<xml_diff>
--- a/Documents/Public Engagement/PublicEngagementActivity.pptx
+++ b/Documents/Public Engagement/PublicEngagementActivity.pptx
@@ -255,7 +255,7 @@
             <a:pPr rtl="0"/>
             <a:fld id="{4245C065-7973-41A8-A2CC-441A8BA3384C}" type="datetime1">
               <a:rPr lang="en-GB" smtClean="0"/>
-              <a:t>27/02/2025</a:t>
+              <a:t>01/03/2025</a:t>
             </a:fld>
             <a:endParaRPr lang="en-GB"/>
           </a:p>
@@ -437,7 +437,7 @@
             <a:fld id="{A087A586-3225-45EC-B90F-43F9676D14C2}" type="datetime1">
               <a:rPr lang="en-GB" smtClean="0"/>
               <a:pPr/>
-              <a:t>27/02/2025</a:t>
+              <a:t>01/03/2025</a:t>
             </a:fld>
             <a:endParaRPr lang="en-GB" dirty="0"/>
           </a:p>
@@ -752,7 +752,34 @@
           <a:bodyPr/>
           <a:lstStyle/>
           <a:p>
-            <a:endParaRPr lang="en-GB"/>
+            <a:r>
+              <a:rPr lang="en-GB" dirty="0"/>
+              <a:t>Good afternoon, my name is Amaan Mujawar, and today I will be presenting my project on </a:t>
+            </a:r>
+            <a:r>
+              <a:rPr lang="en-GB" b="1" dirty="0"/>
+              <a:t>Implementing an Arithmetic Unit Utilizing </a:t>
+            </a:r>
+            <a:r>
+              <a:rPr lang="en-GB" b="1" dirty="0" err="1"/>
+              <a:t>Approximae</a:t>
+            </a:r>
+            <a:r>
+              <a:rPr lang="en-GB" b="1" dirty="0"/>
+              <a:t> Computing into a RISC-V </a:t>
+            </a:r>
+            <a:r>
+              <a:rPr lang="en-GB" b="1" dirty="0" err="1"/>
+              <a:t>SoC</a:t>
+            </a:r>
+            <a:r>
+              <a:rPr lang="en-GB" dirty="0" err="1"/>
+              <a:t>.</a:t>
+            </a:r>
+            <a:r>
+              <a:rPr lang="en-GB" dirty="0"/>
+              <a:t> </a:t>
+            </a:r>
           </a:p>
         </p:txBody>
       </p:sp>
@@ -1140,6 +1167,92 @@
           <a:bodyPr/>
           <a:lstStyle/>
           <a:p>
+            <a:r>
+              <a:rPr lang="en-GB" dirty="0"/>
+              <a:t>So far, the project has achieved:</a:t>
+            </a:r>
+            <a:br>
+              <a:rPr lang="en-GB" dirty="0"/>
+            </a:br>
+            <a:r>
+              <a:rPr lang="en-GB" b="1" dirty="0"/>
+              <a:t>Benchmarking of a pipelined MAC unit</a:t>
+            </a:r>
+            <a:br>
+              <a:rPr lang="en-GB" dirty="0"/>
+            </a:br>
+            <a:r>
+              <a:rPr lang="en-GB" b="1" dirty="0"/>
+              <a:t>Implementation of Approximate Adders and Multipliers</a:t>
+            </a:r>
+            <a:br>
+              <a:rPr lang="en-GB" dirty="0"/>
+            </a:br>
+            <a:r>
+              <a:rPr lang="en-GB" b="1" dirty="0"/>
+              <a:t>Unit testing and validation of individual modules</a:t>
+            </a:r>
+            <a:endParaRPr lang="en-GB" dirty="0"/>
+          </a:p>
+          <a:p>
+            <a:r>
+              <a:rPr lang="en-GB" dirty="0"/>
+              <a:t>However, </a:t>
+            </a:r>
+            <a:r>
+              <a:rPr lang="en-GB" b="1" dirty="0"/>
+              <a:t>pending tasks</a:t>
+            </a:r>
+            <a:r>
+              <a:rPr lang="en-GB" dirty="0"/>
+              <a:t> include:</a:t>
+            </a:r>
+            <a:br>
+              <a:rPr lang="en-GB" dirty="0"/>
+            </a:br>
+            <a:r>
+              <a:rPr lang="en-GB" dirty="0"/>
+              <a:t>Full </a:t>
+            </a:r>
+            <a:r>
+              <a:rPr lang="en-GB" b="1" dirty="0"/>
+              <a:t>integration of approximate components</a:t>
+            </a:r>
+            <a:br>
+              <a:rPr lang="en-GB" dirty="0"/>
+            </a:br>
+            <a:r>
+              <a:rPr lang="en-GB" dirty="0"/>
+              <a:t>Exploring </a:t>
+            </a:r>
+            <a:r>
+              <a:rPr lang="en-GB" b="1" dirty="0"/>
+              <a:t>Fuzzy Memoization</a:t>
+            </a:r>
+            <a:r>
+              <a:rPr lang="en-GB" dirty="0"/>
+              <a:t> for further optimizations</a:t>
+            </a:r>
+            <a:br>
+              <a:rPr lang="en-GB" dirty="0"/>
+            </a:br>
+            <a:r>
+              <a:rPr lang="en-GB" dirty="0"/>
+              <a:t>Conducting </a:t>
+            </a:r>
+            <a:r>
+              <a:rPr lang="en-GB" b="1" dirty="0"/>
+              <a:t>comprehensive testing</a:t>
+            </a:r>
+            <a:r>
+              <a:rPr lang="en-GB" dirty="0"/>
+              <a:t> for power, speed, and accuracy</a:t>
+            </a:r>
+          </a:p>
+          <a:p>
+            <a:endParaRPr lang="en-GB" dirty="0"/>
+          </a:p>
+          <a:p>
             <a:endParaRPr lang="en-GB" dirty="0"/>
           </a:p>
         </p:txBody>
@@ -1224,6 +1337,102 @@
         <p:txBody>
           <a:bodyPr/>
           <a:lstStyle/>
+          <a:p>
+            <a:r>
+              <a:rPr lang="en-GB" dirty="0"/>
+              <a:t>Moving forward, the next steps will be:</a:t>
+            </a:r>
+            <a:br>
+              <a:rPr lang="en-GB" dirty="0"/>
+            </a:br>
+            <a:r>
+              <a:rPr lang="en-GB" dirty="0"/>
+              <a:t>- Completing the </a:t>
+            </a:r>
+            <a:r>
+              <a:rPr lang="en-GB" b="1" dirty="0"/>
+              <a:t>integration of approximate arithmetic units</a:t>
+            </a:r>
+            <a:br>
+              <a:rPr lang="en-GB" dirty="0"/>
+            </a:br>
+            <a:r>
+              <a:rPr lang="en-GB" dirty="0"/>
+              <a:t>- Embedding the </a:t>
+            </a:r>
+            <a:r>
+              <a:rPr lang="en-GB" b="1" dirty="0"/>
+              <a:t>MAC unit into a RISC-V SoC</a:t>
+            </a:r>
+            <a:r>
+              <a:rPr lang="en-GB" dirty="0"/>
+              <a:t> for full system testing</a:t>
+            </a:r>
+            <a:br>
+              <a:rPr lang="en-GB" dirty="0"/>
+            </a:br>
+            <a:r>
+              <a:rPr lang="en-GB" dirty="0"/>
+              <a:t>- </a:t>
+            </a:r>
+            <a:r>
+              <a:rPr lang="en-GB" b="1" dirty="0"/>
+              <a:t>Comparing performance</a:t>
+            </a:r>
+            <a:r>
+              <a:rPr lang="en-GB" dirty="0"/>
+              <a:t> against traditional MAC units</a:t>
+            </a:r>
+          </a:p>
+          <a:p>
+            <a:r>
+              <a:rPr lang="en-GB" dirty="0"/>
+              <a:t>In the </a:t>
+            </a:r>
+            <a:r>
+              <a:rPr lang="en-GB" b="1" dirty="0"/>
+              <a:t>long-term</a:t>
+            </a:r>
+            <a:r>
+              <a:rPr lang="en-GB" dirty="0"/>
+              <a:t>, we aim to:</a:t>
+            </a:r>
+            <a:br>
+              <a:rPr lang="en-GB" dirty="0"/>
+            </a:br>
+            <a:r>
+              <a:rPr lang="en-GB" dirty="0"/>
+              <a:t>- </a:t>
+            </a:r>
+            <a:r>
+              <a:rPr lang="en-GB" b="1" dirty="0"/>
+              <a:t>Explore further optimizations</a:t>
+            </a:r>
+            <a:r>
+              <a:rPr lang="en-GB" dirty="0"/>
+              <a:t> with different approximation methods</a:t>
+            </a:r>
+            <a:br>
+              <a:rPr lang="en-GB" dirty="0"/>
+            </a:br>
+            <a:r>
+              <a:rPr lang="en-GB" dirty="0"/>
+              <a:t>- Investigate applications in other </a:t>
+            </a:r>
+            <a:r>
+              <a:rPr lang="en-GB" b="1" dirty="0"/>
+              <a:t>error-tolerant domains</a:t>
+            </a:r>
+            <a:r>
+              <a:rPr lang="en-GB" dirty="0"/>
+              <a:t> such as </a:t>
+            </a:r>
+            <a:r>
+              <a:rPr lang="en-GB" b="1" dirty="0"/>
+              <a:t>AI and machine learning</a:t>
+            </a:r>
+            <a:endParaRPr lang="en-GB" dirty="0"/>
+          </a:p>
           <a:p>
             <a:endParaRPr lang="en-GB" dirty="0"/>
           </a:p>
@@ -1419,6 +1628,74 @@
           <a:bodyPr/>
           <a:lstStyle/>
           <a:p>
+            <a:r>
+              <a:rPr lang="en-GB" dirty="0"/>
+              <a:t>To summarize, this project demonstrates how </a:t>
+            </a:r>
+            <a:r>
+              <a:rPr lang="en-GB" b="1" dirty="0"/>
+              <a:t>Approximate Computing</a:t>
+            </a:r>
+            <a:r>
+              <a:rPr lang="en-GB" dirty="0"/>
+              <a:t> can be leveraged to build </a:t>
+            </a:r>
+            <a:r>
+              <a:rPr lang="en-GB" b="1" dirty="0"/>
+              <a:t>energy-efficient, high-performance arithmetic units</a:t>
+            </a:r>
+            <a:r>
+              <a:rPr lang="en-GB" dirty="0"/>
+              <a:t>. By designing an </a:t>
+            </a:r>
+            <a:r>
+              <a:rPr lang="en-GB" b="1" dirty="0"/>
+              <a:t>8-bit Approximate MAC Unit</a:t>
+            </a:r>
+            <a:r>
+              <a:rPr lang="en-GB" dirty="0"/>
+              <a:t> and integrating it into </a:t>
+            </a:r>
+            <a:r>
+              <a:rPr lang="en-GB" b="1" dirty="0"/>
+              <a:t>RISC-V SoC</a:t>
+            </a:r>
+            <a:r>
+              <a:rPr lang="en-GB" dirty="0"/>
+              <a:t>, we take a step toward addressing </a:t>
+            </a:r>
+            <a:r>
+              <a:rPr lang="en-GB" b="1" dirty="0"/>
+              <a:t>modern computational challenges</a:t>
+            </a:r>
+            <a:r>
+              <a:rPr lang="en-GB" dirty="0"/>
+              <a:t> in a </a:t>
+            </a:r>
+            <a:r>
+              <a:rPr lang="en-GB" b="1" dirty="0"/>
+              <a:t>power-efficient</a:t>
+            </a:r>
+            <a:r>
+              <a:rPr lang="en-GB" dirty="0"/>
+              <a:t> and </a:t>
+            </a:r>
+            <a:r>
+              <a:rPr lang="en-GB" b="1" dirty="0"/>
+              <a:t>scalable</a:t>
+            </a:r>
+            <a:r>
+              <a:rPr lang="en-GB" dirty="0"/>
+              <a:t> manner.</a:t>
+            </a:r>
+          </a:p>
+          <a:p>
+            <a:r>
+              <a:rPr lang="en-GB" dirty="0"/>
+              <a:t>Thank you all for your time and attention. I would be happy to take any questions.</a:t>
+            </a:r>
+          </a:p>
+          <a:p>
             <a:endParaRPr lang="en-GB" dirty="0"/>
           </a:p>
         </p:txBody>
@@ -1504,7 +1781,10 @@
           <a:bodyPr/>
           <a:lstStyle/>
           <a:p>
-            <a:endParaRPr lang="en-GB" dirty="0"/>
+            <a:r>
+              <a:rPr lang="en-GB" dirty="0"/>
+              <a:t>This work is supervised by Mr. Neil Powell at The University of Sheffield.</a:t>
+            </a:r>
           </a:p>
         </p:txBody>
       </p:sp>
@@ -1588,6 +1868,90 @@
         <p:txBody>
           <a:bodyPr/>
           <a:lstStyle/>
+          <a:p>
+            <a:r>
+              <a:rPr lang="en-GB" dirty="0"/>
+              <a:t>We live in an era where </a:t>
+            </a:r>
+            <a:r>
+              <a:rPr lang="en-GB" b="1" dirty="0"/>
+              <a:t>high-performance computing</a:t>
+            </a:r>
+            <a:r>
+              <a:rPr lang="en-GB" dirty="0"/>
+              <a:t> is essential for applications like </a:t>
+            </a:r>
+            <a:r>
+              <a:rPr lang="en-GB" b="1" dirty="0"/>
+              <a:t>machine learning, computer vision, and multimedia processing</a:t>
+            </a:r>
+            <a:r>
+              <a:rPr lang="en-GB" dirty="0"/>
+              <a:t>. However, </a:t>
+            </a:r>
+            <a:r>
+              <a:rPr lang="en-GB" b="1" dirty="0"/>
+              <a:t>traditional computing approaches</a:t>
+            </a:r>
+            <a:r>
+              <a:rPr lang="en-GB" dirty="0"/>
+              <a:t> are facing limitations due to the </a:t>
+            </a:r>
+            <a:r>
+              <a:rPr lang="en-GB" b="1" dirty="0"/>
+              <a:t>slowing down of Moore’s Law</a:t>
+            </a:r>
+            <a:r>
+              <a:rPr lang="en-GB" dirty="0"/>
+              <a:t>, making it increasingly difficult to achieve significant improvements in speed and efficiency.</a:t>
+            </a:r>
+          </a:p>
+          <a:p>
+            <a:r>
+              <a:rPr lang="en-GB" dirty="0"/>
+              <a:t>To address this, we turn to </a:t>
+            </a:r>
+            <a:r>
+              <a:rPr lang="en-GB" b="1" dirty="0"/>
+              <a:t>Approximate Computing</a:t>
+            </a:r>
+            <a:r>
+              <a:rPr lang="en-GB" dirty="0"/>
+              <a:t>—a technique that </a:t>
+            </a:r>
+            <a:r>
+              <a:rPr lang="en-GB" b="1" dirty="0"/>
+              <a:t>allows controlled errors</a:t>
+            </a:r>
+            <a:r>
+              <a:rPr lang="en-GB" dirty="0"/>
+              <a:t> in calculations, in exchange for </a:t>
+            </a:r>
+            <a:r>
+              <a:rPr lang="en-GB" b="1" dirty="0"/>
+              <a:t>higher energy efficiency and faster processing</a:t>
+            </a:r>
+            <a:r>
+              <a:rPr lang="en-GB" dirty="0"/>
+              <a:t>. This is especially useful for </a:t>
+            </a:r>
+            <a:r>
+              <a:rPr lang="en-GB" b="1" dirty="0"/>
+              <a:t>error-tolerant applications</a:t>
+            </a:r>
+            <a:r>
+              <a:rPr lang="en-GB" dirty="0"/>
+              <a:t> such as </a:t>
+            </a:r>
+            <a:r>
+              <a:rPr lang="en-GB" b="1" dirty="0"/>
+              <a:t>image processing and AI</a:t>
+            </a:r>
+            <a:r>
+              <a:rPr lang="en-GB" dirty="0"/>
+              <a:t>, where perfect accuracy is not always necessary.</a:t>
+            </a:r>
+          </a:p>
           <a:p>
             <a:endParaRPr lang="en-GB" dirty="0"/>
           </a:p>
@@ -1692,6 +2056,195 @@
           <a:bodyPr/>
           <a:lstStyle/>
           <a:p>
+            <a:r>
+              <a:rPr lang="en-GB" dirty="0"/>
+              <a:t>At the heart of this project is an </a:t>
+            </a:r>
+            <a:r>
+              <a:rPr lang="en-GB" b="1" dirty="0"/>
+              <a:t>8-bit Approximate Multiply-Accumulate (MAC) Unit</a:t>
+            </a:r>
+            <a:r>
+              <a:rPr lang="en-GB" dirty="0"/>
+              <a:t>, which is designed to improve computational efficiency while reducing power consumption.</a:t>
+            </a:r>
+          </a:p>
+          <a:p>
+            <a:r>
+              <a:rPr lang="en-GB" dirty="0"/>
+              <a:t>The </a:t>
+            </a:r>
+            <a:r>
+              <a:rPr lang="en-GB" b="1" dirty="0"/>
+              <a:t>architecture</a:t>
+            </a:r>
+            <a:r>
+              <a:rPr lang="en-GB" dirty="0"/>
+              <a:t> consists of several key components:</a:t>
+            </a:r>
+          </a:p>
+          <a:p>
+            <a:pPr>
+              <a:buFont typeface="+mj-lt"/>
+              <a:buAutoNum type="arabicPeriod"/>
+            </a:pPr>
+            <a:r>
+              <a:rPr lang="en-GB" b="1" dirty="0"/>
+              <a:t>Input Fetch Stage:</a:t>
+            </a:r>
+            <a:r>
+              <a:rPr lang="en-GB" dirty="0"/>
+              <a:t> Takes in </a:t>
+            </a:r>
+            <a:r>
+              <a:rPr lang="en-GB" b="1" dirty="0"/>
+              <a:t>8-bit operands</a:t>
+            </a:r>
+            <a:r>
+              <a:rPr lang="en-GB" dirty="0"/>
+              <a:t> and prepares them for computation.</a:t>
+            </a:r>
+          </a:p>
+          <a:p>
+            <a:pPr>
+              <a:buFont typeface="+mj-lt"/>
+              <a:buAutoNum type="arabicPeriod"/>
+            </a:pPr>
+            <a:r>
+              <a:rPr lang="en-GB" b="1" dirty="0"/>
+              <a:t>Fuzzy Memoization Block:</a:t>
+            </a:r>
+            <a:r>
+              <a:rPr lang="en-GB" dirty="0"/>
+              <a:t> Caches and reuses previously computed results to minimize redundant operations.</a:t>
+            </a:r>
+          </a:p>
+          <a:p>
+            <a:pPr>
+              <a:buFont typeface="+mj-lt"/>
+              <a:buAutoNum type="arabicPeriod"/>
+            </a:pPr>
+            <a:r>
+              <a:rPr lang="en-GB" b="1" dirty="0"/>
+              <a:t>Approximate Multiplication Stage:</a:t>
+            </a:r>
+            <a:endParaRPr lang="en-GB" dirty="0"/>
+          </a:p>
+          <a:p>
+            <a:pPr marL="742950" lvl="1" indent="-285750">
+              <a:buFont typeface="+mj-lt"/>
+              <a:buAutoNum type="arabicPeriod"/>
+            </a:pPr>
+            <a:r>
+              <a:rPr lang="en-GB" b="1" dirty="0"/>
+              <a:t>MSBs (Most Significant Bits):</a:t>
+            </a:r>
+            <a:r>
+              <a:rPr lang="en-GB" dirty="0"/>
+              <a:t> Processed using a </a:t>
+            </a:r>
+            <a:r>
+              <a:rPr lang="en-GB" b="1" dirty="0" err="1"/>
+              <a:t>Dadda</a:t>
+            </a:r>
+            <a:r>
+              <a:rPr lang="en-GB" b="1" dirty="0"/>
+              <a:t> Multiplier</a:t>
+            </a:r>
+            <a:r>
+              <a:rPr lang="en-GB" dirty="0"/>
+              <a:t> for accuracy.</a:t>
+            </a:r>
+          </a:p>
+          <a:p>
+            <a:pPr marL="742950" lvl="1" indent="-285750">
+              <a:buFont typeface="+mj-lt"/>
+              <a:buAutoNum type="arabicPeriod"/>
+            </a:pPr>
+            <a:r>
+              <a:rPr lang="en-GB" b="1" dirty="0"/>
+              <a:t>LSBs (Least Significant Bits):</a:t>
+            </a:r>
+            <a:r>
+              <a:rPr lang="en-GB" dirty="0"/>
+              <a:t> Processed using </a:t>
+            </a:r>
+            <a:r>
+              <a:rPr lang="en-GB" b="1" dirty="0"/>
+              <a:t>OR-based logic</a:t>
+            </a:r>
+            <a:r>
+              <a:rPr lang="en-GB" dirty="0"/>
+              <a:t>, reducing power consumption.</a:t>
+            </a:r>
+          </a:p>
+          <a:p>
+            <a:pPr>
+              <a:buFont typeface="+mj-lt"/>
+              <a:buAutoNum type="arabicPeriod"/>
+            </a:pPr>
+            <a:r>
+              <a:rPr lang="en-GB" b="1" dirty="0"/>
+              <a:t>Partial Product Reduction Stage:</a:t>
+            </a:r>
+            <a:r>
+              <a:rPr lang="en-GB" dirty="0"/>
+              <a:t> Uses </a:t>
+            </a:r>
+            <a:r>
+              <a:rPr lang="en-GB" b="1" dirty="0"/>
+              <a:t>compressor-based approximate multipliers</a:t>
+            </a:r>
+            <a:r>
+              <a:rPr lang="en-GB" dirty="0"/>
+              <a:t> for efficiency.</a:t>
+            </a:r>
+          </a:p>
+          <a:p>
+            <a:pPr>
+              <a:buFont typeface="+mj-lt"/>
+              <a:buAutoNum type="arabicPeriod"/>
+            </a:pPr>
+            <a:r>
+              <a:rPr lang="en-GB" b="1" dirty="0"/>
+              <a:t>Approximate Addition Stage:</a:t>
+            </a:r>
+            <a:r>
+              <a:rPr lang="en-GB" dirty="0"/>
+              <a:t> Uses </a:t>
+            </a:r>
+            <a:r>
+              <a:rPr lang="en-GB" b="1" dirty="0"/>
+              <a:t>Lower-Part OR-based Approximate Adders</a:t>
+            </a:r>
+            <a:r>
+              <a:rPr lang="en-GB" dirty="0"/>
+              <a:t> to accumulate results efficiently.</a:t>
+            </a:r>
+          </a:p>
+          <a:p>
+            <a:r>
+              <a:rPr lang="en-GB" dirty="0"/>
+              <a:t>This architecture enables us to </a:t>
+            </a:r>
+            <a:r>
+              <a:rPr lang="en-GB" b="1" dirty="0"/>
+              <a:t>trade off accuracy for improved speed and reduced power consumption</a:t>
+            </a:r>
+            <a:r>
+              <a:rPr lang="en-GB" dirty="0"/>
+              <a:t>, making it well-suited for </a:t>
+            </a:r>
+            <a:r>
+              <a:rPr lang="en-GB" b="1" dirty="0"/>
+              <a:t>low-power embedded systems</a:t>
+            </a:r>
+            <a:r>
+              <a:rPr lang="en-GB" dirty="0"/>
+              <a:t>.</a:t>
+            </a:r>
+          </a:p>
+          <a:p>
             <a:endParaRPr lang="en-GB" dirty="0"/>
           </a:p>
         </p:txBody>
@@ -1783,6 +2336,142 @@
           <a:bodyPr rtlCol="0"/>
           <a:lstStyle/>
           <a:p>
+            <a:r>
+              <a:rPr lang="en-GB" dirty="0"/>
+              <a:t>Why does this matter? Let’s compare traditional computing with approximate computing:</a:t>
+            </a:r>
+          </a:p>
+          <a:p>
+            <a:pPr>
+              <a:buFont typeface="Arial" panose="020B0604020202020204" pitchFamily="34" charset="0"/>
+              <a:buChar char="•"/>
+            </a:pPr>
+            <a:r>
+              <a:rPr lang="en-GB" b="1" dirty="0"/>
+              <a:t>Traditional computation</a:t>
+            </a:r>
+            <a:r>
+              <a:rPr lang="en-GB" dirty="0"/>
+              <a:t> prioritizes </a:t>
+            </a:r>
+            <a:r>
+              <a:rPr lang="en-GB" b="1" dirty="0"/>
+              <a:t>precision</a:t>
+            </a:r>
+            <a:r>
+              <a:rPr lang="en-GB" dirty="0"/>
+              <a:t> but at the cost of </a:t>
+            </a:r>
+            <a:r>
+              <a:rPr lang="en-GB" b="1" dirty="0"/>
+              <a:t>higher power consumption</a:t>
+            </a:r>
+            <a:r>
+              <a:rPr lang="en-GB" dirty="0"/>
+              <a:t> and </a:t>
+            </a:r>
+            <a:r>
+              <a:rPr lang="en-GB" b="1" dirty="0"/>
+              <a:t>larger chip area</a:t>
+            </a:r>
+            <a:r>
+              <a:rPr lang="en-GB" dirty="0"/>
+              <a:t>.</a:t>
+            </a:r>
+          </a:p>
+          <a:p>
+            <a:pPr>
+              <a:buFont typeface="Arial" panose="020B0604020202020204" pitchFamily="34" charset="0"/>
+              <a:buChar char="•"/>
+            </a:pPr>
+            <a:r>
+              <a:rPr lang="en-GB" b="1" dirty="0"/>
+              <a:t>Approximate computing</a:t>
+            </a:r>
+            <a:r>
+              <a:rPr lang="en-GB" dirty="0"/>
+              <a:t>, on the other hand, </a:t>
+            </a:r>
+            <a:r>
+              <a:rPr lang="en-GB" b="1" dirty="0"/>
+              <a:t>trades off some accuracy</a:t>
+            </a:r>
+            <a:r>
+              <a:rPr lang="en-GB" dirty="0"/>
+              <a:t> in exchange for </a:t>
+            </a:r>
+            <a:r>
+              <a:rPr lang="en-GB" b="1" dirty="0"/>
+              <a:t>significant energy savings</a:t>
+            </a:r>
+            <a:r>
+              <a:rPr lang="en-GB" dirty="0"/>
+              <a:t> and </a:t>
+            </a:r>
+            <a:r>
+              <a:rPr lang="en-GB" b="1" dirty="0"/>
+              <a:t>faster processing</a:t>
+            </a:r>
+            <a:r>
+              <a:rPr lang="en-GB" dirty="0"/>
+              <a:t>.</a:t>
+            </a:r>
+          </a:p>
+          <a:p>
+            <a:r>
+              <a:rPr lang="en-GB" dirty="0"/>
+              <a:t>This makes it ideal for applications such as:</a:t>
+            </a:r>
+            <a:br>
+              <a:rPr lang="en-GB" dirty="0"/>
+            </a:br>
+            <a:r>
+              <a:rPr lang="en-GB" b="1" dirty="0"/>
+              <a:t>Image processing</a:t>
+            </a:r>
+            <a:r>
+              <a:rPr lang="en-GB" dirty="0"/>
+              <a:t> (denoising, compression)</a:t>
+            </a:r>
+            <a:br>
+              <a:rPr lang="en-GB" dirty="0"/>
+            </a:br>
+            <a:r>
+              <a:rPr lang="en-GB" b="1" dirty="0"/>
+              <a:t>Machine learning</a:t>
+            </a:r>
+            <a:br>
+              <a:rPr lang="en-GB" dirty="0"/>
+            </a:br>
+            <a:r>
+              <a:rPr lang="en-GB" b="1" dirty="0"/>
+              <a:t>Signal processing in embedded systems</a:t>
+            </a:r>
+            <a:endParaRPr lang="en-GB" dirty="0"/>
+          </a:p>
+          <a:p>
+            <a:r>
+              <a:rPr lang="en-GB" dirty="0"/>
+              <a:t>By leveraging approximate computing, this project contributes to the development of </a:t>
+            </a:r>
+            <a:r>
+              <a:rPr lang="en-GB" b="1" dirty="0"/>
+              <a:t>energy-efficient digital systems</a:t>
+            </a:r>
+            <a:r>
+              <a:rPr lang="en-GB" dirty="0"/>
+              <a:t> for </a:t>
+            </a:r>
+            <a:r>
+              <a:rPr lang="en-GB" b="1" dirty="0"/>
+              <a:t>future computing technologies</a:t>
+            </a:r>
+            <a:r>
+              <a:rPr lang="en-GB" dirty="0"/>
+              <a:t>.</a:t>
+            </a:r>
+          </a:p>
+          <a:p>
             <a:pPr rtl="0"/>
             <a:endParaRPr lang="en-GB" dirty="0"/>
           </a:p>
@@ -1869,7 +2558,93 @@
           <a:bodyPr/>
           <a:lstStyle/>
           <a:p>
+            <a:r>
+              <a:rPr lang="en-GB" dirty="0"/>
+              <a:t>The primary aim of this project is to </a:t>
+            </a:r>
+            <a:r>
+              <a:rPr lang="en-GB" b="1" dirty="0"/>
+              <a:t>design and implement an 8-bit MAC unit</a:t>
+            </a:r>
+            <a:r>
+              <a:rPr lang="en-GB" dirty="0"/>
+              <a:t> using approximate computing techniques and integrate it into a </a:t>
+            </a:r>
+            <a:r>
+              <a:rPr lang="en-GB" b="1" dirty="0"/>
+              <a:t>RISC-V </a:t>
+            </a:r>
+            <a:r>
+              <a:rPr lang="en-GB" b="1" dirty="0" err="1"/>
+              <a:t>SoC</a:t>
+            </a:r>
+            <a:r>
+              <a:rPr lang="en-GB" dirty="0" err="1"/>
+              <a:t>.</a:t>
+            </a:r>
+            <a:r>
+              <a:rPr lang="en-GB" dirty="0"/>
+              <a:t> To achieve this, we set the following objectives:</a:t>
+            </a:r>
+            <a:br>
+              <a:rPr lang="en-GB" dirty="0"/>
+            </a:br>
+            <a:r>
+              <a:rPr lang="en-GB" dirty="0"/>
+              <a:t>- Design and simulate the MAC unit using </a:t>
+            </a:r>
+            <a:r>
+              <a:rPr lang="en-GB" b="1" dirty="0"/>
+              <a:t>Verilog on FPGA</a:t>
+            </a:r>
+            <a:br>
+              <a:rPr lang="en-GB" dirty="0"/>
+            </a:br>
+            <a:r>
+              <a:rPr lang="en-GB" dirty="0"/>
+              <a:t>- Integrate the MAC unit into a </a:t>
+            </a:r>
+            <a:r>
+              <a:rPr lang="en-GB" b="1" dirty="0"/>
+              <a:t>RISC-V SoC</a:t>
+            </a:r>
+            <a:br>
+              <a:rPr lang="en-GB" dirty="0"/>
+            </a:br>
+            <a:r>
+              <a:rPr lang="en-GB" dirty="0"/>
+              <a:t>- Evaluate </a:t>
+            </a:r>
+            <a:r>
+              <a:rPr lang="en-GB" b="1" dirty="0"/>
+              <a:t>power consumption, accuracy, and speed</a:t>
+            </a:r>
+            <a:br>
+              <a:rPr lang="en-GB" dirty="0"/>
+            </a:br>
+            <a:r>
+              <a:rPr lang="en-GB" dirty="0"/>
+              <a:t>- Validate the design through </a:t>
+            </a:r>
+            <a:r>
+              <a:rPr lang="en-GB" b="1" dirty="0"/>
+              <a:t>unit testing and FPGA simulations</a:t>
+            </a:r>
             <a:endParaRPr lang="en-GB" dirty="0"/>
+          </a:p>
+          <a:p>
+            <a:r>
+              <a:rPr lang="en-GB" dirty="0"/>
+              <a:t>This structured approach ensures that we can balance </a:t>
+            </a:r>
+            <a:r>
+              <a:rPr lang="en-GB" b="1" dirty="0"/>
+              <a:t>accuracy, power consumption, and computational speed</a:t>
+            </a:r>
+            <a:r>
+              <a:rPr lang="en-GB" dirty="0"/>
+              <a:t> effectively.</a:t>
+            </a:r>
           </a:p>
         </p:txBody>
       </p:sp>
@@ -1953,6 +2728,93 @@
         <p:txBody>
           <a:bodyPr/>
           <a:lstStyle/>
+          <a:p>
+            <a:r>
+              <a:rPr lang="en-GB" dirty="0"/>
+              <a:t>The </a:t>
+            </a:r>
+            <a:r>
+              <a:rPr lang="en-GB" b="1" dirty="0"/>
+              <a:t>key challenge</a:t>
+            </a:r>
+            <a:r>
+              <a:rPr lang="en-GB" dirty="0"/>
+              <a:t> in this project is achieving a </a:t>
+            </a:r>
+            <a:r>
+              <a:rPr lang="en-GB" b="1" dirty="0"/>
+              <a:t>balance between accuracy, power, and speed</a:t>
+            </a:r>
+            <a:r>
+              <a:rPr lang="en-GB" dirty="0"/>
+              <a:t>.</a:t>
+            </a:r>
+          </a:p>
+          <a:p>
+            <a:r>
+              <a:rPr lang="en-GB" dirty="0"/>
+              <a:t>To address this, we implemented:</a:t>
+            </a:r>
+            <a:br>
+              <a:rPr lang="en-GB" dirty="0"/>
+            </a:br>
+            <a:r>
+              <a:rPr lang="en-GB" b="1" dirty="0"/>
+              <a:t>Approximate Adders and Multipliers</a:t>
+            </a:r>
+            <a:r>
+              <a:rPr lang="en-GB" dirty="0"/>
+              <a:t> based on existing research</a:t>
+            </a:r>
+            <a:br>
+              <a:rPr lang="en-GB" dirty="0"/>
+            </a:br>
+            <a:r>
+              <a:rPr lang="en-GB" b="1" dirty="0"/>
+              <a:t>Verilog for implementation</a:t>
+            </a:r>
+            <a:r>
+              <a:rPr lang="en-GB" dirty="0"/>
+              <a:t> and </a:t>
+            </a:r>
+            <a:r>
+              <a:rPr lang="en-GB" b="1" dirty="0"/>
+              <a:t>FPGA-based simulations</a:t>
+            </a:r>
+            <a:br>
+              <a:rPr lang="en-GB" dirty="0"/>
+            </a:br>
+            <a:r>
+              <a:rPr lang="en-GB" b="1" dirty="0"/>
+              <a:t>Performance evaluations</a:t>
+            </a:r>
+            <a:r>
+              <a:rPr lang="en-GB" dirty="0"/>
+              <a:t> to compare with traditional MAC units</a:t>
+            </a:r>
+          </a:p>
+          <a:p>
+            <a:r>
+              <a:rPr lang="en-GB" dirty="0"/>
+              <a:t>The </a:t>
+            </a:r>
+            <a:r>
+              <a:rPr lang="en-GB" b="1" dirty="0"/>
+              <a:t>expected outcome</a:t>
+            </a:r>
+            <a:r>
+              <a:rPr lang="en-GB" dirty="0"/>
+              <a:t> is a </a:t>
+            </a:r>
+            <a:r>
+              <a:rPr lang="en-GB" b="1" dirty="0"/>
+              <a:t>highly efficient arithmetic unit</a:t>
+            </a:r>
+            <a:r>
+              <a:rPr lang="en-GB" dirty="0"/>
+              <a:t> that minimizes power consumption while maintaining acceptable accuracy levels.</a:t>
+            </a:r>
+          </a:p>
           <a:p>
             <a:endParaRPr lang="en-GB" dirty="0"/>
           </a:p>
@@ -24366,15 +25228,6 @@
 </file>
 
 <file path=customXml/item1.xml><?xml version="1.0" encoding="utf-8"?>
-<?mso-contentType ?>
-<FormTemplates xmlns="http://schemas.microsoft.com/sharepoint/v3/contenttype/forms">
-  <Display>DocumentLibraryForm</Display>
-  <Edit>DocumentLibraryForm</Edit>
-  <New>DocumentLibraryForm</New>
-</FormTemplates>
-</file>
-
-<file path=customXml/item2.xml><?xml version="1.0" encoding="utf-8"?>
 <p:properties xmlns:p="http://schemas.microsoft.com/office/2006/metadata/properties" xmlns:xsi="http://www.w3.org/2001/XMLSchema-instance" xmlns:pc="http://schemas.microsoft.com/office/infopath/2007/PartnerControls">
   <documentManagement>
     <_ip_UnifiedCompliancePolicyUIAction xmlns="http://schemas.microsoft.com/sharepoint/v3" xsi:nil="true"/>
@@ -24391,6 +25244,15 @@
     <MediaServiceKeyPoints xmlns="71af3243-3dd4-4a8d-8c0d-dd76da1f02a5" xsi:nil="true"/>
   </documentManagement>
 </p:properties>
+</file>
+
+<file path=customXml/item2.xml><?xml version="1.0" encoding="utf-8"?>
+<?mso-contentType ?>
+<FormTemplates xmlns="http://schemas.microsoft.com/sharepoint/v3/contenttype/forms">
+  <Display>DocumentLibraryForm</Display>
+  <Edit>DocumentLibraryForm</Edit>
+  <New>DocumentLibraryForm</New>
+</FormTemplates>
 </file>
 
 <file path=customXml/item3.xml><?xml version="1.0" encoding="utf-8"?>
@@ -24670,14 +25532,6 @@
 </file>
 
 <file path=customXml/itemProps1.xml><?xml version="1.0" encoding="utf-8"?>
-<ds:datastoreItem xmlns:ds="http://schemas.openxmlformats.org/officeDocument/2006/customXml" ds:itemID="{2D446390-8521-40A2-A462-EA068123BED9}">
-  <ds:schemaRefs>
-    <ds:schemaRef ds:uri="http://schemas.microsoft.com/sharepoint/v3/contenttype/forms"/>
-  </ds:schemaRefs>
-</ds:datastoreItem>
-</file>
-
-<file path=customXml/itemProps2.xml><?xml version="1.0" encoding="utf-8"?>
 <ds:datastoreItem xmlns:ds="http://schemas.openxmlformats.org/officeDocument/2006/customXml" ds:itemID="{B5BA3906-9696-4247-AC0D-DD5C26B2A70A}">
   <ds:schemaRefs>
     <ds:schemaRef ds:uri="http://schemas.microsoft.com/office/2006/metadata/properties"/>
@@ -24685,6 +25539,14 @@
     <ds:schemaRef ds:uri="http://schemas.microsoft.com/sharepoint/v3"/>
     <ds:schemaRef ds:uri="71af3243-3dd4-4a8d-8c0d-dd76da1f02a5"/>
     <ds:schemaRef ds:uri="230e9df3-be65-4c73-a93b-d1236ebd677e"/>
+  </ds:schemaRefs>
+</ds:datastoreItem>
+</file>
+
+<file path=customXml/itemProps2.xml><?xml version="1.0" encoding="utf-8"?>
+<ds:datastoreItem xmlns:ds="http://schemas.openxmlformats.org/officeDocument/2006/customXml" ds:itemID="{2D446390-8521-40A2-A462-EA068123BED9}">
+  <ds:schemaRefs>
+    <ds:schemaRef ds:uri="http://schemas.microsoft.com/sharepoint/v3/contenttype/forms"/>
   </ds:schemaRefs>
 </ds:datastoreItem>
 </file>

</xml_diff>